<commit_message>
integrate unzip in get operation relocate tmp/ to just in images/
</commit_message>
<xml_diff>
--- a/images/network.pptx
+++ b/images/network.pptx
@@ -6,6 +6,7 @@
   </p:sldMasterIdLst>
   <p:sldIdLst>
     <p:sldId id="256" r:id="rId2"/>
+    <p:sldId id="257" r:id="rId3"/>
   </p:sldIdLst>
   <p:sldSz cx="12192000" cy="6858000"/>
   <p:notesSz cx="6858000" cy="9144000"/>
@@ -243,7 +244,7 @@
           <a:p>
             <a:fld id="{0EC95C33-DAB6-4546-B06D-886B2BAD356F}" type="datetimeFigureOut">
               <a:rPr lang="en-US" smtClean="0"/>
-              <a:t>8/10/18</a:t>
+              <a:t>8/15/18</a:t>
             </a:fld>
             <a:endParaRPr lang="en-US"/>
           </a:p>
@@ -413,7 +414,7 @@
           <a:p>
             <a:fld id="{0EC95C33-DAB6-4546-B06D-886B2BAD356F}" type="datetimeFigureOut">
               <a:rPr lang="en-US" smtClean="0"/>
-              <a:t>8/10/18</a:t>
+              <a:t>8/15/18</a:t>
             </a:fld>
             <a:endParaRPr lang="en-US"/>
           </a:p>
@@ -593,7 +594,7 @@
           <a:p>
             <a:fld id="{0EC95C33-DAB6-4546-B06D-886B2BAD356F}" type="datetimeFigureOut">
               <a:rPr lang="en-US" smtClean="0"/>
-              <a:t>8/10/18</a:t>
+              <a:t>8/15/18</a:t>
             </a:fld>
             <a:endParaRPr lang="en-US"/>
           </a:p>
@@ -763,7 +764,7 @@
           <a:p>
             <a:fld id="{0EC95C33-DAB6-4546-B06D-886B2BAD356F}" type="datetimeFigureOut">
               <a:rPr lang="en-US" smtClean="0"/>
-              <a:t>8/10/18</a:t>
+              <a:t>8/15/18</a:t>
             </a:fld>
             <a:endParaRPr lang="en-US"/>
           </a:p>
@@ -1009,7 +1010,7 @@
           <a:p>
             <a:fld id="{0EC95C33-DAB6-4546-B06D-886B2BAD356F}" type="datetimeFigureOut">
               <a:rPr lang="en-US" smtClean="0"/>
-              <a:t>8/10/18</a:t>
+              <a:t>8/15/18</a:t>
             </a:fld>
             <a:endParaRPr lang="en-US"/>
           </a:p>
@@ -1241,7 +1242,7 @@
           <a:p>
             <a:fld id="{0EC95C33-DAB6-4546-B06D-886B2BAD356F}" type="datetimeFigureOut">
               <a:rPr lang="en-US" smtClean="0"/>
-              <a:t>8/10/18</a:t>
+              <a:t>8/15/18</a:t>
             </a:fld>
             <a:endParaRPr lang="en-US"/>
           </a:p>
@@ -1608,7 +1609,7 @@
           <a:p>
             <a:fld id="{0EC95C33-DAB6-4546-B06D-886B2BAD356F}" type="datetimeFigureOut">
               <a:rPr lang="en-US" smtClean="0"/>
-              <a:t>8/10/18</a:t>
+              <a:t>8/15/18</a:t>
             </a:fld>
             <a:endParaRPr lang="en-US"/>
           </a:p>
@@ -1726,7 +1727,7 @@
           <a:p>
             <a:fld id="{0EC95C33-DAB6-4546-B06D-886B2BAD356F}" type="datetimeFigureOut">
               <a:rPr lang="en-US" smtClean="0"/>
-              <a:t>8/10/18</a:t>
+              <a:t>8/15/18</a:t>
             </a:fld>
             <a:endParaRPr lang="en-US"/>
           </a:p>
@@ -1821,7 +1822,7 @@
           <a:p>
             <a:fld id="{0EC95C33-DAB6-4546-B06D-886B2BAD356F}" type="datetimeFigureOut">
               <a:rPr lang="en-US" smtClean="0"/>
-              <a:t>8/10/18</a:t>
+              <a:t>8/15/18</a:t>
             </a:fld>
             <a:endParaRPr lang="en-US"/>
           </a:p>
@@ -2098,7 +2099,7 @@
           <a:p>
             <a:fld id="{0EC95C33-DAB6-4546-B06D-886B2BAD356F}" type="datetimeFigureOut">
               <a:rPr lang="en-US" smtClean="0"/>
-              <a:t>8/10/18</a:t>
+              <a:t>8/15/18</a:t>
             </a:fld>
             <a:endParaRPr lang="en-US"/>
           </a:p>
@@ -2351,7 +2352,7 @@
           <a:p>
             <a:fld id="{0EC95C33-DAB6-4546-B06D-886B2BAD356F}" type="datetimeFigureOut">
               <a:rPr lang="en-US" smtClean="0"/>
-              <a:t>8/10/18</a:t>
+              <a:t>8/15/18</a:t>
             </a:fld>
             <a:endParaRPr lang="en-US"/>
           </a:p>
@@ -2564,7 +2565,7 @@
           <a:p>
             <a:fld id="{0EC95C33-DAB6-4546-B06D-886B2BAD356F}" type="datetimeFigureOut">
               <a:rPr lang="en-US" smtClean="0"/>
-              <a:t>8/10/18</a:t>
+              <a:t>8/15/18</a:t>
             </a:fld>
             <a:endParaRPr lang="en-US"/>
           </a:p>
@@ -3299,8 +3300,8 @@
           <a:p>
             <a:pPr algn="ctr"/>
             <a:r>
-              <a:rPr lang="en-US" smtClean="0"/>
-              <a:t>Router</a:t>
+              <a:rPr lang="en-US" dirty="0" smtClean="0"/>
+              <a:t>Network Switch</a:t>
             </a:r>
             <a:endParaRPr lang="en-US" dirty="0"/>
           </a:p>
@@ -3838,6 +3839,3697 @@
     <p:extLst>
       <p:ext uri="{BB962C8B-B14F-4D97-AF65-F5344CB8AC3E}">
         <p14:creationId xmlns:p14="http://schemas.microsoft.com/office/powerpoint/2010/main" val="11541399"/>
+      </p:ext>
+    </p:extLst>
+  </p:cSld>
+  <p:clrMapOvr>
+    <a:masterClrMapping/>
+  </p:clrMapOvr>
+</p:sld>
+</file>
+
+<file path=ppt/slides/slide2.xml><?xml version="1.0" encoding="utf-8"?>
+<p:sld xmlns:a="http://schemas.openxmlformats.org/drawingml/2006/main" xmlns:r="http://schemas.openxmlformats.org/officeDocument/2006/relationships" xmlns:p="http://schemas.openxmlformats.org/presentationml/2006/main">
+  <p:cSld>
+    <p:spTree>
+      <p:nvGrpSpPr>
+        <p:cNvPr id="1" name=""/>
+        <p:cNvGrpSpPr/>
+        <p:nvPr/>
+      </p:nvGrpSpPr>
+      <p:grpSpPr>
+        <a:xfrm>
+          <a:off x="0" y="0"/>
+          <a:ext cx="0" cy="0"/>
+          <a:chOff x="0" y="0"/>
+          <a:chExt cx="0" cy="0"/>
+        </a:xfrm>
+      </p:grpSpPr>
+      <p:sp>
+        <p:nvSpPr>
+          <p:cNvPr id="16" name="Rounded Rectangle 15"/>
+          <p:cNvSpPr/>
+          <p:nvPr/>
+        </p:nvSpPr>
+        <p:spPr>
+          <a:xfrm>
+            <a:off x="529441" y="2227614"/>
+            <a:ext cx="1360714" cy="707572"/>
+          </a:xfrm>
+          <a:prstGeom prst="roundRect">
+            <a:avLst/>
+          </a:prstGeom>
+          <a:solidFill>
+            <a:schemeClr val="accent3">
+              <a:lumMod val="40000"/>
+              <a:lumOff val="60000"/>
+            </a:schemeClr>
+          </a:solidFill>
+        </p:spPr>
+        <p:style>
+          <a:lnRef idx="2">
+            <a:schemeClr val="accent1">
+              <a:shade val="50000"/>
+            </a:schemeClr>
+          </a:lnRef>
+          <a:fillRef idx="1">
+            <a:schemeClr val="accent1"/>
+          </a:fillRef>
+          <a:effectRef idx="0">
+            <a:schemeClr val="accent1"/>
+          </a:effectRef>
+          <a:fontRef idx="minor">
+            <a:schemeClr val="lt1"/>
+          </a:fontRef>
+        </p:style>
+        <p:txBody>
+          <a:bodyPr rtlCol="0" anchor="ctr"/>
+          <a:lstStyle/>
+          <a:p>
+            <a:pPr algn="ctr"/>
+            <a:r>
+              <a:rPr lang="en-US" dirty="0" smtClean="0">
+                <a:solidFill>
+                  <a:schemeClr val="tx1"/>
+                </a:solidFill>
+              </a:rPr>
+              <a:t>Laptop</a:t>
+            </a:r>
+            <a:endParaRPr lang="en-US" dirty="0">
+              <a:solidFill>
+                <a:schemeClr val="tx1"/>
+              </a:solidFill>
+            </a:endParaRPr>
+          </a:p>
+        </p:txBody>
+      </p:sp>
+      <p:sp>
+        <p:nvSpPr>
+          <p:cNvPr id="17" name="Rounded Rectangle 16"/>
+          <p:cNvSpPr/>
+          <p:nvPr/>
+        </p:nvSpPr>
+        <p:spPr>
+          <a:xfrm>
+            <a:off x="529441" y="1405746"/>
+            <a:ext cx="1360714" cy="410934"/>
+          </a:xfrm>
+          <a:prstGeom prst="roundRect">
+            <a:avLst/>
+          </a:prstGeom>
+          <a:solidFill>
+            <a:schemeClr val="accent1"/>
+          </a:solidFill>
+        </p:spPr>
+        <p:style>
+          <a:lnRef idx="2">
+            <a:schemeClr val="accent1">
+              <a:shade val="50000"/>
+            </a:schemeClr>
+          </a:lnRef>
+          <a:fillRef idx="1">
+            <a:schemeClr val="accent1"/>
+          </a:fillRef>
+          <a:effectRef idx="0">
+            <a:schemeClr val="accent1"/>
+          </a:effectRef>
+          <a:fontRef idx="minor">
+            <a:schemeClr val="lt1"/>
+          </a:fontRef>
+        </p:style>
+        <p:txBody>
+          <a:bodyPr rtlCol="0" anchor="ctr"/>
+          <a:lstStyle/>
+          <a:p>
+            <a:pPr algn="ctr"/>
+            <a:r>
+              <a:rPr lang="en-US" dirty="0" err="1" smtClean="0"/>
+              <a:t>Wifi</a:t>
+            </a:r>
+            <a:endParaRPr lang="en-US" dirty="0"/>
+          </a:p>
+        </p:txBody>
+      </p:sp>
+      <p:cxnSp>
+        <p:nvCxnSpPr>
+          <p:cNvPr id="20" name="Straight Arrow Connector 19"/>
+          <p:cNvCxnSpPr/>
+          <p:nvPr/>
+        </p:nvCxnSpPr>
+        <p:spPr>
+          <a:xfrm>
+            <a:off x="1209798" y="1798743"/>
+            <a:ext cx="0" cy="430233"/>
+          </a:xfrm>
+          <a:prstGeom prst="straightConnector1">
+            <a:avLst/>
+          </a:prstGeom>
+          <a:ln>
+            <a:headEnd type="triangle"/>
+            <a:tailEnd type="triangle"/>
+          </a:ln>
+        </p:spPr>
+        <p:style>
+          <a:lnRef idx="1">
+            <a:schemeClr val="accent1"/>
+          </a:lnRef>
+          <a:fillRef idx="0">
+            <a:schemeClr val="accent1"/>
+          </a:fillRef>
+          <a:effectRef idx="0">
+            <a:schemeClr val="accent1"/>
+          </a:effectRef>
+          <a:fontRef idx="minor">
+            <a:schemeClr val="tx1"/>
+          </a:fontRef>
+        </p:style>
+      </p:cxnSp>
+      <p:grpSp>
+        <p:nvGrpSpPr>
+          <p:cNvPr id="22" name="Group 21"/>
+          <p:cNvGrpSpPr/>
+          <p:nvPr/>
+        </p:nvGrpSpPr>
+        <p:grpSpPr>
+          <a:xfrm>
+            <a:off x="2728356" y="1405747"/>
+            <a:ext cx="2706674" cy="2097742"/>
+            <a:chOff x="2728355" y="1405746"/>
+            <a:chExt cx="6173191" cy="3514351"/>
+          </a:xfrm>
+        </p:grpSpPr>
+        <p:sp>
+          <p:nvSpPr>
+            <p:cNvPr id="4" name="Rounded Rectangle 3"/>
+            <p:cNvSpPr/>
+            <p:nvPr/>
+          </p:nvSpPr>
+          <p:spPr>
+            <a:xfrm>
+              <a:off x="2728355" y="4206586"/>
+              <a:ext cx="1360714" cy="707572"/>
+            </a:xfrm>
+            <a:prstGeom prst="roundRect">
+              <a:avLst/>
+            </a:prstGeom>
+            <a:solidFill>
+              <a:schemeClr val="accent3">
+                <a:lumMod val="40000"/>
+                <a:lumOff val="60000"/>
+              </a:schemeClr>
+            </a:solidFill>
+          </p:spPr>
+          <p:style>
+            <a:lnRef idx="2">
+              <a:schemeClr val="accent1">
+                <a:shade val="50000"/>
+              </a:schemeClr>
+            </a:lnRef>
+            <a:fillRef idx="1">
+              <a:schemeClr val="accent1"/>
+            </a:fillRef>
+            <a:effectRef idx="0">
+              <a:schemeClr val="accent1"/>
+            </a:effectRef>
+            <a:fontRef idx="minor">
+              <a:schemeClr val="lt1"/>
+            </a:fontRef>
+          </p:style>
+          <p:txBody>
+            <a:bodyPr rtlCol="0" anchor="ctr"/>
+            <a:lstStyle/>
+            <a:p>
+              <a:pPr algn="ctr"/>
+              <a:r>
+                <a:rPr lang="en-US" sz="800" smtClean="0">
+                  <a:solidFill>
+                    <a:schemeClr val="tx1"/>
+                  </a:solidFill>
+                </a:rPr>
+                <a:t>PI Worker</a:t>
+              </a:r>
+              <a:endParaRPr lang="en-US" sz="800">
+                <a:solidFill>
+                  <a:schemeClr val="tx1"/>
+                </a:solidFill>
+              </a:endParaRPr>
+            </a:p>
+          </p:txBody>
+        </p:sp>
+        <p:sp>
+          <p:nvSpPr>
+            <p:cNvPr id="5" name="Rounded Rectangle 4"/>
+            <p:cNvSpPr/>
+            <p:nvPr/>
+          </p:nvSpPr>
+          <p:spPr>
+            <a:xfrm>
+              <a:off x="2728355" y="2227614"/>
+              <a:ext cx="1360714" cy="707572"/>
+            </a:xfrm>
+            <a:prstGeom prst="roundRect">
+              <a:avLst/>
+            </a:prstGeom>
+            <a:solidFill>
+              <a:schemeClr val="accent3">
+                <a:lumMod val="40000"/>
+                <a:lumOff val="60000"/>
+              </a:schemeClr>
+            </a:solidFill>
+          </p:spPr>
+          <p:style>
+            <a:lnRef idx="2">
+              <a:schemeClr val="accent1">
+                <a:shade val="50000"/>
+              </a:schemeClr>
+            </a:lnRef>
+            <a:fillRef idx="1">
+              <a:schemeClr val="accent1"/>
+            </a:fillRef>
+            <a:effectRef idx="0">
+              <a:schemeClr val="accent1"/>
+            </a:effectRef>
+            <a:fontRef idx="minor">
+              <a:schemeClr val="lt1"/>
+            </a:fontRef>
+          </p:style>
+          <p:txBody>
+            <a:bodyPr rtlCol="0" anchor="ctr"/>
+            <a:lstStyle/>
+            <a:p>
+              <a:pPr algn="ctr"/>
+              <a:r>
+                <a:rPr lang="en-US" sz="800" smtClean="0">
+                  <a:solidFill>
+                    <a:schemeClr val="tx1"/>
+                  </a:solidFill>
+                </a:rPr>
+                <a:t>PI Master </a:t>
+              </a:r>
+              <a:endParaRPr lang="en-US" sz="800" dirty="0">
+                <a:solidFill>
+                  <a:schemeClr val="tx1"/>
+                </a:solidFill>
+              </a:endParaRPr>
+            </a:p>
+          </p:txBody>
+        </p:sp>
+        <p:sp>
+          <p:nvSpPr>
+            <p:cNvPr id="6" name="Rounded Rectangle 5"/>
+            <p:cNvSpPr/>
+            <p:nvPr/>
+          </p:nvSpPr>
+          <p:spPr>
+            <a:xfrm>
+              <a:off x="7540832" y="4206586"/>
+              <a:ext cx="1360714" cy="707572"/>
+            </a:xfrm>
+            <a:prstGeom prst="roundRect">
+              <a:avLst/>
+            </a:prstGeom>
+            <a:solidFill>
+              <a:schemeClr val="accent3">
+                <a:lumMod val="40000"/>
+                <a:lumOff val="60000"/>
+              </a:schemeClr>
+            </a:solidFill>
+          </p:spPr>
+          <p:style>
+            <a:lnRef idx="2">
+              <a:schemeClr val="accent1">
+                <a:shade val="50000"/>
+              </a:schemeClr>
+            </a:lnRef>
+            <a:fillRef idx="1">
+              <a:schemeClr val="accent1"/>
+            </a:fillRef>
+            <a:effectRef idx="0">
+              <a:schemeClr val="accent1"/>
+            </a:effectRef>
+            <a:fontRef idx="minor">
+              <a:schemeClr val="lt1"/>
+            </a:fontRef>
+          </p:style>
+          <p:txBody>
+            <a:bodyPr rtlCol="0" anchor="ctr"/>
+            <a:lstStyle/>
+            <a:p>
+              <a:pPr algn="ctr"/>
+              <a:r>
+                <a:rPr lang="en-US" sz="800" smtClean="0">
+                  <a:solidFill>
+                    <a:schemeClr val="tx1"/>
+                  </a:solidFill>
+                </a:rPr>
+                <a:t>PI Worker</a:t>
+              </a:r>
+              <a:endParaRPr lang="en-US" sz="800">
+                <a:solidFill>
+                  <a:schemeClr val="tx1"/>
+                </a:solidFill>
+              </a:endParaRPr>
+            </a:p>
+          </p:txBody>
+        </p:sp>
+        <p:sp>
+          <p:nvSpPr>
+            <p:cNvPr id="7" name="Rounded Rectangle 6"/>
+            <p:cNvSpPr/>
+            <p:nvPr/>
+          </p:nvSpPr>
+          <p:spPr>
+            <a:xfrm>
+              <a:off x="5936673" y="4212525"/>
+              <a:ext cx="1360714" cy="707572"/>
+            </a:xfrm>
+            <a:prstGeom prst="roundRect">
+              <a:avLst/>
+            </a:prstGeom>
+            <a:solidFill>
+              <a:schemeClr val="accent3">
+                <a:lumMod val="40000"/>
+                <a:lumOff val="60000"/>
+              </a:schemeClr>
+            </a:solidFill>
+          </p:spPr>
+          <p:style>
+            <a:lnRef idx="2">
+              <a:schemeClr val="accent1">
+                <a:shade val="50000"/>
+              </a:schemeClr>
+            </a:lnRef>
+            <a:fillRef idx="1">
+              <a:schemeClr val="accent1"/>
+            </a:fillRef>
+            <a:effectRef idx="0">
+              <a:schemeClr val="accent1"/>
+            </a:effectRef>
+            <a:fontRef idx="minor">
+              <a:schemeClr val="lt1"/>
+            </a:fontRef>
+          </p:style>
+          <p:txBody>
+            <a:bodyPr rtlCol="0" anchor="ctr"/>
+            <a:lstStyle/>
+            <a:p>
+              <a:pPr algn="ctr"/>
+              <a:r>
+                <a:rPr lang="en-US" sz="800" smtClean="0">
+                  <a:solidFill>
+                    <a:schemeClr val="tx1"/>
+                  </a:solidFill>
+                </a:rPr>
+                <a:t>PI Worker</a:t>
+              </a:r>
+              <a:endParaRPr lang="en-US" sz="800">
+                <a:solidFill>
+                  <a:schemeClr val="tx1"/>
+                </a:solidFill>
+              </a:endParaRPr>
+            </a:p>
+          </p:txBody>
+        </p:sp>
+        <p:sp>
+          <p:nvSpPr>
+            <p:cNvPr id="8" name="Rounded Rectangle 7"/>
+            <p:cNvSpPr/>
+            <p:nvPr/>
+          </p:nvSpPr>
+          <p:spPr>
+            <a:xfrm>
+              <a:off x="4332514" y="4206586"/>
+              <a:ext cx="1360714" cy="707572"/>
+            </a:xfrm>
+            <a:prstGeom prst="roundRect">
+              <a:avLst/>
+            </a:prstGeom>
+            <a:solidFill>
+              <a:schemeClr val="accent3">
+                <a:lumMod val="40000"/>
+                <a:lumOff val="60000"/>
+              </a:schemeClr>
+            </a:solidFill>
+          </p:spPr>
+          <p:style>
+            <a:lnRef idx="2">
+              <a:schemeClr val="accent1">
+                <a:shade val="50000"/>
+              </a:schemeClr>
+            </a:lnRef>
+            <a:fillRef idx="1">
+              <a:schemeClr val="accent1"/>
+            </a:fillRef>
+            <a:effectRef idx="0">
+              <a:schemeClr val="accent1"/>
+            </a:effectRef>
+            <a:fontRef idx="minor">
+              <a:schemeClr val="lt1"/>
+            </a:fontRef>
+          </p:style>
+          <p:txBody>
+            <a:bodyPr rtlCol="0" anchor="ctr"/>
+            <a:lstStyle/>
+            <a:p>
+              <a:pPr algn="ctr"/>
+              <a:r>
+                <a:rPr lang="en-US" sz="800" smtClean="0">
+                  <a:solidFill>
+                    <a:schemeClr val="tx1"/>
+                  </a:solidFill>
+                </a:rPr>
+                <a:t>PI Worker</a:t>
+              </a:r>
+              <a:endParaRPr lang="en-US" sz="800">
+                <a:solidFill>
+                  <a:schemeClr val="tx1"/>
+                </a:solidFill>
+              </a:endParaRPr>
+            </a:p>
+          </p:txBody>
+        </p:sp>
+        <p:sp>
+          <p:nvSpPr>
+            <p:cNvPr id="9" name="Rounded Rectangle 8"/>
+            <p:cNvSpPr/>
+            <p:nvPr/>
+          </p:nvSpPr>
+          <p:spPr>
+            <a:xfrm>
+              <a:off x="2728355" y="3365419"/>
+              <a:ext cx="6173191" cy="410934"/>
+            </a:xfrm>
+            <a:prstGeom prst="roundRect">
+              <a:avLst/>
+            </a:prstGeom>
+            <a:solidFill>
+              <a:schemeClr val="accent1"/>
+            </a:solidFill>
+          </p:spPr>
+          <p:style>
+            <a:lnRef idx="2">
+              <a:schemeClr val="accent1">
+                <a:shade val="50000"/>
+              </a:schemeClr>
+            </a:lnRef>
+            <a:fillRef idx="1">
+              <a:schemeClr val="accent1"/>
+            </a:fillRef>
+            <a:effectRef idx="0">
+              <a:schemeClr val="accent1"/>
+            </a:effectRef>
+            <a:fontRef idx="minor">
+              <a:schemeClr val="lt1"/>
+            </a:fontRef>
+          </p:style>
+          <p:txBody>
+            <a:bodyPr rtlCol="0" anchor="ctr"/>
+            <a:lstStyle/>
+            <a:p>
+              <a:pPr algn="ctr"/>
+              <a:r>
+                <a:rPr lang="en-US" sz="800" dirty="0" smtClean="0"/>
+                <a:t>Network Switch</a:t>
+              </a:r>
+              <a:endParaRPr lang="en-US" sz="800" dirty="0"/>
+            </a:p>
+          </p:txBody>
+        </p:sp>
+        <p:cxnSp>
+          <p:nvCxnSpPr>
+            <p:cNvPr id="11" name="Straight Arrow Connector 10"/>
+            <p:cNvCxnSpPr>
+              <a:stCxn id="5" idx="2"/>
+            </p:cNvCxnSpPr>
+            <p:nvPr/>
+          </p:nvCxnSpPr>
+          <p:spPr>
+            <a:xfrm>
+              <a:off x="3408712" y="2935186"/>
+              <a:ext cx="0" cy="430233"/>
+            </a:xfrm>
+            <a:prstGeom prst="straightConnector1">
+              <a:avLst/>
+            </a:prstGeom>
+            <a:ln>
+              <a:headEnd type="triangle"/>
+              <a:tailEnd type="triangle"/>
+            </a:ln>
+          </p:spPr>
+          <p:style>
+            <a:lnRef idx="1">
+              <a:schemeClr val="accent1"/>
+            </a:lnRef>
+            <a:fillRef idx="0">
+              <a:schemeClr val="accent1"/>
+            </a:fillRef>
+            <a:effectRef idx="0">
+              <a:schemeClr val="accent1"/>
+            </a:effectRef>
+            <a:fontRef idx="minor">
+              <a:schemeClr val="tx1"/>
+            </a:fontRef>
+          </p:style>
+        </p:cxnSp>
+        <p:cxnSp>
+          <p:nvCxnSpPr>
+            <p:cNvPr id="12" name="Straight Arrow Connector 11"/>
+            <p:cNvCxnSpPr/>
+            <p:nvPr/>
+          </p:nvCxnSpPr>
+          <p:spPr>
+            <a:xfrm>
+              <a:off x="3419102" y="3776353"/>
+              <a:ext cx="0" cy="430233"/>
+            </a:xfrm>
+            <a:prstGeom prst="straightConnector1">
+              <a:avLst/>
+            </a:prstGeom>
+            <a:ln>
+              <a:headEnd type="triangle"/>
+              <a:tailEnd type="triangle"/>
+            </a:ln>
+          </p:spPr>
+          <p:style>
+            <a:lnRef idx="1">
+              <a:schemeClr val="accent1"/>
+            </a:lnRef>
+            <a:fillRef idx="0">
+              <a:schemeClr val="accent1"/>
+            </a:fillRef>
+            <a:effectRef idx="0">
+              <a:schemeClr val="accent1"/>
+            </a:effectRef>
+            <a:fontRef idx="minor">
+              <a:schemeClr val="tx1"/>
+            </a:fontRef>
+          </p:style>
+        </p:cxnSp>
+        <p:cxnSp>
+          <p:nvCxnSpPr>
+            <p:cNvPr id="13" name="Straight Arrow Connector 12"/>
+            <p:cNvCxnSpPr/>
+            <p:nvPr/>
+          </p:nvCxnSpPr>
+          <p:spPr>
+            <a:xfrm>
+              <a:off x="5055917" y="3776353"/>
+              <a:ext cx="0" cy="430233"/>
+            </a:xfrm>
+            <a:prstGeom prst="straightConnector1">
+              <a:avLst/>
+            </a:prstGeom>
+            <a:ln>
+              <a:headEnd type="triangle"/>
+              <a:tailEnd type="triangle"/>
+            </a:ln>
+          </p:spPr>
+          <p:style>
+            <a:lnRef idx="1">
+              <a:schemeClr val="accent1"/>
+            </a:lnRef>
+            <a:fillRef idx="0">
+              <a:schemeClr val="accent1"/>
+            </a:fillRef>
+            <a:effectRef idx="0">
+              <a:schemeClr val="accent1"/>
+            </a:effectRef>
+            <a:fontRef idx="minor">
+              <a:schemeClr val="tx1"/>
+            </a:fontRef>
+          </p:style>
+        </p:cxnSp>
+        <p:cxnSp>
+          <p:nvCxnSpPr>
+            <p:cNvPr id="14" name="Straight Arrow Connector 13"/>
+            <p:cNvCxnSpPr/>
+            <p:nvPr/>
+          </p:nvCxnSpPr>
+          <p:spPr>
+            <a:xfrm>
+              <a:off x="6587835" y="3776353"/>
+              <a:ext cx="0" cy="430233"/>
+            </a:xfrm>
+            <a:prstGeom prst="straightConnector1">
+              <a:avLst/>
+            </a:prstGeom>
+            <a:ln>
+              <a:headEnd type="triangle"/>
+              <a:tailEnd type="triangle"/>
+            </a:ln>
+          </p:spPr>
+          <p:style>
+            <a:lnRef idx="1">
+              <a:schemeClr val="accent1"/>
+            </a:lnRef>
+            <a:fillRef idx="0">
+              <a:schemeClr val="accent1"/>
+            </a:fillRef>
+            <a:effectRef idx="0">
+              <a:schemeClr val="accent1"/>
+            </a:effectRef>
+            <a:fontRef idx="minor">
+              <a:schemeClr val="tx1"/>
+            </a:fontRef>
+          </p:style>
+        </p:cxnSp>
+        <p:cxnSp>
+          <p:nvCxnSpPr>
+            <p:cNvPr id="15" name="Straight Arrow Connector 14"/>
+            <p:cNvCxnSpPr/>
+            <p:nvPr/>
+          </p:nvCxnSpPr>
+          <p:spPr>
+            <a:xfrm>
+              <a:off x="8189024" y="3776353"/>
+              <a:ext cx="0" cy="430233"/>
+            </a:xfrm>
+            <a:prstGeom prst="straightConnector1">
+              <a:avLst/>
+            </a:prstGeom>
+            <a:ln>
+              <a:headEnd type="triangle"/>
+              <a:tailEnd type="triangle"/>
+            </a:ln>
+          </p:spPr>
+          <p:style>
+            <a:lnRef idx="1">
+              <a:schemeClr val="accent1"/>
+            </a:lnRef>
+            <a:fillRef idx="0">
+              <a:schemeClr val="accent1"/>
+            </a:fillRef>
+            <a:effectRef idx="0">
+              <a:schemeClr val="accent1"/>
+            </a:effectRef>
+            <a:fontRef idx="minor">
+              <a:schemeClr val="tx1"/>
+            </a:fontRef>
+          </p:style>
+        </p:cxnSp>
+        <p:sp>
+          <p:nvSpPr>
+            <p:cNvPr id="18" name="Rounded Rectangle 17"/>
+            <p:cNvSpPr/>
+            <p:nvPr/>
+          </p:nvSpPr>
+          <p:spPr>
+            <a:xfrm>
+              <a:off x="2728355" y="1405746"/>
+              <a:ext cx="1360714" cy="410934"/>
+            </a:xfrm>
+            <a:prstGeom prst="roundRect">
+              <a:avLst/>
+            </a:prstGeom>
+            <a:solidFill>
+              <a:schemeClr val="accent1"/>
+            </a:solidFill>
+          </p:spPr>
+          <p:style>
+            <a:lnRef idx="2">
+              <a:schemeClr val="accent1">
+                <a:shade val="50000"/>
+              </a:schemeClr>
+            </a:lnRef>
+            <a:fillRef idx="1">
+              <a:schemeClr val="accent1"/>
+            </a:fillRef>
+            <a:effectRef idx="0">
+              <a:schemeClr val="accent1"/>
+            </a:effectRef>
+            <a:fontRef idx="minor">
+              <a:schemeClr val="lt1"/>
+            </a:fontRef>
+          </p:style>
+          <p:txBody>
+            <a:bodyPr rtlCol="0" anchor="ctr"/>
+            <a:lstStyle/>
+            <a:p>
+              <a:pPr algn="ctr"/>
+              <a:r>
+                <a:rPr lang="en-US" sz="800" dirty="0" err="1" smtClean="0"/>
+                <a:t>Wifi</a:t>
+              </a:r>
+              <a:endParaRPr lang="en-US" sz="800" dirty="0"/>
+            </a:p>
+          </p:txBody>
+        </p:sp>
+        <p:cxnSp>
+          <p:nvCxnSpPr>
+            <p:cNvPr id="19" name="Straight Arrow Connector 18"/>
+            <p:cNvCxnSpPr/>
+            <p:nvPr/>
+          </p:nvCxnSpPr>
+          <p:spPr>
+            <a:xfrm>
+              <a:off x="3419102" y="1797381"/>
+              <a:ext cx="0" cy="430233"/>
+            </a:xfrm>
+            <a:prstGeom prst="straightConnector1">
+              <a:avLst/>
+            </a:prstGeom>
+            <a:ln>
+              <a:headEnd type="triangle"/>
+              <a:tailEnd type="triangle"/>
+            </a:ln>
+          </p:spPr>
+          <p:style>
+            <a:lnRef idx="1">
+              <a:schemeClr val="accent1"/>
+            </a:lnRef>
+            <a:fillRef idx="0">
+              <a:schemeClr val="accent1"/>
+            </a:fillRef>
+            <a:effectRef idx="0">
+              <a:schemeClr val="accent1"/>
+            </a:effectRef>
+            <a:fontRef idx="minor">
+              <a:schemeClr val="tx1"/>
+            </a:fontRef>
+          </p:style>
+        </p:cxnSp>
+        <p:pic>
+          <p:nvPicPr>
+            <p:cNvPr id="2" name="Picture 1"/>
+            <p:cNvPicPr>
+              <a:picLocks noChangeAspect="1"/>
+            </p:cNvPicPr>
+            <p:nvPr/>
+          </p:nvPicPr>
+          <p:blipFill>
+            <a:blip r:embed="rId2"/>
+            <a:stretch>
+              <a:fillRect/>
+            </a:stretch>
+          </p:blipFill>
+          <p:spPr>
+            <a:xfrm>
+              <a:off x="6212507" y="1420087"/>
+              <a:ext cx="1184819" cy="1184819"/>
+            </a:xfrm>
+            <a:prstGeom prst="rect">
+              <a:avLst/>
+            </a:prstGeom>
+          </p:spPr>
+        </p:pic>
+        <p:pic>
+          <p:nvPicPr>
+            <p:cNvPr id="3" name="Picture 2"/>
+            <p:cNvPicPr>
+              <a:picLocks noChangeAspect="1"/>
+            </p:cNvPicPr>
+            <p:nvPr/>
+          </p:nvPicPr>
+          <p:blipFill>
+            <a:blip r:embed="rId3"/>
+            <a:stretch>
+              <a:fillRect/>
+            </a:stretch>
+          </p:blipFill>
+          <p:spPr>
+            <a:xfrm flipH="1">
+              <a:off x="5124669" y="1581226"/>
+              <a:ext cx="986693" cy="986693"/>
+            </a:xfrm>
+            <a:prstGeom prst="rect">
+              <a:avLst/>
+            </a:prstGeom>
+          </p:spPr>
+        </p:pic>
+        <p:pic>
+          <p:nvPicPr>
+            <p:cNvPr id="10" name="Picture 9"/>
+            <p:cNvPicPr>
+              <a:picLocks noChangeAspect="1"/>
+            </p:cNvPicPr>
+            <p:nvPr/>
+          </p:nvPicPr>
+          <p:blipFill>
+            <a:blip r:embed="rId4"/>
+            <a:stretch>
+              <a:fillRect/>
+            </a:stretch>
+          </p:blipFill>
+          <p:spPr>
+            <a:xfrm>
+              <a:off x="4612363" y="1966321"/>
+              <a:ext cx="465447" cy="465447"/>
+            </a:xfrm>
+            <a:prstGeom prst="rect">
+              <a:avLst/>
+            </a:prstGeom>
+          </p:spPr>
+        </p:pic>
+        <p:cxnSp>
+          <p:nvCxnSpPr>
+            <p:cNvPr id="21" name="Straight Arrow Connector 20"/>
+            <p:cNvCxnSpPr/>
+            <p:nvPr/>
+          </p:nvCxnSpPr>
+          <p:spPr>
+            <a:xfrm flipV="1">
+              <a:off x="4332514" y="2567919"/>
+              <a:ext cx="3633792" cy="19291"/>
+            </a:xfrm>
+            <a:prstGeom prst="straightConnector1">
+              <a:avLst/>
+            </a:prstGeom>
+            <a:ln>
+              <a:headEnd type="triangle"/>
+              <a:tailEnd type="triangle"/>
+            </a:ln>
+          </p:spPr>
+          <p:style>
+            <a:lnRef idx="1">
+              <a:schemeClr val="accent1"/>
+            </a:lnRef>
+            <a:fillRef idx="0">
+              <a:schemeClr val="accent1"/>
+            </a:fillRef>
+            <a:effectRef idx="0">
+              <a:schemeClr val="accent1"/>
+            </a:effectRef>
+            <a:fontRef idx="minor">
+              <a:schemeClr val="tx1"/>
+            </a:fontRef>
+          </p:style>
+        </p:cxnSp>
+        <p:sp>
+          <p:nvSpPr>
+            <p:cNvPr id="25" name="TextBox 24"/>
+            <p:cNvSpPr txBox="1"/>
+            <p:nvPr/>
+          </p:nvSpPr>
+          <p:spPr>
+            <a:xfrm>
+              <a:off x="5156073" y="2586800"/>
+              <a:ext cx="2804896" cy="360934"/>
+            </a:xfrm>
+            <a:prstGeom prst="rect">
+              <a:avLst/>
+            </a:prstGeom>
+            <a:noFill/>
+          </p:spPr>
+          <p:txBody>
+            <a:bodyPr wrap="none" rtlCol="0">
+              <a:spAutoFit/>
+            </a:bodyPr>
+            <a:lstStyle/>
+            <a:p>
+              <a:r>
+                <a:rPr lang="en-US" sz="800" dirty="0" smtClean="0"/>
+                <a:t>Recommended, Optional</a:t>
+              </a:r>
+              <a:endParaRPr lang="en-US" sz="800" dirty="0"/>
+            </a:p>
+          </p:txBody>
+        </p:sp>
+      </p:grpSp>
+      <p:grpSp>
+        <p:nvGrpSpPr>
+          <p:cNvPr id="24" name="Group 23"/>
+          <p:cNvGrpSpPr/>
+          <p:nvPr/>
+        </p:nvGrpSpPr>
+        <p:grpSpPr>
+          <a:xfrm>
+            <a:off x="8349661" y="1408073"/>
+            <a:ext cx="2706674" cy="2097742"/>
+            <a:chOff x="2728355" y="1405746"/>
+            <a:chExt cx="6173191" cy="3514351"/>
+          </a:xfrm>
+        </p:grpSpPr>
+        <p:sp>
+          <p:nvSpPr>
+            <p:cNvPr id="26" name="Rounded Rectangle 25"/>
+            <p:cNvSpPr/>
+            <p:nvPr/>
+          </p:nvSpPr>
+          <p:spPr>
+            <a:xfrm>
+              <a:off x="2728355" y="4206586"/>
+              <a:ext cx="1360714" cy="707572"/>
+            </a:xfrm>
+            <a:prstGeom prst="roundRect">
+              <a:avLst/>
+            </a:prstGeom>
+            <a:solidFill>
+              <a:schemeClr val="accent3">
+                <a:lumMod val="40000"/>
+                <a:lumOff val="60000"/>
+              </a:schemeClr>
+            </a:solidFill>
+          </p:spPr>
+          <p:style>
+            <a:lnRef idx="2">
+              <a:schemeClr val="accent1">
+                <a:shade val="50000"/>
+              </a:schemeClr>
+            </a:lnRef>
+            <a:fillRef idx="1">
+              <a:schemeClr val="accent1"/>
+            </a:fillRef>
+            <a:effectRef idx="0">
+              <a:schemeClr val="accent1"/>
+            </a:effectRef>
+            <a:fontRef idx="minor">
+              <a:schemeClr val="lt1"/>
+            </a:fontRef>
+          </p:style>
+          <p:txBody>
+            <a:bodyPr rtlCol="0" anchor="ctr"/>
+            <a:lstStyle/>
+            <a:p>
+              <a:pPr algn="ctr"/>
+              <a:r>
+                <a:rPr lang="en-US" sz="800" smtClean="0">
+                  <a:solidFill>
+                    <a:schemeClr val="tx1"/>
+                  </a:solidFill>
+                </a:rPr>
+                <a:t>PI Worker</a:t>
+              </a:r>
+              <a:endParaRPr lang="en-US" sz="800">
+                <a:solidFill>
+                  <a:schemeClr val="tx1"/>
+                </a:solidFill>
+              </a:endParaRPr>
+            </a:p>
+          </p:txBody>
+        </p:sp>
+        <p:sp>
+          <p:nvSpPr>
+            <p:cNvPr id="27" name="Rounded Rectangle 26"/>
+            <p:cNvSpPr/>
+            <p:nvPr/>
+          </p:nvSpPr>
+          <p:spPr>
+            <a:xfrm>
+              <a:off x="2728355" y="2227614"/>
+              <a:ext cx="1360714" cy="707572"/>
+            </a:xfrm>
+            <a:prstGeom prst="roundRect">
+              <a:avLst/>
+            </a:prstGeom>
+            <a:solidFill>
+              <a:schemeClr val="accent3">
+                <a:lumMod val="40000"/>
+                <a:lumOff val="60000"/>
+              </a:schemeClr>
+            </a:solidFill>
+          </p:spPr>
+          <p:style>
+            <a:lnRef idx="2">
+              <a:schemeClr val="accent1">
+                <a:shade val="50000"/>
+              </a:schemeClr>
+            </a:lnRef>
+            <a:fillRef idx="1">
+              <a:schemeClr val="accent1"/>
+            </a:fillRef>
+            <a:effectRef idx="0">
+              <a:schemeClr val="accent1"/>
+            </a:effectRef>
+            <a:fontRef idx="minor">
+              <a:schemeClr val="lt1"/>
+            </a:fontRef>
+          </p:style>
+          <p:txBody>
+            <a:bodyPr rtlCol="0" anchor="ctr"/>
+            <a:lstStyle/>
+            <a:p>
+              <a:pPr algn="ctr"/>
+              <a:r>
+                <a:rPr lang="en-US" sz="800" smtClean="0">
+                  <a:solidFill>
+                    <a:schemeClr val="tx1"/>
+                  </a:solidFill>
+                </a:rPr>
+                <a:t>PI Master </a:t>
+              </a:r>
+              <a:endParaRPr lang="en-US" sz="800" dirty="0">
+                <a:solidFill>
+                  <a:schemeClr val="tx1"/>
+                </a:solidFill>
+              </a:endParaRPr>
+            </a:p>
+          </p:txBody>
+        </p:sp>
+        <p:sp>
+          <p:nvSpPr>
+            <p:cNvPr id="28" name="Rounded Rectangle 27"/>
+            <p:cNvSpPr/>
+            <p:nvPr/>
+          </p:nvSpPr>
+          <p:spPr>
+            <a:xfrm>
+              <a:off x="7540832" y="4206586"/>
+              <a:ext cx="1360714" cy="707572"/>
+            </a:xfrm>
+            <a:prstGeom prst="roundRect">
+              <a:avLst/>
+            </a:prstGeom>
+            <a:solidFill>
+              <a:schemeClr val="accent3">
+                <a:lumMod val="40000"/>
+                <a:lumOff val="60000"/>
+              </a:schemeClr>
+            </a:solidFill>
+          </p:spPr>
+          <p:style>
+            <a:lnRef idx="2">
+              <a:schemeClr val="accent1">
+                <a:shade val="50000"/>
+              </a:schemeClr>
+            </a:lnRef>
+            <a:fillRef idx="1">
+              <a:schemeClr val="accent1"/>
+            </a:fillRef>
+            <a:effectRef idx="0">
+              <a:schemeClr val="accent1"/>
+            </a:effectRef>
+            <a:fontRef idx="minor">
+              <a:schemeClr val="lt1"/>
+            </a:fontRef>
+          </p:style>
+          <p:txBody>
+            <a:bodyPr rtlCol="0" anchor="ctr"/>
+            <a:lstStyle/>
+            <a:p>
+              <a:pPr algn="ctr"/>
+              <a:r>
+                <a:rPr lang="en-US" sz="800" smtClean="0">
+                  <a:solidFill>
+                    <a:schemeClr val="tx1"/>
+                  </a:solidFill>
+                </a:rPr>
+                <a:t>PI Worker</a:t>
+              </a:r>
+              <a:endParaRPr lang="en-US" sz="800">
+                <a:solidFill>
+                  <a:schemeClr val="tx1"/>
+                </a:solidFill>
+              </a:endParaRPr>
+            </a:p>
+          </p:txBody>
+        </p:sp>
+        <p:sp>
+          <p:nvSpPr>
+            <p:cNvPr id="29" name="Rounded Rectangle 28"/>
+            <p:cNvSpPr/>
+            <p:nvPr/>
+          </p:nvSpPr>
+          <p:spPr>
+            <a:xfrm>
+              <a:off x="5936673" y="4212525"/>
+              <a:ext cx="1360714" cy="707572"/>
+            </a:xfrm>
+            <a:prstGeom prst="roundRect">
+              <a:avLst/>
+            </a:prstGeom>
+            <a:solidFill>
+              <a:schemeClr val="accent3">
+                <a:lumMod val="40000"/>
+                <a:lumOff val="60000"/>
+              </a:schemeClr>
+            </a:solidFill>
+          </p:spPr>
+          <p:style>
+            <a:lnRef idx="2">
+              <a:schemeClr val="accent1">
+                <a:shade val="50000"/>
+              </a:schemeClr>
+            </a:lnRef>
+            <a:fillRef idx="1">
+              <a:schemeClr val="accent1"/>
+            </a:fillRef>
+            <a:effectRef idx="0">
+              <a:schemeClr val="accent1"/>
+            </a:effectRef>
+            <a:fontRef idx="minor">
+              <a:schemeClr val="lt1"/>
+            </a:fontRef>
+          </p:style>
+          <p:txBody>
+            <a:bodyPr rtlCol="0" anchor="ctr"/>
+            <a:lstStyle/>
+            <a:p>
+              <a:pPr algn="ctr"/>
+              <a:r>
+                <a:rPr lang="en-US" sz="800" smtClean="0">
+                  <a:solidFill>
+                    <a:schemeClr val="tx1"/>
+                  </a:solidFill>
+                </a:rPr>
+                <a:t>PI Worker</a:t>
+              </a:r>
+              <a:endParaRPr lang="en-US" sz="800">
+                <a:solidFill>
+                  <a:schemeClr val="tx1"/>
+                </a:solidFill>
+              </a:endParaRPr>
+            </a:p>
+          </p:txBody>
+        </p:sp>
+        <p:sp>
+          <p:nvSpPr>
+            <p:cNvPr id="30" name="Rounded Rectangle 29"/>
+            <p:cNvSpPr/>
+            <p:nvPr/>
+          </p:nvSpPr>
+          <p:spPr>
+            <a:xfrm>
+              <a:off x="4332514" y="4206586"/>
+              <a:ext cx="1360714" cy="707572"/>
+            </a:xfrm>
+            <a:prstGeom prst="roundRect">
+              <a:avLst/>
+            </a:prstGeom>
+            <a:solidFill>
+              <a:schemeClr val="accent3">
+                <a:lumMod val="40000"/>
+                <a:lumOff val="60000"/>
+              </a:schemeClr>
+            </a:solidFill>
+          </p:spPr>
+          <p:style>
+            <a:lnRef idx="2">
+              <a:schemeClr val="accent1">
+                <a:shade val="50000"/>
+              </a:schemeClr>
+            </a:lnRef>
+            <a:fillRef idx="1">
+              <a:schemeClr val="accent1"/>
+            </a:fillRef>
+            <a:effectRef idx="0">
+              <a:schemeClr val="accent1"/>
+            </a:effectRef>
+            <a:fontRef idx="minor">
+              <a:schemeClr val="lt1"/>
+            </a:fontRef>
+          </p:style>
+          <p:txBody>
+            <a:bodyPr rtlCol="0" anchor="ctr"/>
+            <a:lstStyle/>
+            <a:p>
+              <a:pPr algn="ctr"/>
+              <a:r>
+                <a:rPr lang="en-US" sz="800" smtClean="0">
+                  <a:solidFill>
+                    <a:schemeClr val="tx1"/>
+                  </a:solidFill>
+                </a:rPr>
+                <a:t>PI Worker</a:t>
+              </a:r>
+              <a:endParaRPr lang="en-US" sz="800">
+                <a:solidFill>
+                  <a:schemeClr val="tx1"/>
+                </a:solidFill>
+              </a:endParaRPr>
+            </a:p>
+          </p:txBody>
+        </p:sp>
+        <p:sp>
+          <p:nvSpPr>
+            <p:cNvPr id="31" name="Rounded Rectangle 30"/>
+            <p:cNvSpPr/>
+            <p:nvPr/>
+          </p:nvSpPr>
+          <p:spPr>
+            <a:xfrm>
+              <a:off x="2728355" y="3365419"/>
+              <a:ext cx="6173191" cy="410934"/>
+            </a:xfrm>
+            <a:prstGeom prst="roundRect">
+              <a:avLst/>
+            </a:prstGeom>
+            <a:solidFill>
+              <a:schemeClr val="accent1"/>
+            </a:solidFill>
+          </p:spPr>
+          <p:style>
+            <a:lnRef idx="2">
+              <a:schemeClr val="accent1">
+                <a:shade val="50000"/>
+              </a:schemeClr>
+            </a:lnRef>
+            <a:fillRef idx="1">
+              <a:schemeClr val="accent1"/>
+            </a:fillRef>
+            <a:effectRef idx="0">
+              <a:schemeClr val="accent1"/>
+            </a:effectRef>
+            <a:fontRef idx="minor">
+              <a:schemeClr val="lt1"/>
+            </a:fontRef>
+          </p:style>
+          <p:txBody>
+            <a:bodyPr rtlCol="0" anchor="ctr"/>
+            <a:lstStyle/>
+            <a:p>
+              <a:pPr algn="ctr"/>
+              <a:r>
+                <a:rPr lang="en-US" sz="800" dirty="0" smtClean="0"/>
+                <a:t>Network Switch</a:t>
+              </a:r>
+              <a:endParaRPr lang="en-US" sz="800" dirty="0"/>
+            </a:p>
+          </p:txBody>
+        </p:sp>
+        <p:cxnSp>
+          <p:nvCxnSpPr>
+            <p:cNvPr id="32" name="Straight Arrow Connector 31"/>
+            <p:cNvCxnSpPr>
+              <a:stCxn id="28" idx="2"/>
+            </p:cNvCxnSpPr>
+            <p:nvPr/>
+          </p:nvCxnSpPr>
+          <p:spPr>
+            <a:xfrm>
+              <a:off x="3408712" y="2935186"/>
+              <a:ext cx="0" cy="430233"/>
+            </a:xfrm>
+            <a:prstGeom prst="straightConnector1">
+              <a:avLst/>
+            </a:prstGeom>
+            <a:ln>
+              <a:headEnd type="triangle"/>
+              <a:tailEnd type="triangle"/>
+            </a:ln>
+          </p:spPr>
+          <p:style>
+            <a:lnRef idx="1">
+              <a:schemeClr val="accent1"/>
+            </a:lnRef>
+            <a:fillRef idx="0">
+              <a:schemeClr val="accent1"/>
+            </a:fillRef>
+            <a:effectRef idx="0">
+              <a:schemeClr val="accent1"/>
+            </a:effectRef>
+            <a:fontRef idx="minor">
+              <a:schemeClr val="tx1"/>
+            </a:fontRef>
+          </p:style>
+        </p:cxnSp>
+        <p:cxnSp>
+          <p:nvCxnSpPr>
+            <p:cNvPr id="33" name="Straight Arrow Connector 32"/>
+            <p:cNvCxnSpPr/>
+            <p:nvPr/>
+          </p:nvCxnSpPr>
+          <p:spPr>
+            <a:xfrm>
+              <a:off x="3419102" y="3776353"/>
+              <a:ext cx="0" cy="430233"/>
+            </a:xfrm>
+            <a:prstGeom prst="straightConnector1">
+              <a:avLst/>
+            </a:prstGeom>
+            <a:ln>
+              <a:headEnd type="triangle"/>
+              <a:tailEnd type="triangle"/>
+            </a:ln>
+          </p:spPr>
+          <p:style>
+            <a:lnRef idx="1">
+              <a:schemeClr val="accent1"/>
+            </a:lnRef>
+            <a:fillRef idx="0">
+              <a:schemeClr val="accent1"/>
+            </a:fillRef>
+            <a:effectRef idx="0">
+              <a:schemeClr val="accent1"/>
+            </a:effectRef>
+            <a:fontRef idx="minor">
+              <a:schemeClr val="tx1"/>
+            </a:fontRef>
+          </p:style>
+        </p:cxnSp>
+        <p:cxnSp>
+          <p:nvCxnSpPr>
+            <p:cNvPr id="34" name="Straight Arrow Connector 33"/>
+            <p:cNvCxnSpPr/>
+            <p:nvPr/>
+          </p:nvCxnSpPr>
+          <p:spPr>
+            <a:xfrm>
+              <a:off x="5055917" y="3776353"/>
+              <a:ext cx="0" cy="430233"/>
+            </a:xfrm>
+            <a:prstGeom prst="straightConnector1">
+              <a:avLst/>
+            </a:prstGeom>
+            <a:ln>
+              <a:headEnd type="triangle"/>
+              <a:tailEnd type="triangle"/>
+            </a:ln>
+          </p:spPr>
+          <p:style>
+            <a:lnRef idx="1">
+              <a:schemeClr val="accent1"/>
+            </a:lnRef>
+            <a:fillRef idx="0">
+              <a:schemeClr val="accent1"/>
+            </a:fillRef>
+            <a:effectRef idx="0">
+              <a:schemeClr val="accent1"/>
+            </a:effectRef>
+            <a:fontRef idx="minor">
+              <a:schemeClr val="tx1"/>
+            </a:fontRef>
+          </p:style>
+        </p:cxnSp>
+        <p:cxnSp>
+          <p:nvCxnSpPr>
+            <p:cNvPr id="35" name="Straight Arrow Connector 34"/>
+            <p:cNvCxnSpPr/>
+            <p:nvPr/>
+          </p:nvCxnSpPr>
+          <p:spPr>
+            <a:xfrm>
+              <a:off x="6587835" y="3776353"/>
+              <a:ext cx="0" cy="430233"/>
+            </a:xfrm>
+            <a:prstGeom prst="straightConnector1">
+              <a:avLst/>
+            </a:prstGeom>
+            <a:ln>
+              <a:headEnd type="triangle"/>
+              <a:tailEnd type="triangle"/>
+            </a:ln>
+          </p:spPr>
+          <p:style>
+            <a:lnRef idx="1">
+              <a:schemeClr val="accent1"/>
+            </a:lnRef>
+            <a:fillRef idx="0">
+              <a:schemeClr val="accent1"/>
+            </a:fillRef>
+            <a:effectRef idx="0">
+              <a:schemeClr val="accent1"/>
+            </a:effectRef>
+            <a:fontRef idx="minor">
+              <a:schemeClr val="tx1"/>
+            </a:fontRef>
+          </p:style>
+        </p:cxnSp>
+        <p:cxnSp>
+          <p:nvCxnSpPr>
+            <p:cNvPr id="36" name="Straight Arrow Connector 35"/>
+            <p:cNvCxnSpPr/>
+            <p:nvPr/>
+          </p:nvCxnSpPr>
+          <p:spPr>
+            <a:xfrm>
+              <a:off x="8189024" y="3776353"/>
+              <a:ext cx="0" cy="430233"/>
+            </a:xfrm>
+            <a:prstGeom prst="straightConnector1">
+              <a:avLst/>
+            </a:prstGeom>
+            <a:ln>
+              <a:headEnd type="triangle"/>
+              <a:tailEnd type="triangle"/>
+            </a:ln>
+          </p:spPr>
+          <p:style>
+            <a:lnRef idx="1">
+              <a:schemeClr val="accent1"/>
+            </a:lnRef>
+            <a:fillRef idx="0">
+              <a:schemeClr val="accent1"/>
+            </a:fillRef>
+            <a:effectRef idx="0">
+              <a:schemeClr val="accent1"/>
+            </a:effectRef>
+            <a:fontRef idx="minor">
+              <a:schemeClr val="tx1"/>
+            </a:fontRef>
+          </p:style>
+        </p:cxnSp>
+        <p:sp>
+          <p:nvSpPr>
+            <p:cNvPr id="37" name="Rounded Rectangle 36"/>
+            <p:cNvSpPr/>
+            <p:nvPr/>
+          </p:nvSpPr>
+          <p:spPr>
+            <a:xfrm>
+              <a:off x="2728355" y="1405746"/>
+              <a:ext cx="1360714" cy="410934"/>
+            </a:xfrm>
+            <a:prstGeom prst="roundRect">
+              <a:avLst/>
+            </a:prstGeom>
+            <a:solidFill>
+              <a:schemeClr val="accent1"/>
+            </a:solidFill>
+          </p:spPr>
+          <p:style>
+            <a:lnRef idx="2">
+              <a:schemeClr val="accent1">
+                <a:shade val="50000"/>
+              </a:schemeClr>
+            </a:lnRef>
+            <a:fillRef idx="1">
+              <a:schemeClr val="accent1"/>
+            </a:fillRef>
+            <a:effectRef idx="0">
+              <a:schemeClr val="accent1"/>
+            </a:effectRef>
+            <a:fontRef idx="minor">
+              <a:schemeClr val="lt1"/>
+            </a:fontRef>
+          </p:style>
+          <p:txBody>
+            <a:bodyPr rtlCol="0" anchor="ctr"/>
+            <a:lstStyle/>
+            <a:p>
+              <a:pPr algn="ctr"/>
+              <a:r>
+                <a:rPr lang="en-US" sz="800" dirty="0" err="1" smtClean="0"/>
+                <a:t>Wifi</a:t>
+              </a:r>
+              <a:endParaRPr lang="en-US" sz="800" dirty="0"/>
+            </a:p>
+          </p:txBody>
+        </p:sp>
+        <p:cxnSp>
+          <p:nvCxnSpPr>
+            <p:cNvPr id="38" name="Straight Arrow Connector 37"/>
+            <p:cNvCxnSpPr/>
+            <p:nvPr/>
+          </p:nvCxnSpPr>
+          <p:spPr>
+            <a:xfrm>
+              <a:off x="3419102" y="1797381"/>
+              <a:ext cx="0" cy="430233"/>
+            </a:xfrm>
+            <a:prstGeom prst="straightConnector1">
+              <a:avLst/>
+            </a:prstGeom>
+            <a:ln>
+              <a:headEnd type="triangle"/>
+              <a:tailEnd type="triangle"/>
+            </a:ln>
+          </p:spPr>
+          <p:style>
+            <a:lnRef idx="1">
+              <a:schemeClr val="accent1"/>
+            </a:lnRef>
+            <a:fillRef idx="0">
+              <a:schemeClr val="accent1"/>
+            </a:fillRef>
+            <a:effectRef idx="0">
+              <a:schemeClr val="accent1"/>
+            </a:effectRef>
+            <a:fontRef idx="minor">
+              <a:schemeClr val="tx1"/>
+            </a:fontRef>
+          </p:style>
+        </p:cxnSp>
+        <p:pic>
+          <p:nvPicPr>
+            <p:cNvPr id="39" name="Picture 38"/>
+            <p:cNvPicPr>
+              <a:picLocks noChangeAspect="1"/>
+            </p:cNvPicPr>
+            <p:nvPr/>
+          </p:nvPicPr>
+          <p:blipFill>
+            <a:blip r:embed="rId2"/>
+            <a:stretch>
+              <a:fillRect/>
+            </a:stretch>
+          </p:blipFill>
+          <p:spPr>
+            <a:xfrm>
+              <a:off x="6212507" y="1420087"/>
+              <a:ext cx="1184819" cy="1184819"/>
+            </a:xfrm>
+            <a:prstGeom prst="rect">
+              <a:avLst/>
+            </a:prstGeom>
+          </p:spPr>
+        </p:pic>
+        <p:pic>
+          <p:nvPicPr>
+            <p:cNvPr id="40" name="Picture 39"/>
+            <p:cNvPicPr>
+              <a:picLocks noChangeAspect="1"/>
+            </p:cNvPicPr>
+            <p:nvPr/>
+          </p:nvPicPr>
+          <p:blipFill>
+            <a:blip r:embed="rId3"/>
+            <a:stretch>
+              <a:fillRect/>
+            </a:stretch>
+          </p:blipFill>
+          <p:spPr>
+            <a:xfrm flipH="1">
+              <a:off x="5124669" y="1581226"/>
+              <a:ext cx="986693" cy="986693"/>
+            </a:xfrm>
+            <a:prstGeom prst="rect">
+              <a:avLst/>
+            </a:prstGeom>
+          </p:spPr>
+        </p:pic>
+        <p:pic>
+          <p:nvPicPr>
+            <p:cNvPr id="41" name="Picture 40"/>
+            <p:cNvPicPr>
+              <a:picLocks noChangeAspect="1"/>
+            </p:cNvPicPr>
+            <p:nvPr/>
+          </p:nvPicPr>
+          <p:blipFill>
+            <a:blip r:embed="rId4"/>
+            <a:stretch>
+              <a:fillRect/>
+            </a:stretch>
+          </p:blipFill>
+          <p:spPr>
+            <a:xfrm>
+              <a:off x="4612363" y="1966321"/>
+              <a:ext cx="465447" cy="465447"/>
+            </a:xfrm>
+            <a:prstGeom prst="rect">
+              <a:avLst/>
+            </a:prstGeom>
+          </p:spPr>
+        </p:pic>
+        <p:cxnSp>
+          <p:nvCxnSpPr>
+            <p:cNvPr id="42" name="Straight Arrow Connector 41"/>
+            <p:cNvCxnSpPr/>
+            <p:nvPr/>
+          </p:nvCxnSpPr>
+          <p:spPr>
+            <a:xfrm flipV="1">
+              <a:off x="4332514" y="2567919"/>
+              <a:ext cx="3633792" cy="19291"/>
+            </a:xfrm>
+            <a:prstGeom prst="straightConnector1">
+              <a:avLst/>
+            </a:prstGeom>
+            <a:ln>
+              <a:headEnd type="triangle"/>
+              <a:tailEnd type="triangle"/>
+            </a:ln>
+          </p:spPr>
+          <p:style>
+            <a:lnRef idx="1">
+              <a:schemeClr val="accent1"/>
+            </a:lnRef>
+            <a:fillRef idx="0">
+              <a:schemeClr val="accent1"/>
+            </a:fillRef>
+            <a:effectRef idx="0">
+              <a:schemeClr val="accent1"/>
+            </a:effectRef>
+            <a:fontRef idx="minor">
+              <a:schemeClr val="tx1"/>
+            </a:fontRef>
+          </p:style>
+        </p:cxnSp>
+        <p:sp>
+          <p:nvSpPr>
+            <p:cNvPr id="43" name="TextBox 42"/>
+            <p:cNvSpPr txBox="1"/>
+            <p:nvPr/>
+          </p:nvSpPr>
+          <p:spPr>
+            <a:xfrm>
+              <a:off x="5156073" y="2586800"/>
+              <a:ext cx="2804896" cy="360934"/>
+            </a:xfrm>
+            <a:prstGeom prst="rect">
+              <a:avLst/>
+            </a:prstGeom>
+            <a:noFill/>
+          </p:spPr>
+          <p:txBody>
+            <a:bodyPr wrap="none" rtlCol="0">
+              <a:spAutoFit/>
+            </a:bodyPr>
+            <a:lstStyle/>
+            <a:p>
+              <a:r>
+                <a:rPr lang="en-US" sz="800" dirty="0" smtClean="0"/>
+                <a:t>Recommended, Optional</a:t>
+              </a:r>
+              <a:endParaRPr lang="en-US" sz="800" dirty="0"/>
+            </a:p>
+          </p:txBody>
+        </p:sp>
+      </p:grpSp>
+      <p:grpSp>
+        <p:nvGrpSpPr>
+          <p:cNvPr id="44" name="Group 43"/>
+          <p:cNvGrpSpPr/>
+          <p:nvPr/>
+        </p:nvGrpSpPr>
+        <p:grpSpPr>
+          <a:xfrm>
+            <a:off x="2781726" y="4167783"/>
+            <a:ext cx="2706674" cy="2097742"/>
+            <a:chOff x="2728355" y="1405746"/>
+            <a:chExt cx="6173191" cy="3514351"/>
+          </a:xfrm>
+        </p:grpSpPr>
+        <p:sp>
+          <p:nvSpPr>
+            <p:cNvPr id="45" name="Rounded Rectangle 44"/>
+            <p:cNvSpPr/>
+            <p:nvPr/>
+          </p:nvSpPr>
+          <p:spPr>
+            <a:xfrm>
+              <a:off x="2728355" y="4206586"/>
+              <a:ext cx="1360714" cy="707572"/>
+            </a:xfrm>
+            <a:prstGeom prst="roundRect">
+              <a:avLst/>
+            </a:prstGeom>
+            <a:solidFill>
+              <a:schemeClr val="accent3">
+                <a:lumMod val="40000"/>
+                <a:lumOff val="60000"/>
+              </a:schemeClr>
+            </a:solidFill>
+          </p:spPr>
+          <p:style>
+            <a:lnRef idx="2">
+              <a:schemeClr val="accent1">
+                <a:shade val="50000"/>
+              </a:schemeClr>
+            </a:lnRef>
+            <a:fillRef idx="1">
+              <a:schemeClr val="accent1"/>
+            </a:fillRef>
+            <a:effectRef idx="0">
+              <a:schemeClr val="accent1"/>
+            </a:effectRef>
+            <a:fontRef idx="minor">
+              <a:schemeClr val="lt1"/>
+            </a:fontRef>
+          </p:style>
+          <p:txBody>
+            <a:bodyPr rtlCol="0" anchor="ctr"/>
+            <a:lstStyle/>
+            <a:p>
+              <a:pPr algn="ctr"/>
+              <a:r>
+                <a:rPr lang="en-US" sz="800" smtClean="0">
+                  <a:solidFill>
+                    <a:schemeClr val="tx1"/>
+                  </a:solidFill>
+                </a:rPr>
+                <a:t>PI Worker</a:t>
+              </a:r>
+              <a:endParaRPr lang="en-US" sz="800">
+                <a:solidFill>
+                  <a:schemeClr val="tx1"/>
+                </a:solidFill>
+              </a:endParaRPr>
+            </a:p>
+          </p:txBody>
+        </p:sp>
+        <p:sp>
+          <p:nvSpPr>
+            <p:cNvPr id="46" name="Rounded Rectangle 45"/>
+            <p:cNvSpPr/>
+            <p:nvPr/>
+          </p:nvSpPr>
+          <p:spPr>
+            <a:xfrm>
+              <a:off x="2728355" y="2227614"/>
+              <a:ext cx="1360714" cy="707572"/>
+            </a:xfrm>
+            <a:prstGeom prst="roundRect">
+              <a:avLst/>
+            </a:prstGeom>
+            <a:solidFill>
+              <a:schemeClr val="accent3">
+                <a:lumMod val="40000"/>
+                <a:lumOff val="60000"/>
+              </a:schemeClr>
+            </a:solidFill>
+          </p:spPr>
+          <p:style>
+            <a:lnRef idx="2">
+              <a:schemeClr val="accent1">
+                <a:shade val="50000"/>
+              </a:schemeClr>
+            </a:lnRef>
+            <a:fillRef idx="1">
+              <a:schemeClr val="accent1"/>
+            </a:fillRef>
+            <a:effectRef idx="0">
+              <a:schemeClr val="accent1"/>
+            </a:effectRef>
+            <a:fontRef idx="minor">
+              <a:schemeClr val="lt1"/>
+            </a:fontRef>
+          </p:style>
+          <p:txBody>
+            <a:bodyPr rtlCol="0" anchor="ctr"/>
+            <a:lstStyle/>
+            <a:p>
+              <a:pPr algn="ctr"/>
+              <a:r>
+                <a:rPr lang="en-US" sz="800" smtClean="0">
+                  <a:solidFill>
+                    <a:schemeClr val="tx1"/>
+                  </a:solidFill>
+                </a:rPr>
+                <a:t>PI Master </a:t>
+              </a:r>
+              <a:endParaRPr lang="en-US" sz="800" dirty="0">
+                <a:solidFill>
+                  <a:schemeClr val="tx1"/>
+                </a:solidFill>
+              </a:endParaRPr>
+            </a:p>
+          </p:txBody>
+        </p:sp>
+        <p:sp>
+          <p:nvSpPr>
+            <p:cNvPr id="47" name="Rounded Rectangle 46"/>
+            <p:cNvSpPr/>
+            <p:nvPr/>
+          </p:nvSpPr>
+          <p:spPr>
+            <a:xfrm>
+              <a:off x="7540832" y="4206586"/>
+              <a:ext cx="1360714" cy="707572"/>
+            </a:xfrm>
+            <a:prstGeom prst="roundRect">
+              <a:avLst/>
+            </a:prstGeom>
+            <a:solidFill>
+              <a:schemeClr val="accent3">
+                <a:lumMod val="40000"/>
+                <a:lumOff val="60000"/>
+              </a:schemeClr>
+            </a:solidFill>
+          </p:spPr>
+          <p:style>
+            <a:lnRef idx="2">
+              <a:schemeClr val="accent1">
+                <a:shade val="50000"/>
+              </a:schemeClr>
+            </a:lnRef>
+            <a:fillRef idx="1">
+              <a:schemeClr val="accent1"/>
+            </a:fillRef>
+            <a:effectRef idx="0">
+              <a:schemeClr val="accent1"/>
+            </a:effectRef>
+            <a:fontRef idx="minor">
+              <a:schemeClr val="lt1"/>
+            </a:fontRef>
+          </p:style>
+          <p:txBody>
+            <a:bodyPr rtlCol="0" anchor="ctr"/>
+            <a:lstStyle/>
+            <a:p>
+              <a:pPr algn="ctr"/>
+              <a:r>
+                <a:rPr lang="en-US" sz="800" smtClean="0">
+                  <a:solidFill>
+                    <a:schemeClr val="tx1"/>
+                  </a:solidFill>
+                </a:rPr>
+                <a:t>PI Worker</a:t>
+              </a:r>
+              <a:endParaRPr lang="en-US" sz="800">
+                <a:solidFill>
+                  <a:schemeClr val="tx1"/>
+                </a:solidFill>
+              </a:endParaRPr>
+            </a:p>
+          </p:txBody>
+        </p:sp>
+        <p:sp>
+          <p:nvSpPr>
+            <p:cNvPr id="48" name="Rounded Rectangle 47"/>
+            <p:cNvSpPr/>
+            <p:nvPr/>
+          </p:nvSpPr>
+          <p:spPr>
+            <a:xfrm>
+              <a:off x="5936673" y="4212525"/>
+              <a:ext cx="1360714" cy="707572"/>
+            </a:xfrm>
+            <a:prstGeom prst="roundRect">
+              <a:avLst/>
+            </a:prstGeom>
+            <a:solidFill>
+              <a:schemeClr val="accent3">
+                <a:lumMod val="40000"/>
+                <a:lumOff val="60000"/>
+              </a:schemeClr>
+            </a:solidFill>
+          </p:spPr>
+          <p:style>
+            <a:lnRef idx="2">
+              <a:schemeClr val="accent1">
+                <a:shade val="50000"/>
+              </a:schemeClr>
+            </a:lnRef>
+            <a:fillRef idx="1">
+              <a:schemeClr val="accent1"/>
+            </a:fillRef>
+            <a:effectRef idx="0">
+              <a:schemeClr val="accent1"/>
+            </a:effectRef>
+            <a:fontRef idx="minor">
+              <a:schemeClr val="lt1"/>
+            </a:fontRef>
+          </p:style>
+          <p:txBody>
+            <a:bodyPr rtlCol="0" anchor="ctr"/>
+            <a:lstStyle/>
+            <a:p>
+              <a:pPr algn="ctr"/>
+              <a:r>
+                <a:rPr lang="en-US" sz="800" smtClean="0">
+                  <a:solidFill>
+                    <a:schemeClr val="tx1"/>
+                  </a:solidFill>
+                </a:rPr>
+                <a:t>PI Worker</a:t>
+              </a:r>
+              <a:endParaRPr lang="en-US" sz="800">
+                <a:solidFill>
+                  <a:schemeClr val="tx1"/>
+                </a:solidFill>
+              </a:endParaRPr>
+            </a:p>
+          </p:txBody>
+        </p:sp>
+        <p:sp>
+          <p:nvSpPr>
+            <p:cNvPr id="49" name="Rounded Rectangle 48"/>
+            <p:cNvSpPr/>
+            <p:nvPr/>
+          </p:nvSpPr>
+          <p:spPr>
+            <a:xfrm>
+              <a:off x="4332514" y="4206586"/>
+              <a:ext cx="1360714" cy="707572"/>
+            </a:xfrm>
+            <a:prstGeom prst="roundRect">
+              <a:avLst/>
+            </a:prstGeom>
+            <a:solidFill>
+              <a:schemeClr val="accent3">
+                <a:lumMod val="40000"/>
+                <a:lumOff val="60000"/>
+              </a:schemeClr>
+            </a:solidFill>
+          </p:spPr>
+          <p:style>
+            <a:lnRef idx="2">
+              <a:schemeClr val="accent1">
+                <a:shade val="50000"/>
+              </a:schemeClr>
+            </a:lnRef>
+            <a:fillRef idx="1">
+              <a:schemeClr val="accent1"/>
+            </a:fillRef>
+            <a:effectRef idx="0">
+              <a:schemeClr val="accent1"/>
+            </a:effectRef>
+            <a:fontRef idx="minor">
+              <a:schemeClr val="lt1"/>
+            </a:fontRef>
+          </p:style>
+          <p:txBody>
+            <a:bodyPr rtlCol="0" anchor="ctr"/>
+            <a:lstStyle/>
+            <a:p>
+              <a:pPr algn="ctr"/>
+              <a:r>
+                <a:rPr lang="en-US" sz="800" smtClean="0">
+                  <a:solidFill>
+                    <a:schemeClr val="tx1"/>
+                  </a:solidFill>
+                </a:rPr>
+                <a:t>PI Worker</a:t>
+              </a:r>
+              <a:endParaRPr lang="en-US" sz="800">
+                <a:solidFill>
+                  <a:schemeClr val="tx1"/>
+                </a:solidFill>
+              </a:endParaRPr>
+            </a:p>
+          </p:txBody>
+        </p:sp>
+        <p:sp>
+          <p:nvSpPr>
+            <p:cNvPr id="50" name="Rounded Rectangle 49"/>
+            <p:cNvSpPr/>
+            <p:nvPr/>
+          </p:nvSpPr>
+          <p:spPr>
+            <a:xfrm>
+              <a:off x="2728355" y="3365419"/>
+              <a:ext cx="6173191" cy="410934"/>
+            </a:xfrm>
+            <a:prstGeom prst="roundRect">
+              <a:avLst/>
+            </a:prstGeom>
+            <a:solidFill>
+              <a:schemeClr val="accent1"/>
+            </a:solidFill>
+          </p:spPr>
+          <p:style>
+            <a:lnRef idx="2">
+              <a:schemeClr val="accent1">
+                <a:shade val="50000"/>
+              </a:schemeClr>
+            </a:lnRef>
+            <a:fillRef idx="1">
+              <a:schemeClr val="accent1"/>
+            </a:fillRef>
+            <a:effectRef idx="0">
+              <a:schemeClr val="accent1"/>
+            </a:effectRef>
+            <a:fontRef idx="minor">
+              <a:schemeClr val="lt1"/>
+            </a:fontRef>
+          </p:style>
+          <p:txBody>
+            <a:bodyPr rtlCol="0" anchor="ctr"/>
+            <a:lstStyle/>
+            <a:p>
+              <a:pPr algn="ctr"/>
+              <a:r>
+                <a:rPr lang="en-US" sz="800" dirty="0" smtClean="0"/>
+                <a:t>Network Switch</a:t>
+              </a:r>
+              <a:endParaRPr lang="en-US" sz="800" dirty="0"/>
+            </a:p>
+          </p:txBody>
+        </p:sp>
+        <p:cxnSp>
+          <p:nvCxnSpPr>
+            <p:cNvPr id="51" name="Straight Arrow Connector 50"/>
+            <p:cNvCxnSpPr>
+              <a:stCxn id="47" idx="2"/>
+            </p:cNvCxnSpPr>
+            <p:nvPr/>
+          </p:nvCxnSpPr>
+          <p:spPr>
+            <a:xfrm>
+              <a:off x="3408712" y="2935186"/>
+              <a:ext cx="0" cy="430233"/>
+            </a:xfrm>
+            <a:prstGeom prst="straightConnector1">
+              <a:avLst/>
+            </a:prstGeom>
+            <a:ln>
+              <a:headEnd type="triangle"/>
+              <a:tailEnd type="triangle"/>
+            </a:ln>
+          </p:spPr>
+          <p:style>
+            <a:lnRef idx="1">
+              <a:schemeClr val="accent1"/>
+            </a:lnRef>
+            <a:fillRef idx="0">
+              <a:schemeClr val="accent1"/>
+            </a:fillRef>
+            <a:effectRef idx="0">
+              <a:schemeClr val="accent1"/>
+            </a:effectRef>
+            <a:fontRef idx="minor">
+              <a:schemeClr val="tx1"/>
+            </a:fontRef>
+          </p:style>
+        </p:cxnSp>
+        <p:cxnSp>
+          <p:nvCxnSpPr>
+            <p:cNvPr id="52" name="Straight Arrow Connector 51"/>
+            <p:cNvCxnSpPr/>
+            <p:nvPr/>
+          </p:nvCxnSpPr>
+          <p:spPr>
+            <a:xfrm>
+              <a:off x="3419102" y="3776353"/>
+              <a:ext cx="0" cy="430233"/>
+            </a:xfrm>
+            <a:prstGeom prst="straightConnector1">
+              <a:avLst/>
+            </a:prstGeom>
+            <a:ln>
+              <a:headEnd type="triangle"/>
+              <a:tailEnd type="triangle"/>
+            </a:ln>
+          </p:spPr>
+          <p:style>
+            <a:lnRef idx="1">
+              <a:schemeClr val="accent1"/>
+            </a:lnRef>
+            <a:fillRef idx="0">
+              <a:schemeClr val="accent1"/>
+            </a:fillRef>
+            <a:effectRef idx="0">
+              <a:schemeClr val="accent1"/>
+            </a:effectRef>
+            <a:fontRef idx="minor">
+              <a:schemeClr val="tx1"/>
+            </a:fontRef>
+          </p:style>
+        </p:cxnSp>
+        <p:cxnSp>
+          <p:nvCxnSpPr>
+            <p:cNvPr id="53" name="Straight Arrow Connector 52"/>
+            <p:cNvCxnSpPr/>
+            <p:nvPr/>
+          </p:nvCxnSpPr>
+          <p:spPr>
+            <a:xfrm>
+              <a:off x="5055917" y="3776353"/>
+              <a:ext cx="0" cy="430233"/>
+            </a:xfrm>
+            <a:prstGeom prst="straightConnector1">
+              <a:avLst/>
+            </a:prstGeom>
+            <a:ln>
+              <a:headEnd type="triangle"/>
+              <a:tailEnd type="triangle"/>
+            </a:ln>
+          </p:spPr>
+          <p:style>
+            <a:lnRef idx="1">
+              <a:schemeClr val="accent1"/>
+            </a:lnRef>
+            <a:fillRef idx="0">
+              <a:schemeClr val="accent1"/>
+            </a:fillRef>
+            <a:effectRef idx="0">
+              <a:schemeClr val="accent1"/>
+            </a:effectRef>
+            <a:fontRef idx="minor">
+              <a:schemeClr val="tx1"/>
+            </a:fontRef>
+          </p:style>
+        </p:cxnSp>
+        <p:cxnSp>
+          <p:nvCxnSpPr>
+            <p:cNvPr id="54" name="Straight Arrow Connector 53"/>
+            <p:cNvCxnSpPr/>
+            <p:nvPr/>
+          </p:nvCxnSpPr>
+          <p:spPr>
+            <a:xfrm>
+              <a:off x="6587835" y="3776353"/>
+              <a:ext cx="0" cy="430233"/>
+            </a:xfrm>
+            <a:prstGeom prst="straightConnector1">
+              <a:avLst/>
+            </a:prstGeom>
+            <a:ln>
+              <a:headEnd type="triangle"/>
+              <a:tailEnd type="triangle"/>
+            </a:ln>
+          </p:spPr>
+          <p:style>
+            <a:lnRef idx="1">
+              <a:schemeClr val="accent1"/>
+            </a:lnRef>
+            <a:fillRef idx="0">
+              <a:schemeClr val="accent1"/>
+            </a:fillRef>
+            <a:effectRef idx="0">
+              <a:schemeClr val="accent1"/>
+            </a:effectRef>
+            <a:fontRef idx="minor">
+              <a:schemeClr val="tx1"/>
+            </a:fontRef>
+          </p:style>
+        </p:cxnSp>
+        <p:cxnSp>
+          <p:nvCxnSpPr>
+            <p:cNvPr id="55" name="Straight Arrow Connector 54"/>
+            <p:cNvCxnSpPr/>
+            <p:nvPr/>
+          </p:nvCxnSpPr>
+          <p:spPr>
+            <a:xfrm>
+              <a:off x="8189024" y="3776353"/>
+              <a:ext cx="0" cy="430233"/>
+            </a:xfrm>
+            <a:prstGeom prst="straightConnector1">
+              <a:avLst/>
+            </a:prstGeom>
+            <a:ln>
+              <a:headEnd type="triangle"/>
+              <a:tailEnd type="triangle"/>
+            </a:ln>
+          </p:spPr>
+          <p:style>
+            <a:lnRef idx="1">
+              <a:schemeClr val="accent1"/>
+            </a:lnRef>
+            <a:fillRef idx="0">
+              <a:schemeClr val="accent1"/>
+            </a:fillRef>
+            <a:effectRef idx="0">
+              <a:schemeClr val="accent1"/>
+            </a:effectRef>
+            <a:fontRef idx="minor">
+              <a:schemeClr val="tx1"/>
+            </a:fontRef>
+          </p:style>
+        </p:cxnSp>
+        <p:sp>
+          <p:nvSpPr>
+            <p:cNvPr id="56" name="Rounded Rectangle 55"/>
+            <p:cNvSpPr/>
+            <p:nvPr/>
+          </p:nvSpPr>
+          <p:spPr>
+            <a:xfrm>
+              <a:off x="2728355" y="1405746"/>
+              <a:ext cx="1360714" cy="410934"/>
+            </a:xfrm>
+            <a:prstGeom prst="roundRect">
+              <a:avLst/>
+            </a:prstGeom>
+            <a:solidFill>
+              <a:schemeClr val="accent1"/>
+            </a:solidFill>
+          </p:spPr>
+          <p:style>
+            <a:lnRef idx="2">
+              <a:schemeClr val="accent1">
+                <a:shade val="50000"/>
+              </a:schemeClr>
+            </a:lnRef>
+            <a:fillRef idx="1">
+              <a:schemeClr val="accent1"/>
+            </a:fillRef>
+            <a:effectRef idx="0">
+              <a:schemeClr val="accent1"/>
+            </a:effectRef>
+            <a:fontRef idx="minor">
+              <a:schemeClr val="lt1"/>
+            </a:fontRef>
+          </p:style>
+          <p:txBody>
+            <a:bodyPr rtlCol="0" anchor="ctr"/>
+            <a:lstStyle/>
+            <a:p>
+              <a:pPr algn="ctr"/>
+              <a:r>
+                <a:rPr lang="en-US" sz="800" dirty="0" err="1" smtClean="0"/>
+                <a:t>Wifi</a:t>
+              </a:r>
+              <a:endParaRPr lang="en-US" sz="800" dirty="0"/>
+            </a:p>
+          </p:txBody>
+        </p:sp>
+        <p:cxnSp>
+          <p:nvCxnSpPr>
+            <p:cNvPr id="57" name="Straight Arrow Connector 56"/>
+            <p:cNvCxnSpPr/>
+            <p:nvPr/>
+          </p:nvCxnSpPr>
+          <p:spPr>
+            <a:xfrm>
+              <a:off x="3419102" y="1797381"/>
+              <a:ext cx="0" cy="430233"/>
+            </a:xfrm>
+            <a:prstGeom prst="straightConnector1">
+              <a:avLst/>
+            </a:prstGeom>
+            <a:ln>
+              <a:headEnd type="triangle"/>
+              <a:tailEnd type="triangle"/>
+            </a:ln>
+          </p:spPr>
+          <p:style>
+            <a:lnRef idx="1">
+              <a:schemeClr val="accent1"/>
+            </a:lnRef>
+            <a:fillRef idx="0">
+              <a:schemeClr val="accent1"/>
+            </a:fillRef>
+            <a:effectRef idx="0">
+              <a:schemeClr val="accent1"/>
+            </a:effectRef>
+            <a:fontRef idx="minor">
+              <a:schemeClr val="tx1"/>
+            </a:fontRef>
+          </p:style>
+        </p:cxnSp>
+        <p:pic>
+          <p:nvPicPr>
+            <p:cNvPr id="58" name="Picture 57"/>
+            <p:cNvPicPr>
+              <a:picLocks noChangeAspect="1"/>
+            </p:cNvPicPr>
+            <p:nvPr/>
+          </p:nvPicPr>
+          <p:blipFill>
+            <a:blip r:embed="rId2"/>
+            <a:stretch>
+              <a:fillRect/>
+            </a:stretch>
+          </p:blipFill>
+          <p:spPr>
+            <a:xfrm>
+              <a:off x="6212507" y="1420087"/>
+              <a:ext cx="1184819" cy="1184819"/>
+            </a:xfrm>
+            <a:prstGeom prst="rect">
+              <a:avLst/>
+            </a:prstGeom>
+          </p:spPr>
+        </p:pic>
+        <p:pic>
+          <p:nvPicPr>
+            <p:cNvPr id="59" name="Picture 58"/>
+            <p:cNvPicPr>
+              <a:picLocks noChangeAspect="1"/>
+            </p:cNvPicPr>
+            <p:nvPr/>
+          </p:nvPicPr>
+          <p:blipFill>
+            <a:blip r:embed="rId3"/>
+            <a:stretch>
+              <a:fillRect/>
+            </a:stretch>
+          </p:blipFill>
+          <p:spPr>
+            <a:xfrm flipH="1">
+              <a:off x="5124669" y="1581226"/>
+              <a:ext cx="986693" cy="986693"/>
+            </a:xfrm>
+            <a:prstGeom prst="rect">
+              <a:avLst/>
+            </a:prstGeom>
+          </p:spPr>
+        </p:pic>
+        <p:pic>
+          <p:nvPicPr>
+            <p:cNvPr id="60" name="Picture 59"/>
+            <p:cNvPicPr>
+              <a:picLocks noChangeAspect="1"/>
+            </p:cNvPicPr>
+            <p:nvPr/>
+          </p:nvPicPr>
+          <p:blipFill>
+            <a:blip r:embed="rId4"/>
+            <a:stretch>
+              <a:fillRect/>
+            </a:stretch>
+          </p:blipFill>
+          <p:spPr>
+            <a:xfrm>
+              <a:off x="4612363" y="1966321"/>
+              <a:ext cx="465447" cy="465447"/>
+            </a:xfrm>
+            <a:prstGeom prst="rect">
+              <a:avLst/>
+            </a:prstGeom>
+          </p:spPr>
+        </p:pic>
+        <p:cxnSp>
+          <p:nvCxnSpPr>
+            <p:cNvPr id="61" name="Straight Arrow Connector 60"/>
+            <p:cNvCxnSpPr/>
+            <p:nvPr/>
+          </p:nvCxnSpPr>
+          <p:spPr>
+            <a:xfrm flipV="1">
+              <a:off x="4332514" y="2567919"/>
+              <a:ext cx="3633792" cy="19291"/>
+            </a:xfrm>
+            <a:prstGeom prst="straightConnector1">
+              <a:avLst/>
+            </a:prstGeom>
+            <a:ln>
+              <a:headEnd type="triangle"/>
+              <a:tailEnd type="triangle"/>
+            </a:ln>
+          </p:spPr>
+          <p:style>
+            <a:lnRef idx="1">
+              <a:schemeClr val="accent1"/>
+            </a:lnRef>
+            <a:fillRef idx="0">
+              <a:schemeClr val="accent1"/>
+            </a:fillRef>
+            <a:effectRef idx="0">
+              <a:schemeClr val="accent1"/>
+            </a:effectRef>
+            <a:fontRef idx="minor">
+              <a:schemeClr val="tx1"/>
+            </a:fontRef>
+          </p:style>
+        </p:cxnSp>
+        <p:sp>
+          <p:nvSpPr>
+            <p:cNvPr id="62" name="TextBox 61"/>
+            <p:cNvSpPr txBox="1"/>
+            <p:nvPr/>
+          </p:nvSpPr>
+          <p:spPr>
+            <a:xfrm>
+              <a:off x="5156073" y="2586800"/>
+              <a:ext cx="2804896" cy="360934"/>
+            </a:xfrm>
+            <a:prstGeom prst="rect">
+              <a:avLst/>
+            </a:prstGeom>
+            <a:noFill/>
+          </p:spPr>
+          <p:txBody>
+            <a:bodyPr wrap="none" rtlCol="0">
+              <a:spAutoFit/>
+            </a:bodyPr>
+            <a:lstStyle/>
+            <a:p>
+              <a:r>
+                <a:rPr lang="en-US" sz="800" dirty="0" smtClean="0"/>
+                <a:t>Recommended, Optional</a:t>
+              </a:r>
+              <a:endParaRPr lang="en-US" sz="800" dirty="0"/>
+            </a:p>
+          </p:txBody>
+        </p:sp>
+      </p:grpSp>
+      <p:grpSp>
+        <p:nvGrpSpPr>
+          <p:cNvPr id="63" name="Group 62"/>
+          <p:cNvGrpSpPr/>
+          <p:nvPr/>
+        </p:nvGrpSpPr>
+        <p:grpSpPr>
+          <a:xfrm>
+            <a:off x="8349661" y="4160250"/>
+            <a:ext cx="2706674" cy="2097742"/>
+            <a:chOff x="2728355" y="1405746"/>
+            <a:chExt cx="6173191" cy="3514351"/>
+          </a:xfrm>
+        </p:grpSpPr>
+        <p:sp>
+          <p:nvSpPr>
+            <p:cNvPr id="64" name="Rounded Rectangle 63"/>
+            <p:cNvSpPr/>
+            <p:nvPr/>
+          </p:nvSpPr>
+          <p:spPr>
+            <a:xfrm>
+              <a:off x="2728355" y="4206586"/>
+              <a:ext cx="1360714" cy="707572"/>
+            </a:xfrm>
+            <a:prstGeom prst="roundRect">
+              <a:avLst/>
+            </a:prstGeom>
+            <a:solidFill>
+              <a:schemeClr val="accent3">
+                <a:lumMod val="40000"/>
+                <a:lumOff val="60000"/>
+              </a:schemeClr>
+            </a:solidFill>
+          </p:spPr>
+          <p:style>
+            <a:lnRef idx="2">
+              <a:schemeClr val="accent1">
+                <a:shade val="50000"/>
+              </a:schemeClr>
+            </a:lnRef>
+            <a:fillRef idx="1">
+              <a:schemeClr val="accent1"/>
+            </a:fillRef>
+            <a:effectRef idx="0">
+              <a:schemeClr val="accent1"/>
+            </a:effectRef>
+            <a:fontRef idx="minor">
+              <a:schemeClr val="lt1"/>
+            </a:fontRef>
+          </p:style>
+          <p:txBody>
+            <a:bodyPr rtlCol="0" anchor="ctr"/>
+            <a:lstStyle/>
+            <a:p>
+              <a:pPr algn="ctr"/>
+              <a:r>
+                <a:rPr lang="en-US" sz="800" smtClean="0">
+                  <a:solidFill>
+                    <a:schemeClr val="tx1"/>
+                  </a:solidFill>
+                </a:rPr>
+                <a:t>PI Worker</a:t>
+              </a:r>
+              <a:endParaRPr lang="en-US" sz="800">
+                <a:solidFill>
+                  <a:schemeClr val="tx1"/>
+                </a:solidFill>
+              </a:endParaRPr>
+            </a:p>
+          </p:txBody>
+        </p:sp>
+        <p:sp>
+          <p:nvSpPr>
+            <p:cNvPr id="65" name="Rounded Rectangle 64"/>
+            <p:cNvSpPr/>
+            <p:nvPr/>
+          </p:nvSpPr>
+          <p:spPr>
+            <a:xfrm>
+              <a:off x="2728355" y="2227614"/>
+              <a:ext cx="1360714" cy="707572"/>
+            </a:xfrm>
+            <a:prstGeom prst="roundRect">
+              <a:avLst/>
+            </a:prstGeom>
+            <a:solidFill>
+              <a:schemeClr val="accent3">
+                <a:lumMod val="40000"/>
+                <a:lumOff val="60000"/>
+              </a:schemeClr>
+            </a:solidFill>
+          </p:spPr>
+          <p:style>
+            <a:lnRef idx="2">
+              <a:schemeClr val="accent1">
+                <a:shade val="50000"/>
+              </a:schemeClr>
+            </a:lnRef>
+            <a:fillRef idx="1">
+              <a:schemeClr val="accent1"/>
+            </a:fillRef>
+            <a:effectRef idx="0">
+              <a:schemeClr val="accent1"/>
+            </a:effectRef>
+            <a:fontRef idx="minor">
+              <a:schemeClr val="lt1"/>
+            </a:fontRef>
+          </p:style>
+          <p:txBody>
+            <a:bodyPr rtlCol="0" anchor="ctr"/>
+            <a:lstStyle/>
+            <a:p>
+              <a:pPr algn="ctr"/>
+              <a:r>
+                <a:rPr lang="en-US" sz="800" smtClean="0">
+                  <a:solidFill>
+                    <a:schemeClr val="tx1"/>
+                  </a:solidFill>
+                </a:rPr>
+                <a:t>PI Master </a:t>
+              </a:r>
+              <a:endParaRPr lang="en-US" sz="800" dirty="0">
+                <a:solidFill>
+                  <a:schemeClr val="tx1"/>
+                </a:solidFill>
+              </a:endParaRPr>
+            </a:p>
+          </p:txBody>
+        </p:sp>
+        <p:sp>
+          <p:nvSpPr>
+            <p:cNvPr id="66" name="Rounded Rectangle 65"/>
+            <p:cNvSpPr/>
+            <p:nvPr/>
+          </p:nvSpPr>
+          <p:spPr>
+            <a:xfrm>
+              <a:off x="7540832" y="4206586"/>
+              <a:ext cx="1360714" cy="707572"/>
+            </a:xfrm>
+            <a:prstGeom prst="roundRect">
+              <a:avLst/>
+            </a:prstGeom>
+            <a:solidFill>
+              <a:schemeClr val="accent3">
+                <a:lumMod val="40000"/>
+                <a:lumOff val="60000"/>
+              </a:schemeClr>
+            </a:solidFill>
+          </p:spPr>
+          <p:style>
+            <a:lnRef idx="2">
+              <a:schemeClr val="accent1">
+                <a:shade val="50000"/>
+              </a:schemeClr>
+            </a:lnRef>
+            <a:fillRef idx="1">
+              <a:schemeClr val="accent1"/>
+            </a:fillRef>
+            <a:effectRef idx="0">
+              <a:schemeClr val="accent1"/>
+            </a:effectRef>
+            <a:fontRef idx="minor">
+              <a:schemeClr val="lt1"/>
+            </a:fontRef>
+          </p:style>
+          <p:txBody>
+            <a:bodyPr rtlCol="0" anchor="ctr"/>
+            <a:lstStyle/>
+            <a:p>
+              <a:pPr algn="ctr"/>
+              <a:r>
+                <a:rPr lang="en-US" sz="800" smtClean="0">
+                  <a:solidFill>
+                    <a:schemeClr val="tx1"/>
+                  </a:solidFill>
+                </a:rPr>
+                <a:t>PI Worker</a:t>
+              </a:r>
+              <a:endParaRPr lang="en-US" sz="800">
+                <a:solidFill>
+                  <a:schemeClr val="tx1"/>
+                </a:solidFill>
+              </a:endParaRPr>
+            </a:p>
+          </p:txBody>
+        </p:sp>
+        <p:sp>
+          <p:nvSpPr>
+            <p:cNvPr id="67" name="Rounded Rectangle 66"/>
+            <p:cNvSpPr/>
+            <p:nvPr/>
+          </p:nvSpPr>
+          <p:spPr>
+            <a:xfrm>
+              <a:off x="5936673" y="4212525"/>
+              <a:ext cx="1360714" cy="707572"/>
+            </a:xfrm>
+            <a:prstGeom prst="roundRect">
+              <a:avLst/>
+            </a:prstGeom>
+            <a:solidFill>
+              <a:schemeClr val="accent3">
+                <a:lumMod val="40000"/>
+                <a:lumOff val="60000"/>
+              </a:schemeClr>
+            </a:solidFill>
+          </p:spPr>
+          <p:style>
+            <a:lnRef idx="2">
+              <a:schemeClr val="accent1">
+                <a:shade val="50000"/>
+              </a:schemeClr>
+            </a:lnRef>
+            <a:fillRef idx="1">
+              <a:schemeClr val="accent1"/>
+            </a:fillRef>
+            <a:effectRef idx="0">
+              <a:schemeClr val="accent1"/>
+            </a:effectRef>
+            <a:fontRef idx="minor">
+              <a:schemeClr val="lt1"/>
+            </a:fontRef>
+          </p:style>
+          <p:txBody>
+            <a:bodyPr rtlCol="0" anchor="ctr"/>
+            <a:lstStyle/>
+            <a:p>
+              <a:pPr algn="ctr"/>
+              <a:r>
+                <a:rPr lang="en-US" sz="800" smtClean="0">
+                  <a:solidFill>
+                    <a:schemeClr val="tx1"/>
+                  </a:solidFill>
+                </a:rPr>
+                <a:t>PI Worker</a:t>
+              </a:r>
+              <a:endParaRPr lang="en-US" sz="800">
+                <a:solidFill>
+                  <a:schemeClr val="tx1"/>
+                </a:solidFill>
+              </a:endParaRPr>
+            </a:p>
+          </p:txBody>
+        </p:sp>
+        <p:sp>
+          <p:nvSpPr>
+            <p:cNvPr id="68" name="Rounded Rectangle 67"/>
+            <p:cNvSpPr/>
+            <p:nvPr/>
+          </p:nvSpPr>
+          <p:spPr>
+            <a:xfrm>
+              <a:off x="4332514" y="4206586"/>
+              <a:ext cx="1360714" cy="707572"/>
+            </a:xfrm>
+            <a:prstGeom prst="roundRect">
+              <a:avLst/>
+            </a:prstGeom>
+            <a:solidFill>
+              <a:schemeClr val="accent3">
+                <a:lumMod val="40000"/>
+                <a:lumOff val="60000"/>
+              </a:schemeClr>
+            </a:solidFill>
+          </p:spPr>
+          <p:style>
+            <a:lnRef idx="2">
+              <a:schemeClr val="accent1">
+                <a:shade val="50000"/>
+              </a:schemeClr>
+            </a:lnRef>
+            <a:fillRef idx="1">
+              <a:schemeClr val="accent1"/>
+            </a:fillRef>
+            <a:effectRef idx="0">
+              <a:schemeClr val="accent1"/>
+            </a:effectRef>
+            <a:fontRef idx="minor">
+              <a:schemeClr val="lt1"/>
+            </a:fontRef>
+          </p:style>
+          <p:txBody>
+            <a:bodyPr rtlCol="0" anchor="ctr"/>
+            <a:lstStyle/>
+            <a:p>
+              <a:pPr algn="ctr"/>
+              <a:r>
+                <a:rPr lang="en-US" sz="800" smtClean="0">
+                  <a:solidFill>
+                    <a:schemeClr val="tx1"/>
+                  </a:solidFill>
+                </a:rPr>
+                <a:t>PI Worker</a:t>
+              </a:r>
+              <a:endParaRPr lang="en-US" sz="800">
+                <a:solidFill>
+                  <a:schemeClr val="tx1"/>
+                </a:solidFill>
+              </a:endParaRPr>
+            </a:p>
+          </p:txBody>
+        </p:sp>
+        <p:sp>
+          <p:nvSpPr>
+            <p:cNvPr id="69" name="Rounded Rectangle 68"/>
+            <p:cNvSpPr/>
+            <p:nvPr/>
+          </p:nvSpPr>
+          <p:spPr>
+            <a:xfrm>
+              <a:off x="2728355" y="3365419"/>
+              <a:ext cx="6173191" cy="410935"/>
+            </a:xfrm>
+            <a:prstGeom prst="roundRect">
+              <a:avLst/>
+            </a:prstGeom>
+            <a:solidFill>
+              <a:schemeClr val="accent1"/>
+            </a:solidFill>
+          </p:spPr>
+          <p:style>
+            <a:lnRef idx="2">
+              <a:schemeClr val="accent1">
+                <a:shade val="50000"/>
+              </a:schemeClr>
+            </a:lnRef>
+            <a:fillRef idx="1">
+              <a:schemeClr val="accent1"/>
+            </a:fillRef>
+            <a:effectRef idx="0">
+              <a:schemeClr val="accent1"/>
+            </a:effectRef>
+            <a:fontRef idx="minor">
+              <a:schemeClr val="lt1"/>
+            </a:fontRef>
+          </p:style>
+          <p:txBody>
+            <a:bodyPr rtlCol="0" anchor="ctr"/>
+            <a:lstStyle/>
+            <a:p>
+              <a:pPr algn="ctr"/>
+              <a:r>
+                <a:rPr lang="en-US" sz="800" dirty="0" smtClean="0"/>
+                <a:t>Network Switch</a:t>
+              </a:r>
+              <a:endParaRPr lang="en-US" sz="800" dirty="0"/>
+            </a:p>
+          </p:txBody>
+        </p:sp>
+        <p:cxnSp>
+          <p:nvCxnSpPr>
+            <p:cNvPr id="70" name="Straight Arrow Connector 69"/>
+            <p:cNvCxnSpPr>
+              <a:stCxn id="66" idx="2"/>
+            </p:cNvCxnSpPr>
+            <p:nvPr/>
+          </p:nvCxnSpPr>
+          <p:spPr>
+            <a:xfrm>
+              <a:off x="3408712" y="2935186"/>
+              <a:ext cx="0" cy="430233"/>
+            </a:xfrm>
+            <a:prstGeom prst="straightConnector1">
+              <a:avLst/>
+            </a:prstGeom>
+            <a:ln>
+              <a:headEnd type="triangle"/>
+              <a:tailEnd type="triangle"/>
+            </a:ln>
+          </p:spPr>
+          <p:style>
+            <a:lnRef idx="1">
+              <a:schemeClr val="accent1"/>
+            </a:lnRef>
+            <a:fillRef idx="0">
+              <a:schemeClr val="accent1"/>
+            </a:fillRef>
+            <a:effectRef idx="0">
+              <a:schemeClr val="accent1"/>
+            </a:effectRef>
+            <a:fontRef idx="minor">
+              <a:schemeClr val="tx1"/>
+            </a:fontRef>
+          </p:style>
+        </p:cxnSp>
+        <p:cxnSp>
+          <p:nvCxnSpPr>
+            <p:cNvPr id="71" name="Straight Arrow Connector 70"/>
+            <p:cNvCxnSpPr/>
+            <p:nvPr/>
+          </p:nvCxnSpPr>
+          <p:spPr>
+            <a:xfrm>
+              <a:off x="3419102" y="3776353"/>
+              <a:ext cx="0" cy="430233"/>
+            </a:xfrm>
+            <a:prstGeom prst="straightConnector1">
+              <a:avLst/>
+            </a:prstGeom>
+            <a:ln>
+              <a:headEnd type="triangle"/>
+              <a:tailEnd type="triangle"/>
+            </a:ln>
+          </p:spPr>
+          <p:style>
+            <a:lnRef idx="1">
+              <a:schemeClr val="accent1"/>
+            </a:lnRef>
+            <a:fillRef idx="0">
+              <a:schemeClr val="accent1"/>
+            </a:fillRef>
+            <a:effectRef idx="0">
+              <a:schemeClr val="accent1"/>
+            </a:effectRef>
+            <a:fontRef idx="minor">
+              <a:schemeClr val="tx1"/>
+            </a:fontRef>
+          </p:style>
+        </p:cxnSp>
+        <p:cxnSp>
+          <p:nvCxnSpPr>
+            <p:cNvPr id="72" name="Straight Arrow Connector 71"/>
+            <p:cNvCxnSpPr/>
+            <p:nvPr/>
+          </p:nvCxnSpPr>
+          <p:spPr>
+            <a:xfrm>
+              <a:off x="5055917" y="3776353"/>
+              <a:ext cx="0" cy="430233"/>
+            </a:xfrm>
+            <a:prstGeom prst="straightConnector1">
+              <a:avLst/>
+            </a:prstGeom>
+            <a:ln>
+              <a:headEnd type="triangle"/>
+              <a:tailEnd type="triangle"/>
+            </a:ln>
+          </p:spPr>
+          <p:style>
+            <a:lnRef idx="1">
+              <a:schemeClr val="accent1"/>
+            </a:lnRef>
+            <a:fillRef idx="0">
+              <a:schemeClr val="accent1"/>
+            </a:fillRef>
+            <a:effectRef idx="0">
+              <a:schemeClr val="accent1"/>
+            </a:effectRef>
+            <a:fontRef idx="minor">
+              <a:schemeClr val="tx1"/>
+            </a:fontRef>
+          </p:style>
+        </p:cxnSp>
+        <p:cxnSp>
+          <p:nvCxnSpPr>
+            <p:cNvPr id="73" name="Straight Arrow Connector 72"/>
+            <p:cNvCxnSpPr/>
+            <p:nvPr/>
+          </p:nvCxnSpPr>
+          <p:spPr>
+            <a:xfrm>
+              <a:off x="6587835" y="3776353"/>
+              <a:ext cx="0" cy="430233"/>
+            </a:xfrm>
+            <a:prstGeom prst="straightConnector1">
+              <a:avLst/>
+            </a:prstGeom>
+            <a:ln>
+              <a:headEnd type="triangle"/>
+              <a:tailEnd type="triangle"/>
+            </a:ln>
+          </p:spPr>
+          <p:style>
+            <a:lnRef idx="1">
+              <a:schemeClr val="accent1"/>
+            </a:lnRef>
+            <a:fillRef idx="0">
+              <a:schemeClr val="accent1"/>
+            </a:fillRef>
+            <a:effectRef idx="0">
+              <a:schemeClr val="accent1"/>
+            </a:effectRef>
+            <a:fontRef idx="minor">
+              <a:schemeClr val="tx1"/>
+            </a:fontRef>
+          </p:style>
+        </p:cxnSp>
+        <p:cxnSp>
+          <p:nvCxnSpPr>
+            <p:cNvPr id="74" name="Straight Arrow Connector 73"/>
+            <p:cNvCxnSpPr/>
+            <p:nvPr/>
+          </p:nvCxnSpPr>
+          <p:spPr>
+            <a:xfrm>
+              <a:off x="8189024" y="3776353"/>
+              <a:ext cx="0" cy="430233"/>
+            </a:xfrm>
+            <a:prstGeom prst="straightConnector1">
+              <a:avLst/>
+            </a:prstGeom>
+            <a:ln>
+              <a:headEnd type="triangle"/>
+              <a:tailEnd type="triangle"/>
+            </a:ln>
+          </p:spPr>
+          <p:style>
+            <a:lnRef idx="1">
+              <a:schemeClr val="accent1"/>
+            </a:lnRef>
+            <a:fillRef idx="0">
+              <a:schemeClr val="accent1"/>
+            </a:fillRef>
+            <a:effectRef idx="0">
+              <a:schemeClr val="accent1"/>
+            </a:effectRef>
+            <a:fontRef idx="minor">
+              <a:schemeClr val="tx1"/>
+            </a:fontRef>
+          </p:style>
+        </p:cxnSp>
+        <p:sp>
+          <p:nvSpPr>
+            <p:cNvPr id="75" name="Rounded Rectangle 74"/>
+            <p:cNvSpPr/>
+            <p:nvPr/>
+          </p:nvSpPr>
+          <p:spPr>
+            <a:xfrm>
+              <a:off x="2728355" y="1405746"/>
+              <a:ext cx="1360714" cy="410934"/>
+            </a:xfrm>
+            <a:prstGeom prst="roundRect">
+              <a:avLst/>
+            </a:prstGeom>
+            <a:solidFill>
+              <a:schemeClr val="accent1"/>
+            </a:solidFill>
+          </p:spPr>
+          <p:style>
+            <a:lnRef idx="2">
+              <a:schemeClr val="accent1">
+                <a:shade val="50000"/>
+              </a:schemeClr>
+            </a:lnRef>
+            <a:fillRef idx="1">
+              <a:schemeClr val="accent1"/>
+            </a:fillRef>
+            <a:effectRef idx="0">
+              <a:schemeClr val="accent1"/>
+            </a:effectRef>
+            <a:fontRef idx="minor">
+              <a:schemeClr val="lt1"/>
+            </a:fontRef>
+          </p:style>
+          <p:txBody>
+            <a:bodyPr rtlCol="0" anchor="ctr"/>
+            <a:lstStyle/>
+            <a:p>
+              <a:pPr algn="ctr"/>
+              <a:r>
+                <a:rPr lang="en-US" sz="800" dirty="0" err="1" smtClean="0"/>
+                <a:t>Wifi</a:t>
+              </a:r>
+              <a:endParaRPr lang="en-US" sz="800" dirty="0"/>
+            </a:p>
+          </p:txBody>
+        </p:sp>
+        <p:cxnSp>
+          <p:nvCxnSpPr>
+            <p:cNvPr id="76" name="Straight Arrow Connector 75"/>
+            <p:cNvCxnSpPr/>
+            <p:nvPr/>
+          </p:nvCxnSpPr>
+          <p:spPr>
+            <a:xfrm>
+              <a:off x="3419102" y="1797381"/>
+              <a:ext cx="0" cy="430233"/>
+            </a:xfrm>
+            <a:prstGeom prst="straightConnector1">
+              <a:avLst/>
+            </a:prstGeom>
+            <a:ln>
+              <a:headEnd type="triangle"/>
+              <a:tailEnd type="triangle"/>
+            </a:ln>
+          </p:spPr>
+          <p:style>
+            <a:lnRef idx="1">
+              <a:schemeClr val="accent1"/>
+            </a:lnRef>
+            <a:fillRef idx="0">
+              <a:schemeClr val="accent1"/>
+            </a:fillRef>
+            <a:effectRef idx="0">
+              <a:schemeClr val="accent1"/>
+            </a:effectRef>
+            <a:fontRef idx="minor">
+              <a:schemeClr val="tx1"/>
+            </a:fontRef>
+          </p:style>
+        </p:cxnSp>
+        <p:pic>
+          <p:nvPicPr>
+            <p:cNvPr id="77" name="Picture 76"/>
+            <p:cNvPicPr>
+              <a:picLocks noChangeAspect="1"/>
+            </p:cNvPicPr>
+            <p:nvPr/>
+          </p:nvPicPr>
+          <p:blipFill>
+            <a:blip r:embed="rId2"/>
+            <a:stretch>
+              <a:fillRect/>
+            </a:stretch>
+          </p:blipFill>
+          <p:spPr>
+            <a:xfrm>
+              <a:off x="6212507" y="1420087"/>
+              <a:ext cx="1184819" cy="1184819"/>
+            </a:xfrm>
+            <a:prstGeom prst="rect">
+              <a:avLst/>
+            </a:prstGeom>
+          </p:spPr>
+        </p:pic>
+        <p:pic>
+          <p:nvPicPr>
+            <p:cNvPr id="78" name="Picture 77"/>
+            <p:cNvPicPr>
+              <a:picLocks noChangeAspect="1"/>
+            </p:cNvPicPr>
+            <p:nvPr/>
+          </p:nvPicPr>
+          <p:blipFill>
+            <a:blip r:embed="rId3"/>
+            <a:stretch>
+              <a:fillRect/>
+            </a:stretch>
+          </p:blipFill>
+          <p:spPr>
+            <a:xfrm flipH="1">
+              <a:off x="5124669" y="1581226"/>
+              <a:ext cx="986693" cy="986693"/>
+            </a:xfrm>
+            <a:prstGeom prst="rect">
+              <a:avLst/>
+            </a:prstGeom>
+          </p:spPr>
+        </p:pic>
+        <p:pic>
+          <p:nvPicPr>
+            <p:cNvPr id="79" name="Picture 78"/>
+            <p:cNvPicPr>
+              <a:picLocks noChangeAspect="1"/>
+            </p:cNvPicPr>
+            <p:nvPr/>
+          </p:nvPicPr>
+          <p:blipFill>
+            <a:blip r:embed="rId4"/>
+            <a:stretch>
+              <a:fillRect/>
+            </a:stretch>
+          </p:blipFill>
+          <p:spPr>
+            <a:xfrm>
+              <a:off x="4612363" y="1966321"/>
+              <a:ext cx="465447" cy="465447"/>
+            </a:xfrm>
+            <a:prstGeom prst="rect">
+              <a:avLst/>
+            </a:prstGeom>
+          </p:spPr>
+        </p:pic>
+        <p:cxnSp>
+          <p:nvCxnSpPr>
+            <p:cNvPr id="80" name="Straight Arrow Connector 79"/>
+            <p:cNvCxnSpPr/>
+            <p:nvPr/>
+          </p:nvCxnSpPr>
+          <p:spPr>
+            <a:xfrm flipV="1">
+              <a:off x="4332514" y="2567919"/>
+              <a:ext cx="3633792" cy="19291"/>
+            </a:xfrm>
+            <a:prstGeom prst="straightConnector1">
+              <a:avLst/>
+            </a:prstGeom>
+            <a:ln>
+              <a:headEnd type="triangle"/>
+              <a:tailEnd type="triangle"/>
+            </a:ln>
+          </p:spPr>
+          <p:style>
+            <a:lnRef idx="1">
+              <a:schemeClr val="accent1"/>
+            </a:lnRef>
+            <a:fillRef idx="0">
+              <a:schemeClr val="accent1"/>
+            </a:fillRef>
+            <a:effectRef idx="0">
+              <a:schemeClr val="accent1"/>
+            </a:effectRef>
+            <a:fontRef idx="minor">
+              <a:schemeClr val="tx1"/>
+            </a:fontRef>
+          </p:style>
+        </p:cxnSp>
+        <p:sp>
+          <p:nvSpPr>
+            <p:cNvPr id="81" name="TextBox 80"/>
+            <p:cNvSpPr txBox="1"/>
+            <p:nvPr/>
+          </p:nvSpPr>
+          <p:spPr>
+            <a:xfrm>
+              <a:off x="5156073" y="2586800"/>
+              <a:ext cx="2804896" cy="360934"/>
+            </a:xfrm>
+            <a:prstGeom prst="rect">
+              <a:avLst/>
+            </a:prstGeom>
+            <a:noFill/>
+          </p:spPr>
+          <p:txBody>
+            <a:bodyPr wrap="none" rtlCol="0">
+              <a:spAutoFit/>
+            </a:bodyPr>
+            <a:lstStyle/>
+            <a:p>
+              <a:r>
+                <a:rPr lang="en-US" sz="800" dirty="0" smtClean="0"/>
+                <a:t>Recommended, Optional</a:t>
+              </a:r>
+              <a:endParaRPr lang="en-US" sz="800" dirty="0"/>
+            </a:p>
+          </p:txBody>
+        </p:sp>
+      </p:grpSp>
+      <p:sp>
+        <p:nvSpPr>
+          <p:cNvPr id="82" name="Rounded Rectangle 81"/>
+          <p:cNvSpPr/>
+          <p:nvPr/>
+        </p:nvSpPr>
+        <p:spPr>
+          <a:xfrm rot="16200000">
+            <a:off x="4487686" y="4008442"/>
+            <a:ext cx="4794460" cy="410934"/>
+          </a:xfrm>
+          <a:prstGeom prst="roundRect">
+            <a:avLst/>
+          </a:prstGeom>
+          <a:solidFill>
+            <a:schemeClr val="accent1"/>
+          </a:solidFill>
+        </p:spPr>
+        <p:style>
+          <a:lnRef idx="2">
+            <a:schemeClr val="accent1">
+              <a:shade val="50000"/>
+            </a:schemeClr>
+          </a:lnRef>
+          <a:fillRef idx="1">
+            <a:schemeClr val="accent1"/>
+          </a:fillRef>
+          <a:effectRef idx="0">
+            <a:schemeClr val="accent1"/>
+          </a:effectRef>
+          <a:fontRef idx="minor">
+            <a:schemeClr val="lt1"/>
+          </a:fontRef>
+        </p:style>
+        <p:txBody>
+          <a:bodyPr rtlCol="0" anchor="ctr"/>
+          <a:lstStyle/>
+          <a:p>
+            <a:pPr algn="ctr"/>
+            <a:r>
+              <a:rPr lang="en-US" smtClean="0"/>
+              <a:t>Network Switch </a:t>
+            </a:r>
+            <a:endParaRPr lang="en-US" dirty="0"/>
+          </a:p>
+        </p:txBody>
+      </p:sp>
+      <p:cxnSp>
+        <p:nvCxnSpPr>
+          <p:cNvPr id="83" name="Straight Arrow Connector 82"/>
+          <p:cNvCxnSpPr/>
+          <p:nvPr/>
+        </p:nvCxnSpPr>
+        <p:spPr>
+          <a:xfrm flipV="1">
+            <a:off x="5442881" y="2698135"/>
+            <a:ext cx="1236567" cy="5758"/>
+          </a:xfrm>
+          <a:prstGeom prst="straightConnector1">
+            <a:avLst/>
+          </a:prstGeom>
+          <a:ln>
+            <a:headEnd type="triangle"/>
+            <a:tailEnd type="triangle"/>
+          </a:ln>
+        </p:spPr>
+        <p:style>
+          <a:lnRef idx="1">
+            <a:schemeClr val="accent1"/>
+          </a:lnRef>
+          <a:fillRef idx="0">
+            <a:schemeClr val="accent1"/>
+          </a:fillRef>
+          <a:effectRef idx="0">
+            <a:schemeClr val="accent1"/>
+          </a:effectRef>
+          <a:fontRef idx="minor">
+            <a:schemeClr val="tx1"/>
+          </a:fontRef>
+        </p:style>
+      </p:cxnSp>
+      <p:cxnSp>
+        <p:nvCxnSpPr>
+          <p:cNvPr id="84" name="Straight Arrow Connector 83"/>
+          <p:cNvCxnSpPr/>
+          <p:nvPr/>
+        </p:nvCxnSpPr>
+        <p:spPr>
+          <a:xfrm flipV="1">
+            <a:off x="5465641" y="5439526"/>
+            <a:ext cx="1236567" cy="5758"/>
+          </a:xfrm>
+          <a:prstGeom prst="straightConnector1">
+            <a:avLst/>
+          </a:prstGeom>
+          <a:ln>
+            <a:headEnd type="triangle"/>
+            <a:tailEnd type="triangle"/>
+          </a:ln>
+        </p:spPr>
+        <p:style>
+          <a:lnRef idx="1">
+            <a:schemeClr val="accent1"/>
+          </a:lnRef>
+          <a:fillRef idx="0">
+            <a:schemeClr val="accent1"/>
+          </a:fillRef>
+          <a:effectRef idx="0">
+            <a:schemeClr val="accent1"/>
+          </a:effectRef>
+          <a:fontRef idx="minor">
+            <a:schemeClr val="tx1"/>
+          </a:fontRef>
+        </p:style>
+      </p:cxnSp>
+      <p:cxnSp>
+        <p:nvCxnSpPr>
+          <p:cNvPr id="85" name="Straight Arrow Connector 84"/>
+          <p:cNvCxnSpPr/>
+          <p:nvPr/>
+        </p:nvCxnSpPr>
+        <p:spPr>
+          <a:xfrm flipV="1">
+            <a:off x="7097361" y="2698135"/>
+            <a:ext cx="1236567" cy="5758"/>
+          </a:xfrm>
+          <a:prstGeom prst="straightConnector1">
+            <a:avLst/>
+          </a:prstGeom>
+          <a:ln>
+            <a:headEnd type="triangle"/>
+            <a:tailEnd type="triangle"/>
+          </a:ln>
+        </p:spPr>
+        <p:style>
+          <a:lnRef idx="1">
+            <a:schemeClr val="accent1"/>
+          </a:lnRef>
+          <a:fillRef idx="0">
+            <a:schemeClr val="accent1"/>
+          </a:fillRef>
+          <a:effectRef idx="0">
+            <a:schemeClr val="accent1"/>
+          </a:effectRef>
+          <a:fontRef idx="minor">
+            <a:schemeClr val="tx1"/>
+          </a:fontRef>
+        </p:style>
+      </p:cxnSp>
+      <p:cxnSp>
+        <p:nvCxnSpPr>
+          <p:cNvPr id="86" name="Straight Arrow Connector 85"/>
+          <p:cNvCxnSpPr/>
+          <p:nvPr/>
+        </p:nvCxnSpPr>
+        <p:spPr>
+          <a:xfrm flipV="1">
+            <a:off x="7097361" y="5460171"/>
+            <a:ext cx="1236567" cy="5758"/>
+          </a:xfrm>
+          <a:prstGeom prst="straightConnector1">
+            <a:avLst/>
+          </a:prstGeom>
+          <a:ln>
+            <a:headEnd type="triangle"/>
+            <a:tailEnd type="triangle"/>
+          </a:ln>
+        </p:spPr>
+        <p:style>
+          <a:lnRef idx="1">
+            <a:schemeClr val="accent1"/>
+          </a:lnRef>
+          <a:fillRef idx="0">
+            <a:schemeClr val="accent1"/>
+          </a:fillRef>
+          <a:effectRef idx="0">
+            <a:schemeClr val="accent1"/>
+          </a:effectRef>
+          <a:fontRef idx="minor">
+            <a:schemeClr val="tx1"/>
+          </a:fontRef>
+        </p:style>
+      </p:cxnSp>
+      <p:sp>
+        <p:nvSpPr>
+          <p:cNvPr id="87" name="TextBox 86"/>
+          <p:cNvSpPr txBox="1"/>
+          <p:nvPr/>
+        </p:nvSpPr>
+        <p:spPr>
+          <a:xfrm>
+            <a:off x="3694494" y="1028882"/>
+            <a:ext cx="1481496" cy="369332"/>
+          </a:xfrm>
+          <a:prstGeom prst="rect">
+            <a:avLst/>
+          </a:prstGeom>
+          <a:noFill/>
+        </p:spPr>
+        <p:txBody>
+          <a:bodyPr wrap="none" rtlCol="0">
+            <a:spAutoFit/>
+          </a:bodyPr>
+          <a:lstStyle/>
+          <a:p>
+            <a:r>
+              <a:rPr lang="en-US" dirty="0" smtClean="0"/>
+              <a:t>192.168.0.1-5</a:t>
+            </a:r>
+            <a:endParaRPr lang="en-US" dirty="0"/>
+          </a:p>
+        </p:txBody>
+      </p:sp>
+      <p:sp>
+        <p:nvSpPr>
+          <p:cNvPr id="88" name="TextBox 87"/>
+          <p:cNvSpPr txBox="1"/>
+          <p:nvPr/>
+        </p:nvSpPr>
+        <p:spPr>
+          <a:xfrm>
+            <a:off x="474054" y="3070028"/>
+            <a:ext cx="1527982" cy="369332"/>
+          </a:xfrm>
+          <a:prstGeom prst="rect">
+            <a:avLst/>
+          </a:prstGeom>
+          <a:noFill/>
+        </p:spPr>
+        <p:txBody>
+          <a:bodyPr wrap="none" rtlCol="0">
+            <a:spAutoFit/>
+          </a:bodyPr>
+          <a:lstStyle/>
+          <a:p>
+            <a:r>
+              <a:rPr lang="en-US" dirty="0" smtClean="0"/>
+              <a:t>192.168.0.254</a:t>
+            </a:r>
+            <a:endParaRPr lang="en-US" dirty="0"/>
+          </a:p>
+        </p:txBody>
+      </p:sp>
+      <p:sp>
+        <p:nvSpPr>
+          <p:cNvPr id="89" name="TextBox 88"/>
+          <p:cNvSpPr txBox="1"/>
+          <p:nvPr/>
+        </p:nvSpPr>
+        <p:spPr>
+          <a:xfrm>
+            <a:off x="3727596" y="3862081"/>
+            <a:ext cx="1598515" cy="369332"/>
+          </a:xfrm>
+          <a:prstGeom prst="rect">
+            <a:avLst/>
+          </a:prstGeom>
+          <a:noFill/>
+        </p:spPr>
+        <p:txBody>
+          <a:bodyPr wrap="none" rtlCol="0">
+            <a:spAutoFit/>
+          </a:bodyPr>
+          <a:lstStyle/>
+          <a:p>
+            <a:r>
+              <a:rPr lang="en-US" dirty="0" smtClean="0"/>
+              <a:t>192.168.0.6-10</a:t>
+            </a:r>
+            <a:endParaRPr lang="en-US" dirty="0"/>
+          </a:p>
+        </p:txBody>
+      </p:sp>
+      <p:sp>
+        <p:nvSpPr>
+          <p:cNvPr id="90" name="TextBox 89"/>
+          <p:cNvSpPr txBox="1"/>
+          <p:nvPr/>
+        </p:nvSpPr>
+        <p:spPr>
+          <a:xfrm>
+            <a:off x="9171254" y="1019843"/>
+            <a:ext cx="1715534" cy="369332"/>
+          </a:xfrm>
+          <a:prstGeom prst="rect">
+            <a:avLst/>
+          </a:prstGeom>
+          <a:noFill/>
+        </p:spPr>
+        <p:txBody>
+          <a:bodyPr wrap="none" rtlCol="0">
+            <a:spAutoFit/>
+          </a:bodyPr>
+          <a:lstStyle/>
+          <a:p>
+            <a:r>
+              <a:rPr lang="en-US" smtClean="0"/>
+              <a:t>192.168.0.11-15</a:t>
+            </a:r>
+            <a:endParaRPr lang="en-US" dirty="0"/>
+          </a:p>
+        </p:txBody>
+      </p:sp>
+      <p:sp>
+        <p:nvSpPr>
+          <p:cNvPr id="91" name="TextBox 90"/>
+          <p:cNvSpPr txBox="1"/>
+          <p:nvPr/>
+        </p:nvSpPr>
+        <p:spPr>
+          <a:xfrm>
+            <a:off x="9053014" y="3839095"/>
+            <a:ext cx="1715534" cy="369332"/>
+          </a:xfrm>
+          <a:prstGeom prst="rect">
+            <a:avLst/>
+          </a:prstGeom>
+          <a:noFill/>
+        </p:spPr>
+        <p:txBody>
+          <a:bodyPr wrap="none" rtlCol="0">
+            <a:spAutoFit/>
+          </a:bodyPr>
+          <a:lstStyle/>
+          <a:p>
+            <a:r>
+              <a:rPr lang="en-US" dirty="0" smtClean="0"/>
+              <a:t>192.168.0.16-20</a:t>
+            </a:r>
+            <a:endParaRPr lang="en-US" dirty="0"/>
+          </a:p>
+        </p:txBody>
+      </p:sp>
+      <p:sp>
+        <p:nvSpPr>
+          <p:cNvPr id="92" name="TextBox 91"/>
+          <p:cNvSpPr txBox="1"/>
+          <p:nvPr/>
+        </p:nvSpPr>
+        <p:spPr>
+          <a:xfrm>
+            <a:off x="281769" y="3346120"/>
+            <a:ext cx="2072042" cy="369332"/>
+          </a:xfrm>
+          <a:prstGeom prst="rect">
+            <a:avLst/>
+          </a:prstGeom>
+          <a:noFill/>
+        </p:spPr>
+        <p:txBody>
+          <a:bodyPr wrap="none" rtlCol="0">
+            <a:spAutoFit/>
+          </a:bodyPr>
+          <a:lstStyle/>
+          <a:p>
+            <a:r>
+              <a:rPr lang="en-US" dirty="0" smtClean="0"/>
+              <a:t>hostname=node254</a:t>
+            </a:r>
+            <a:endParaRPr lang="en-US" dirty="0"/>
+          </a:p>
+        </p:txBody>
+      </p:sp>
+      <p:sp>
+        <p:nvSpPr>
+          <p:cNvPr id="93" name="TextBox 92"/>
+          <p:cNvSpPr txBox="1"/>
+          <p:nvPr/>
+        </p:nvSpPr>
+        <p:spPr>
+          <a:xfrm>
+            <a:off x="281769" y="5849138"/>
+            <a:ext cx="6534667" cy="923330"/>
+          </a:xfrm>
+          <a:prstGeom prst="rect">
+            <a:avLst/>
+          </a:prstGeom>
+          <a:noFill/>
+        </p:spPr>
+        <p:txBody>
+          <a:bodyPr wrap="square" rtlCol="0">
+            <a:spAutoFit/>
+          </a:bodyPr>
+          <a:lstStyle/>
+          <a:p>
+            <a:r>
+              <a:rPr lang="en-US" dirty="0" smtClean="0"/>
+              <a:t>Hostname schema</a:t>
+            </a:r>
+            <a:endParaRPr lang="en-US" dirty="0"/>
+          </a:p>
+          <a:p>
+            <a:r>
+              <a:rPr lang="en-US" dirty="0" smtClean="0"/>
+              <a:t>192.168.0.n</a:t>
+            </a:r>
+          </a:p>
+          <a:p>
+            <a:r>
+              <a:rPr lang="en-US" dirty="0" smtClean="0"/>
+              <a:t>hostname=“{name}{n}”.format(name=“node”, n=</a:t>
+            </a:r>
+            <a:r>
+              <a:rPr lang="en-US" dirty="0" err="1" smtClean="0"/>
+              <a:t>str</a:t>
+            </a:r>
+            <a:r>
+              <a:rPr lang="en-US" dirty="0" smtClean="0"/>
+              <a:t>(n).</a:t>
+            </a:r>
+            <a:r>
+              <a:rPr lang="en-US" dirty="0" err="1" smtClean="0"/>
+              <a:t>zfill</a:t>
+            </a:r>
+            <a:r>
+              <a:rPr lang="en-US" dirty="0" smtClean="0"/>
+              <a:t>(3))</a:t>
+            </a:r>
+            <a:endParaRPr lang="en-US" dirty="0"/>
+          </a:p>
+        </p:txBody>
+      </p:sp>
+      <p:sp>
+        <p:nvSpPr>
+          <p:cNvPr id="94" name="TextBox 93"/>
+          <p:cNvSpPr txBox="1"/>
+          <p:nvPr/>
+        </p:nvSpPr>
+        <p:spPr>
+          <a:xfrm>
+            <a:off x="3694494" y="723139"/>
+            <a:ext cx="2510495" cy="369332"/>
+          </a:xfrm>
+          <a:prstGeom prst="rect">
+            <a:avLst/>
+          </a:prstGeom>
+          <a:noFill/>
+        </p:spPr>
+        <p:txBody>
+          <a:bodyPr wrap="none" rtlCol="0">
+            <a:spAutoFit/>
+          </a:bodyPr>
+          <a:lstStyle/>
+          <a:p>
+            <a:r>
+              <a:rPr lang="en-US" dirty="0" err="1" smtClean="0"/>
+              <a:t>Clustername</a:t>
+            </a:r>
+            <a:r>
+              <a:rPr lang="en-US" dirty="0" smtClean="0"/>
+              <a:t> = cluster01 </a:t>
+            </a:r>
+            <a:endParaRPr lang="en-US" dirty="0"/>
+          </a:p>
+        </p:txBody>
+      </p:sp>
+      <p:sp>
+        <p:nvSpPr>
+          <p:cNvPr id="95" name="TextBox 94"/>
+          <p:cNvSpPr txBox="1"/>
+          <p:nvPr/>
+        </p:nvSpPr>
+        <p:spPr>
+          <a:xfrm>
+            <a:off x="3731385" y="3560528"/>
+            <a:ext cx="2510495" cy="369332"/>
+          </a:xfrm>
+          <a:prstGeom prst="rect">
+            <a:avLst/>
+          </a:prstGeom>
+          <a:noFill/>
+        </p:spPr>
+        <p:txBody>
+          <a:bodyPr wrap="none" rtlCol="0">
+            <a:spAutoFit/>
+          </a:bodyPr>
+          <a:lstStyle/>
+          <a:p>
+            <a:r>
+              <a:rPr lang="en-US" dirty="0" err="1" smtClean="0"/>
+              <a:t>Clustername</a:t>
+            </a:r>
+            <a:r>
+              <a:rPr lang="en-US" dirty="0" smtClean="0"/>
+              <a:t> = cluster02 </a:t>
+            </a:r>
+            <a:endParaRPr lang="en-US" dirty="0"/>
+          </a:p>
+        </p:txBody>
+      </p:sp>
+      <p:sp>
+        <p:nvSpPr>
+          <p:cNvPr id="96" name="TextBox 95"/>
+          <p:cNvSpPr txBox="1"/>
+          <p:nvPr/>
+        </p:nvSpPr>
+        <p:spPr>
+          <a:xfrm>
+            <a:off x="9166758" y="733301"/>
+            <a:ext cx="2510495" cy="369332"/>
+          </a:xfrm>
+          <a:prstGeom prst="rect">
+            <a:avLst/>
+          </a:prstGeom>
+          <a:noFill/>
+        </p:spPr>
+        <p:txBody>
+          <a:bodyPr wrap="none" rtlCol="0">
+            <a:spAutoFit/>
+          </a:bodyPr>
+          <a:lstStyle/>
+          <a:p>
+            <a:r>
+              <a:rPr lang="en-US" dirty="0" err="1" smtClean="0"/>
+              <a:t>Clustername</a:t>
+            </a:r>
+            <a:r>
+              <a:rPr lang="en-US" dirty="0" smtClean="0"/>
+              <a:t> = cluster03 </a:t>
+            </a:r>
+            <a:endParaRPr lang="en-US" dirty="0"/>
+          </a:p>
+        </p:txBody>
+      </p:sp>
+      <p:sp>
+        <p:nvSpPr>
+          <p:cNvPr id="97" name="TextBox 96"/>
+          <p:cNvSpPr txBox="1"/>
+          <p:nvPr/>
+        </p:nvSpPr>
+        <p:spPr>
+          <a:xfrm>
+            <a:off x="9039574" y="3558838"/>
+            <a:ext cx="2510495" cy="369332"/>
+          </a:xfrm>
+          <a:prstGeom prst="rect">
+            <a:avLst/>
+          </a:prstGeom>
+          <a:noFill/>
+        </p:spPr>
+        <p:txBody>
+          <a:bodyPr wrap="none" rtlCol="0">
+            <a:spAutoFit/>
+          </a:bodyPr>
+          <a:lstStyle/>
+          <a:p>
+            <a:r>
+              <a:rPr lang="en-US" dirty="0" err="1" smtClean="0"/>
+              <a:t>Clustername</a:t>
+            </a:r>
+            <a:r>
+              <a:rPr lang="en-US" dirty="0" smtClean="0"/>
+              <a:t> = cluster04 </a:t>
+            </a:r>
+            <a:endParaRPr lang="en-US" dirty="0"/>
+          </a:p>
+        </p:txBody>
+      </p:sp>
+    </p:spTree>
+    <p:extLst>
+      <p:ext uri="{BB962C8B-B14F-4D97-AF65-F5344CB8AC3E}">
+        <p14:creationId xmlns:p14="http://schemas.microsoft.com/office/powerpoint/2010/main" val="1906603589"/>
       </p:ext>
     </p:extLst>
   </p:cSld>

</xml_diff>

<commit_message>
New images for setting up the Pi.
</commit_message>
<xml_diff>
--- a/images/network.pptx
+++ b/images/network.pptx
@@ -6,7 +6,9 @@
   </p:sldMasterIdLst>
   <p:sldIdLst>
     <p:sldId id="256" r:id="rId2"/>
-    <p:sldId id="257" r:id="rId3"/>
+    <p:sldId id="259" r:id="rId3"/>
+    <p:sldId id="258" r:id="rId4"/>
+    <p:sldId id="257" r:id="rId5"/>
   </p:sldIdLst>
   <p:sldSz cx="12192000" cy="6858000"/>
   <p:notesSz cx="6858000" cy="9144000"/>
@@ -107,7 +109,7 @@
   </p:defaultTextStyle>
   <p:extLst>
     <p:ext uri="{EFAFB233-063F-42B5-8137-9DF3F51BA10A}">
-      <p15:sldGuideLst xmlns:p15="http://schemas.microsoft.com/office/powerpoint/2012/main"/>
+      <p15:sldGuideLst xmlns:p15="http://schemas.microsoft.com/office/powerpoint/2012/main" xmlns=""/>
     </p:ext>
   </p:extLst>
 </p:presentation>
@@ -244,7 +246,7 @@
           <a:p>
             <a:fld id="{0EC95C33-DAB6-4546-B06D-886B2BAD356F}" type="datetimeFigureOut">
               <a:rPr lang="en-US" smtClean="0"/>
-              <a:t>8/15/18</a:t>
+              <a:t>12/12/18</a:t>
             </a:fld>
             <a:endParaRPr lang="en-US"/>
           </a:p>
@@ -414,7 +416,7 @@
           <a:p>
             <a:fld id="{0EC95C33-DAB6-4546-B06D-886B2BAD356F}" type="datetimeFigureOut">
               <a:rPr lang="en-US" smtClean="0"/>
-              <a:t>8/15/18</a:t>
+              <a:t>12/12/18</a:t>
             </a:fld>
             <a:endParaRPr lang="en-US"/>
           </a:p>
@@ -594,7 +596,7 @@
           <a:p>
             <a:fld id="{0EC95C33-DAB6-4546-B06D-886B2BAD356F}" type="datetimeFigureOut">
               <a:rPr lang="en-US" smtClean="0"/>
-              <a:t>8/15/18</a:t>
+              <a:t>12/12/18</a:t>
             </a:fld>
             <a:endParaRPr lang="en-US"/>
           </a:p>
@@ -764,7 +766,7 @@
           <a:p>
             <a:fld id="{0EC95C33-DAB6-4546-B06D-886B2BAD356F}" type="datetimeFigureOut">
               <a:rPr lang="en-US" smtClean="0"/>
-              <a:t>8/15/18</a:t>
+              <a:t>12/12/18</a:t>
             </a:fld>
             <a:endParaRPr lang="en-US"/>
           </a:p>
@@ -1010,7 +1012,7 @@
           <a:p>
             <a:fld id="{0EC95C33-DAB6-4546-B06D-886B2BAD356F}" type="datetimeFigureOut">
               <a:rPr lang="en-US" smtClean="0"/>
-              <a:t>8/15/18</a:t>
+              <a:t>12/12/18</a:t>
             </a:fld>
             <a:endParaRPr lang="en-US"/>
           </a:p>
@@ -1242,7 +1244,7 @@
           <a:p>
             <a:fld id="{0EC95C33-DAB6-4546-B06D-886B2BAD356F}" type="datetimeFigureOut">
               <a:rPr lang="en-US" smtClean="0"/>
-              <a:t>8/15/18</a:t>
+              <a:t>12/12/18</a:t>
             </a:fld>
             <a:endParaRPr lang="en-US"/>
           </a:p>
@@ -1609,7 +1611,7 @@
           <a:p>
             <a:fld id="{0EC95C33-DAB6-4546-B06D-886B2BAD356F}" type="datetimeFigureOut">
               <a:rPr lang="en-US" smtClean="0"/>
-              <a:t>8/15/18</a:t>
+              <a:t>12/12/18</a:t>
             </a:fld>
             <a:endParaRPr lang="en-US"/>
           </a:p>
@@ -1727,7 +1729,7 @@
           <a:p>
             <a:fld id="{0EC95C33-DAB6-4546-B06D-886B2BAD356F}" type="datetimeFigureOut">
               <a:rPr lang="en-US" smtClean="0"/>
-              <a:t>8/15/18</a:t>
+              <a:t>12/12/18</a:t>
             </a:fld>
             <a:endParaRPr lang="en-US"/>
           </a:p>
@@ -1822,7 +1824,7 @@
           <a:p>
             <a:fld id="{0EC95C33-DAB6-4546-B06D-886B2BAD356F}" type="datetimeFigureOut">
               <a:rPr lang="en-US" smtClean="0"/>
-              <a:t>8/15/18</a:t>
+              <a:t>12/12/18</a:t>
             </a:fld>
             <a:endParaRPr lang="en-US"/>
           </a:p>
@@ -2099,7 +2101,7 @@
           <a:p>
             <a:fld id="{0EC95C33-DAB6-4546-B06D-886B2BAD356F}" type="datetimeFigureOut">
               <a:rPr lang="en-US" smtClean="0"/>
-              <a:t>8/15/18</a:t>
+              <a:t>12/12/18</a:t>
             </a:fld>
             <a:endParaRPr lang="en-US"/>
           </a:p>
@@ -2352,7 +2354,7 @@
           <a:p>
             <a:fld id="{0EC95C33-DAB6-4546-B06D-886B2BAD356F}" type="datetimeFigureOut">
               <a:rPr lang="en-US" smtClean="0"/>
-              <a:t>8/15/18</a:t>
+              <a:t>12/12/18</a:t>
             </a:fld>
             <a:endParaRPr lang="en-US"/>
           </a:p>
@@ -2565,7 +2567,7 @@
           <a:p>
             <a:fld id="{0EC95C33-DAB6-4546-B06D-886B2BAD356F}" type="datetimeFigureOut">
               <a:rPr lang="en-US" smtClean="0"/>
-              <a:t>8/15/18</a:t>
+              <a:t>12/12/18</a:t>
             </a:fld>
             <a:endParaRPr lang="en-US"/>
           </a:p>
@@ -3787,7 +3789,7 @@
           </a:prstGeom>
           <a:ln>
             <a:headEnd type="triangle"/>
-            <a:tailEnd type="triangle"/>
+            <a:tailEnd type="none"/>
           </a:ln>
         </p:spPr>
         <p:style>
@@ -3849,6 +3851,1795 @@
 </file>
 
 <file path=ppt/slides/slide2.xml><?xml version="1.0" encoding="utf-8"?>
+<p:sld xmlns:a="http://schemas.openxmlformats.org/drawingml/2006/main" xmlns:r="http://schemas.openxmlformats.org/officeDocument/2006/relationships" xmlns:p="http://schemas.openxmlformats.org/presentationml/2006/main">
+  <p:cSld>
+    <p:spTree>
+      <p:nvGrpSpPr>
+        <p:cNvPr id="1" name=""/>
+        <p:cNvGrpSpPr/>
+        <p:nvPr/>
+      </p:nvGrpSpPr>
+      <p:grpSpPr>
+        <a:xfrm>
+          <a:off x="0" y="0"/>
+          <a:ext cx="0" cy="0"/>
+          <a:chOff x="0" y="0"/>
+          <a:chExt cx="0" cy="0"/>
+        </a:xfrm>
+      </p:grpSpPr>
+      <p:sp>
+        <p:nvSpPr>
+          <p:cNvPr id="4" name="Rounded Rectangle 3"/>
+          <p:cNvSpPr/>
+          <p:nvPr/>
+        </p:nvSpPr>
+        <p:spPr>
+          <a:xfrm>
+            <a:off x="2728355" y="4624386"/>
+            <a:ext cx="1360714" cy="707572"/>
+          </a:xfrm>
+          <a:prstGeom prst="roundRect">
+            <a:avLst/>
+          </a:prstGeom>
+          <a:solidFill>
+            <a:schemeClr val="accent3">
+              <a:lumMod val="40000"/>
+              <a:lumOff val="60000"/>
+            </a:schemeClr>
+          </a:solidFill>
+        </p:spPr>
+        <p:style>
+          <a:lnRef idx="2">
+            <a:schemeClr val="accent1">
+              <a:shade val="50000"/>
+            </a:schemeClr>
+          </a:lnRef>
+          <a:fillRef idx="1">
+            <a:schemeClr val="accent1"/>
+          </a:fillRef>
+          <a:effectRef idx="0">
+            <a:schemeClr val="accent1"/>
+          </a:effectRef>
+          <a:fontRef idx="minor">
+            <a:schemeClr val="lt1"/>
+          </a:fontRef>
+        </p:style>
+        <p:txBody>
+          <a:bodyPr rtlCol="0" anchor="ctr"/>
+          <a:lstStyle/>
+          <a:p>
+            <a:pPr algn="ctr"/>
+            <a:r>
+              <a:rPr lang="en-US" smtClean="0">
+                <a:solidFill>
+                  <a:schemeClr val="tx1"/>
+                </a:solidFill>
+              </a:rPr>
+              <a:t>PI Worker</a:t>
+            </a:r>
+            <a:endParaRPr lang="en-US">
+              <a:solidFill>
+                <a:schemeClr val="tx1"/>
+              </a:solidFill>
+            </a:endParaRPr>
+          </a:p>
+        </p:txBody>
+      </p:sp>
+      <p:sp>
+        <p:nvSpPr>
+          <p:cNvPr id="5" name="Rounded Rectangle 4"/>
+          <p:cNvSpPr/>
+          <p:nvPr/>
+        </p:nvSpPr>
+        <p:spPr>
+          <a:xfrm>
+            <a:off x="2728355" y="2645414"/>
+            <a:ext cx="1360714" cy="707572"/>
+          </a:xfrm>
+          <a:prstGeom prst="roundRect">
+            <a:avLst/>
+          </a:prstGeom>
+          <a:solidFill>
+            <a:schemeClr val="accent3">
+              <a:lumMod val="40000"/>
+              <a:lumOff val="60000"/>
+            </a:schemeClr>
+          </a:solidFill>
+        </p:spPr>
+        <p:style>
+          <a:lnRef idx="2">
+            <a:schemeClr val="accent1">
+              <a:shade val="50000"/>
+            </a:schemeClr>
+          </a:lnRef>
+          <a:fillRef idx="1">
+            <a:schemeClr val="accent1"/>
+          </a:fillRef>
+          <a:effectRef idx="0">
+            <a:schemeClr val="accent1"/>
+          </a:effectRef>
+          <a:fontRef idx="minor">
+            <a:schemeClr val="lt1"/>
+          </a:fontRef>
+        </p:style>
+        <p:txBody>
+          <a:bodyPr rtlCol="0" anchor="ctr"/>
+          <a:lstStyle/>
+          <a:p>
+            <a:pPr algn="ctr"/>
+            <a:r>
+              <a:rPr lang="en-US" smtClean="0">
+                <a:solidFill>
+                  <a:schemeClr val="tx1"/>
+                </a:solidFill>
+              </a:rPr>
+              <a:t>PI Master </a:t>
+            </a:r>
+            <a:endParaRPr lang="en-US" dirty="0">
+              <a:solidFill>
+                <a:schemeClr val="tx1"/>
+              </a:solidFill>
+            </a:endParaRPr>
+          </a:p>
+        </p:txBody>
+      </p:sp>
+      <p:sp>
+        <p:nvSpPr>
+          <p:cNvPr id="6" name="Rounded Rectangle 5"/>
+          <p:cNvSpPr/>
+          <p:nvPr/>
+        </p:nvSpPr>
+        <p:spPr>
+          <a:xfrm>
+            <a:off x="7540832" y="4624386"/>
+            <a:ext cx="1360714" cy="707572"/>
+          </a:xfrm>
+          <a:prstGeom prst="roundRect">
+            <a:avLst/>
+          </a:prstGeom>
+          <a:solidFill>
+            <a:schemeClr val="accent3">
+              <a:lumMod val="40000"/>
+              <a:lumOff val="60000"/>
+            </a:schemeClr>
+          </a:solidFill>
+        </p:spPr>
+        <p:style>
+          <a:lnRef idx="2">
+            <a:schemeClr val="accent1">
+              <a:shade val="50000"/>
+            </a:schemeClr>
+          </a:lnRef>
+          <a:fillRef idx="1">
+            <a:schemeClr val="accent1"/>
+          </a:fillRef>
+          <a:effectRef idx="0">
+            <a:schemeClr val="accent1"/>
+          </a:effectRef>
+          <a:fontRef idx="minor">
+            <a:schemeClr val="lt1"/>
+          </a:fontRef>
+        </p:style>
+        <p:txBody>
+          <a:bodyPr rtlCol="0" anchor="ctr"/>
+          <a:lstStyle/>
+          <a:p>
+            <a:pPr algn="ctr"/>
+            <a:r>
+              <a:rPr lang="en-US" smtClean="0">
+                <a:solidFill>
+                  <a:schemeClr val="tx1"/>
+                </a:solidFill>
+              </a:rPr>
+              <a:t>PI Worker</a:t>
+            </a:r>
+            <a:endParaRPr lang="en-US">
+              <a:solidFill>
+                <a:schemeClr val="tx1"/>
+              </a:solidFill>
+            </a:endParaRPr>
+          </a:p>
+        </p:txBody>
+      </p:sp>
+      <p:sp>
+        <p:nvSpPr>
+          <p:cNvPr id="7" name="Rounded Rectangle 6"/>
+          <p:cNvSpPr/>
+          <p:nvPr/>
+        </p:nvSpPr>
+        <p:spPr>
+          <a:xfrm>
+            <a:off x="5936673" y="4630325"/>
+            <a:ext cx="1360714" cy="707572"/>
+          </a:xfrm>
+          <a:prstGeom prst="roundRect">
+            <a:avLst/>
+          </a:prstGeom>
+          <a:solidFill>
+            <a:schemeClr val="accent3">
+              <a:lumMod val="40000"/>
+              <a:lumOff val="60000"/>
+            </a:schemeClr>
+          </a:solidFill>
+        </p:spPr>
+        <p:style>
+          <a:lnRef idx="2">
+            <a:schemeClr val="accent1">
+              <a:shade val="50000"/>
+            </a:schemeClr>
+          </a:lnRef>
+          <a:fillRef idx="1">
+            <a:schemeClr val="accent1"/>
+          </a:fillRef>
+          <a:effectRef idx="0">
+            <a:schemeClr val="accent1"/>
+          </a:effectRef>
+          <a:fontRef idx="minor">
+            <a:schemeClr val="lt1"/>
+          </a:fontRef>
+        </p:style>
+        <p:txBody>
+          <a:bodyPr rtlCol="0" anchor="ctr"/>
+          <a:lstStyle/>
+          <a:p>
+            <a:pPr algn="ctr"/>
+            <a:r>
+              <a:rPr lang="en-US" smtClean="0">
+                <a:solidFill>
+                  <a:schemeClr val="tx1"/>
+                </a:solidFill>
+              </a:rPr>
+              <a:t>PI Worker</a:t>
+            </a:r>
+            <a:endParaRPr lang="en-US">
+              <a:solidFill>
+                <a:schemeClr val="tx1"/>
+              </a:solidFill>
+            </a:endParaRPr>
+          </a:p>
+        </p:txBody>
+      </p:sp>
+      <p:sp>
+        <p:nvSpPr>
+          <p:cNvPr id="8" name="Rounded Rectangle 7"/>
+          <p:cNvSpPr/>
+          <p:nvPr/>
+        </p:nvSpPr>
+        <p:spPr>
+          <a:xfrm>
+            <a:off x="4332514" y="4624386"/>
+            <a:ext cx="1360714" cy="707572"/>
+          </a:xfrm>
+          <a:prstGeom prst="roundRect">
+            <a:avLst/>
+          </a:prstGeom>
+          <a:solidFill>
+            <a:schemeClr val="accent3">
+              <a:lumMod val="40000"/>
+              <a:lumOff val="60000"/>
+            </a:schemeClr>
+          </a:solidFill>
+        </p:spPr>
+        <p:style>
+          <a:lnRef idx="2">
+            <a:schemeClr val="accent1">
+              <a:shade val="50000"/>
+            </a:schemeClr>
+          </a:lnRef>
+          <a:fillRef idx="1">
+            <a:schemeClr val="accent1"/>
+          </a:fillRef>
+          <a:effectRef idx="0">
+            <a:schemeClr val="accent1"/>
+          </a:effectRef>
+          <a:fontRef idx="minor">
+            <a:schemeClr val="lt1"/>
+          </a:fontRef>
+        </p:style>
+        <p:txBody>
+          <a:bodyPr rtlCol="0" anchor="ctr"/>
+          <a:lstStyle/>
+          <a:p>
+            <a:pPr algn="ctr"/>
+            <a:r>
+              <a:rPr lang="en-US" smtClean="0">
+                <a:solidFill>
+                  <a:schemeClr val="tx1"/>
+                </a:solidFill>
+              </a:rPr>
+              <a:t>PI Worker</a:t>
+            </a:r>
+            <a:endParaRPr lang="en-US">
+              <a:solidFill>
+                <a:schemeClr val="tx1"/>
+              </a:solidFill>
+            </a:endParaRPr>
+          </a:p>
+        </p:txBody>
+      </p:sp>
+      <p:sp>
+        <p:nvSpPr>
+          <p:cNvPr id="9" name="Rounded Rectangle 8"/>
+          <p:cNvSpPr/>
+          <p:nvPr/>
+        </p:nvSpPr>
+        <p:spPr>
+          <a:xfrm>
+            <a:off x="2728355" y="3783219"/>
+            <a:ext cx="6173191" cy="410934"/>
+          </a:xfrm>
+          <a:prstGeom prst="roundRect">
+            <a:avLst/>
+          </a:prstGeom>
+          <a:solidFill>
+            <a:schemeClr val="accent1"/>
+          </a:solidFill>
+        </p:spPr>
+        <p:style>
+          <a:lnRef idx="2">
+            <a:schemeClr val="accent1">
+              <a:shade val="50000"/>
+            </a:schemeClr>
+          </a:lnRef>
+          <a:fillRef idx="1">
+            <a:schemeClr val="accent1"/>
+          </a:fillRef>
+          <a:effectRef idx="0">
+            <a:schemeClr val="accent1"/>
+          </a:effectRef>
+          <a:fontRef idx="minor">
+            <a:schemeClr val="lt1"/>
+          </a:fontRef>
+        </p:style>
+        <p:txBody>
+          <a:bodyPr rtlCol="0" anchor="ctr"/>
+          <a:lstStyle/>
+          <a:p>
+            <a:pPr algn="ctr"/>
+            <a:r>
+              <a:rPr lang="en-US" dirty="0" smtClean="0"/>
+              <a:t>Network Switch</a:t>
+            </a:r>
+            <a:endParaRPr lang="en-US" dirty="0"/>
+          </a:p>
+        </p:txBody>
+      </p:sp>
+      <p:cxnSp>
+        <p:nvCxnSpPr>
+          <p:cNvPr id="11" name="Straight Arrow Connector 10"/>
+          <p:cNvCxnSpPr>
+            <a:stCxn id="5" idx="2"/>
+          </p:cNvCxnSpPr>
+          <p:nvPr/>
+        </p:nvCxnSpPr>
+        <p:spPr>
+          <a:xfrm>
+            <a:off x="3408712" y="3352986"/>
+            <a:ext cx="0" cy="430233"/>
+          </a:xfrm>
+          <a:prstGeom prst="straightConnector1">
+            <a:avLst/>
+          </a:prstGeom>
+          <a:ln>
+            <a:headEnd type="triangle"/>
+            <a:tailEnd type="triangle"/>
+          </a:ln>
+        </p:spPr>
+        <p:style>
+          <a:lnRef idx="1">
+            <a:schemeClr val="accent1"/>
+          </a:lnRef>
+          <a:fillRef idx="0">
+            <a:schemeClr val="accent1"/>
+          </a:fillRef>
+          <a:effectRef idx="0">
+            <a:schemeClr val="accent1"/>
+          </a:effectRef>
+          <a:fontRef idx="minor">
+            <a:schemeClr val="tx1"/>
+          </a:fontRef>
+        </p:style>
+      </p:cxnSp>
+      <p:cxnSp>
+        <p:nvCxnSpPr>
+          <p:cNvPr id="12" name="Straight Arrow Connector 11"/>
+          <p:cNvCxnSpPr/>
+          <p:nvPr/>
+        </p:nvCxnSpPr>
+        <p:spPr>
+          <a:xfrm>
+            <a:off x="3419102" y="4194153"/>
+            <a:ext cx="0" cy="430233"/>
+          </a:xfrm>
+          <a:prstGeom prst="straightConnector1">
+            <a:avLst/>
+          </a:prstGeom>
+          <a:ln>
+            <a:headEnd type="triangle"/>
+            <a:tailEnd type="triangle"/>
+          </a:ln>
+        </p:spPr>
+        <p:style>
+          <a:lnRef idx="1">
+            <a:schemeClr val="accent1"/>
+          </a:lnRef>
+          <a:fillRef idx="0">
+            <a:schemeClr val="accent1"/>
+          </a:fillRef>
+          <a:effectRef idx="0">
+            <a:schemeClr val="accent1"/>
+          </a:effectRef>
+          <a:fontRef idx="minor">
+            <a:schemeClr val="tx1"/>
+          </a:fontRef>
+        </p:style>
+      </p:cxnSp>
+      <p:cxnSp>
+        <p:nvCxnSpPr>
+          <p:cNvPr id="13" name="Straight Arrow Connector 12"/>
+          <p:cNvCxnSpPr/>
+          <p:nvPr/>
+        </p:nvCxnSpPr>
+        <p:spPr>
+          <a:xfrm>
+            <a:off x="5055917" y="4194153"/>
+            <a:ext cx="0" cy="430233"/>
+          </a:xfrm>
+          <a:prstGeom prst="straightConnector1">
+            <a:avLst/>
+          </a:prstGeom>
+          <a:ln>
+            <a:headEnd type="triangle"/>
+            <a:tailEnd type="triangle"/>
+          </a:ln>
+        </p:spPr>
+        <p:style>
+          <a:lnRef idx="1">
+            <a:schemeClr val="accent1"/>
+          </a:lnRef>
+          <a:fillRef idx="0">
+            <a:schemeClr val="accent1"/>
+          </a:fillRef>
+          <a:effectRef idx="0">
+            <a:schemeClr val="accent1"/>
+          </a:effectRef>
+          <a:fontRef idx="minor">
+            <a:schemeClr val="tx1"/>
+          </a:fontRef>
+        </p:style>
+      </p:cxnSp>
+      <p:cxnSp>
+        <p:nvCxnSpPr>
+          <p:cNvPr id="14" name="Straight Arrow Connector 13"/>
+          <p:cNvCxnSpPr/>
+          <p:nvPr/>
+        </p:nvCxnSpPr>
+        <p:spPr>
+          <a:xfrm>
+            <a:off x="6587835" y="4194153"/>
+            <a:ext cx="0" cy="430233"/>
+          </a:xfrm>
+          <a:prstGeom prst="straightConnector1">
+            <a:avLst/>
+          </a:prstGeom>
+          <a:ln>
+            <a:headEnd type="triangle"/>
+            <a:tailEnd type="triangle"/>
+          </a:ln>
+        </p:spPr>
+        <p:style>
+          <a:lnRef idx="1">
+            <a:schemeClr val="accent1"/>
+          </a:lnRef>
+          <a:fillRef idx="0">
+            <a:schemeClr val="accent1"/>
+          </a:fillRef>
+          <a:effectRef idx="0">
+            <a:schemeClr val="accent1"/>
+          </a:effectRef>
+          <a:fontRef idx="minor">
+            <a:schemeClr val="tx1"/>
+          </a:fontRef>
+        </p:style>
+      </p:cxnSp>
+      <p:cxnSp>
+        <p:nvCxnSpPr>
+          <p:cNvPr id="15" name="Straight Arrow Connector 14"/>
+          <p:cNvCxnSpPr/>
+          <p:nvPr/>
+        </p:nvCxnSpPr>
+        <p:spPr>
+          <a:xfrm>
+            <a:off x="8189024" y="4194153"/>
+            <a:ext cx="0" cy="430233"/>
+          </a:xfrm>
+          <a:prstGeom prst="straightConnector1">
+            <a:avLst/>
+          </a:prstGeom>
+          <a:ln>
+            <a:headEnd type="triangle"/>
+            <a:tailEnd type="triangle"/>
+          </a:ln>
+        </p:spPr>
+        <p:style>
+          <a:lnRef idx="1">
+            <a:schemeClr val="accent1"/>
+          </a:lnRef>
+          <a:fillRef idx="0">
+            <a:schemeClr val="accent1"/>
+          </a:fillRef>
+          <a:effectRef idx="0">
+            <a:schemeClr val="accent1"/>
+          </a:effectRef>
+          <a:fontRef idx="minor">
+            <a:schemeClr val="tx1"/>
+          </a:fontRef>
+        </p:style>
+      </p:cxnSp>
+      <p:sp>
+        <p:nvSpPr>
+          <p:cNvPr id="16" name="Rounded Rectangle 15"/>
+          <p:cNvSpPr/>
+          <p:nvPr/>
+        </p:nvSpPr>
+        <p:spPr>
+          <a:xfrm>
+            <a:off x="529441" y="2645414"/>
+            <a:ext cx="1360714" cy="707572"/>
+          </a:xfrm>
+          <a:prstGeom prst="roundRect">
+            <a:avLst/>
+          </a:prstGeom>
+          <a:solidFill>
+            <a:schemeClr val="accent3">
+              <a:lumMod val="40000"/>
+              <a:lumOff val="60000"/>
+            </a:schemeClr>
+          </a:solidFill>
+        </p:spPr>
+        <p:style>
+          <a:lnRef idx="2">
+            <a:schemeClr val="accent1">
+              <a:shade val="50000"/>
+            </a:schemeClr>
+          </a:lnRef>
+          <a:fillRef idx="1">
+            <a:schemeClr val="accent1"/>
+          </a:fillRef>
+          <a:effectRef idx="0">
+            <a:schemeClr val="accent1"/>
+          </a:effectRef>
+          <a:fontRef idx="minor">
+            <a:schemeClr val="lt1"/>
+          </a:fontRef>
+        </p:style>
+        <p:txBody>
+          <a:bodyPr rtlCol="0" anchor="ctr"/>
+          <a:lstStyle/>
+          <a:p>
+            <a:pPr algn="ctr"/>
+            <a:r>
+              <a:rPr lang="en-US" dirty="0" smtClean="0">
+                <a:solidFill>
+                  <a:schemeClr val="tx1"/>
+                </a:solidFill>
+              </a:rPr>
+              <a:t>Laptop</a:t>
+            </a:r>
+            <a:endParaRPr lang="en-US" dirty="0">
+              <a:solidFill>
+                <a:schemeClr val="tx1"/>
+              </a:solidFill>
+            </a:endParaRPr>
+          </a:p>
+        </p:txBody>
+      </p:sp>
+      <p:sp>
+        <p:nvSpPr>
+          <p:cNvPr id="17" name="Rounded Rectangle 16"/>
+          <p:cNvSpPr/>
+          <p:nvPr/>
+        </p:nvSpPr>
+        <p:spPr>
+          <a:xfrm>
+            <a:off x="529441" y="1405745"/>
+            <a:ext cx="1360714" cy="809435"/>
+          </a:xfrm>
+          <a:prstGeom prst="roundRect">
+            <a:avLst/>
+          </a:prstGeom>
+          <a:solidFill>
+            <a:schemeClr val="accent1"/>
+          </a:solidFill>
+        </p:spPr>
+        <p:style>
+          <a:lnRef idx="2">
+            <a:schemeClr val="accent1">
+              <a:shade val="50000"/>
+            </a:schemeClr>
+          </a:lnRef>
+          <a:fillRef idx="1">
+            <a:schemeClr val="accent1"/>
+          </a:fillRef>
+          <a:effectRef idx="0">
+            <a:schemeClr val="accent1"/>
+          </a:effectRef>
+          <a:fontRef idx="minor">
+            <a:schemeClr val="lt1"/>
+          </a:fontRef>
+        </p:style>
+        <p:txBody>
+          <a:bodyPr rtlCol="0" anchor="ctr"/>
+          <a:lstStyle/>
+          <a:p>
+            <a:pPr algn="ctr"/>
+            <a:r>
+              <a:rPr lang="en-US" dirty="0" err="1" smtClean="0"/>
+              <a:t>Wifi</a:t>
+            </a:r>
+            <a:r>
+              <a:rPr lang="en-US" dirty="0" smtClean="0"/>
+              <a:t> / Ethernet</a:t>
+            </a:r>
+            <a:endParaRPr lang="en-US" dirty="0"/>
+          </a:p>
+        </p:txBody>
+      </p:sp>
+      <p:sp>
+        <p:nvSpPr>
+          <p:cNvPr id="18" name="Rounded Rectangle 17"/>
+          <p:cNvSpPr/>
+          <p:nvPr/>
+        </p:nvSpPr>
+        <p:spPr>
+          <a:xfrm>
+            <a:off x="2728355" y="1405745"/>
+            <a:ext cx="1360714" cy="823231"/>
+          </a:xfrm>
+          <a:prstGeom prst="roundRect">
+            <a:avLst/>
+          </a:prstGeom>
+          <a:solidFill>
+            <a:schemeClr val="accent1"/>
+          </a:solidFill>
+        </p:spPr>
+        <p:style>
+          <a:lnRef idx="2">
+            <a:schemeClr val="accent1">
+              <a:shade val="50000"/>
+            </a:schemeClr>
+          </a:lnRef>
+          <a:fillRef idx="1">
+            <a:schemeClr val="accent1"/>
+          </a:fillRef>
+          <a:effectRef idx="0">
+            <a:schemeClr val="accent1"/>
+          </a:effectRef>
+          <a:fontRef idx="minor">
+            <a:schemeClr val="lt1"/>
+          </a:fontRef>
+        </p:style>
+        <p:txBody>
+          <a:bodyPr rtlCol="0" anchor="ctr"/>
+          <a:lstStyle/>
+          <a:p>
+            <a:pPr algn="ctr"/>
+            <a:r>
+              <a:rPr lang="en-US" dirty="0" err="1" smtClean="0"/>
+              <a:t>Wifi</a:t>
+            </a:r>
+            <a:r>
+              <a:rPr lang="en-US" dirty="0" smtClean="0"/>
+              <a:t> / </a:t>
+            </a:r>
+            <a:r>
+              <a:rPr lang="en-US" dirty="0" smtClean="0"/>
+              <a:t>USB Ethernet</a:t>
+            </a:r>
+            <a:endParaRPr lang="en-US" dirty="0"/>
+          </a:p>
+        </p:txBody>
+      </p:sp>
+      <p:cxnSp>
+        <p:nvCxnSpPr>
+          <p:cNvPr id="19" name="Straight Arrow Connector 18"/>
+          <p:cNvCxnSpPr/>
+          <p:nvPr/>
+        </p:nvCxnSpPr>
+        <p:spPr>
+          <a:xfrm>
+            <a:off x="3385563" y="2215181"/>
+            <a:ext cx="0" cy="430233"/>
+          </a:xfrm>
+          <a:prstGeom prst="straightConnector1">
+            <a:avLst/>
+          </a:prstGeom>
+          <a:ln>
+            <a:headEnd type="triangle"/>
+            <a:tailEnd type="triangle"/>
+          </a:ln>
+        </p:spPr>
+        <p:style>
+          <a:lnRef idx="1">
+            <a:schemeClr val="accent1"/>
+          </a:lnRef>
+          <a:fillRef idx="0">
+            <a:schemeClr val="accent1"/>
+          </a:fillRef>
+          <a:effectRef idx="0">
+            <a:schemeClr val="accent1"/>
+          </a:effectRef>
+          <a:fontRef idx="minor">
+            <a:schemeClr val="tx1"/>
+          </a:fontRef>
+        </p:style>
+      </p:cxnSp>
+      <p:cxnSp>
+        <p:nvCxnSpPr>
+          <p:cNvPr id="20" name="Straight Arrow Connector 19"/>
+          <p:cNvCxnSpPr/>
+          <p:nvPr/>
+        </p:nvCxnSpPr>
+        <p:spPr>
+          <a:xfrm>
+            <a:off x="1241881" y="2215181"/>
+            <a:ext cx="0" cy="430233"/>
+          </a:xfrm>
+          <a:prstGeom prst="straightConnector1">
+            <a:avLst/>
+          </a:prstGeom>
+          <a:ln>
+            <a:headEnd type="triangle"/>
+            <a:tailEnd type="triangle"/>
+          </a:ln>
+        </p:spPr>
+        <p:style>
+          <a:lnRef idx="1">
+            <a:schemeClr val="accent1"/>
+          </a:lnRef>
+          <a:fillRef idx="0">
+            <a:schemeClr val="accent1"/>
+          </a:fillRef>
+          <a:effectRef idx="0">
+            <a:schemeClr val="accent1"/>
+          </a:effectRef>
+          <a:fontRef idx="minor">
+            <a:schemeClr val="tx1"/>
+          </a:fontRef>
+        </p:style>
+      </p:cxnSp>
+      <p:pic>
+        <p:nvPicPr>
+          <p:cNvPr id="2" name="Picture 1"/>
+          <p:cNvPicPr>
+            <a:picLocks noChangeAspect="1"/>
+          </p:cNvPicPr>
+          <p:nvPr/>
+        </p:nvPicPr>
+        <p:blipFill>
+          <a:blip r:embed="rId2"/>
+          <a:stretch>
+            <a:fillRect/>
+          </a:stretch>
+        </p:blipFill>
+        <p:spPr>
+          <a:xfrm>
+            <a:off x="6212507" y="1837887"/>
+            <a:ext cx="1184819" cy="1184819"/>
+          </a:xfrm>
+          <a:prstGeom prst="rect">
+            <a:avLst/>
+          </a:prstGeom>
+        </p:spPr>
+      </p:pic>
+      <p:pic>
+        <p:nvPicPr>
+          <p:cNvPr id="3" name="Picture 2"/>
+          <p:cNvPicPr>
+            <a:picLocks noChangeAspect="1"/>
+          </p:cNvPicPr>
+          <p:nvPr/>
+        </p:nvPicPr>
+        <p:blipFill>
+          <a:blip r:embed="rId3"/>
+          <a:stretch>
+            <a:fillRect/>
+          </a:stretch>
+        </p:blipFill>
+        <p:spPr>
+          <a:xfrm flipH="1">
+            <a:off x="5124669" y="1999026"/>
+            <a:ext cx="986693" cy="986693"/>
+          </a:xfrm>
+          <a:prstGeom prst="rect">
+            <a:avLst/>
+          </a:prstGeom>
+        </p:spPr>
+      </p:pic>
+      <p:pic>
+        <p:nvPicPr>
+          <p:cNvPr id="10" name="Picture 9"/>
+          <p:cNvPicPr>
+            <a:picLocks noChangeAspect="1"/>
+          </p:cNvPicPr>
+          <p:nvPr/>
+        </p:nvPicPr>
+        <p:blipFill>
+          <a:blip r:embed="rId4"/>
+          <a:stretch>
+            <a:fillRect/>
+          </a:stretch>
+        </p:blipFill>
+        <p:spPr>
+          <a:xfrm>
+            <a:off x="4612363" y="2384121"/>
+            <a:ext cx="465447" cy="465447"/>
+          </a:xfrm>
+          <a:prstGeom prst="rect">
+            <a:avLst/>
+          </a:prstGeom>
+        </p:spPr>
+      </p:pic>
+      <p:cxnSp>
+        <p:nvCxnSpPr>
+          <p:cNvPr id="21" name="Straight Arrow Connector 20"/>
+          <p:cNvCxnSpPr/>
+          <p:nvPr/>
+        </p:nvCxnSpPr>
+        <p:spPr>
+          <a:xfrm flipV="1">
+            <a:off x="4332514" y="2985719"/>
+            <a:ext cx="3633792" cy="19291"/>
+          </a:xfrm>
+          <a:prstGeom prst="straightConnector1">
+            <a:avLst/>
+          </a:prstGeom>
+          <a:ln>
+            <a:headEnd type="triangle"/>
+            <a:tailEnd type="none"/>
+          </a:ln>
+        </p:spPr>
+        <p:style>
+          <a:lnRef idx="1">
+            <a:schemeClr val="accent1"/>
+          </a:lnRef>
+          <a:fillRef idx="0">
+            <a:schemeClr val="accent1"/>
+          </a:fillRef>
+          <a:effectRef idx="0">
+            <a:schemeClr val="accent1"/>
+          </a:effectRef>
+          <a:fontRef idx="minor">
+            <a:schemeClr val="tx1"/>
+          </a:fontRef>
+        </p:style>
+      </p:cxnSp>
+      <p:sp>
+        <p:nvSpPr>
+          <p:cNvPr id="25" name="TextBox 24"/>
+          <p:cNvSpPr txBox="1"/>
+          <p:nvPr/>
+        </p:nvSpPr>
+        <p:spPr>
+          <a:xfrm>
+            <a:off x="5156072" y="3004601"/>
+            <a:ext cx="1743106" cy="276999"/>
+          </a:xfrm>
+          <a:prstGeom prst="rect">
+            <a:avLst/>
+          </a:prstGeom>
+          <a:noFill/>
+        </p:spPr>
+        <p:txBody>
+          <a:bodyPr wrap="none" rtlCol="0">
+            <a:spAutoFit/>
+          </a:bodyPr>
+          <a:lstStyle/>
+          <a:p>
+            <a:r>
+              <a:rPr lang="en-US" sz="1200" dirty="0" smtClean="0"/>
+              <a:t>Recommended, Optional</a:t>
+            </a:r>
+            <a:endParaRPr lang="en-US" sz="1200" dirty="0"/>
+          </a:p>
+        </p:txBody>
+      </p:sp>
+      <p:sp>
+        <p:nvSpPr>
+          <p:cNvPr id="23" name="Rounded Rectangle 22"/>
+          <p:cNvSpPr/>
+          <p:nvPr/>
+        </p:nvSpPr>
+        <p:spPr>
+          <a:xfrm>
+            <a:off x="414645" y="539551"/>
+            <a:ext cx="3674424" cy="410934"/>
+          </a:xfrm>
+          <a:prstGeom prst="roundRect">
+            <a:avLst/>
+          </a:prstGeom>
+          <a:solidFill>
+            <a:schemeClr val="accent1"/>
+          </a:solidFill>
+        </p:spPr>
+        <p:style>
+          <a:lnRef idx="2">
+            <a:schemeClr val="accent1">
+              <a:shade val="50000"/>
+            </a:schemeClr>
+          </a:lnRef>
+          <a:fillRef idx="1">
+            <a:schemeClr val="accent1"/>
+          </a:fillRef>
+          <a:effectRef idx="0">
+            <a:schemeClr val="accent1"/>
+          </a:effectRef>
+          <a:fontRef idx="minor">
+            <a:schemeClr val="lt1"/>
+          </a:fontRef>
+        </p:style>
+        <p:txBody>
+          <a:bodyPr rtlCol="0" anchor="ctr"/>
+          <a:lstStyle/>
+          <a:p>
+            <a:pPr algn="ctr"/>
+            <a:r>
+              <a:rPr lang="en-US" dirty="0" smtClean="0"/>
+              <a:t>Local Network with Internet Access</a:t>
+            </a:r>
+            <a:endParaRPr lang="en-US" dirty="0"/>
+          </a:p>
+        </p:txBody>
+      </p:sp>
+      <p:cxnSp>
+        <p:nvCxnSpPr>
+          <p:cNvPr id="24" name="Straight Arrow Connector 23"/>
+          <p:cNvCxnSpPr/>
+          <p:nvPr/>
+        </p:nvCxnSpPr>
+        <p:spPr>
+          <a:xfrm>
+            <a:off x="1201780" y="975513"/>
+            <a:ext cx="0" cy="430233"/>
+          </a:xfrm>
+          <a:prstGeom prst="straightConnector1">
+            <a:avLst/>
+          </a:prstGeom>
+          <a:ln>
+            <a:headEnd type="triangle"/>
+            <a:tailEnd type="triangle"/>
+          </a:ln>
+        </p:spPr>
+        <p:style>
+          <a:lnRef idx="1">
+            <a:schemeClr val="accent1"/>
+          </a:lnRef>
+          <a:fillRef idx="0">
+            <a:schemeClr val="accent1"/>
+          </a:fillRef>
+          <a:effectRef idx="0">
+            <a:schemeClr val="accent1"/>
+          </a:effectRef>
+          <a:fontRef idx="minor">
+            <a:schemeClr val="tx1"/>
+          </a:fontRef>
+        </p:style>
+      </p:cxnSp>
+      <p:cxnSp>
+        <p:nvCxnSpPr>
+          <p:cNvPr id="26" name="Straight Arrow Connector 25"/>
+          <p:cNvCxnSpPr/>
+          <p:nvPr/>
+        </p:nvCxnSpPr>
+        <p:spPr>
+          <a:xfrm>
+            <a:off x="3453196" y="950485"/>
+            <a:ext cx="0" cy="430233"/>
+          </a:xfrm>
+          <a:prstGeom prst="straightConnector1">
+            <a:avLst/>
+          </a:prstGeom>
+          <a:ln>
+            <a:headEnd type="triangle"/>
+            <a:tailEnd type="triangle"/>
+          </a:ln>
+        </p:spPr>
+        <p:style>
+          <a:lnRef idx="1">
+            <a:schemeClr val="accent1"/>
+          </a:lnRef>
+          <a:fillRef idx="0">
+            <a:schemeClr val="accent1"/>
+          </a:fillRef>
+          <a:effectRef idx="0">
+            <a:schemeClr val="accent1"/>
+          </a:effectRef>
+          <a:fontRef idx="minor">
+            <a:schemeClr val="tx1"/>
+          </a:fontRef>
+        </p:style>
+      </p:cxnSp>
+    </p:spTree>
+    <p:extLst>
+      <p:ext uri="{BB962C8B-B14F-4D97-AF65-F5344CB8AC3E}">
+        <p14:creationId xmlns:p14="http://schemas.microsoft.com/office/powerpoint/2010/main" val="874099342"/>
+      </p:ext>
+    </p:extLst>
+  </p:cSld>
+  <p:clrMapOvr>
+    <a:masterClrMapping/>
+  </p:clrMapOvr>
+</p:sld>
+</file>
+
+<file path=ppt/slides/slide3.xml><?xml version="1.0" encoding="utf-8"?>
+<p:sld xmlns:a="http://schemas.openxmlformats.org/drawingml/2006/main" xmlns:r="http://schemas.openxmlformats.org/officeDocument/2006/relationships" xmlns:p="http://schemas.openxmlformats.org/presentationml/2006/main">
+  <p:cSld>
+    <p:spTree>
+      <p:nvGrpSpPr>
+        <p:cNvPr id="1" name=""/>
+        <p:cNvGrpSpPr/>
+        <p:nvPr/>
+      </p:nvGrpSpPr>
+      <p:grpSpPr>
+        <a:xfrm>
+          <a:off x="0" y="0"/>
+          <a:ext cx="0" cy="0"/>
+          <a:chOff x="0" y="0"/>
+          <a:chExt cx="0" cy="0"/>
+        </a:xfrm>
+      </p:grpSpPr>
+      <p:sp>
+        <p:nvSpPr>
+          <p:cNvPr id="4" name="Rounded Rectangle 3"/>
+          <p:cNvSpPr/>
+          <p:nvPr/>
+        </p:nvSpPr>
+        <p:spPr>
+          <a:xfrm>
+            <a:off x="2728355" y="4206586"/>
+            <a:ext cx="1360714" cy="707572"/>
+          </a:xfrm>
+          <a:prstGeom prst="roundRect">
+            <a:avLst/>
+          </a:prstGeom>
+          <a:solidFill>
+            <a:schemeClr val="accent3">
+              <a:lumMod val="40000"/>
+              <a:lumOff val="60000"/>
+            </a:schemeClr>
+          </a:solidFill>
+        </p:spPr>
+        <p:style>
+          <a:lnRef idx="2">
+            <a:schemeClr val="accent1">
+              <a:shade val="50000"/>
+            </a:schemeClr>
+          </a:lnRef>
+          <a:fillRef idx="1">
+            <a:schemeClr val="accent1"/>
+          </a:fillRef>
+          <a:effectRef idx="0">
+            <a:schemeClr val="accent1"/>
+          </a:effectRef>
+          <a:fontRef idx="minor">
+            <a:schemeClr val="lt1"/>
+          </a:fontRef>
+        </p:style>
+        <p:txBody>
+          <a:bodyPr rtlCol="0" anchor="ctr"/>
+          <a:lstStyle/>
+          <a:p>
+            <a:pPr algn="ctr"/>
+            <a:r>
+              <a:rPr lang="en-US" smtClean="0">
+                <a:solidFill>
+                  <a:schemeClr val="tx1"/>
+                </a:solidFill>
+              </a:rPr>
+              <a:t>PI Worker</a:t>
+            </a:r>
+            <a:endParaRPr lang="en-US">
+              <a:solidFill>
+                <a:schemeClr val="tx1"/>
+              </a:solidFill>
+            </a:endParaRPr>
+          </a:p>
+        </p:txBody>
+      </p:sp>
+      <p:sp>
+        <p:nvSpPr>
+          <p:cNvPr id="5" name="Rounded Rectangle 4"/>
+          <p:cNvSpPr/>
+          <p:nvPr/>
+        </p:nvSpPr>
+        <p:spPr>
+          <a:xfrm>
+            <a:off x="4566455" y="2227614"/>
+            <a:ext cx="1360714" cy="707572"/>
+          </a:xfrm>
+          <a:prstGeom prst="roundRect">
+            <a:avLst/>
+          </a:prstGeom>
+          <a:solidFill>
+            <a:schemeClr val="accent3">
+              <a:lumMod val="40000"/>
+              <a:lumOff val="60000"/>
+            </a:schemeClr>
+          </a:solidFill>
+        </p:spPr>
+        <p:style>
+          <a:lnRef idx="2">
+            <a:schemeClr val="accent1">
+              <a:shade val="50000"/>
+            </a:schemeClr>
+          </a:lnRef>
+          <a:fillRef idx="1">
+            <a:schemeClr val="accent1"/>
+          </a:fillRef>
+          <a:effectRef idx="0">
+            <a:schemeClr val="accent1"/>
+          </a:effectRef>
+          <a:fontRef idx="minor">
+            <a:schemeClr val="lt1"/>
+          </a:fontRef>
+        </p:style>
+        <p:txBody>
+          <a:bodyPr rtlCol="0" anchor="ctr"/>
+          <a:lstStyle/>
+          <a:p>
+            <a:pPr algn="ctr"/>
+            <a:r>
+              <a:rPr lang="en-US" dirty="0" smtClean="0">
+                <a:solidFill>
+                  <a:schemeClr val="tx1"/>
+                </a:solidFill>
+              </a:rPr>
+              <a:t>PI Master </a:t>
+            </a:r>
+            <a:endParaRPr lang="en-US" dirty="0">
+              <a:solidFill>
+                <a:schemeClr val="tx1"/>
+              </a:solidFill>
+            </a:endParaRPr>
+          </a:p>
+        </p:txBody>
+      </p:sp>
+      <p:sp>
+        <p:nvSpPr>
+          <p:cNvPr id="6" name="Rounded Rectangle 5"/>
+          <p:cNvSpPr/>
+          <p:nvPr/>
+        </p:nvSpPr>
+        <p:spPr>
+          <a:xfrm>
+            <a:off x="7540832" y="4206586"/>
+            <a:ext cx="1360714" cy="707572"/>
+          </a:xfrm>
+          <a:prstGeom prst="roundRect">
+            <a:avLst/>
+          </a:prstGeom>
+          <a:solidFill>
+            <a:schemeClr val="accent3">
+              <a:lumMod val="40000"/>
+              <a:lumOff val="60000"/>
+            </a:schemeClr>
+          </a:solidFill>
+        </p:spPr>
+        <p:style>
+          <a:lnRef idx="2">
+            <a:schemeClr val="accent1">
+              <a:shade val="50000"/>
+            </a:schemeClr>
+          </a:lnRef>
+          <a:fillRef idx="1">
+            <a:schemeClr val="accent1"/>
+          </a:fillRef>
+          <a:effectRef idx="0">
+            <a:schemeClr val="accent1"/>
+          </a:effectRef>
+          <a:fontRef idx="minor">
+            <a:schemeClr val="lt1"/>
+          </a:fontRef>
+        </p:style>
+        <p:txBody>
+          <a:bodyPr rtlCol="0" anchor="ctr"/>
+          <a:lstStyle/>
+          <a:p>
+            <a:pPr algn="ctr"/>
+            <a:r>
+              <a:rPr lang="en-US" smtClean="0">
+                <a:solidFill>
+                  <a:schemeClr val="tx1"/>
+                </a:solidFill>
+              </a:rPr>
+              <a:t>PI Worker</a:t>
+            </a:r>
+            <a:endParaRPr lang="en-US">
+              <a:solidFill>
+                <a:schemeClr val="tx1"/>
+              </a:solidFill>
+            </a:endParaRPr>
+          </a:p>
+        </p:txBody>
+      </p:sp>
+      <p:sp>
+        <p:nvSpPr>
+          <p:cNvPr id="7" name="Rounded Rectangle 6"/>
+          <p:cNvSpPr/>
+          <p:nvPr/>
+        </p:nvSpPr>
+        <p:spPr>
+          <a:xfrm>
+            <a:off x="5936673" y="4212525"/>
+            <a:ext cx="1360714" cy="707572"/>
+          </a:xfrm>
+          <a:prstGeom prst="roundRect">
+            <a:avLst/>
+          </a:prstGeom>
+          <a:solidFill>
+            <a:schemeClr val="accent3">
+              <a:lumMod val="40000"/>
+              <a:lumOff val="60000"/>
+            </a:schemeClr>
+          </a:solidFill>
+        </p:spPr>
+        <p:style>
+          <a:lnRef idx="2">
+            <a:schemeClr val="accent1">
+              <a:shade val="50000"/>
+            </a:schemeClr>
+          </a:lnRef>
+          <a:fillRef idx="1">
+            <a:schemeClr val="accent1"/>
+          </a:fillRef>
+          <a:effectRef idx="0">
+            <a:schemeClr val="accent1"/>
+          </a:effectRef>
+          <a:fontRef idx="minor">
+            <a:schemeClr val="lt1"/>
+          </a:fontRef>
+        </p:style>
+        <p:txBody>
+          <a:bodyPr rtlCol="0" anchor="ctr"/>
+          <a:lstStyle/>
+          <a:p>
+            <a:pPr algn="ctr"/>
+            <a:r>
+              <a:rPr lang="en-US" smtClean="0">
+                <a:solidFill>
+                  <a:schemeClr val="tx1"/>
+                </a:solidFill>
+              </a:rPr>
+              <a:t>PI Worker</a:t>
+            </a:r>
+            <a:endParaRPr lang="en-US">
+              <a:solidFill>
+                <a:schemeClr val="tx1"/>
+              </a:solidFill>
+            </a:endParaRPr>
+          </a:p>
+        </p:txBody>
+      </p:sp>
+      <p:sp>
+        <p:nvSpPr>
+          <p:cNvPr id="8" name="Rounded Rectangle 7"/>
+          <p:cNvSpPr/>
+          <p:nvPr/>
+        </p:nvSpPr>
+        <p:spPr>
+          <a:xfrm>
+            <a:off x="4332514" y="4206586"/>
+            <a:ext cx="1360714" cy="707572"/>
+          </a:xfrm>
+          <a:prstGeom prst="roundRect">
+            <a:avLst/>
+          </a:prstGeom>
+          <a:solidFill>
+            <a:schemeClr val="accent3">
+              <a:lumMod val="40000"/>
+              <a:lumOff val="60000"/>
+            </a:schemeClr>
+          </a:solidFill>
+        </p:spPr>
+        <p:style>
+          <a:lnRef idx="2">
+            <a:schemeClr val="accent1">
+              <a:shade val="50000"/>
+            </a:schemeClr>
+          </a:lnRef>
+          <a:fillRef idx="1">
+            <a:schemeClr val="accent1"/>
+          </a:fillRef>
+          <a:effectRef idx="0">
+            <a:schemeClr val="accent1"/>
+          </a:effectRef>
+          <a:fontRef idx="minor">
+            <a:schemeClr val="lt1"/>
+          </a:fontRef>
+        </p:style>
+        <p:txBody>
+          <a:bodyPr rtlCol="0" anchor="ctr"/>
+          <a:lstStyle/>
+          <a:p>
+            <a:pPr algn="ctr"/>
+            <a:r>
+              <a:rPr lang="en-US" smtClean="0">
+                <a:solidFill>
+                  <a:schemeClr val="tx1"/>
+                </a:solidFill>
+              </a:rPr>
+              <a:t>PI Worker</a:t>
+            </a:r>
+            <a:endParaRPr lang="en-US">
+              <a:solidFill>
+                <a:schemeClr val="tx1"/>
+              </a:solidFill>
+            </a:endParaRPr>
+          </a:p>
+        </p:txBody>
+      </p:sp>
+      <p:sp>
+        <p:nvSpPr>
+          <p:cNvPr id="9" name="Rounded Rectangle 8"/>
+          <p:cNvSpPr/>
+          <p:nvPr/>
+        </p:nvSpPr>
+        <p:spPr>
+          <a:xfrm>
+            <a:off x="2728355" y="3365419"/>
+            <a:ext cx="6173191" cy="410934"/>
+          </a:xfrm>
+          <a:prstGeom prst="roundRect">
+            <a:avLst/>
+          </a:prstGeom>
+          <a:solidFill>
+            <a:schemeClr val="accent1"/>
+          </a:solidFill>
+        </p:spPr>
+        <p:style>
+          <a:lnRef idx="2">
+            <a:schemeClr val="accent1">
+              <a:shade val="50000"/>
+            </a:schemeClr>
+          </a:lnRef>
+          <a:fillRef idx="1">
+            <a:schemeClr val="accent1"/>
+          </a:fillRef>
+          <a:effectRef idx="0">
+            <a:schemeClr val="accent1"/>
+          </a:effectRef>
+          <a:fontRef idx="minor">
+            <a:schemeClr val="lt1"/>
+          </a:fontRef>
+        </p:style>
+        <p:txBody>
+          <a:bodyPr rtlCol="0" anchor="ctr"/>
+          <a:lstStyle/>
+          <a:p>
+            <a:pPr algn="ctr"/>
+            <a:r>
+              <a:rPr lang="en-US" dirty="0" smtClean="0"/>
+              <a:t>Local Network with Internet Access</a:t>
+            </a:r>
+            <a:endParaRPr lang="en-US" dirty="0"/>
+          </a:p>
+        </p:txBody>
+      </p:sp>
+      <p:cxnSp>
+        <p:nvCxnSpPr>
+          <p:cNvPr id="11" name="Straight Arrow Connector 10"/>
+          <p:cNvCxnSpPr>
+            <a:stCxn id="5" idx="2"/>
+          </p:cNvCxnSpPr>
+          <p:nvPr/>
+        </p:nvCxnSpPr>
+        <p:spPr>
+          <a:xfrm>
+            <a:off x="5246812" y="2935186"/>
+            <a:ext cx="0" cy="430233"/>
+          </a:xfrm>
+          <a:prstGeom prst="straightConnector1">
+            <a:avLst/>
+          </a:prstGeom>
+          <a:ln>
+            <a:headEnd type="triangle"/>
+            <a:tailEnd type="triangle"/>
+          </a:ln>
+        </p:spPr>
+        <p:style>
+          <a:lnRef idx="1">
+            <a:schemeClr val="accent1"/>
+          </a:lnRef>
+          <a:fillRef idx="0">
+            <a:schemeClr val="accent1"/>
+          </a:fillRef>
+          <a:effectRef idx="0">
+            <a:schemeClr val="accent1"/>
+          </a:effectRef>
+          <a:fontRef idx="minor">
+            <a:schemeClr val="tx1"/>
+          </a:fontRef>
+        </p:style>
+      </p:cxnSp>
+      <p:cxnSp>
+        <p:nvCxnSpPr>
+          <p:cNvPr id="12" name="Straight Arrow Connector 11"/>
+          <p:cNvCxnSpPr/>
+          <p:nvPr/>
+        </p:nvCxnSpPr>
+        <p:spPr>
+          <a:xfrm>
+            <a:off x="3419102" y="3776353"/>
+            <a:ext cx="0" cy="430233"/>
+          </a:xfrm>
+          <a:prstGeom prst="straightConnector1">
+            <a:avLst/>
+          </a:prstGeom>
+          <a:ln>
+            <a:headEnd type="triangle"/>
+            <a:tailEnd type="triangle"/>
+          </a:ln>
+        </p:spPr>
+        <p:style>
+          <a:lnRef idx="1">
+            <a:schemeClr val="accent1"/>
+          </a:lnRef>
+          <a:fillRef idx="0">
+            <a:schemeClr val="accent1"/>
+          </a:fillRef>
+          <a:effectRef idx="0">
+            <a:schemeClr val="accent1"/>
+          </a:effectRef>
+          <a:fontRef idx="minor">
+            <a:schemeClr val="tx1"/>
+          </a:fontRef>
+        </p:style>
+      </p:cxnSp>
+      <p:cxnSp>
+        <p:nvCxnSpPr>
+          <p:cNvPr id="13" name="Straight Arrow Connector 12"/>
+          <p:cNvCxnSpPr/>
+          <p:nvPr/>
+        </p:nvCxnSpPr>
+        <p:spPr>
+          <a:xfrm>
+            <a:off x="5055917" y="3776353"/>
+            <a:ext cx="0" cy="430233"/>
+          </a:xfrm>
+          <a:prstGeom prst="straightConnector1">
+            <a:avLst/>
+          </a:prstGeom>
+          <a:ln>
+            <a:headEnd type="triangle"/>
+            <a:tailEnd type="triangle"/>
+          </a:ln>
+        </p:spPr>
+        <p:style>
+          <a:lnRef idx="1">
+            <a:schemeClr val="accent1"/>
+          </a:lnRef>
+          <a:fillRef idx="0">
+            <a:schemeClr val="accent1"/>
+          </a:fillRef>
+          <a:effectRef idx="0">
+            <a:schemeClr val="accent1"/>
+          </a:effectRef>
+          <a:fontRef idx="minor">
+            <a:schemeClr val="tx1"/>
+          </a:fontRef>
+        </p:style>
+      </p:cxnSp>
+      <p:cxnSp>
+        <p:nvCxnSpPr>
+          <p:cNvPr id="14" name="Straight Arrow Connector 13"/>
+          <p:cNvCxnSpPr/>
+          <p:nvPr/>
+        </p:nvCxnSpPr>
+        <p:spPr>
+          <a:xfrm>
+            <a:off x="6587835" y="3776353"/>
+            <a:ext cx="0" cy="430233"/>
+          </a:xfrm>
+          <a:prstGeom prst="straightConnector1">
+            <a:avLst/>
+          </a:prstGeom>
+          <a:ln>
+            <a:headEnd type="triangle"/>
+            <a:tailEnd type="triangle"/>
+          </a:ln>
+        </p:spPr>
+        <p:style>
+          <a:lnRef idx="1">
+            <a:schemeClr val="accent1"/>
+          </a:lnRef>
+          <a:fillRef idx="0">
+            <a:schemeClr val="accent1"/>
+          </a:fillRef>
+          <a:effectRef idx="0">
+            <a:schemeClr val="accent1"/>
+          </a:effectRef>
+          <a:fontRef idx="minor">
+            <a:schemeClr val="tx1"/>
+          </a:fontRef>
+        </p:style>
+      </p:cxnSp>
+      <p:cxnSp>
+        <p:nvCxnSpPr>
+          <p:cNvPr id="15" name="Straight Arrow Connector 14"/>
+          <p:cNvCxnSpPr/>
+          <p:nvPr/>
+        </p:nvCxnSpPr>
+        <p:spPr>
+          <a:xfrm>
+            <a:off x="8189024" y="3776353"/>
+            <a:ext cx="0" cy="430233"/>
+          </a:xfrm>
+          <a:prstGeom prst="straightConnector1">
+            <a:avLst/>
+          </a:prstGeom>
+          <a:ln>
+            <a:headEnd type="triangle"/>
+            <a:tailEnd type="triangle"/>
+          </a:ln>
+        </p:spPr>
+        <p:style>
+          <a:lnRef idx="1">
+            <a:schemeClr val="accent1"/>
+          </a:lnRef>
+          <a:fillRef idx="0">
+            <a:schemeClr val="accent1"/>
+          </a:fillRef>
+          <a:effectRef idx="0">
+            <a:schemeClr val="accent1"/>
+          </a:effectRef>
+          <a:fontRef idx="minor">
+            <a:schemeClr val="tx1"/>
+          </a:fontRef>
+        </p:style>
+      </p:cxnSp>
+      <p:sp>
+        <p:nvSpPr>
+          <p:cNvPr id="16" name="Rounded Rectangle 15"/>
+          <p:cNvSpPr/>
+          <p:nvPr/>
+        </p:nvSpPr>
+        <p:spPr>
+          <a:xfrm>
+            <a:off x="2787990" y="2263645"/>
+            <a:ext cx="1360714" cy="707572"/>
+          </a:xfrm>
+          <a:prstGeom prst="roundRect">
+            <a:avLst/>
+          </a:prstGeom>
+          <a:solidFill>
+            <a:schemeClr val="accent3">
+              <a:lumMod val="40000"/>
+              <a:lumOff val="60000"/>
+            </a:schemeClr>
+          </a:solidFill>
+        </p:spPr>
+        <p:style>
+          <a:lnRef idx="2">
+            <a:schemeClr val="accent1">
+              <a:shade val="50000"/>
+            </a:schemeClr>
+          </a:lnRef>
+          <a:fillRef idx="1">
+            <a:schemeClr val="accent1"/>
+          </a:fillRef>
+          <a:effectRef idx="0">
+            <a:schemeClr val="accent1"/>
+          </a:effectRef>
+          <a:fontRef idx="minor">
+            <a:schemeClr val="lt1"/>
+          </a:fontRef>
+        </p:style>
+        <p:txBody>
+          <a:bodyPr rtlCol="0" anchor="ctr"/>
+          <a:lstStyle/>
+          <a:p>
+            <a:pPr algn="ctr"/>
+            <a:r>
+              <a:rPr lang="en-US" dirty="0" smtClean="0">
+                <a:solidFill>
+                  <a:schemeClr val="tx1"/>
+                </a:solidFill>
+              </a:rPr>
+              <a:t>Laptop</a:t>
+            </a:r>
+            <a:endParaRPr lang="en-US" dirty="0">
+              <a:solidFill>
+                <a:schemeClr val="tx1"/>
+              </a:solidFill>
+            </a:endParaRPr>
+          </a:p>
+        </p:txBody>
+      </p:sp>
+      <p:cxnSp>
+        <p:nvCxnSpPr>
+          <p:cNvPr id="20" name="Straight Arrow Connector 19"/>
+          <p:cNvCxnSpPr/>
+          <p:nvPr/>
+        </p:nvCxnSpPr>
+        <p:spPr>
+          <a:xfrm>
+            <a:off x="3444314" y="2935186"/>
+            <a:ext cx="0" cy="430233"/>
+          </a:xfrm>
+          <a:prstGeom prst="straightConnector1">
+            <a:avLst/>
+          </a:prstGeom>
+          <a:ln>
+            <a:headEnd type="triangle"/>
+            <a:tailEnd type="triangle"/>
+          </a:ln>
+        </p:spPr>
+        <p:style>
+          <a:lnRef idx="1">
+            <a:schemeClr val="accent1"/>
+          </a:lnRef>
+          <a:fillRef idx="0">
+            <a:schemeClr val="accent1"/>
+          </a:fillRef>
+          <a:effectRef idx="0">
+            <a:schemeClr val="accent1"/>
+          </a:effectRef>
+          <a:fontRef idx="minor">
+            <a:schemeClr val="tx1"/>
+          </a:fontRef>
+        </p:style>
+      </p:cxnSp>
+      <p:pic>
+        <p:nvPicPr>
+          <p:cNvPr id="2" name="Picture 1"/>
+          <p:cNvPicPr>
+            <a:picLocks noChangeAspect="1"/>
+          </p:cNvPicPr>
+          <p:nvPr/>
+        </p:nvPicPr>
+        <p:blipFill>
+          <a:blip r:embed="rId2"/>
+          <a:stretch>
+            <a:fillRect/>
+          </a:stretch>
+        </p:blipFill>
+        <p:spPr>
+          <a:xfrm>
+            <a:off x="8050607" y="1420087"/>
+            <a:ext cx="1184819" cy="1184819"/>
+          </a:xfrm>
+          <a:prstGeom prst="rect">
+            <a:avLst/>
+          </a:prstGeom>
+        </p:spPr>
+      </p:pic>
+      <p:pic>
+        <p:nvPicPr>
+          <p:cNvPr id="3" name="Picture 2"/>
+          <p:cNvPicPr>
+            <a:picLocks noChangeAspect="1"/>
+          </p:cNvPicPr>
+          <p:nvPr/>
+        </p:nvPicPr>
+        <p:blipFill>
+          <a:blip r:embed="rId3"/>
+          <a:stretch>
+            <a:fillRect/>
+          </a:stretch>
+        </p:blipFill>
+        <p:spPr>
+          <a:xfrm flipH="1">
+            <a:off x="6962769" y="1581226"/>
+            <a:ext cx="986693" cy="986693"/>
+          </a:xfrm>
+          <a:prstGeom prst="rect">
+            <a:avLst/>
+          </a:prstGeom>
+        </p:spPr>
+      </p:pic>
+      <p:pic>
+        <p:nvPicPr>
+          <p:cNvPr id="10" name="Picture 9"/>
+          <p:cNvPicPr>
+            <a:picLocks noChangeAspect="1"/>
+          </p:cNvPicPr>
+          <p:nvPr/>
+        </p:nvPicPr>
+        <p:blipFill>
+          <a:blip r:embed="rId4"/>
+          <a:stretch>
+            <a:fillRect/>
+          </a:stretch>
+        </p:blipFill>
+        <p:spPr>
+          <a:xfrm>
+            <a:off x="6450463" y="1966321"/>
+            <a:ext cx="465447" cy="465447"/>
+          </a:xfrm>
+          <a:prstGeom prst="rect">
+            <a:avLst/>
+          </a:prstGeom>
+        </p:spPr>
+      </p:pic>
+      <p:cxnSp>
+        <p:nvCxnSpPr>
+          <p:cNvPr id="21" name="Straight Arrow Connector 20"/>
+          <p:cNvCxnSpPr/>
+          <p:nvPr/>
+        </p:nvCxnSpPr>
+        <p:spPr>
+          <a:xfrm flipV="1">
+            <a:off x="6170614" y="2587211"/>
+            <a:ext cx="3064812" cy="1"/>
+          </a:xfrm>
+          <a:prstGeom prst="straightConnector1">
+            <a:avLst/>
+          </a:prstGeom>
+          <a:ln>
+            <a:headEnd type="triangle"/>
+            <a:tailEnd type="none"/>
+          </a:ln>
+        </p:spPr>
+        <p:style>
+          <a:lnRef idx="1">
+            <a:schemeClr val="accent1"/>
+          </a:lnRef>
+          <a:fillRef idx="0">
+            <a:schemeClr val="accent1"/>
+          </a:fillRef>
+          <a:effectRef idx="0">
+            <a:schemeClr val="accent1"/>
+          </a:effectRef>
+          <a:fontRef idx="minor">
+            <a:schemeClr val="tx1"/>
+          </a:fontRef>
+        </p:style>
+      </p:cxnSp>
+      <p:sp>
+        <p:nvSpPr>
+          <p:cNvPr id="25" name="TextBox 24"/>
+          <p:cNvSpPr txBox="1"/>
+          <p:nvPr/>
+        </p:nvSpPr>
+        <p:spPr>
+          <a:xfrm>
+            <a:off x="6994172" y="2586801"/>
+            <a:ext cx="1743106" cy="276999"/>
+          </a:xfrm>
+          <a:prstGeom prst="rect">
+            <a:avLst/>
+          </a:prstGeom>
+          <a:noFill/>
+        </p:spPr>
+        <p:txBody>
+          <a:bodyPr wrap="none" rtlCol="0">
+            <a:spAutoFit/>
+          </a:bodyPr>
+          <a:lstStyle/>
+          <a:p>
+            <a:r>
+              <a:rPr lang="en-US" sz="1200" dirty="0" smtClean="0"/>
+              <a:t>Recommended, Optional</a:t>
+            </a:r>
+            <a:endParaRPr lang="en-US" sz="1200" dirty="0"/>
+          </a:p>
+        </p:txBody>
+      </p:sp>
+    </p:spTree>
+    <p:extLst>
+      <p:ext uri="{BB962C8B-B14F-4D97-AF65-F5344CB8AC3E}">
+        <p14:creationId xmlns:p14="http://schemas.microsoft.com/office/powerpoint/2010/main" val="2366804960"/>
+      </p:ext>
+    </p:extLst>
+  </p:cSld>
+  <p:clrMapOvr>
+    <a:masterClrMapping/>
+  </p:clrMapOvr>
+</p:sld>
+</file>
+
+<file path=ppt/slides/slide4.xml><?xml version="1.0" encoding="utf-8"?>
 <p:sld xmlns:a="http://schemas.openxmlformats.org/drawingml/2006/main" xmlns:r="http://schemas.openxmlformats.org/officeDocument/2006/relationships" xmlns:p="http://schemas.openxmlformats.org/presentationml/2006/main">
   <p:cSld>
     <p:spTree>
@@ -7582,7 +9373,7 @@
     </a:clrScheme>
     <a:fontScheme name="Office">
       <a:majorFont>
-        <a:latin typeface="Calibri Light" panose="020F0302020204030204"/>
+        <a:latin typeface="Calibri Light"/>
         <a:ea typeface=""/>
         <a:cs typeface=""/>
         <a:font script="Jpan" typeface="Yu Gothic Light"/>
@@ -7617,7 +9408,7 @@
         <a:font script="Geor" typeface="Sylfaen"/>
       </a:majorFont>
       <a:minorFont>
-        <a:latin typeface="Calibri" panose="020F0502020204030204"/>
+        <a:latin typeface="Calibri"/>
         <a:ea typeface=""/>
         <a:cs typeface=""/>
         <a:font script="Jpan" typeface="Yu Gothic"/>
@@ -7794,7 +9585,7 @@
   <a:extraClrSchemeLst/>
   <a:extLst>
     <a:ext uri="{05A4C25C-085E-4340-85A3-A5531E510DB2}">
-      <thm15:themeFamily xmlns:thm15="http://schemas.microsoft.com/office/thememl/2012/main" name="Office Theme" id="{62F939B6-93AF-4DB8-9C6B-D6C7DFDC589F}" vid="{4A3C46E8-61CC-4603-A589-7422A47A8E4A}"/>
+      <thm15:themeFamily xmlns:thm15="http://schemas.microsoft.com/office/thememl/2012/main" xmlns="" name="Office Theme" id="{62F939B6-93AF-4DB8-9C6B-D6C7DFDC589F}" vid="{4A3C46E8-61CC-4603-A589-7422A47A8E4A}"/>
     </a:ext>
   </a:extLst>
 </a:theme>

</xml_diff>

<commit_message>
add new image of cluster netrworking
</commit_message>
<xml_diff>
--- a/images/network.pptx
+++ b/images/network.pptx
@@ -6,7 +6,8 @@
   </p:sldMasterIdLst>
   <p:sldIdLst>
     <p:sldId id="256" r:id="rId2"/>
-    <p:sldId id="257" r:id="rId3"/>
+    <p:sldId id="258" r:id="rId3"/>
+    <p:sldId id="257" r:id="rId4"/>
   </p:sldIdLst>
   <p:sldSz cx="12192000" cy="6858000"/>
   <p:notesSz cx="6858000" cy="9144000"/>
@@ -155,10 +156,9 @@
           </a:lstStyle>
           <a:p>
             <a:r>
-              <a:rPr lang="en-US" smtClean="0"/>
+              <a:rPr lang="en-US"/>
               <a:t>Click to edit Master title style</a:t>
             </a:r>
-            <a:endParaRPr lang="en-US"/>
           </a:p>
         </p:txBody>
       </p:sp>
@@ -220,10 +220,9 @@
           </a:lstStyle>
           <a:p>
             <a:r>
-              <a:rPr lang="en-US" smtClean="0"/>
+              <a:rPr lang="en-US"/>
               <a:t>Click to edit Master subtitle style</a:t>
             </a:r>
-            <a:endParaRPr lang="en-US"/>
           </a:p>
         </p:txBody>
       </p:sp>
@@ -244,7 +243,7 @@
           <a:p>
             <a:fld id="{0EC95C33-DAB6-4546-B06D-886B2BAD356F}" type="datetimeFigureOut">
               <a:rPr lang="en-US" smtClean="0"/>
-              <a:t>8/15/18</a:t>
+              <a:t>1/20/21</a:t>
             </a:fld>
             <a:endParaRPr lang="en-US"/>
           </a:p>
@@ -338,10 +337,9 @@
           <a:lstStyle/>
           <a:p>
             <a:r>
-              <a:rPr lang="en-US" smtClean="0"/>
+              <a:rPr lang="en-US"/>
               <a:t>Click to edit Master title style</a:t>
             </a:r>
-            <a:endParaRPr lang="en-US"/>
           </a:p>
         </p:txBody>
       </p:sp>
@@ -362,38 +360,37 @@
           <a:p>
             <a:pPr lvl="0"/>
             <a:r>
-              <a:rPr lang="en-US" smtClean="0"/>
+              <a:rPr lang="en-US"/>
               <a:t>Click to edit Master text styles</a:t>
             </a:r>
           </a:p>
           <a:p>
             <a:pPr lvl="1"/>
             <a:r>
-              <a:rPr lang="en-US" smtClean="0"/>
+              <a:rPr lang="en-US"/>
               <a:t>Second level</a:t>
             </a:r>
           </a:p>
           <a:p>
             <a:pPr lvl="2"/>
             <a:r>
-              <a:rPr lang="en-US" smtClean="0"/>
+              <a:rPr lang="en-US"/>
               <a:t>Third level</a:t>
             </a:r>
           </a:p>
           <a:p>
             <a:pPr lvl="3"/>
             <a:r>
-              <a:rPr lang="en-US" smtClean="0"/>
+              <a:rPr lang="en-US"/>
               <a:t>Fourth level</a:t>
             </a:r>
           </a:p>
           <a:p>
             <a:pPr lvl="4"/>
             <a:r>
-              <a:rPr lang="en-US" smtClean="0"/>
+              <a:rPr lang="en-US"/>
               <a:t>Fifth level</a:t>
             </a:r>
-            <a:endParaRPr lang="en-US"/>
           </a:p>
         </p:txBody>
       </p:sp>
@@ -414,7 +411,7 @@
           <a:p>
             <a:fld id="{0EC95C33-DAB6-4546-B06D-886B2BAD356F}" type="datetimeFigureOut">
               <a:rPr lang="en-US" smtClean="0"/>
-              <a:t>8/15/18</a:t>
+              <a:t>1/20/21</a:t>
             </a:fld>
             <a:endParaRPr lang="en-US"/>
           </a:p>
@@ -513,10 +510,9 @@
           <a:lstStyle/>
           <a:p>
             <a:r>
-              <a:rPr lang="en-US" smtClean="0"/>
+              <a:rPr lang="en-US"/>
               <a:t>Click to edit Master title style</a:t>
             </a:r>
-            <a:endParaRPr lang="en-US"/>
           </a:p>
         </p:txBody>
       </p:sp>
@@ -542,38 +538,37 @@
           <a:p>
             <a:pPr lvl="0"/>
             <a:r>
-              <a:rPr lang="en-US" smtClean="0"/>
+              <a:rPr lang="en-US"/>
               <a:t>Click to edit Master text styles</a:t>
             </a:r>
           </a:p>
           <a:p>
             <a:pPr lvl="1"/>
             <a:r>
-              <a:rPr lang="en-US" smtClean="0"/>
+              <a:rPr lang="en-US"/>
               <a:t>Second level</a:t>
             </a:r>
           </a:p>
           <a:p>
             <a:pPr lvl="2"/>
             <a:r>
-              <a:rPr lang="en-US" smtClean="0"/>
+              <a:rPr lang="en-US"/>
               <a:t>Third level</a:t>
             </a:r>
           </a:p>
           <a:p>
             <a:pPr lvl="3"/>
             <a:r>
-              <a:rPr lang="en-US" smtClean="0"/>
+              <a:rPr lang="en-US"/>
               <a:t>Fourth level</a:t>
             </a:r>
           </a:p>
           <a:p>
             <a:pPr lvl="4"/>
             <a:r>
-              <a:rPr lang="en-US" smtClean="0"/>
+              <a:rPr lang="en-US"/>
               <a:t>Fifth level</a:t>
             </a:r>
-            <a:endParaRPr lang="en-US"/>
           </a:p>
         </p:txBody>
       </p:sp>
@@ -594,7 +589,7 @@
           <a:p>
             <a:fld id="{0EC95C33-DAB6-4546-B06D-886B2BAD356F}" type="datetimeFigureOut">
               <a:rPr lang="en-US" smtClean="0"/>
-              <a:t>8/15/18</a:t>
+              <a:t>1/20/21</a:t>
             </a:fld>
             <a:endParaRPr lang="en-US"/>
           </a:p>
@@ -688,10 +683,9 @@
           <a:lstStyle/>
           <a:p>
             <a:r>
-              <a:rPr lang="en-US" smtClean="0"/>
+              <a:rPr lang="en-US"/>
               <a:t>Click to edit Master title style</a:t>
             </a:r>
-            <a:endParaRPr lang="en-US"/>
           </a:p>
         </p:txBody>
       </p:sp>
@@ -712,38 +706,37 @@
           <a:p>
             <a:pPr lvl="0"/>
             <a:r>
-              <a:rPr lang="en-US" smtClean="0"/>
+              <a:rPr lang="en-US"/>
               <a:t>Click to edit Master text styles</a:t>
             </a:r>
           </a:p>
           <a:p>
             <a:pPr lvl="1"/>
             <a:r>
-              <a:rPr lang="en-US" smtClean="0"/>
+              <a:rPr lang="en-US"/>
               <a:t>Second level</a:t>
             </a:r>
           </a:p>
           <a:p>
             <a:pPr lvl="2"/>
             <a:r>
-              <a:rPr lang="en-US" smtClean="0"/>
+              <a:rPr lang="en-US"/>
               <a:t>Third level</a:t>
             </a:r>
           </a:p>
           <a:p>
             <a:pPr lvl="3"/>
             <a:r>
-              <a:rPr lang="en-US" smtClean="0"/>
+              <a:rPr lang="en-US"/>
               <a:t>Fourth level</a:t>
             </a:r>
           </a:p>
           <a:p>
             <a:pPr lvl="4"/>
             <a:r>
-              <a:rPr lang="en-US" smtClean="0"/>
+              <a:rPr lang="en-US"/>
               <a:t>Fifth level</a:t>
             </a:r>
-            <a:endParaRPr lang="en-US"/>
           </a:p>
         </p:txBody>
       </p:sp>
@@ -764,7 +757,7 @@
           <a:p>
             <a:fld id="{0EC95C33-DAB6-4546-B06D-886B2BAD356F}" type="datetimeFigureOut">
               <a:rPr lang="en-US" smtClean="0"/>
-              <a:t>8/15/18</a:t>
+              <a:t>1/20/21</a:t>
             </a:fld>
             <a:endParaRPr lang="en-US"/>
           </a:p>
@@ -867,10 +860,9 @@
           </a:lstStyle>
           <a:p>
             <a:r>
-              <a:rPr lang="en-US" smtClean="0"/>
+              <a:rPr lang="en-US"/>
               <a:t>Click to edit Master title style</a:t>
             </a:r>
-            <a:endParaRPr lang="en-US"/>
           </a:p>
         </p:txBody>
       </p:sp>
@@ -987,7 +979,7 @@
           <a:p>
             <a:pPr lvl="0"/>
             <a:r>
-              <a:rPr lang="en-US" smtClean="0"/>
+              <a:rPr lang="en-US"/>
               <a:t>Click to edit Master text styles</a:t>
             </a:r>
           </a:p>
@@ -1010,7 +1002,7 @@
           <a:p>
             <a:fld id="{0EC95C33-DAB6-4546-B06D-886B2BAD356F}" type="datetimeFigureOut">
               <a:rPr lang="en-US" smtClean="0"/>
-              <a:t>8/15/18</a:t>
+              <a:t>1/20/21</a:t>
             </a:fld>
             <a:endParaRPr lang="en-US"/>
           </a:p>
@@ -1104,10 +1096,9 @@
           <a:lstStyle/>
           <a:p>
             <a:r>
-              <a:rPr lang="en-US" smtClean="0"/>
+              <a:rPr lang="en-US"/>
               <a:t>Click to edit Master title style</a:t>
             </a:r>
-            <a:endParaRPr lang="en-US"/>
           </a:p>
         </p:txBody>
       </p:sp>
@@ -1133,38 +1124,37 @@
           <a:p>
             <a:pPr lvl="0"/>
             <a:r>
-              <a:rPr lang="en-US" smtClean="0"/>
+              <a:rPr lang="en-US"/>
               <a:t>Click to edit Master text styles</a:t>
             </a:r>
           </a:p>
           <a:p>
             <a:pPr lvl="1"/>
             <a:r>
-              <a:rPr lang="en-US" smtClean="0"/>
+              <a:rPr lang="en-US"/>
               <a:t>Second level</a:t>
             </a:r>
           </a:p>
           <a:p>
             <a:pPr lvl="2"/>
             <a:r>
-              <a:rPr lang="en-US" smtClean="0"/>
+              <a:rPr lang="en-US"/>
               <a:t>Third level</a:t>
             </a:r>
           </a:p>
           <a:p>
             <a:pPr lvl="3"/>
             <a:r>
-              <a:rPr lang="en-US" smtClean="0"/>
+              <a:rPr lang="en-US"/>
               <a:t>Fourth level</a:t>
             </a:r>
           </a:p>
           <a:p>
             <a:pPr lvl="4"/>
             <a:r>
-              <a:rPr lang="en-US" smtClean="0"/>
+              <a:rPr lang="en-US"/>
               <a:t>Fifth level</a:t>
             </a:r>
-            <a:endParaRPr lang="en-US"/>
           </a:p>
         </p:txBody>
       </p:sp>
@@ -1190,38 +1180,37 @@
           <a:p>
             <a:pPr lvl="0"/>
             <a:r>
-              <a:rPr lang="en-US" smtClean="0"/>
+              <a:rPr lang="en-US"/>
               <a:t>Click to edit Master text styles</a:t>
             </a:r>
           </a:p>
           <a:p>
             <a:pPr lvl="1"/>
             <a:r>
-              <a:rPr lang="en-US" smtClean="0"/>
+              <a:rPr lang="en-US"/>
               <a:t>Second level</a:t>
             </a:r>
           </a:p>
           <a:p>
             <a:pPr lvl="2"/>
             <a:r>
-              <a:rPr lang="en-US" smtClean="0"/>
+              <a:rPr lang="en-US"/>
               <a:t>Third level</a:t>
             </a:r>
           </a:p>
           <a:p>
             <a:pPr lvl="3"/>
             <a:r>
-              <a:rPr lang="en-US" smtClean="0"/>
+              <a:rPr lang="en-US"/>
               <a:t>Fourth level</a:t>
             </a:r>
           </a:p>
           <a:p>
             <a:pPr lvl="4"/>
             <a:r>
-              <a:rPr lang="en-US" smtClean="0"/>
+              <a:rPr lang="en-US"/>
               <a:t>Fifth level</a:t>
             </a:r>
-            <a:endParaRPr lang="en-US"/>
           </a:p>
         </p:txBody>
       </p:sp>
@@ -1242,7 +1231,7 @@
           <a:p>
             <a:fld id="{0EC95C33-DAB6-4546-B06D-886B2BAD356F}" type="datetimeFigureOut">
               <a:rPr lang="en-US" smtClean="0"/>
-              <a:t>8/15/18</a:t>
+              <a:t>1/20/21</a:t>
             </a:fld>
             <a:endParaRPr lang="en-US"/>
           </a:p>
@@ -1341,10 +1330,9 @@
           <a:lstStyle/>
           <a:p>
             <a:r>
-              <a:rPr lang="en-US" smtClean="0"/>
+              <a:rPr lang="en-US"/>
               <a:t>Click to edit Master title style</a:t>
             </a:r>
-            <a:endParaRPr lang="en-US"/>
           </a:p>
         </p:txBody>
       </p:sp>
@@ -1407,7 +1395,7 @@
           <a:p>
             <a:pPr lvl="0"/>
             <a:r>
-              <a:rPr lang="en-US" smtClean="0"/>
+              <a:rPr lang="en-US"/>
               <a:t>Click to edit Master text styles</a:t>
             </a:r>
           </a:p>
@@ -1435,38 +1423,37 @@
           <a:p>
             <a:pPr lvl="0"/>
             <a:r>
-              <a:rPr lang="en-US" smtClean="0"/>
+              <a:rPr lang="en-US"/>
               <a:t>Click to edit Master text styles</a:t>
             </a:r>
           </a:p>
           <a:p>
             <a:pPr lvl="1"/>
             <a:r>
-              <a:rPr lang="en-US" smtClean="0"/>
+              <a:rPr lang="en-US"/>
               <a:t>Second level</a:t>
             </a:r>
           </a:p>
           <a:p>
             <a:pPr lvl="2"/>
             <a:r>
-              <a:rPr lang="en-US" smtClean="0"/>
+              <a:rPr lang="en-US"/>
               <a:t>Third level</a:t>
             </a:r>
           </a:p>
           <a:p>
             <a:pPr lvl="3"/>
             <a:r>
-              <a:rPr lang="en-US" smtClean="0"/>
+              <a:rPr lang="en-US"/>
               <a:t>Fourth level</a:t>
             </a:r>
           </a:p>
           <a:p>
             <a:pPr lvl="4"/>
             <a:r>
-              <a:rPr lang="en-US" smtClean="0"/>
+              <a:rPr lang="en-US"/>
               <a:t>Fifth level</a:t>
             </a:r>
-            <a:endParaRPr lang="en-US"/>
           </a:p>
         </p:txBody>
       </p:sp>
@@ -1529,7 +1516,7 @@
           <a:p>
             <a:pPr lvl="0"/>
             <a:r>
-              <a:rPr lang="en-US" smtClean="0"/>
+              <a:rPr lang="en-US"/>
               <a:t>Click to edit Master text styles</a:t>
             </a:r>
           </a:p>
@@ -1557,38 +1544,37 @@
           <a:p>
             <a:pPr lvl="0"/>
             <a:r>
-              <a:rPr lang="en-US" smtClean="0"/>
+              <a:rPr lang="en-US"/>
               <a:t>Click to edit Master text styles</a:t>
             </a:r>
           </a:p>
           <a:p>
             <a:pPr lvl="1"/>
             <a:r>
-              <a:rPr lang="en-US" smtClean="0"/>
+              <a:rPr lang="en-US"/>
               <a:t>Second level</a:t>
             </a:r>
           </a:p>
           <a:p>
             <a:pPr lvl="2"/>
             <a:r>
-              <a:rPr lang="en-US" smtClean="0"/>
+              <a:rPr lang="en-US"/>
               <a:t>Third level</a:t>
             </a:r>
           </a:p>
           <a:p>
             <a:pPr lvl="3"/>
             <a:r>
-              <a:rPr lang="en-US" smtClean="0"/>
+              <a:rPr lang="en-US"/>
               <a:t>Fourth level</a:t>
             </a:r>
           </a:p>
           <a:p>
             <a:pPr lvl="4"/>
             <a:r>
-              <a:rPr lang="en-US" smtClean="0"/>
+              <a:rPr lang="en-US"/>
               <a:t>Fifth level</a:t>
             </a:r>
-            <a:endParaRPr lang="en-US"/>
           </a:p>
         </p:txBody>
       </p:sp>
@@ -1609,7 +1595,7 @@
           <a:p>
             <a:fld id="{0EC95C33-DAB6-4546-B06D-886B2BAD356F}" type="datetimeFigureOut">
               <a:rPr lang="en-US" smtClean="0"/>
-              <a:t>8/15/18</a:t>
+              <a:t>1/20/21</a:t>
             </a:fld>
             <a:endParaRPr lang="en-US"/>
           </a:p>
@@ -1703,10 +1689,9 @@
           <a:lstStyle/>
           <a:p>
             <a:r>
-              <a:rPr lang="en-US" smtClean="0"/>
+              <a:rPr lang="en-US"/>
               <a:t>Click to edit Master title style</a:t>
             </a:r>
-            <a:endParaRPr lang="en-US"/>
           </a:p>
         </p:txBody>
       </p:sp>
@@ -1727,7 +1712,7 @@
           <a:p>
             <a:fld id="{0EC95C33-DAB6-4546-B06D-886B2BAD356F}" type="datetimeFigureOut">
               <a:rPr lang="en-US" smtClean="0"/>
-              <a:t>8/15/18</a:t>
+              <a:t>1/20/21</a:t>
             </a:fld>
             <a:endParaRPr lang="en-US"/>
           </a:p>
@@ -1822,7 +1807,7 @@
           <a:p>
             <a:fld id="{0EC95C33-DAB6-4546-B06D-886B2BAD356F}" type="datetimeFigureOut">
               <a:rPr lang="en-US" smtClean="0"/>
-              <a:t>8/15/18</a:t>
+              <a:t>1/20/21</a:t>
             </a:fld>
             <a:endParaRPr lang="en-US"/>
           </a:p>
@@ -1925,10 +1910,9 @@
           </a:lstStyle>
           <a:p>
             <a:r>
-              <a:rPr lang="en-US" smtClean="0"/>
+              <a:rPr lang="en-US"/>
               <a:t>Click to edit Master title style</a:t>
             </a:r>
-            <a:endParaRPr lang="en-US"/>
           </a:p>
         </p:txBody>
       </p:sp>
@@ -1982,38 +1966,37 @@
           <a:p>
             <a:pPr lvl="0"/>
             <a:r>
-              <a:rPr lang="en-US" smtClean="0"/>
+              <a:rPr lang="en-US"/>
               <a:t>Click to edit Master text styles</a:t>
             </a:r>
           </a:p>
           <a:p>
             <a:pPr lvl="1"/>
             <a:r>
-              <a:rPr lang="en-US" smtClean="0"/>
+              <a:rPr lang="en-US"/>
               <a:t>Second level</a:t>
             </a:r>
           </a:p>
           <a:p>
             <a:pPr lvl="2"/>
             <a:r>
-              <a:rPr lang="en-US" smtClean="0"/>
+              <a:rPr lang="en-US"/>
               <a:t>Third level</a:t>
             </a:r>
           </a:p>
           <a:p>
             <a:pPr lvl="3"/>
             <a:r>
-              <a:rPr lang="en-US" smtClean="0"/>
+              <a:rPr lang="en-US"/>
               <a:t>Fourth level</a:t>
             </a:r>
           </a:p>
           <a:p>
             <a:pPr lvl="4"/>
             <a:r>
-              <a:rPr lang="en-US" smtClean="0"/>
+              <a:rPr lang="en-US"/>
               <a:t>Fifth level</a:t>
             </a:r>
-            <a:endParaRPr lang="en-US"/>
           </a:p>
         </p:txBody>
       </p:sp>
@@ -2076,7 +2059,7 @@
           <a:p>
             <a:pPr lvl="0"/>
             <a:r>
-              <a:rPr lang="en-US" smtClean="0"/>
+              <a:rPr lang="en-US"/>
               <a:t>Click to edit Master text styles</a:t>
             </a:r>
           </a:p>
@@ -2099,7 +2082,7 @@
           <a:p>
             <a:fld id="{0EC95C33-DAB6-4546-B06D-886B2BAD356F}" type="datetimeFigureOut">
               <a:rPr lang="en-US" smtClean="0"/>
-              <a:t>8/15/18</a:t>
+              <a:t>1/20/21</a:t>
             </a:fld>
             <a:endParaRPr lang="en-US"/>
           </a:p>
@@ -2202,10 +2185,9 @@
           </a:lstStyle>
           <a:p>
             <a:r>
-              <a:rPr lang="en-US" smtClean="0"/>
+              <a:rPr lang="en-US"/>
               <a:t>Click to edit Master title style</a:t>
             </a:r>
-            <a:endParaRPr lang="en-US"/>
           </a:p>
         </p:txBody>
       </p:sp>
@@ -2329,7 +2311,7 @@
           <a:p>
             <a:pPr lvl="0"/>
             <a:r>
-              <a:rPr lang="en-US" smtClean="0"/>
+              <a:rPr lang="en-US"/>
               <a:t>Click to edit Master text styles</a:t>
             </a:r>
           </a:p>
@@ -2352,7 +2334,7 @@
           <a:p>
             <a:fld id="{0EC95C33-DAB6-4546-B06D-886B2BAD356F}" type="datetimeFigureOut">
               <a:rPr lang="en-US" smtClean="0"/>
-              <a:t>8/15/18</a:t>
+              <a:t>1/20/21</a:t>
             </a:fld>
             <a:endParaRPr lang="en-US"/>
           </a:p>
@@ -2461,10 +2443,9 @@
           <a:lstStyle/>
           <a:p>
             <a:r>
-              <a:rPr lang="en-US" smtClean="0"/>
+              <a:rPr lang="en-US"/>
               <a:t>Click to edit Master title style</a:t>
             </a:r>
-            <a:endParaRPr lang="en-US"/>
           </a:p>
         </p:txBody>
       </p:sp>
@@ -2495,38 +2476,37 @@
           <a:p>
             <a:pPr lvl="0"/>
             <a:r>
-              <a:rPr lang="en-US" smtClean="0"/>
+              <a:rPr lang="en-US"/>
               <a:t>Click to edit Master text styles</a:t>
             </a:r>
           </a:p>
           <a:p>
             <a:pPr lvl="1"/>
             <a:r>
-              <a:rPr lang="en-US" smtClean="0"/>
+              <a:rPr lang="en-US"/>
               <a:t>Second level</a:t>
             </a:r>
           </a:p>
           <a:p>
             <a:pPr lvl="2"/>
             <a:r>
-              <a:rPr lang="en-US" smtClean="0"/>
+              <a:rPr lang="en-US"/>
               <a:t>Third level</a:t>
             </a:r>
           </a:p>
           <a:p>
             <a:pPr lvl="3"/>
             <a:r>
-              <a:rPr lang="en-US" smtClean="0"/>
+              <a:rPr lang="en-US"/>
               <a:t>Fourth level</a:t>
             </a:r>
           </a:p>
           <a:p>
             <a:pPr lvl="4"/>
             <a:r>
-              <a:rPr lang="en-US" smtClean="0"/>
+              <a:rPr lang="en-US"/>
               <a:t>Fifth level</a:t>
             </a:r>
-            <a:endParaRPr lang="en-US"/>
           </a:p>
         </p:txBody>
       </p:sp>
@@ -2565,7 +2545,7 @@
           <a:p>
             <a:fld id="{0EC95C33-DAB6-4546-B06D-886B2BAD356F}" type="datetimeFigureOut">
               <a:rPr lang="en-US" smtClean="0"/>
-              <a:t>8/15/18</a:t>
+              <a:t>1/20/21</a:t>
             </a:fld>
             <a:endParaRPr lang="en-US"/>
           </a:p>
@@ -3013,18 +2993,13 @@
           <a:p>
             <a:pPr algn="ctr"/>
             <a:r>
-              <a:rPr lang="en-US" smtClean="0">
+              <a:rPr lang="en-US">
                 <a:solidFill>
                   <a:schemeClr val="tx1"/>
                 </a:solidFill>
               </a:rPr>
               <a:t>PI Worker</a:t>
             </a:r>
-            <a:endParaRPr lang="en-US">
-              <a:solidFill>
-                <a:schemeClr val="tx1"/>
-              </a:solidFill>
-            </a:endParaRPr>
           </a:p>
         </p:txBody>
       </p:sp>
@@ -3071,7 +3046,7 @@
           <a:p>
             <a:pPr algn="ctr"/>
             <a:r>
-              <a:rPr lang="en-US" smtClean="0">
+              <a:rPr lang="en-US">
                 <a:solidFill>
                   <a:schemeClr val="tx1"/>
                 </a:solidFill>
@@ -3129,18 +3104,13 @@
           <a:p>
             <a:pPr algn="ctr"/>
             <a:r>
-              <a:rPr lang="en-US" smtClean="0">
+              <a:rPr lang="en-US">
                 <a:solidFill>
                   <a:schemeClr val="tx1"/>
                 </a:solidFill>
               </a:rPr>
               <a:t>PI Worker</a:t>
             </a:r>
-            <a:endParaRPr lang="en-US">
-              <a:solidFill>
-                <a:schemeClr val="tx1"/>
-              </a:solidFill>
-            </a:endParaRPr>
           </a:p>
         </p:txBody>
       </p:sp>
@@ -3187,18 +3157,13 @@
           <a:p>
             <a:pPr algn="ctr"/>
             <a:r>
-              <a:rPr lang="en-US" smtClean="0">
+              <a:rPr lang="en-US">
                 <a:solidFill>
                   <a:schemeClr val="tx1"/>
                 </a:solidFill>
               </a:rPr>
               <a:t>PI Worker</a:t>
             </a:r>
-            <a:endParaRPr lang="en-US">
-              <a:solidFill>
-                <a:schemeClr val="tx1"/>
-              </a:solidFill>
-            </a:endParaRPr>
           </a:p>
         </p:txBody>
       </p:sp>
@@ -3245,18 +3210,13 @@
           <a:p>
             <a:pPr algn="ctr"/>
             <a:r>
-              <a:rPr lang="en-US" smtClean="0">
+              <a:rPr lang="en-US">
                 <a:solidFill>
                   <a:schemeClr val="tx1"/>
                 </a:solidFill>
               </a:rPr>
               <a:t>PI Worker</a:t>
             </a:r>
-            <a:endParaRPr lang="en-US">
-              <a:solidFill>
-                <a:schemeClr val="tx1"/>
-              </a:solidFill>
-            </a:endParaRPr>
           </a:p>
         </p:txBody>
       </p:sp>
@@ -3300,10 +3260,9 @@
           <a:p>
             <a:pPr algn="ctr"/>
             <a:r>
-              <a:rPr lang="en-US" dirty="0" smtClean="0"/>
+              <a:rPr lang="en-US" dirty="0"/>
               <a:t>Network Switch</a:t>
             </a:r>
-            <a:endParaRPr lang="en-US" dirty="0"/>
           </a:p>
         </p:txBody>
       </p:sp>
@@ -3522,18 +3481,13 @@
           <a:p>
             <a:pPr algn="ctr"/>
             <a:r>
-              <a:rPr lang="en-US" dirty="0" smtClean="0">
+              <a:rPr lang="en-US" dirty="0">
                 <a:solidFill>
                   <a:schemeClr val="tx1"/>
                 </a:solidFill>
               </a:rPr>
               <a:t>Laptop</a:t>
             </a:r>
-            <a:endParaRPr lang="en-US" dirty="0">
-              <a:solidFill>
-                <a:schemeClr val="tx1"/>
-              </a:solidFill>
-            </a:endParaRPr>
           </a:p>
         </p:txBody>
       </p:sp>
@@ -3577,7 +3531,7 @@
           <a:p>
             <a:pPr algn="ctr"/>
             <a:r>
-              <a:rPr lang="en-US" dirty="0" err="1" smtClean="0"/>
+              <a:rPr lang="en-US" dirty="0" err="1"/>
               <a:t>Wifi</a:t>
             </a:r>
             <a:endParaRPr lang="en-US" dirty="0"/>
@@ -3624,7 +3578,7 @@
           <a:p>
             <a:pPr algn="ctr"/>
             <a:r>
-              <a:rPr lang="en-US" dirty="0" err="1" smtClean="0"/>
+              <a:rPr lang="en-US" dirty="0" err="1"/>
               <a:t>Wifi</a:t>
             </a:r>
             <a:endParaRPr lang="en-US" dirty="0"/>
@@ -3828,10 +3782,9 @@
           <a:lstStyle/>
           <a:p>
             <a:r>
-              <a:rPr lang="en-US" sz="1200" dirty="0" smtClean="0"/>
+              <a:rPr lang="en-US" sz="1200" dirty="0"/>
               <a:t>Recommended, Optional</a:t>
             </a:r>
-            <a:endParaRPr lang="en-US" sz="1200" dirty="0"/>
           </a:p>
         </p:txBody>
       </p:sp>
@@ -3867,13 +3820,13 @@
       </p:grpSpPr>
       <p:sp>
         <p:nvSpPr>
-          <p:cNvPr id="16" name="Rounded Rectangle 15"/>
+          <p:cNvPr id="4" name="Rounded Rectangle 3"/>
           <p:cNvSpPr/>
           <p:nvPr/>
         </p:nvSpPr>
         <p:spPr>
           <a:xfrm>
-            <a:off x="529441" y="2227614"/>
+            <a:off x="2728355" y="4206586"/>
             <a:ext cx="1360714" cy="707572"/>
           </a:xfrm>
           <a:prstGeom prst="roundRect">
@@ -3908,37 +3861,35 @@
           <a:p>
             <a:pPr algn="ctr"/>
             <a:r>
-              <a:rPr lang="en-US" dirty="0" smtClean="0">
+              <a:rPr lang="en-US">
                 <a:solidFill>
                   <a:schemeClr val="tx1"/>
                 </a:solidFill>
               </a:rPr>
-              <a:t>Laptop</a:t>
-            </a:r>
-            <a:endParaRPr lang="en-US" dirty="0">
-              <a:solidFill>
-                <a:schemeClr val="tx1"/>
-              </a:solidFill>
-            </a:endParaRPr>
-          </a:p>
-        </p:txBody>
-      </p:sp>
-      <p:sp>
-        <p:nvSpPr>
-          <p:cNvPr id="17" name="Rounded Rectangle 16"/>
+              <a:t>PI Worker</a:t>
+            </a:r>
+          </a:p>
+        </p:txBody>
+      </p:sp>
+      <p:sp>
+        <p:nvSpPr>
+          <p:cNvPr id="5" name="Rounded Rectangle 4"/>
           <p:cNvSpPr/>
           <p:nvPr/>
         </p:nvSpPr>
         <p:spPr>
           <a:xfrm>
-            <a:off x="529441" y="1405746"/>
-            <a:ext cx="1360714" cy="410934"/>
+            <a:off x="2728355" y="2227614"/>
+            <a:ext cx="1360714" cy="707572"/>
           </a:xfrm>
           <a:prstGeom prst="roundRect">
             <a:avLst/>
           </a:prstGeom>
           <a:solidFill>
-            <a:schemeClr val="accent1"/>
+            <a:schemeClr val="accent3">
+              <a:lumMod val="40000"/>
+              <a:lumOff val="60000"/>
+            </a:schemeClr>
           </a:solidFill>
         </p:spPr>
         <p:style>
@@ -3963,7 +3914,1534 @@
           <a:p>
             <a:pPr algn="ctr"/>
             <a:r>
-              <a:rPr lang="en-US" dirty="0" err="1" smtClean="0"/>
+              <a:rPr lang="en-US">
+                <a:solidFill>
+                  <a:schemeClr val="tx1"/>
+                </a:solidFill>
+              </a:rPr>
+              <a:t>PI Master </a:t>
+            </a:r>
+            <a:endParaRPr lang="en-US" dirty="0">
+              <a:solidFill>
+                <a:schemeClr val="tx1"/>
+              </a:solidFill>
+            </a:endParaRPr>
+          </a:p>
+        </p:txBody>
+      </p:sp>
+      <p:sp>
+        <p:nvSpPr>
+          <p:cNvPr id="6" name="Rounded Rectangle 5"/>
+          <p:cNvSpPr/>
+          <p:nvPr/>
+        </p:nvSpPr>
+        <p:spPr>
+          <a:xfrm>
+            <a:off x="7540832" y="4206586"/>
+            <a:ext cx="1360714" cy="707572"/>
+          </a:xfrm>
+          <a:prstGeom prst="roundRect">
+            <a:avLst/>
+          </a:prstGeom>
+          <a:solidFill>
+            <a:schemeClr val="accent3">
+              <a:lumMod val="40000"/>
+              <a:lumOff val="60000"/>
+            </a:schemeClr>
+          </a:solidFill>
+        </p:spPr>
+        <p:style>
+          <a:lnRef idx="2">
+            <a:schemeClr val="accent1">
+              <a:shade val="50000"/>
+            </a:schemeClr>
+          </a:lnRef>
+          <a:fillRef idx="1">
+            <a:schemeClr val="accent1"/>
+          </a:fillRef>
+          <a:effectRef idx="0">
+            <a:schemeClr val="accent1"/>
+          </a:effectRef>
+          <a:fontRef idx="minor">
+            <a:schemeClr val="lt1"/>
+          </a:fontRef>
+        </p:style>
+        <p:txBody>
+          <a:bodyPr rtlCol="0" anchor="ctr"/>
+          <a:lstStyle/>
+          <a:p>
+            <a:pPr algn="ctr"/>
+            <a:r>
+              <a:rPr lang="en-US">
+                <a:solidFill>
+                  <a:schemeClr val="tx1"/>
+                </a:solidFill>
+              </a:rPr>
+              <a:t>PI Worker</a:t>
+            </a:r>
+          </a:p>
+        </p:txBody>
+      </p:sp>
+      <p:sp>
+        <p:nvSpPr>
+          <p:cNvPr id="7" name="Rounded Rectangle 6"/>
+          <p:cNvSpPr/>
+          <p:nvPr/>
+        </p:nvSpPr>
+        <p:spPr>
+          <a:xfrm>
+            <a:off x="5936673" y="4212525"/>
+            <a:ext cx="1360714" cy="707572"/>
+          </a:xfrm>
+          <a:prstGeom prst="roundRect">
+            <a:avLst/>
+          </a:prstGeom>
+          <a:solidFill>
+            <a:schemeClr val="accent3">
+              <a:lumMod val="40000"/>
+              <a:lumOff val="60000"/>
+            </a:schemeClr>
+          </a:solidFill>
+        </p:spPr>
+        <p:style>
+          <a:lnRef idx="2">
+            <a:schemeClr val="accent1">
+              <a:shade val="50000"/>
+            </a:schemeClr>
+          </a:lnRef>
+          <a:fillRef idx="1">
+            <a:schemeClr val="accent1"/>
+          </a:fillRef>
+          <a:effectRef idx="0">
+            <a:schemeClr val="accent1"/>
+          </a:effectRef>
+          <a:fontRef idx="minor">
+            <a:schemeClr val="lt1"/>
+          </a:fontRef>
+        </p:style>
+        <p:txBody>
+          <a:bodyPr rtlCol="0" anchor="ctr"/>
+          <a:lstStyle/>
+          <a:p>
+            <a:pPr algn="ctr"/>
+            <a:r>
+              <a:rPr lang="en-US">
+                <a:solidFill>
+                  <a:schemeClr val="tx1"/>
+                </a:solidFill>
+              </a:rPr>
+              <a:t>PI Worker</a:t>
+            </a:r>
+          </a:p>
+        </p:txBody>
+      </p:sp>
+      <p:sp>
+        <p:nvSpPr>
+          <p:cNvPr id="8" name="Rounded Rectangle 7"/>
+          <p:cNvSpPr/>
+          <p:nvPr/>
+        </p:nvSpPr>
+        <p:spPr>
+          <a:xfrm>
+            <a:off x="4332514" y="4206586"/>
+            <a:ext cx="1360714" cy="707572"/>
+          </a:xfrm>
+          <a:prstGeom prst="roundRect">
+            <a:avLst/>
+          </a:prstGeom>
+          <a:solidFill>
+            <a:schemeClr val="accent3">
+              <a:lumMod val="40000"/>
+              <a:lumOff val="60000"/>
+            </a:schemeClr>
+          </a:solidFill>
+        </p:spPr>
+        <p:style>
+          <a:lnRef idx="2">
+            <a:schemeClr val="accent1">
+              <a:shade val="50000"/>
+            </a:schemeClr>
+          </a:lnRef>
+          <a:fillRef idx="1">
+            <a:schemeClr val="accent1"/>
+          </a:fillRef>
+          <a:effectRef idx="0">
+            <a:schemeClr val="accent1"/>
+          </a:effectRef>
+          <a:fontRef idx="minor">
+            <a:schemeClr val="lt1"/>
+          </a:fontRef>
+        </p:style>
+        <p:txBody>
+          <a:bodyPr rtlCol="0" anchor="ctr"/>
+          <a:lstStyle/>
+          <a:p>
+            <a:pPr algn="ctr"/>
+            <a:r>
+              <a:rPr lang="en-US">
+                <a:solidFill>
+                  <a:schemeClr val="tx1"/>
+                </a:solidFill>
+              </a:rPr>
+              <a:t>PI Worker</a:t>
+            </a:r>
+          </a:p>
+        </p:txBody>
+      </p:sp>
+      <p:sp>
+        <p:nvSpPr>
+          <p:cNvPr id="9" name="Rounded Rectangle 8"/>
+          <p:cNvSpPr/>
+          <p:nvPr/>
+        </p:nvSpPr>
+        <p:spPr>
+          <a:xfrm>
+            <a:off x="2728355" y="3365419"/>
+            <a:ext cx="6173191" cy="410934"/>
+          </a:xfrm>
+          <a:prstGeom prst="roundRect">
+            <a:avLst/>
+          </a:prstGeom>
+          <a:solidFill>
+            <a:schemeClr val="accent1"/>
+          </a:solidFill>
+        </p:spPr>
+        <p:style>
+          <a:lnRef idx="2">
+            <a:schemeClr val="accent1">
+              <a:shade val="50000"/>
+            </a:schemeClr>
+          </a:lnRef>
+          <a:fillRef idx="1">
+            <a:schemeClr val="accent1"/>
+          </a:fillRef>
+          <a:effectRef idx="0">
+            <a:schemeClr val="accent1"/>
+          </a:effectRef>
+          <a:fontRef idx="minor">
+            <a:schemeClr val="lt1"/>
+          </a:fontRef>
+        </p:style>
+        <p:txBody>
+          <a:bodyPr rtlCol="0" anchor="ctr"/>
+          <a:lstStyle/>
+          <a:p>
+            <a:pPr algn="ctr"/>
+            <a:r>
+              <a:rPr lang="en-US" dirty="0"/>
+              <a:t>Network Switch</a:t>
+            </a:r>
+          </a:p>
+        </p:txBody>
+      </p:sp>
+      <p:cxnSp>
+        <p:nvCxnSpPr>
+          <p:cNvPr id="11" name="Straight Arrow Connector 10"/>
+          <p:cNvCxnSpPr>
+            <a:stCxn id="5" idx="2"/>
+          </p:cNvCxnSpPr>
+          <p:nvPr/>
+        </p:nvCxnSpPr>
+        <p:spPr>
+          <a:xfrm>
+            <a:off x="3408712" y="2935186"/>
+            <a:ext cx="0" cy="430233"/>
+          </a:xfrm>
+          <a:prstGeom prst="straightConnector1">
+            <a:avLst/>
+          </a:prstGeom>
+          <a:ln>
+            <a:headEnd type="triangle"/>
+            <a:tailEnd type="triangle"/>
+          </a:ln>
+        </p:spPr>
+        <p:style>
+          <a:lnRef idx="1">
+            <a:schemeClr val="accent1"/>
+          </a:lnRef>
+          <a:fillRef idx="0">
+            <a:schemeClr val="accent1"/>
+          </a:fillRef>
+          <a:effectRef idx="0">
+            <a:schemeClr val="accent1"/>
+          </a:effectRef>
+          <a:fontRef idx="minor">
+            <a:schemeClr val="tx1"/>
+          </a:fontRef>
+        </p:style>
+      </p:cxnSp>
+      <p:cxnSp>
+        <p:nvCxnSpPr>
+          <p:cNvPr id="12" name="Straight Arrow Connector 11"/>
+          <p:cNvCxnSpPr/>
+          <p:nvPr/>
+        </p:nvCxnSpPr>
+        <p:spPr>
+          <a:xfrm>
+            <a:off x="3419102" y="3776353"/>
+            <a:ext cx="0" cy="430233"/>
+          </a:xfrm>
+          <a:prstGeom prst="straightConnector1">
+            <a:avLst/>
+          </a:prstGeom>
+          <a:ln>
+            <a:headEnd type="triangle"/>
+            <a:tailEnd type="triangle"/>
+          </a:ln>
+        </p:spPr>
+        <p:style>
+          <a:lnRef idx="1">
+            <a:schemeClr val="accent1"/>
+          </a:lnRef>
+          <a:fillRef idx="0">
+            <a:schemeClr val="accent1"/>
+          </a:fillRef>
+          <a:effectRef idx="0">
+            <a:schemeClr val="accent1"/>
+          </a:effectRef>
+          <a:fontRef idx="minor">
+            <a:schemeClr val="tx1"/>
+          </a:fontRef>
+        </p:style>
+      </p:cxnSp>
+      <p:cxnSp>
+        <p:nvCxnSpPr>
+          <p:cNvPr id="13" name="Straight Arrow Connector 12"/>
+          <p:cNvCxnSpPr/>
+          <p:nvPr/>
+        </p:nvCxnSpPr>
+        <p:spPr>
+          <a:xfrm>
+            <a:off x="5055917" y="3776353"/>
+            <a:ext cx="0" cy="430233"/>
+          </a:xfrm>
+          <a:prstGeom prst="straightConnector1">
+            <a:avLst/>
+          </a:prstGeom>
+          <a:ln>
+            <a:headEnd type="triangle"/>
+            <a:tailEnd type="triangle"/>
+          </a:ln>
+        </p:spPr>
+        <p:style>
+          <a:lnRef idx="1">
+            <a:schemeClr val="accent1"/>
+          </a:lnRef>
+          <a:fillRef idx="0">
+            <a:schemeClr val="accent1"/>
+          </a:fillRef>
+          <a:effectRef idx="0">
+            <a:schemeClr val="accent1"/>
+          </a:effectRef>
+          <a:fontRef idx="minor">
+            <a:schemeClr val="tx1"/>
+          </a:fontRef>
+        </p:style>
+      </p:cxnSp>
+      <p:cxnSp>
+        <p:nvCxnSpPr>
+          <p:cNvPr id="14" name="Straight Arrow Connector 13"/>
+          <p:cNvCxnSpPr/>
+          <p:nvPr/>
+        </p:nvCxnSpPr>
+        <p:spPr>
+          <a:xfrm>
+            <a:off x="6587835" y="3776353"/>
+            <a:ext cx="0" cy="430233"/>
+          </a:xfrm>
+          <a:prstGeom prst="straightConnector1">
+            <a:avLst/>
+          </a:prstGeom>
+          <a:ln>
+            <a:headEnd type="triangle"/>
+            <a:tailEnd type="triangle"/>
+          </a:ln>
+        </p:spPr>
+        <p:style>
+          <a:lnRef idx="1">
+            <a:schemeClr val="accent1"/>
+          </a:lnRef>
+          <a:fillRef idx="0">
+            <a:schemeClr val="accent1"/>
+          </a:fillRef>
+          <a:effectRef idx="0">
+            <a:schemeClr val="accent1"/>
+          </a:effectRef>
+          <a:fontRef idx="minor">
+            <a:schemeClr val="tx1"/>
+          </a:fontRef>
+        </p:style>
+      </p:cxnSp>
+      <p:cxnSp>
+        <p:nvCxnSpPr>
+          <p:cNvPr id="15" name="Straight Arrow Connector 14"/>
+          <p:cNvCxnSpPr/>
+          <p:nvPr/>
+        </p:nvCxnSpPr>
+        <p:spPr>
+          <a:xfrm>
+            <a:off x="8189024" y="3776353"/>
+            <a:ext cx="0" cy="430233"/>
+          </a:xfrm>
+          <a:prstGeom prst="straightConnector1">
+            <a:avLst/>
+          </a:prstGeom>
+          <a:ln>
+            <a:headEnd type="triangle"/>
+            <a:tailEnd type="triangle"/>
+          </a:ln>
+        </p:spPr>
+        <p:style>
+          <a:lnRef idx="1">
+            <a:schemeClr val="accent1"/>
+          </a:lnRef>
+          <a:fillRef idx="0">
+            <a:schemeClr val="accent1"/>
+          </a:fillRef>
+          <a:effectRef idx="0">
+            <a:schemeClr val="accent1"/>
+          </a:effectRef>
+          <a:fontRef idx="minor">
+            <a:schemeClr val="tx1"/>
+          </a:fontRef>
+        </p:style>
+      </p:cxnSp>
+      <p:sp>
+        <p:nvSpPr>
+          <p:cNvPr id="16" name="Rounded Rectangle 15"/>
+          <p:cNvSpPr/>
+          <p:nvPr/>
+        </p:nvSpPr>
+        <p:spPr>
+          <a:xfrm>
+            <a:off x="573727" y="270407"/>
+            <a:ext cx="1360714" cy="707572"/>
+          </a:xfrm>
+          <a:prstGeom prst="roundRect">
+            <a:avLst/>
+          </a:prstGeom>
+          <a:solidFill>
+            <a:schemeClr val="accent3">
+              <a:lumMod val="40000"/>
+              <a:lumOff val="60000"/>
+            </a:schemeClr>
+          </a:solidFill>
+        </p:spPr>
+        <p:style>
+          <a:lnRef idx="2">
+            <a:schemeClr val="accent1">
+              <a:shade val="50000"/>
+            </a:schemeClr>
+          </a:lnRef>
+          <a:fillRef idx="1">
+            <a:schemeClr val="accent1"/>
+          </a:fillRef>
+          <a:effectRef idx="0">
+            <a:schemeClr val="accent1"/>
+          </a:effectRef>
+          <a:fontRef idx="minor">
+            <a:schemeClr val="lt1"/>
+          </a:fontRef>
+        </p:style>
+        <p:txBody>
+          <a:bodyPr rtlCol="0" anchor="ctr"/>
+          <a:lstStyle/>
+          <a:p>
+            <a:pPr algn="ctr"/>
+            <a:r>
+              <a:rPr lang="en-US" dirty="0">
+                <a:solidFill>
+                  <a:schemeClr val="tx1"/>
+                </a:solidFill>
+              </a:rPr>
+              <a:t>Internet</a:t>
+            </a:r>
+          </a:p>
+        </p:txBody>
+      </p:sp>
+      <p:sp>
+        <p:nvSpPr>
+          <p:cNvPr id="17" name="Rounded Rectangle 16"/>
+          <p:cNvSpPr/>
+          <p:nvPr/>
+        </p:nvSpPr>
+        <p:spPr>
+          <a:xfrm>
+            <a:off x="525248" y="1403225"/>
+            <a:ext cx="3719558" cy="410934"/>
+          </a:xfrm>
+          <a:prstGeom prst="roundRect">
+            <a:avLst/>
+          </a:prstGeom>
+          <a:solidFill>
+            <a:schemeClr val="accent1"/>
+          </a:solidFill>
+        </p:spPr>
+        <p:style>
+          <a:lnRef idx="2">
+            <a:schemeClr val="accent1">
+              <a:shade val="50000"/>
+            </a:schemeClr>
+          </a:lnRef>
+          <a:fillRef idx="1">
+            <a:schemeClr val="accent1"/>
+          </a:fillRef>
+          <a:effectRef idx="0">
+            <a:schemeClr val="accent1"/>
+          </a:effectRef>
+          <a:fontRef idx="minor">
+            <a:schemeClr val="lt1"/>
+          </a:fontRef>
+        </p:style>
+        <p:txBody>
+          <a:bodyPr rtlCol="0" anchor="ctr"/>
+          <a:lstStyle/>
+          <a:p>
+            <a:pPr algn="ctr"/>
+            <a:r>
+              <a:rPr lang="en-US" dirty="0" err="1"/>
+              <a:t>Wifi</a:t>
+            </a:r>
+            <a:endParaRPr lang="en-US" dirty="0"/>
+          </a:p>
+        </p:txBody>
+      </p:sp>
+      <p:cxnSp>
+        <p:nvCxnSpPr>
+          <p:cNvPr id="19" name="Straight Arrow Connector 18"/>
+          <p:cNvCxnSpPr/>
+          <p:nvPr/>
+        </p:nvCxnSpPr>
+        <p:spPr>
+          <a:xfrm>
+            <a:off x="3419102" y="1797381"/>
+            <a:ext cx="0" cy="430233"/>
+          </a:xfrm>
+          <a:prstGeom prst="straightConnector1">
+            <a:avLst/>
+          </a:prstGeom>
+          <a:ln>
+            <a:headEnd type="triangle"/>
+            <a:tailEnd type="triangle"/>
+          </a:ln>
+        </p:spPr>
+        <p:style>
+          <a:lnRef idx="1">
+            <a:schemeClr val="accent1"/>
+          </a:lnRef>
+          <a:fillRef idx="0">
+            <a:schemeClr val="accent1"/>
+          </a:fillRef>
+          <a:effectRef idx="0">
+            <a:schemeClr val="accent1"/>
+          </a:effectRef>
+          <a:fontRef idx="minor">
+            <a:schemeClr val="tx1"/>
+          </a:fontRef>
+        </p:style>
+      </p:cxnSp>
+      <p:cxnSp>
+        <p:nvCxnSpPr>
+          <p:cNvPr id="20" name="Straight Arrow Connector 19"/>
+          <p:cNvCxnSpPr/>
+          <p:nvPr/>
+        </p:nvCxnSpPr>
+        <p:spPr>
+          <a:xfrm>
+            <a:off x="1209798" y="972992"/>
+            <a:ext cx="0" cy="430233"/>
+          </a:xfrm>
+          <a:prstGeom prst="straightConnector1">
+            <a:avLst/>
+          </a:prstGeom>
+          <a:ln>
+            <a:headEnd type="triangle"/>
+            <a:tailEnd type="triangle"/>
+          </a:ln>
+        </p:spPr>
+        <p:style>
+          <a:lnRef idx="1">
+            <a:schemeClr val="accent1"/>
+          </a:lnRef>
+          <a:fillRef idx="0">
+            <a:schemeClr val="accent1"/>
+          </a:fillRef>
+          <a:effectRef idx="0">
+            <a:schemeClr val="accent1"/>
+          </a:effectRef>
+          <a:fontRef idx="minor">
+            <a:schemeClr val="tx1"/>
+          </a:fontRef>
+        </p:style>
+      </p:cxnSp>
+      <p:pic>
+        <p:nvPicPr>
+          <p:cNvPr id="2" name="Picture 1"/>
+          <p:cNvPicPr>
+            <a:picLocks noChangeAspect="1"/>
+          </p:cNvPicPr>
+          <p:nvPr/>
+        </p:nvPicPr>
+        <p:blipFill>
+          <a:blip r:embed="rId2"/>
+          <a:stretch>
+            <a:fillRect/>
+          </a:stretch>
+        </p:blipFill>
+        <p:spPr>
+          <a:xfrm>
+            <a:off x="6212507" y="1420087"/>
+            <a:ext cx="1184819" cy="1184819"/>
+          </a:xfrm>
+          <a:prstGeom prst="rect">
+            <a:avLst/>
+          </a:prstGeom>
+        </p:spPr>
+      </p:pic>
+      <p:pic>
+        <p:nvPicPr>
+          <p:cNvPr id="3" name="Picture 2"/>
+          <p:cNvPicPr>
+            <a:picLocks noChangeAspect="1"/>
+          </p:cNvPicPr>
+          <p:nvPr/>
+        </p:nvPicPr>
+        <p:blipFill>
+          <a:blip r:embed="rId3"/>
+          <a:stretch>
+            <a:fillRect/>
+          </a:stretch>
+        </p:blipFill>
+        <p:spPr>
+          <a:xfrm flipH="1">
+            <a:off x="5124669" y="1581226"/>
+            <a:ext cx="986693" cy="986693"/>
+          </a:xfrm>
+          <a:prstGeom prst="rect">
+            <a:avLst/>
+          </a:prstGeom>
+        </p:spPr>
+      </p:pic>
+      <p:pic>
+        <p:nvPicPr>
+          <p:cNvPr id="10" name="Picture 9"/>
+          <p:cNvPicPr>
+            <a:picLocks noChangeAspect="1"/>
+          </p:cNvPicPr>
+          <p:nvPr/>
+        </p:nvPicPr>
+        <p:blipFill>
+          <a:blip r:embed="rId4"/>
+          <a:stretch>
+            <a:fillRect/>
+          </a:stretch>
+        </p:blipFill>
+        <p:spPr>
+          <a:xfrm>
+            <a:off x="4612363" y="1966321"/>
+            <a:ext cx="465447" cy="465447"/>
+          </a:xfrm>
+          <a:prstGeom prst="rect">
+            <a:avLst/>
+          </a:prstGeom>
+        </p:spPr>
+      </p:pic>
+      <p:cxnSp>
+        <p:nvCxnSpPr>
+          <p:cNvPr id="21" name="Straight Arrow Connector 20"/>
+          <p:cNvCxnSpPr/>
+          <p:nvPr/>
+        </p:nvCxnSpPr>
+        <p:spPr>
+          <a:xfrm flipV="1">
+            <a:off x="4332514" y="2567919"/>
+            <a:ext cx="3633792" cy="19291"/>
+          </a:xfrm>
+          <a:prstGeom prst="straightConnector1">
+            <a:avLst/>
+          </a:prstGeom>
+          <a:ln>
+            <a:headEnd type="triangle"/>
+            <a:tailEnd type="triangle"/>
+          </a:ln>
+        </p:spPr>
+        <p:style>
+          <a:lnRef idx="1">
+            <a:schemeClr val="accent1"/>
+          </a:lnRef>
+          <a:fillRef idx="0">
+            <a:schemeClr val="accent1"/>
+          </a:fillRef>
+          <a:effectRef idx="0">
+            <a:schemeClr val="accent1"/>
+          </a:effectRef>
+          <a:fontRef idx="minor">
+            <a:schemeClr val="tx1"/>
+          </a:fontRef>
+        </p:style>
+      </p:cxnSp>
+      <p:sp>
+        <p:nvSpPr>
+          <p:cNvPr id="25" name="TextBox 24"/>
+          <p:cNvSpPr txBox="1"/>
+          <p:nvPr/>
+        </p:nvSpPr>
+        <p:spPr>
+          <a:xfrm>
+            <a:off x="5156072" y="2586801"/>
+            <a:ext cx="1743106" cy="276999"/>
+          </a:xfrm>
+          <a:prstGeom prst="rect">
+            <a:avLst/>
+          </a:prstGeom>
+          <a:noFill/>
+        </p:spPr>
+        <p:txBody>
+          <a:bodyPr wrap="none" rtlCol="0">
+            <a:spAutoFit/>
+          </a:bodyPr>
+          <a:lstStyle/>
+          <a:p>
+            <a:r>
+              <a:rPr lang="en-US" sz="1200" dirty="0"/>
+              <a:t>Recommended, Optional</a:t>
+            </a:r>
+          </a:p>
+        </p:txBody>
+      </p:sp>
+      <p:sp>
+        <p:nvSpPr>
+          <p:cNvPr id="23" name="Rounded Rectangle 22">
+            <a:extLst>
+              <a:ext uri="{FF2B5EF4-FFF2-40B4-BE49-F238E27FC236}">
+                <a16:creationId xmlns:a16="http://schemas.microsoft.com/office/drawing/2014/main" id="{F94134C2-F81E-FF4D-935A-39569E1CB389}"/>
+              </a:ext>
+            </a:extLst>
+          </p:cNvPr>
+          <p:cNvSpPr/>
+          <p:nvPr/>
+        </p:nvSpPr>
+        <p:spPr>
+          <a:xfrm>
+            <a:off x="2738745" y="282282"/>
+            <a:ext cx="1360714" cy="707572"/>
+          </a:xfrm>
+          <a:prstGeom prst="roundRect">
+            <a:avLst/>
+          </a:prstGeom>
+          <a:solidFill>
+            <a:schemeClr val="accent3">
+              <a:lumMod val="40000"/>
+              <a:lumOff val="60000"/>
+            </a:schemeClr>
+          </a:solidFill>
+        </p:spPr>
+        <p:style>
+          <a:lnRef idx="2">
+            <a:schemeClr val="accent1">
+              <a:shade val="50000"/>
+            </a:schemeClr>
+          </a:lnRef>
+          <a:fillRef idx="1">
+            <a:schemeClr val="accent1"/>
+          </a:fillRef>
+          <a:effectRef idx="0">
+            <a:schemeClr val="accent1"/>
+          </a:effectRef>
+          <a:fontRef idx="minor">
+            <a:schemeClr val="lt1"/>
+          </a:fontRef>
+        </p:style>
+        <p:txBody>
+          <a:bodyPr rtlCol="0" anchor="ctr"/>
+          <a:lstStyle/>
+          <a:p>
+            <a:pPr algn="ctr"/>
+            <a:r>
+              <a:rPr lang="en-US" dirty="0">
+                <a:solidFill>
+                  <a:schemeClr val="tx1"/>
+                </a:solidFill>
+              </a:rPr>
+              <a:t>Laptop</a:t>
+            </a:r>
+          </a:p>
+        </p:txBody>
+      </p:sp>
+      <p:cxnSp>
+        <p:nvCxnSpPr>
+          <p:cNvPr id="24" name="Straight Arrow Connector 23">
+            <a:extLst>
+              <a:ext uri="{FF2B5EF4-FFF2-40B4-BE49-F238E27FC236}">
+                <a16:creationId xmlns:a16="http://schemas.microsoft.com/office/drawing/2014/main" id="{78518C1B-A23B-2D4F-BC73-064275EC105A}"/>
+              </a:ext>
+            </a:extLst>
+          </p:cNvPr>
+          <p:cNvCxnSpPr/>
+          <p:nvPr/>
+        </p:nvCxnSpPr>
+        <p:spPr>
+          <a:xfrm>
+            <a:off x="3419102" y="989854"/>
+            <a:ext cx="0" cy="430233"/>
+          </a:xfrm>
+          <a:prstGeom prst="straightConnector1">
+            <a:avLst/>
+          </a:prstGeom>
+          <a:ln>
+            <a:headEnd type="triangle"/>
+            <a:tailEnd type="triangle"/>
+          </a:ln>
+        </p:spPr>
+        <p:style>
+          <a:lnRef idx="1">
+            <a:schemeClr val="accent1"/>
+          </a:lnRef>
+          <a:fillRef idx="0">
+            <a:schemeClr val="accent1"/>
+          </a:fillRef>
+          <a:effectRef idx="0">
+            <a:schemeClr val="accent1"/>
+          </a:effectRef>
+          <a:fontRef idx="minor">
+            <a:schemeClr val="tx1"/>
+          </a:fontRef>
+        </p:style>
+      </p:cxnSp>
+      <p:sp>
+        <p:nvSpPr>
+          <p:cNvPr id="22" name="Snip Single Corner Rectangle 21">
+            <a:extLst>
+              <a:ext uri="{FF2B5EF4-FFF2-40B4-BE49-F238E27FC236}">
+                <a16:creationId xmlns:a16="http://schemas.microsoft.com/office/drawing/2014/main" id="{F8C45667-EB4F-3842-9F2D-FE8769BB9D1D}"/>
+              </a:ext>
+            </a:extLst>
+          </p:cNvPr>
+          <p:cNvSpPr/>
+          <p:nvPr/>
+        </p:nvSpPr>
+        <p:spPr>
+          <a:xfrm>
+            <a:off x="2904526" y="2826517"/>
+            <a:ext cx="289086" cy="317292"/>
+          </a:xfrm>
+          <a:prstGeom prst="snip1Rect">
+            <a:avLst/>
+          </a:prstGeom>
+        </p:spPr>
+        <p:style>
+          <a:lnRef idx="2">
+            <a:schemeClr val="accent4">
+              <a:shade val="50000"/>
+            </a:schemeClr>
+          </a:lnRef>
+          <a:fillRef idx="1">
+            <a:schemeClr val="accent4"/>
+          </a:fillRef>
+          <a:effectRef idx="0">
+            <a:schemeClr val="accent4"/>
+          </a:effectRef>
+          <a:fontRef idx="minor">
+            <a:schemeClr val="lt1"/>
+          </a:fontRef>
+        </p:style>
+        <p:txBody>
+          <a:bodyPr rtlCol="0" anchor="ctr"/>
+          <a:lstStyle/>
+          <a:p>
+            <a:pPr algn="ctr"/>
+            <a:r>
+              <a:rPr lang="en-US" dirty="0"/>
+              <a:t>M</a:t>
+            </a:r>
+          </a:p>
+        </p:txBody>
+      </p:sp>
+      <p:sp>
+        <p:nvSpPr>
+          <p:cNvPr id="28" name="Snip Single Corner Rectangle 27">
+            <a:extLst>
+              <a:ext uri="{FF2B5EF4-FFF2-40B4-BE49-F238E27FC236}">
+                <a16:creationId xmlns:a16="http://schemas.microsoft.com/office/drawing/2014/main" id="{376A0602-DB5B-5E40-BE3E-862271695BEF}"/>
+              </a:ext>
+            </a:extLst>
+          </p:cNvPr>
+          <p:cNvSpPr/>
+          <p:nvPr/>
+        </p:nvSpPr>
+        <p:spPr>
+          <a:xfrm>
+            <a:off x="2848533" y="4755512"/>
+            <a:ext cx="289086" cy="317292"/>
+          </a:xfrm>
+          <a:prstGeom prst="snip1Rect">
+            <a:avLst/>
+          </a:prstGeom>
+        </p:spPr>
+        <p:style>
+          <a:lnRef idx="2">
+            <a:schemeClr val="accent2">
+              <a:shade val="50000"/>
+            </a:schemeClr>
+          </a:lnRef>
+          <a:fillRef idx="1">
+            <a:schemeClr val="accent2"/>
+          </a:fillRef>
+          <a:effectRef idx="0">
+            <a:schemeClr val="accent2"/>
+          </a:effectRef>
+          <a:fontRef idx="minor">
+            <a:schemeClr val="lt1"/>
+          </a:fontRef>
+        </p:style>
+        <p:txBody>
+          <a:bodyPr rtlCol="0" anchor="ctr"/>
+          <a:lstStyle/>
+          <a:p>
+            <a:pPr algn="ctr"/>
+            <a:r>
+              <a:rPr lang="en-US" dirty="0"/>
+              <a:t>W</a:t>
+            </a:r>
+          </a:p>
+        </p:txBody>
+      </p:sp>
+      <p:sp>
+        <p:nvSpPr>
+          <p:cNvPr id="29" name="Snip Single Corner Rectangle 28">
+            <a:extLst>
+              <a:ext uri="{FF2B5EF4-FFF2-40B4-BE49-F238E27FC236}">
+                <a16:creationId xmlns:a16="http://schemas.microsoft.com/office/drawing/2014/main" id="{D8C856D9-17AB-E54D-BE31-7FBCD4A07537}"/>
+              </a:ext>
+            </a:extLst>
+          </p:cNvPr>
+          <p:cNvSpPr/>
+          <p:nvPr/>
+        </p:nvSpPr>
+        <p:spPr>
+          <a:xfrm>
+            <a:off x="4452692" y="4745677"/>
+            <a:ext cx="289086" cy="317292"/>
+          </a:xfrm>
+          <a:prstGeom prst="snip1Rect">
+            <a:avLst/>
+          </a:prstGeom>
+        </p:spPr>
+        <p:style>
+          <a:lnRef idx="2">
+            <a:schemeClr val="accent2">
+              <a:shade val="50000"/>
+            </a:schemeClr>
+          </a:lnRef>
+          <a:fillRef idx="1">
+            <a:schemeClr val="accent2"/>
+          </a:fillRef>
+          <a:effectRef idx="0">
+            <a:schemeClr val="accent2"/>
+          </a:effectRef>
+          <a:fontRef idx="minor">
+            <a:schemeClr val="lt1"/>
+          </a:fontRef>
+        </p:style>
+        <p:txBody>
+          <a:bodyPr rtlCol="0" anchor="ctr"/>
+          <a:lstStyle/>
+          <a:p>
+            <a:pPr algn="ctr"/>
+            <a:r>
+              <a:rPr lang="en-US" dirty="0"/>
+              <a:t>W</a:t>
+            </a:r>
+          </a:p>
+        </p:txBody>
+      </p:sp>
+      <p:sp>
+        <p:nvSpPr>
+          <p:cNvPr id="30" name="Snip Single Corner Rectangle 29">
+            <a:extLst>
+              <a:ext uri="{FF2B5EF4-FFF2-40B4-BE49-F238E27FC236}">
+                <a16:creationId xmlns:a16="http://schemas.microsoft.com/office/drawing/2014/main" id="{28F08A7F-B052-A542-80B3-9D0D27EC5955}"/>
+              </a:ext>
+            </a:extLst>
+          </p:cNvPr>
+          <p:cNvSpPr/>
+          <p:nvPr/>
+        </p:nvSpPr>
+        <p:spPr>
+          <a:xfrm>
+            <a:off x="6086045" y="4804129"/>
+            <a:ext cx="289086" cy="317292"/>
+          </a:xfrm>
+          <a:prstGeom prst="snip1Rect">
+            <a:avLst/>
+          </a:prstGeom>
+        </p:spPr>
+        <p:style>
+          <a:lnRef idx="2">
+            <a:schemeClr val="accent2">
+              <a:shade val="50000"/>
+            </a:schemeClr>
+          </a:lnRef>
+          <a:fillRef idx="1">
+            <a:schemeClr val="accent2"/>
+          </a:fillRef>
+          <a:effectRef idx="0">
+            <a:schemeClr val="accent2"/>
+          </a:effectRef>
+          <a:fontRef idx="minor">
+            <a:schemeClr val="lt1"/>
+          </a:fontRef>
+        </p:style>
+        <p:txBody>
+          <a:bodyPr rtlCol="0" anchor="ctr"/>
+          <a:lstStyle/>
+          <a:p>
+            <a:pPr algn="ctr"/>
+            <a:r>
+              <a:rPr lang="en-US" dirty="0"/>
+              <a:t>W</a:t>
+            </a:r>
+          </a:p>
+        </p:txBody>
+      </p:sp>
+      <p:sp>
+        <p:nvSpPr>
+          <p:cNvPr id="31" name="Snip Single Corner Rectangle 30">
+            <a:extLst>
+              <a:ext uri="{FF2B5EF4-FFF2-40B4-BE49-F238E27FC236}">
+                <a16:creationId xmlns:a16="http://schemas.microsoft.com/office/drawing/2014/main" id="{F1E362E6-1F53-9644-9976-F35F2A2F16C5}"/>
+              </a:ext>
+            </a:extLst>
+          </p:cNvPr>
+          <p:cNvSpPr/>
+          <p:nvPr/>
+        </p:nvSpPr>
+        <p:spPr>
+          <a:xfrm>
+            <a:off x="7628845" y="4804129"/>
+            <a:ext cx="289086" cy="317292"/>
+          </a:xfrm>
+          <a:prstGeom prst="snip1Rect">
+            <a:avLst/>
+          </a:prstGeom>
+        </p:spPr>
+        <p:style>
+          <a:lnRef idx="2">
+            <a:schemeClr val="accent2">
+              <a:shade val="50000"/>
+            </a:schemeClr>
+          </a:lnRef>
+          <a:fillRef idx="1">
+            <a:schemeClr val="accent2"/>
+          </a:fillRef>
+          <a:effectRef idx="0">
+            <a:schemeClr val="accent2"/>
+          </a:effectRef>
+          <a:fontRef idx="minor">
+            <a:schemeClr val="lt1"/>
+          </a:fontRef>
+        </p:style>
+        <p:txBody>
+          <a:bodyPr rtlCol="0" anchor="ctr"/>
+          <a:lstStyle/>
+          <a:p>
+            <a:pPr algn="ctr"/>
+            <a:r>
+              <a:rPr lang="en-US" dirty="0"/>
+              <a:t>W</a:t>
+            </a:r>
+          </a:p>
+        </p:txBody>
+      </p:sp>
+      <p:sp>
+        <p:nvSpPr>
+          <p:cNvPr id="32" name="Snip Single Corner Rectangle 31">
+            <a:extLst>
+              <a:ext uri="{FF2B5EF4-FFF2-40B4-BE49-F238E27FC236}">
+                <a16:creationId xmlns:a16="http://schemas.microsoft.com/office/drawing/2014/main" id="{AB2F65A0-6E52-AA49-895A-2CE0897BF8E3}"/>
+              </a:ext>
+            </a:extLst>
+          </p:cNvPr>
+          <p:cNvSpPr/>
+          <p:nvPr/>
+        </p:nvSpPr>
+        <p:spPr>
+          <a:xfrm>
+            <a:off x="2059117" y="2826517"/>
+            <a:ext cx="289086" cy="317292"/>
+          </a:xfrm>
+          <a:prstGeom prst="snip1Rect">
+            <a:avLst/>
+          </a:prstGeom>
+        </p:spPr>
+        <p:style>
+          <a:lnRef idx="2">
+            <a:schemeClr val="accent6">
+              <a:shade val="50000"/>
+            </a:schemeClr>
+          </a:lnRef>
+          <a:fillRef idx="1">
+            <a:schemeClr val="accent6"/>
+          </a:fillRef>
+          <a:effectRef idx="0">
+            <a:schemeClr val="accent6"/>
+          </a:effectRef>
+          <a:fontRef idx="minor">
+            <a:schemeClr val="lt1"/>
+          </a:fontRef>
+        </p:style>
+        <p:txBody>
+          <a:bodyPr rtlCol="0" anchor="ctr"/>
+          <a:lstStyle/>
+          <a:p>
+            <a:pPr algn="ctr"/>
+            <a:r>
+              <a:rPr lang="en-US" dirty="0"/>
+              <a:t>B</a:t>
+            </a:r>
+          </a:p>
+        </p:txBody>
+      </p:sp>
+      <p:sp>
+        <p:nvSpPr>
+          <p:cNvPr id="33" name="Snip Single Corner Rectangle 32">
+            <a:extLst>
+              <a:ext uri="{FF2B5EF4-FFF2-40B4-BE49-F238E27FC236}">
+                <a16:creationId xmlns:a16="http://schemas.microsoft.com/office/drawing/2014/main" id="{61014A9F-3070-C149-B9F9-246B0EF687E7}"/>
+              </a:ext>
+            </a:extLst>
+          </p:cNvPr>
+          <p:cNvSpPr/>
+          <p:nvPr/>
+        </p:nvSpPr>
+        <p:spPr>
+          <a:xfrm>
+            <a:off x="9046754" y="1174905"/>
+            <a:ext cx="289086" cy="317292"/>
+          </a:xfrm>
+          <a:prstGeom prst="snip1Rect">
+            <a:avLst/>
+          </a:prstGeom>
+        </p:spPr>
+        <p:style>
+          <a:lnRef idx="2">
+            <a:schemeClr val="accent6">
+              <a:shade val="50000"/>
+            </a:schemeClr>
+          </a:lnRef>
+          <a:fillRef idx="1">
+            <a:schemeClr val="accent6"/>
+          </a:fillRef>
+          <a:effectRef idx="0">
+            <a:schemeClr val="accent6"/>
+          </a:effectRef>
+          <a:fontRef idx="minor">
+            <a:schemeClr val="lt1"/>
+          </a:fontRef>
+        </p:style>
+        <p:txBody>
+          <a:bodyPr rtlCol="0" anchor="ctr"/>
+          <a:lstStyle/>
+          <a:p>
+            <a:pPr algn="ctr"/>
+            <a:r>
+              <a:rPr lang="en-US" dirty="0"/>
+              <a:t>B</a:t>
+            </a:r>
+          </a:p>
+        </p:txBody>
+      </p:sp>
+      <p:sp>
+        <p:nvSpPr>
+          <p:cNvPr id="35" name="Snip Single Corner Rectangle 34">
+            <a:extLst>
+              <a:ext uri="{FF2B5EF4-FFF2-40B4-BE49-F238E27FC236}">
+                <a16:creationId xmlns:a16="http://schemas.microsoft.com/office/drawing/2014/main" id="{E83815B2-5932-D94A-AFFB-6C2073CAEE4C}"/>
+              </a:ext>
+            </a:extLst>
+          </p:cNvPr>
+          <p:cNvSpPr/>
+          <p:nvPr/>
+        </p:nvSpPr>
+        <p:spPr>
+          <a:xfrm>
+            <a:off x="9046755" y="1686033"/>
+            <a:ext cx="289086" cy="317292"/>
+          </a:xfrm>
+          <a:prstGeom prst="snip1Rect">
+            <a:avLst/>
+          </a:prstGeom>
+        </p:spPr>
+        <p:style>
+          <a:lnRef idx="2">
+            <a:schemeClr val="accent4">
+              <a:shade val="50000"/>
+            </a:schemeClr>
+          </a:lnRef>
+          <a:fillRef idx="1">
+            <a:schemeClr val="accent4"/>
+          </a:fillRef>
+          <a:effectRef idx="0">
+            <a:schemeClr val="accent4"/>
+          </a:effectRef>
+          <a:fontRef idx="minor">
+            <a:schemeClr val="lt1"/>
+          </a:fontRef>
+        </p:style>
+        <p:txBody>
+          <a:bodyPr rtlCol="0" anchor="ctr"/>
+          <a:lstStyle/>
+          <a:p>
+            <a:pPr algn="ctr"/>
+            <a:r>
+              <a:rPr lang="en-US" dirty="0"/>
+              <a:t>M</a:t>
+            </a:r>
+          </a:p>
+        </p:txBody>
+      </p:sp>
+      <p:sp>
+        <p:nvSpPr>
+          <p:cNvPr id="36" name="Snip Single Corner Rectangle 35">
+            <a:extLst>
+              <a:ext uri="{FF2B5EF4-FFF2-40B4-BE49-F238E27FC236}">
+                <a16:creationId xmlns:a16="http://schemas.microsoft.com/office/drawing/2014/main" id="{FBE39F69-4280-4049-AA21-3D4DC4E27573}"/>
+              </a:ext>
+            </a:extLst>
+          </p:cNvPr>
+          <p:cNvSpPr/>
+          <p:nvPr/>
+        </p:nvSpPr>
+        <p:spPr>
+          <a:xfrm>
+            <a:off x="9027193" y="2335678"/>
+            <a:ext cx="289086" cy="317292"/>
+          </a:xfrm>
+          <a:prstGeom prst="snip1Rect">
+            <a:avLst/>
+          </a:prstGeom>
+        </p:spPr>
+        <p:style>
+          <a:lnRef idx="2">
+            <a:schemeClr val="accent2">
+              <a:shade val="50000"/>
+            </a:schemeClr>
+          </a:lnRef>
+          <a:fillRef idx="1">
+            <a:schemeClr val="accent2"/>
+          </a:fillRef>
+          <a:effectRef idx="0">
+            <a:schemeClr val="accent2"/>
+          </a:effectRef>
+          <a:fontRef idx="minor">
+            <a:schemeClr val="lt1"/>
+          </a:fontRef>
+        </p:style>
+        <p:txBody>
+          <a:bodyPr rtlCol="0" anchor="ctr"/>
+          <a:lstStyle/>
+          <a:p>
+            <a:pPr algn="ctr"/>
+            <a:r>
+              <a:rPr lang="en-US" dirty="0"/>
+              <a:t>W</a:t>
+            </a:r>
+          </a:p>
+        </p:txBody>
+      </p:sp>
+      <p:sp>
+        <p:nvSpPr>
+          <p:cNvPr id="37" name="TextBox 36">
+            <a:extLst>
+              <a:ext uri="{FF2B5EF4-FFF2-40B4-BE49-F238E27FC236}">
+                <a16:creationId xmlns:a16="http://schemas.microsoft.com/office/drawing/2014/main" id="{CBDAB471-40AB-0742-9274-9A0650CE2224}"/>
+              </a:ext>
+            </a:extLst>
+          </p:cNvPr>
+          <p:cNvSpPr txBox="1"/>
+          <p:nvPr/>
+        </p:nvSpPr>
+        <p:spPr>
+          <a:xfrm>
+            <a:off x="9288448" y="2295932"/>
+            <a:ext cx="2063642" cy="646331"/>
+          </a:xfrm>
+          <a:prstGeom prst="rect">
+            <a:avLst/>
+          </a:prstGeom>
+          <a:noFill/>
+        </p:spPr>
+        <p:txBody>
+          <a:bodyPr wrap="none" rtlCol="0">
+            <a:spAutoFit/>
+          </a:bodyPr>
+          <a:lstStyle/>
+          <a:p>
+            <a:r>
+              <a:rPr lang="en-US" dirty="0"/>
+              <a:t>Worker: </a:t>
+            </a:r>
+          </a:p>
+          <a:p>
+            <a:r>
+              <a:rPr lang="en-US" dirty="0"/>
+              <a:t>Raspberry Pi OS Lite</a:t>
+            </a:r>
+          </a:p>
+        </p:txBody>
+      </p:sp>
+      <p:sp>
+        <p:nvSpPr>
+          <p:cNvPr id="38" name="TextBox 37">
+            <a:extLst>
+              <a:ext uri="{FF2B5EF4-FFF2-40B4-BE49-F238E27FC236}">
+                <a16:creationId xmlns:a16="http://schemas.microsoft.com/office/drawing/2014/main" id="{15E9E79F-3DB7-734C-806E-340CB02B5120}"/>
+              </a:ext>
+            </a:extLst>
+          </p:cNvPr>
+          <p:cNvSpPr txBox="1"/>
+          <p:nvPr/>
+        </p:nvSpPr>
+        <p:spPr>
+          <a:xfrm>
+            <a:off x="9365024" y="1581226"/>
+            <a:ext cx="1968103" cy="923330"/>
+          </a:xfrm>
+          <a:prstGeom prst="rect">
+            <a:avLst/>
+          </a:prstGeom>
+          <a:noFill/>
+        </p:spPr>
+        <p:txBody>
+          <a:bodyPr wrap="none" rtlCol="0">
+            <a:spAutoFit/>
+          </a:bodyPr>
+          <a:lstStyle/>
+          <a:p>
+            <a:r>
+              <a:rPr lang="en-US" dirty="0"/>
+              <a:t>Master: Raspberry </a:t>
+            </a:r>
+          </a:p>
+          <a:p>
+            <a:r>
+              <a:rPr lang="en-US" dirty="0"/>
+              <a:t>Pi OS with desktop</a:t>
+            </a:r>
+          </a:p>
+          <a:p>
+            <a:endParaRPr lang="en-US" dirty="0"/>
+          </a:p>
+        </p:txBody>
+      </p:sp>
+      <p:sp>
+        <p:nvSpPr>
+          <p:cNvPr id="39" name="Rectangle 38">
+            <a:extLst>
+              <a:ext uri="{FF2B5EF4-FFF2-40B4-BE49-F238E27FC236}">
+                <a16:creationId xmlns:a16="http://schemas.microsoft.com/office/drawing/2014/main" id="{E348BC35-D858-BF42-A804-51B737E6B742}"/>
+              </a:ext>
+            </a:extLst>
+          </p:cNvPr>
+          <p:cNvSpPr/>
+          <p:nvPr/>
+        </p:nvSpPr>
+        <p:spPr>
+          <a:xfrm>
+            <a:off x="9365023" y="934895"/>
+            <a:ext cx="6096000" cy="646331"/>
+          </a:xfrm>
+          <a:prstGeom prst="rect">
+            <a:avLst/>
+          </a:prstGeom>
+        </p:spPr>
+        <p:txBody>
+          <a:bodyPr>
+            <a:spAutoFit/>
+          </a:bodyPr>
+          <a:lstStyle/>
+          <a:p>
+            <a:r>
+              <a:rPr lang="en-US" dirty="0"/>
+              <a:t>Burner: Raspberry </a:t>
+            </a:r>
+          </a:p>
+          <a:p>
+            <a:r>
+              <a:rPr lang="en-US" dirty="0"/>
+              <a:t>Pi OS with desktop</a:t>
+            </a:r>
+          </a:p>
+        </p:txBody>
+      </p:sp>
+      <p:sp>
+        <p:nvSpPr>
+          <p:cNvPr id="40" name="Left-Right Arrow 39">
+            <a:extLst>
+              <a:ext uri="{FF2B5EF4-FFF2-40B4-BE49-F238E27FC236}">
+                <a16:creationId xmlns:a16="http://schemas.microsoft.com/office/drawing/2014/main" id="{FDE58FAE-100D-3A4B-B3B1-0E315C09E0C3}"/>
+              </a:ext>
+            </a:extLst>
+          </p:cNvPr>
+          <p:cNvSpPr/>
+          <p:nvPr/>
+        </p:nvSpPr>
+        <p:spPr>
+          <a:xfrm>
+            <a:off x="2401280" y="2929247"/>
+            <a:ext cx="434457" cy="158647"/>
+          </a:xfrm>
+          <a:prstGeom prst="leftRightArrow">
+            <a:avLst/>
+          </a:prstGeom>
+        </p:spPr>
+        <p:style>
+          <a:lnRef idx="2">
+            <a:schemeClr val="dk1"/>
+          </a:lnRef>
+          <a:fillRef idx="1">
+            <a:schemeClr val="lt1"/>
+          </a:fillRef>
+          <a:effectRef idx="0">
+            <a:schemeClr val="dk1"/>
+          </a:effectRef>
+          <a:fontRef idx="minor">
+            <a:schemeClr val="dk1"/>
+          </a:fontRef>
+        </p:style>
+        <p:txBody>
+          <a:bodyPr rtlCol="0" anchor="ctr"/>
+          <a:lstStyle/>
+          <a:p>
+            <a:pPr algn="ctr"/>
+            <a:endParaRPr lang="en-US"/>
+          </a:p>
+        </p:txBody>
+      </p:sp>
+    </p:spTree>
+    <p:extLst>
+      <p:ext uri="{BB962C8B-B14F-4D97-AF65-F5344CB8AC3E}">
+        <p14:creationId xmlns:p14="http://schemas.microsoft.com/office/powerpoint/2010/main" val="837495575"/>
+      </p:ext>
+    </p:extLst>
+  </p:cSld>
+  <p:clrMapOvr>
+    <a:masterClrMapping/>
+  </p:clrMapOvr>
+</p:sld>
+</file>
+
+<file path=ppt/slides/slide3.xml><?xml version="1.0" encoding="utf-8"?>
+<p:sld xmlns:a="http://schemas.openxmlformats.org/drawingml/2006/main" xmlns:r="http://schemas.openxmlformats.org/officeDocument/2006/relationships" xmlns:p="http://schemas.openxmlformats.org/presentationml/2006/main">
+  <p:cSld>
+    <p:spTree>
+      <p:nvGrpSpPr>
+        <p:cNvPr id="1" name=""/>
+        <p:cNvGrpSpPr/>
+        <p:nvPr/>
+      </p:nvGrpSpPr>
+      <p:grpSpPr>
+        <a:xfrm>
+          <a:off x="0" y="0"/>
+          <a:ext cx="0" cy="0"/>
+          <a:chOff x="0" y="0"/>
+          <a:chExt cx="0" cy="0"/>
+        </a:xfrm>
+      </p:grpSpPr>
+      <p:sp>
+        <p:nvSpPr>
+          <p:cNvPr id="16" name="Rounded Rectangle 15"/>
+          <p:cNvSpPr/>
+          <p:nvPr/>
+        </p:nvSpPr>
+        <p:spPr>
+          <a:xfrm>
+            <a:off x="529441" y="2227614"/>
+            <a:ext cx="1360714" cy="707572"/>
+          </a:xfrm>
+          <a:prstGeom prst="roundRect">
+            <a:avLst/>
+          </a:prstGeom>
+          <a:solidFill>
+            <a:schemeClr val="accent3">
+              <a:lumMod val="40000"/>
+              <a:lumOff val="60000"/>
+            </a:schemeClr>
+          </a:solidFill>
+        </p:spPr>
+        <p:style>
+          <a:lnRef idx="2">
+            <a:schemeClr val="accent1">
+              <a:shade val="50000"/>
+            </a:schemeClr>
+          </a:lnRef>
+          <a:fillRef idx="1">
+            <a:schemeClr val="accent1"/>
+          </a:fillRef>
+          <a:effectRef idx="0">
+            <a:schemeClr val="accent1"/>
+          </a:effectRef>
+          <a:fontRef idx="minor">
+            <a:schemeClr val="lt1"/>
+          </a:fontRef>
+        </p:style>
+        <p:txBody>
+          <a:bodyPr rtlCol="0" anchor="ctr"/>
+          <a:lstStyle/>
+          <a:p>
+            <a:pPr algn="ctr"/>
+            <a:r>
+              <a:rPr lang="en-US" dirty="0">
+                <a:solidFill>
+                  <a:schemeClr val="tx1"/>
+                </a:solidFill>
+              </a:rPr>
+              <a:t>Laptop</a:t>
+            </a:r>
+          </a:p>
+        </p:txBody>
+      </p:sp>
+      <p:sp>
+        <p:nvSpPr>
+          <p:cNvPr id="17" name="Rounded Rectangle 16"/>
+          <p:cNvSpPr/>
+          <p:nvPr/>
+        </p:nvSpPr>
+        <p:spPr>
+          <a:xfrm>
+            <a:off x="529441" y="1405746"/>
+            <a:ext cx="1360714" cy="410934"/>
+          </a:xfrm>
+          <a:prstGeom prst="roundRect">
+            <a:avLst/>
+          </a:prstGeom>
+          <a:solidFill>
+            <a:schemeClr val="accent1"/>
+          </a:solidFill>
+        </p:spPr>
+        <p:style>
+          <a:lnRef idx="2">
+            <a:schemeClr val="accent1">
+              <a:shade val="50000"/>
+            </a:schemeClr>
+          </a:lnRef>
+          <a:fillRef idx="1">
+            <a:schemeClr val="accent1"/>
+          </a:fillRef>
+          <a:effectRef idx="0">
+            <a:schemeClr val="accent1"/>
+          </a:effectRef>
+          <a:fontRef idx="minor">
+            <a:schemeClr val="lt1"/>
+          </a:fontRef>
+        </p:style>
+        <p:txBody>
+          <a:bodyPr rtlCol="0" anchor="ctr"/>
+          <a:lstStyle/>
+          <a:p>
+            <a:pPr algn="ctr"/>
+            <a:r>
+              <a:rPr lang="en-US" dirty="0" err="1"/>
               <a:t>Wifi</a:t>
             </a:r>
             <a:endParaRPr lang="en-US" dirty="0"/>
@@ -4061,18 +5539,13 @@
             <a:p>
               <a:pPr algn="ctr"/>
               <a:r>
-                <a:rPr lang="en-US" sz="800" smtClean="0">
+                <a:rPr lang="en-US" sz="800">
                   <a:solidFill>
                     <a:schemeClr val="tx1"/>
                   </a:solidFill>
                 </a:rPr>
                 <a:t>PI Worker</a:t>
               </a:r>
-              <a:endParaRPr lang="en-US" sz="800">
-                <a:solidFill>
-                  <a:schemeClr val="tx1"/>
-                </a:solidFill>
-              </a:endParaRPr>
             </a:p>
           </p:txBody>
         </p:sp>
@@ -4119,7 +5592,7 @@
             <a:p>
               <a:pPr algn="ctr"/>
               <a:r>
-                <a:rPr lang="en-US" sz="800" smtClean="0">
+                <a:rPr lang="en-US" sz="800">
                   <a:solidFill>
                     <a:schemeClr val="tx1"/>
                   </a:solidFill>
@@ -4177,18 +5650,13 @@
             <a:p>
               <a:pPr algn="ctr"/>
               <a:r>
-                <a:rPr lang="en-US" sz="800" smtClean="0">
+                <a:rPr lang="en-US" sz="800">
                   <a:solidFill>
                     <a:schemeClr val="tx1"/>
                   </a:solidFill>
                 </a:rPr>
                 <a:t>PI Worker</a:t>
               </a:r>
-              <a:endParaRPr lang="en-US" sz="800">
-                <a:solidFill>
-                  <a:schemeClr val="tx1"/>
-                </a:solidFill>
-              </a:endParaRPr>
             </a:p>
           </p:txBody>
         </p:sp>
@@ -4235,18 +5703,13 @@
             <a:p>
               <a:pPr algn="ctr"/>
               <a:r>
-                <a:rPr lang="en-US" sz="800" smtClean="0">
+                <a:rPr lang="en-US" sz="800">
                   <a:solidFill>
                     <a:schemeClr val="tx1"/>
                   </a:solidFill>
                 </a:rPr>
                 <a:t>PI Worker</a:t>
               </a:r>
-              <a:endParaRPr lang="en-US" sz="800">
-                <a:solidFill>
-                  <a:schemeClr val="tx1"/>
-                </a:solidFill>
-              </a:endParaRPr>
             </a:p>
           </p:txBody>
         </p:sp>
@@ -4293,18 +5756,13 @@
             <a:p>
               <a:pPr algn="ctr"/>
               <a:r>
-                <a:rPr lang="en-US" sz="800" smtClean="0">
+                <a:rPr lang="en-US" sz="800">
                   <a:solidFill>
                     <a:schemeClr val="tx1"/>
                   </a:solidFill>
                 </a:rPr>
                 <a:t>PI Worker</a:t>
               </a:r>
-              <a:endParaRPr lang="en-US" sz="800">
-                <a:solidFill>
-                  <a:schemeClr val="tx1"/>
-                </a:solidFill>
-              </a:endParaRPr>
             </a:p>
           </p:txBody>
         </p:sp>
@@ -4348,10 +5806,9 @@
             <a:p>
               <a:pPr algn="ctr"/>
               <a:r>
-                <a:rPr lang="en-US" sz="800" dirty="0" smtClean="0"/>
+                <a:rPr lang="en-US" sz="800" dirty="0"/>
                 <a:t>Network Switch</a:t>
               </a:r>
-              <a:endParaRPr lang="en-US" sz="800" dirty="0"/>
             </a:p>
           </p:txBody>
         </p:sp>
@@ -4567,7 +6024,7 @@
             <a:p>
               <a:pPr algn="ctr"/>
               <a:r>
-                <a:rPr lang="en-US" sz="800" dirty="0" err="1" smtClean="0"/>
+                <a:rPr lang="en-US" sz="800" dirty="0" err="1"/>
                 <a:t>Wifi</a:t>
               </a:r>
               <a:endParaRPr lang="en-US" sz="800" dirty="0"/>
@@ -4737,10 +6194,9 @@
             <a:lstStyle/>
             <a:p>
               <a:r>
-                <a:rPr lang="en-US" sz="800" dirty="0" smtClean="0"/>
+                <a:rPr lang="en-US" sz="800" dirty="0"/>
                 <a:t>Recommended, Optional</a:t>
               </a:r>
-              <a:endParaRPr lang="en-US" sz="800" dirty="0"/>
             </a:p>
           </p:txBody>
         </p:sp>
@@ -4802,18 +6258,13 @@
             <a:p>
               <a:pPr algn="ctr"/>
               <a:r>
-                <a:rPr lang="en-US" sz="800" smtClean="0">
+                <a:rPr lang="en-US" sz="800">
                   <a:solidFill>
                     <a:schemeClr val="tx1"/>
                   </a:solidFill>
                 </a:rPr>
                 <a:t>PI Worker</a:t>
               </a:r>
-              <a:endParaRPr lang="en-US" sz="800">
-                <a:solidFill>
-                  <a:schemeClr val="tx1"/>
-                </a:solidFill>
-              </a:endParaRPr>
             </a:p>
           </p:txBody>
         </p:sp>
@@ -4860,7 +6311,7 @@
             <a:p>
               <a:pPr algn="ctr"/>
               <a:r>
-                <a:rPr lang="en-US" sz="800" smtClean="0">
+                <a:rPr lang="en-US" sz="800">
                   <a:solidFill>
                     <a:schemeClr val="tx1"/>
                   </a:solidFill>
@@ -4918,18 +6369,13 @@
             <a:p>
               <a:pPr algn="ctr"/>
               <a:r>
-                <a:rPr lang="en-US" sz="800" smtClean="0">
+                <a:rPr lang="en-US" sz="800">
                   <a:solidFill>
                     <a:schemeClr val="tx1"/>
                   </a:solidFill>
                 </a:rPr>
                 <a:t>PI Worker</a:t>
               </a:r>
-              <a:endParaRPr lang="en-US" sz="800">
-                <a:solidFill>
-                  <a:schemeClr val="tx1"/>
-                </a:solidFill>
-              </a:endParaRPr>
             </a:p>
           </p:txBody>
         </p:sp>
@@ -4976,18 +6422,13 @@
             <a:p>
               <a:pPr algn="ctr"/>
               <a:r>
-                <a:rPr lang="en-US" sz="800" smtClean="0">
+                <a:rPr lang="en-US" sz="800">
                   <a:solidFill>
                     <a:schemeClr val="tx1"/>
                   </a:solidFill>
                 </a:rPr>
                 <a:t>PI Worker</a:t>
               </a:r>
-              <a:endParaRPr lang="en-US" sz="800">
-                <a:solidFill>
-                  <a:schemeClr val="tx1"/>
-                </a:solidFill>
-              </a:endParaRPr>
             </a:p>
           </p:txBody>
         </p:sp>
@@ -5034,18 +6475,13 @@
             <a:p>
               <a:pPr algn="ctr"/>
               <a:r>
-                <a:rPr lang="en-US" sz="800" smtClean="0">
+                <a:rPr lang="en-US" sz="800">
                   <a:solidFill>
                     <a:schemeClr val="tx1"/>
                   </a:solidFill>
                 </a:rPr>
                 <a:t>PI Worker</a:t>
               </a:r>
-              <a:endParaRPr lang="en-US" sz="800">
-                <a:solidFill>
-                  <a:schemeClr val="tx1"/>
-                </a:solidFill>
-              </a:endParaRPr>
             </a:p>
           </p:txBody>
         </p:sp>
@@ -5089,10 +6525,9 @@
             <a:p>
               <a:pPr algn="ctr"/>
               <a:r>
-                <a:rPr lang="en-US" sz="800" dirty="0" smtClean="0"/>
+                <a:rPr lang="en-US" sz="800" dirty="0"/>
                 <a:t>Network Switch</a:t>
               </a:r>
-              <a:endParaRPr lang="en-US" sz="800" dirty="0"/>
             </a:p>
           </p:txBody>
         </p:sp>
@@ -5308,7 +6743,7 @@
             <a:p>
               <a:pPr algn="ctr"/>
               <a:r>
-                <a:rPr lang="en-US" sz="800" dirty="0" err="1" smtClean="0"/>
+                <a:rPr lang="en-US" sz="800" dirty="0" err="1"/>
                 <a:t>Wifi</a:t>
               </a:r>
               <a:endParaRPr lang="en-US" sz="800" dirty="0"/>
@@ -5478,10 +6913,9 @@
             <a:lstStyle/>
             <a:p>
               <a:r>
-                <a:rPr lang="en-US" sz="800" dirty="0" smtClean="0"/>
+                <a:rPr lang="en-US" sz="800" dirty="0"/>
                 <a:t>Recommended, Optional</a:t>
               </a:r>
-              <a:endParaRPr lang="en-US" sz="800" dirty="0"/>
             </a:p>
           </p:txBody>
         </p:sp>
@@ -5543,18 +6977,13 @@
             <a:p>
               <a:pPr algn="ctr"/>
               <a:r>
-                <a:rPr lang="en-US" sz="800" smtClean="0">
+                <a:rPr lang="en-US" sz="800">
                   <a:solidFill>
                     <a:schemeClr val="tx1"/>
                   </a:solidFill>
                 </a:rPr>
                 <a:t>PI Worker</a:t>
               </a:r>
-              <a:endParaRPr lang="en-US" sz="800">
-                <a:solidFill>
-                  <a:schemeClr val="tx1"/>
-                </a:solidFill>
-              </a:endParaRPr>
             </a:p>
           </p:txBody>
         </p:sp>
@@ -5601,7 +7030,7 @@
             <a:p>
               <a:pPr algn="ctr"/>
               <a:r>
-                <a:rPr lang="en-US" sz="800" smtClean="0">
+                <a:rPr lang="en-US" sz="800">
                   <a:solidFill>
                     <a:schemeClr val="tx1"/>
                   </a:solidFill>
@@ -5659,18 +7088,13 @@
             <a:p>
               <a:pPr algn="ctr"/>
               <a:r>
-                <a:rPr lang="en-US" sz="800" smtClean="0">
+                <a:rPr lang="en-US" sz="800">
                   <a:solidFill>
                     <a:schemeClr val="tx1"/>
                   </a:solidFill>
                 </a:rPr>
                 <a:t>PI Worker</a:t>
               </a:r>
-              <a:endParaRPr lang="en-US" sz="800">
-                <a:solidFill>
-                  <a:schemeClr val="tx1"/>
-                </a:solidFill>
-              </a:endParaRPr>
             </a:p>
           </p:txBody>
         </p:sp>
@@ -5717,18 +7141,13 @@
             <a:p>
               <a:pPr algn="ctr"/>
               <a:r>
-                <a:rPr lang="en-US" sz="800" smtClean="0">
+                <a:rPr lang="en-US" sz="800">
                   <a:solidFill>
                     <a:schemeClr val="tx1"/>
                   </a:solidFill>
                 </a:rPr>
                 <a:t>PI Worker</a:t>
               </a:r>
-              <a:endParaRPr lang="en-US" sz="800">
-                <a:solidFill>
-                  <a:schemeClr val="tx1"/>
-                </a:solidFill>
-              </a:endParaRPr>
             </a:p>
           </p:txBody>
         </p:sp>
@@ -5775,18 +7194,13 @@
             <a:p>
               <a:pPr algn="ctr"/>
               <a:r>
-                <a:rPr lang="en-US" sz="800" smtClean="0">
+                <a:rPr lang="en-US" sz="800">
                   <a:solidFill>
                     <a:schemeClr val="tx1"/>
                   </a:solidFill>
                 </a:rPr>
                 <a:t>PI Worker</a:t>
               </a:r>
-              <a:endParaRPr lang="en-US" sz="800">
-                <a:solidFill>
-                  <a:schemeClr val="tx1"/>
-                </a:solidFill>
-              </a:endParaRPr>
             </a:p>
           </p:txBody>
         </p:sp>
@@ -5830,10 +7244,9 @@
             <a:p>
               <a:pPr algn="ctr"/>
               <a:r>
-                <a:rPr lang="en-US" sz="800" dirty="0" smtClean="0"/>
+                <a:rPr lang="en-US" sz="800" dirty="0"/>
                 <a:t>Network Switch</a:t>
               </a:r>
-              <a:endParaRPr lang="en-US" sz="800" dirty="0"/>
             </a:p>
           </p:txBody>
         </p:sp>
@@ -6049,7 +7462,7 @@
             <a:p>
               <a:pPr algn="ctr"/>
               <a:r>
-                <a:rPr lang="en-US" sz="800" dirty="0" err="1" smtClean="0"/>
+                <a:rPr lang="en-US" sz="800" dirty="0" err="1"/>
                 <a:t>Wifi</a:t>
               </a:r>
               <a:endParaRPr lang="en-US" sz="800" dirty="0"/>
@@ -6219,10 +7632,9 @@
             <a:lstStyle/>
             <a:p>
               <a:r>
-                <a:rPr lang="en-US" sz="800" dirty="0" smtClean="0"/>
+                <a:rPr lang="en-US" sz="800" dirty="0"/>
                 <a:t>Recommended, Optional</a:t>
               </a:r>
-              <a:endParaRPr lang="en-US" sz="800" dirty="0"/>
             </a:p>
           </p:txBody>
         </p:sp>
@@ -6284,18 +7696,13 @@
             <a:p>
               <a:pPr algn="ctr"/>
               <a:r>
-                <a:rPr lang="en-US" sz="800" smtClean="0">
+                <a:rPr lang="en-US" sz="800">
                   <a:solidFill>
                     <a:schemeClr val="tx1"/>
                   </a:solidFill>
                 </a:rPr>
                 <a:t>PI Worker</a:t>
               </a:r>
-              <a:endParaRPr lang="en-US" sz="800">
-                <a:solidFill>
-                  <a:schemeClr val="tx1"/>
-                </a:solidFill>
-              </a:endParaRPr>
             </a:p>
           </p:txBody>
         </p:sp>
@@ -6342,7 +7749,7 @@
             <a:p>
               <a:pPr algn="ctr"/>
               <a:r>
-                <a:rPr lang="en-US" sz="800" smtClean="0">
+                <a:rPr lang="en-US" sz="800">
                   <a:solidFill>
                     <a:schemeClr val="tx1"/>
                   </a:solidFill>
@@ -6400,18 +7807,13 @@
             <a:p>
               <a:pPr algn="ctr"/>
               <a:r>
-                <a:rPr lang="en-US" sz="800" smtClean="0">
+                <a:rPr lang="en-US" sz="800">
                   <a:solidFill>
                     <a:schemeClr val="tx1"/>
                   </a:solidFill>
                 </a:rPr>
                 <a:t>PI Worker</a:t>
               </a:r>
-              <a:endParaRPr lang="en-US" sz="800">
-                <a:solidFill>
-                  <a:schemeClr val="tx1"/>
-                </a:solidFill>
-              </a:endParaRPr>
             </a:p>
           </p:txBody>
         </p:sp>
@@ -6458,18 +7860,13 @@
             <a:p>
               <a:pPr algn="ctr"/>
               <a:r>
-                <a:rPr lang="en-US" sz="800" smtClean="0">
+                <a:rPr lang="en-US" sz="800">
                   <a:solidFill>
                     <a:schemeClr val="tx1"/>
                   </a:solidFill>
                 </a:rPr>
                 <a:t>PI Worker</a:t>
               </a:r>
-              <a:endParaRPr lang="en-US" sz="800">
-                <a:solidFill>
-                  <a:schemeClr val="tx1"/>
-                </a:solidFill>
-              </a:endParaRPr>
             </a:p>
           </p:txBody>
         </p:sp>
@@ -6516,18 +7913,13 @@
             <a:p>
               <a:pPr algn="ctr"/>
               <a:r>
-                <a:rPr lang="en-US" sz="800" smtClean="0">
+                <a:rPr lang="en-US" sz="800">
                   <a:solidFill>
                     <a:schemeClr val="tx1"/>
                   </a:solidFill>
                 </a:rPr>
                 <a:t>PI Worker</a:t>
               </a:r>
-              <a:endParaRPr lang="en-US" sz="800">
-                <a:solidFill>
-                  <a:schemeClr val="tx1"/>
-                </a:solidFill>
-              </a:endParaRPr>
             </a:p>
           </p:txBody>
         </p:sp>
@@ -6571,10 +7963,9 @@
             <a:p>
               <a:pPr algn="ctr"/>
               <a:r>
-                <a:rPr lang="en-US" sz="800" dirty="0" smtClean="0"/>
+                <a:rPr lang="en-US" sz="800" dirty="0"/>
                 <a:t>Network Switch</a:t>
               </a:r>
-              <a:endParaRPr lang="en-US" sz="800" dirty="0"/>
             </a:p>
           </p:txBody>
         </p:sp>
@@ -6790,7 +8181,7 @@
             <a:p>
               <a:pPr algn="ctr"/>
               <a:r>
-                <a:rPr lang="en-US" sz="800" dirty="0" err="1" smtClean="0"/>
+                <a:rPr lang="en-US" sz="800" dirty="0" err="1"/>
                 <a:t>Wifi</a:t>
               </a:r>
               <a:endParaRPr lang="en-US" sz="800" dirty="0"/>
@@ -6960,10 +8351,9 @@
             <a:lstStyle/>
             <a:p>
               <a:r>
-                <a:rPr lang="en-US" sz="800" dirty="0" smtClean="0"/>
+                <a:rPr lang="en-US" sz="800" dirty="0"/>
                 <a:t>Recommended, Optional</a:t>
               </a:r>
-              <a:endParaRPr lang="en-US" sz="800" dirty="0"/>
             </a:p>
           </p:txBody>
         </p:sp>
@@ -7008,7 +8398,7 @@
           <a:p>
             <a:pPr algn="ctr"/>
             <a:r>
-              <a:rPr lang="en-US" smtClean="0"/>
+              <a:rPr lang="en-US"/>
               <a:t>Network Switch </a:t>
             </a:r>
             <a:endParaRPr lang="en-US" dirty="0"/>
@@ -7174,10 +8564,9 @@
           <a:lstStyle/>
           <a:p>
             <a:r>
-              <a:rPr lang="en-US" dirty="0" smtClean="0"/>
+              <a:rPr lang="en-US" dirty="0"/>
               <a:t>192.168.0.1-5</a:t>
             </a:r>
-            <a:endParaRPr lang="en-US" dirty="0"/>
           </a:p>
         </p:txBody>
       </p:sp>
@@ -7204,10 +8593,9 @@
           <a:lstStyle/>
           <a:p>
             <a:r>
-              <a:rPr lang="en-US" dirty="0" smtClean="0"/>
+              <a:rPr lang="en-US" dirty="0"/>
               <a:t>192.168.0.254</a:t>
             </a:r>
-            <a:endParaRPr lang="en-US" dirty="0"/>
           </a:p>
         </p:txBody>
       </p:sp>
@@ -7234,10 +8622,9 @@
           <a:lstStyle/>
           <a:p>
             <a:r>
-              <a:rPr lang="en-US" dirty="0" smtClean="0"/>
+              <a:rPr lang="en-US" dirty="0"/>
               <a:t>192.168.0.6-10</a:t>
             </a:r>
-            <a:endParaRPr lang="en-US" dirty="0"/>
           </a:p>
         </p:txBody>
       </p:sp>
@@ -7264,7 +8651,7 @@
           <a:lstStyle/>
           <a:p>
             <a:r>
-              <a:rPr lang="en-US" smtClean="0"/>
+              <a:rPr lang="en-US"/>
               <a:t>192.168.0.11-15</a:t>
             </a:r>
             <a:endParaRPr lang="en-US" dirty="0"/>
@@ -7294,10 +8681,9 @@
           <a:lstStyle/>
           <a:p>
             <a:r>
-              <a:rPr lang="en-US" dirty="0" smtClean="0"/>
+              <a:rPr lang="en-US" dirty="0"/>
               <a:t>192.168.0.16-20</a:t>
             </a:r>
-            <a:endParaRPr lang="en-US" dirty="0"/>
           </a:p>
         </p:txBody>
       </p:sp>
@@ -7324,10 +8710,9 @@
           <a:lstStyle/>
           <a:p>
             <a:r>
-              <a:rPr lang="en-US" dirty="0" smtClean="0"/>
+              <a:rPr lang="en-US" dirty="0"/>
               <a:t>hostname=node254</a:t>
             </a:r>
-            <a:endParaRPr lang="en-US" dirty="0"/>
           </a:p>
         </p:txBody>
       </p:sp>
@@ -7354,39 +8739,37 @@
           <a:lstStyle/>
           <a:p>
             <a:r>
-              <a:rPr lang="en-US" dirty="0" smtClean="0"/>
+              <a:rPr lang="en-US" dirty="0"/>
               <a:t>Hostname schema</a:t>
             </a:r>
-            <a:endParaRPr lang="en-US" dirty="0"/>
-          </a:p>
-          <a:p>
-            <a:r>
-              <a:rPr lang="en-US" dirty="0" smtClean="0"/>
+          </a:p>
+          <a:p>
+            <a:r>
+              <a:rPr lang="en-US" dirty="0"/>
               <a:t>192.168.0.n</a:t>
             </a:r>
           </a:p>
           <a:p>
             <a:r>
-              <a:rPr lang="en-US" dirty="0" smtClean="0"/>
+              <a:rPr lang="en-US" dirty="0"/>
               <a:t>hostname=“{name}{n}”.format(name=“node”, n=</a:t>
             </a:r>
             <a:r>
-              <a:rPr lang="en-US" dirty="0" err="1" smtClean="0"/>
+              <a:rPr lang="en-US" dirty="0" err="1"/>
               <a:t>str</a:t>
             </a:r>
             <a:r>
-              <a:rPr lang="en-US" dirty="0" smtClean="0"/>
+              <a:rPr lang="en-US" dirty="0"/>
               <a:t>(n).</a:t>
             </a:r>
             <a:r>
-              <a:rPr lang="en-US" dirty="0" err="1" smtClean="0"/>
+              <a:rPr lang="en-US" dirty="0" err="1"/>
               <a:t>zfill</a:t>
             </a:r>
             <a:r>
-              <a:rPr lang="en-US" dirty="0" smtClean="0"/>
+              <a:rPr lang="en-US" dirty="0"/>
               <a:t>(3))</a:t>
             </a:r>
-            <a:endParaRPr lang="en-US" dirty="0"/>
           </a:p>
         </p:txBody>
       </p:sp>
@@ -7413,14 +8796,13 @@
           <a:lstStyle/>
           <a:p>
             <a:r>
-              <a:rPr lang="en-US" dirty="0" err="1" smtClean="0"/>
+              <a:rPr lang="en-US" dirty="0" err="1"/>
               <a:t>Clustername</a:t>
             </a:r>
             <a:r>
-              <a:rPr lang="en-US" dirty="0" smtClean="0"/>
+              <a:rPr lang="en-US" dirty="0"/>
               <a:t> = cluster01 </a:t>
             </a:r>
-            <a:endParaRPr lang="en-US" dirty="0"/>
           </a:p>
         </p:txBody>
       </p:sp>
@@ -7447,14 +8829,13 @@
           <a:lstStyle/>
           <a:p>
             <a:r>
-              <a:rPr lang="en-US" dirty="0" err="1" smtClean="0"/>
+              <a:rPr lang="en-US" dirty="0" err="1"/>
               <a:t>Clustername</a:t>
             </a:r>
             <a:r>
-              <a:rPr lang="en-US" dirty="0" smtClean="0"/>
+              <a:rPr lang="en-US" dirty="0"/>
               <a:t> = cluster02 </a:t>
             </a:r>
-            <a:endParaRPr lang="en-US" dirty="0"/>
           </a:p>
         </p:txBody>
       </p:sp>
@@ -7481,14 +8862,13 @@
           <a:lstStyle/>
           <a:p>
             <a:r>
-              <a:rPr lang="en-US" dirty="0" err="1" smtClean="0"/>
+              <a:rPr lang="en-US" dirty="0" err="1"/>
               <a:t>Clustername</a:t>
             </a:r>
             <a:r>
-              <a:rPr lang="en-US" dirty="0" smtClean="0"/>
+              <a:rPr lang="en-US" dirty="0"/>
               <a:t> = cluster03 </a:t>
             </a:r>
-            <a:endParaRPr lang="en-US" dirty="0"/>
           </a:p>
         </p:txBody>
       </p:sp>
@@ -7515,14 +8895,13 @@
           <a:lstStyle/>
           <a:p>
             <a:r>
-              <a:rPr lang="en-US" dirty="0" err="1" smtClean="0"/>
+              <a:rPr lang="en-US" dirty="0" err="1"/>
               <a:t>Clustername</a:t>
             </a:r>
             <a:r>
-              <a:rPr lang="en-US" dirty="0" smtClean="0"/>
+              <a:rPr lang="en-US" dirty="0"/>
               <a:t> = cluster04 </a:t>
             </a:r>
-            <a:endParaRPr lang="en-US" dirty="0"/>
           </a:p>
         </p:txBody>
       </p:sp>

</xml_diff>

<commit_message>
add the bridge to the image
</commit_message>
<xml_diff>
--- a/images/network.pptx
+++ b/images/network.pptx
@@ -4136,42 +4136,6 @@
       </p:sp>
       <p:cxnSp>
         <p:nvCxnSpPr>
-          <p:cNvPr id="11" name="Straight Arrow Connector 10"/>
-          <p:cNvCxnSpPr>
-            <a:stCxn id="5" idx="2"/>
-          </p:cNvCxnSpPr>
-          <p:nvPr/>
-        </p:nvCxnSpPr>
-        <p:spPr>
-          <a:xfrm>
-            <a:off x="3408712" y="2935186"/>
-            <a:ext cx="0" cy="430233"/>
-          </a:xfrm>
-          <a:prstGeom prst="straightConnector1">
-            <a:avLst/>
-          </a:prstGeom>
-          <a:ln>
-            <a:headEnd type="triangle"/>
-            <a:tailEnd type="triangle"/>
-          </a:ln>
-        </p:spPr>
-        <p:style>
-          <a:lnRef idx="1">
-            <a:schemeClr val="accent1"/>
-          </a:lnRef>
-          <a:fillRef idx="0">
-            <a:schemeClr val="accent1"/>
-          </a:fillRef>
-          <a:effectRef idx="0">
-            <a:schemeClr val="accent1"/>
-          </a:effectRef>
-          <a:fontRef idx="minor">
-            <a:schemeClr val="tx1"/>
-          </a:fontRef>
-        </p:style>
-      </p:cxnSp>
-      <p:cxnSp>
-        <p:nvCxnSpPr>
           <p:cNvPr id="12" name="Straight Arrow Connector 11"/>
           <p:cNvCxnSpPr/>
           <p:nvPr/>
@@ -4314,7 +4278,7 @@
         </p:nvSpPr>
         <p:spPr>
           <a:xfrm>
-            <a:off x="573727" y="270407"/>
+            <a:off x="573727" y="246657"/>
             <a:ext cx="1360714" cy="707572"/>
           </a:xfrm>
           <a:prstGeom prst="roundRect">
@@ -4367,7 +4331,7 @@
         </p:nvSpPr>
         <p:spPr>
           <a:xfrm>
-            <a:off x="525248" y="1403225"/>
+            <a:off x="525248" y="1379475"/>
             <a:ext cx="3719558" cy="410934"/>
           </a:xfrm>
           <a:prstGeom prst="roundRect">
@@ -4408,47 +4372,13 @@
       </p:sp>
       <p:cxnSp>
         <p:nvCxnSpPr>
-          <p:cNvPr id="19" name="Straight Arrow Connector 18"/>
-          <p:cNvCxnSpPr/>
-          <p:nvPr/>
-        </p:nvCxnSpPr>
-        <p:spPr>
-          <a:xfrm>
-            <a:off x="3419102" y="1797381"/>
-            <a:ext cx="0" cy="430233"/>
-          </a:xfrm>
-          <a:prstGeom prst="straightConnector1">
-            <a:avLst/>
-          </a:prstGeom>
-          <a:ln>
-            <a:headEnd type="triangle"/>
-            <a:tailEnd type="triangle"/>
-          </a:ln>
-        </p:spPr>
-        <p:style>
-          <a:lnRef idx="1">
-            <a:schemeClr val="accent1"/>
-          </a:lnRef>
-          <a:fillRef idx="0">
-            <a:schemeClr val="accent1"/>
-          </a:fillRef>
-          <a:effectRef idx="0">
-            <a:schemeClr val="accent1"/>
-          </a:effectRef>
-          <a:fontRef idx="minor">
-            <a:schemeClr val="tx1"/>
-          </a:fontRef>
-        </p:style>
-      </p:cxnSp>
-      <p:cxnSp>
-        <p:nvCxnSpPr>
           <p:cNvPr id="20" name="Straight Arrow Connector 19"/>
           <p:cNvCxnSpPr/>
           <p:nvPr/>
         </p:nvCxnSpPr>
         <p:spPr>
           <a:xfrm>
-            <a:off x="1209798" y="972992"/>
+            <a:off x="1209798" y="949242"/>
             <a:ext cx="0" cy="430233"/>
           </a:xfrm>
           <a:prstGeom prst="straightConnector1">
@@ -4623,7 +4553,7 @@
         </p:nvSpPr>
         <p:spPr>
           <a:xfrm>
-            <a:off x="2738745" y="282282"/>
+            <a:off x="2738745" y="258532"/>
             <a:ext cx="1360714" cy="707572"/>
           </a:xfrm>
           <a:prstGeom prst="roundRect">
@@ -4682,7 +4612,7 @@
         </p:nvCxnSpPr>
         <p:spPr>
           <a:xfrm>
-            <a:off x="3419102" y="989854"/>
+            <a:off x="3419102" y="966104"/>
             <a:ext cx="0" cy="430233"/>
           </a:xfrm>
           <a:prstGeom prst="straightConnector1">
@@ -5315,6 +5245,168 @@
           <a:p>
             <a:pPr algn="ctr"/>
             <a:endParaRPr lang="en-US"/>
+          </a:p>
+        </p:txBody>
+      </p:sp>
+      <p:sp>
+        <p:nvSpPr>
+          <p:cNvPr id="43" name="Up-Down Arrow 42">
+            <a:extLst>
+              <a:ext uri="{FF2B5EF4-FFF2-40B4-BE49-F238E27FC236}">
+                <a16:creationId xmlns:a16="http://schemas.microsoft.com/office/drawing/2014/main" id="{A7CD07C8-77ED-0248-BCED-A556A5F91A2A}"/>
+              </a:ext>
+            </a:extLst>
+          </p:cNvPr>
+          <p:cNvSpPr/>
+          <p:nvPr/>
+        </p:nvSpPr>
+        <p:spPr>
+          <a:xfrm>
+            <a:off x="3281968" y="2945218"/>
+            <a:ext cx="274268" cy="423156"/>
+          </a:xfrm>
+          <a:prstGeom prst="upDownArrow">
+            <a:avLst/>
+          </a:prstGeom>
+        </p:spPr>
+        <p:style>
+          <a:lnRef idx="2">
+            <a:schemeClr val="accent1">
+              <a:shade val="50000"/>
+            </a:schemeClr>
+          </a:lnRef>
+          <a:fillRef idx="1">
+            <a:schemeClr val="accent1"/>
+          </a:fillRef>
+          <a:effectRef idx="0">
+            <a:schemeClr val="accent1"/>
+          </a:effectRef>
+          <a:fontRef idx="minor">
+            <a:schemeClr val="lt1"/>
+          </a:fontRef>
+        </p:style>
+        <p:txBody>
+          <a:bodyPr rtlCol="0" anchor="ctr"/>
+          <a:lstStyle/>
+          <a:p>
+            <a:pPr algn="ctr"/>
+            <a:endParaRPr lang="en-US" dirty="0"/>
+          </a:p>
+        </p:txBody>
+      </p:sp>
+      <p:sp>
+        <p:nvSpPr>
+          <p:cNvPr id="44" name="Up-Down Arrow 43">
+            <a:extLst>
+              <a:ext uri="{FF2B5EF4-FFF2-40B4-BE49-F238E27FC236}">
+                <a16:creationId xmlns:a16="http://schemas.microsoft.com/office/drawing/2014/main" id="{897FF324-6238-B747-B1F6-76EE920FDAB7}"/>
+              </a:ext>
+            </a:extLst>
+          </p:cNvPr>
+          <p:cNvSpPr/>
+          <p:nvPr/>
+        </p:nvSpPr>
+        <p:spPr>
+          <a:xfrm>
+            <a:off x="3281968" y="1802213"/>
+            <a:ext cx="274268" cy="423156"/>
+          </a:xfrm>
+          <a:prstGeom prst="upDownArrow">
+            <a:avLst/>
+          </a:prstGeom>
+        </p:spPr>
+        <p:style>
+          <a:lnRef idx="2">
+            <a:schemeClr val="accent1">
+              <a:shade val="50000"/>
+            </a:schemeClr>
+          </a:lnRef>
+          <a:fillRef idx="1">
+            <a:schemeClr val="accent1"/>
+          </a:fillRef>
+          <a:effectRef idx="0">
+            <a:schemeClr val="accent1"/>
+          </a:effectRef>
+          <a:fontRef idx="minor">
+            <a:schemeClr val="lt1"/>
+          </a:fontRef>
+        </p:style>
+        <p:txBody>
+          <a:bodyPr rtlCol="0" anchor="ctr"/>
+          <a:lstStyle/>
+          <a:p>
+            <a:pPr algn="ctr"/>
+            <a:endParaRPr lang="en-US" dirty="0"/>
+          </a:p>
+        </p:txBody>
+      </p:sp>
+      <p:sp>
+        <p:nvSpPr>
+          <p:cNvPr id="45" name="TextBox 44">
+            <a:extLst>
+              <a:ext uri="{FF2B5EF4-FFF2-40B4-BE49-F238E27FC236}">
+                <a16:creationId xmlns:a16="http://schemas.microsoft.com/office/drawing/2014/main" id="{CE1AA2E9-923F-7948-8F65-4E1C4D245D18}"/>
+              </a:ext>
+            </a:extLst>
+          </p:cNvPr>
+          <p:cNvSpPr txBox="1"/>
+          <p:nvPr/>
+        </p:nvSpPr>
+        <p:spPr>
+          <a:xfrm>
+            <a:off x="3533707" y="1841278"/>
+            <a:ext cx="787075" cy="369332"/>
+          </a:xfrm>
+          <a:prstGeom prst="rect">
+            <a:avLst/>
+          </a:prstGeom>
+          <a:noFill/>
+        </p:spPr>
+        <p:txBody>
+          <a:bodyPr wrap="none" rtlCol="0">
+            <a:spAutoFit/>
+          </a:bodyPr>
+          <a:lstStyle/>
+          <a:p>
+            <a:r>
+              <a:rPr lang="en-US" dirty="0"/>
+              <a:t>Bridge</a:t>
+            </a:r>
+          </a:p>
+        </p:txBody>
+      </p:sp>
+      <p:sp>
+        <p:nvSpPr>
+          <p:cNvPr id="46" name="TextBox 45">
+            <a:extLst>
+              <a:ext uri="{FF2B5EF4-FFF2-40B4-BE49-F238E27FC236}">
+                <a16:creationId xmlns:a16="http://schemas.microsoft.com/office/drawing/2014/main" id="{105CEA48-D7C4-7E4C-8587-F9B06D886391}"/>
+              </a:ext>
+            </a:extLst>
+          </p:cNvPr>
+          <p:cNvSpPr txBox="1"/>
+          <p:nvPr/>
+        </p:nvSpPr>
+        <p:spPr>
+          <a:xfrm>
+            <a:off x="3557730" y="2972130"/>
+            <a:ext cx="787075" cy="369332"/>
+          </a:xfrm>
+          <a:prstGeom prst="rect">
+            <a:avLst/>
+          </a:prstGeom>
+          <a:noFill/>
+        </p:spPr>
+        <p:txBody>
+          <a:bodyPr wrap="none" rtlCol="0">
+            <a:spAutoFit/>
+          </a:bodyPr>
+          <a:lstStyle/>
+          <a:p>
+            <a:r>
+              <a:rPr lang="en-US" dirty="0"/>
+              <a:t>Bridge</a:t>
+            </a:r>
           </a:p>
         </p:txBody>
       </p:sp>

</xml_diff>

<commit_message>
add updated network images
</commit_message>
<xml_diff>
--- a/images/network.pptx
+++ b/images/network.pptx
@@ -4653,7 +4653,7 @@
         </p:nvSpPr>
         <p:spPr>
           <a:xfrm>
-            <a:off x="2904526" y="2826517"/>
+            <a:off x="3624959" y="2796415"/>
             <a:ext cx="289086" cy="317292"/>
           </a:xfrm>
           <a:prstGeom prst="snip1Rect">
@@ -4702,7 +4702,7 @@
         </p:nvSpPr>
         <p:spPr>
           <a:xfrm>
-            <a:off x="2848533" y="4755512"/>
+            <a:off x="3691775" y="4804129"/>
             <a:ext cx="289086" cy="317292"/>
           </a:xfrm>
           <a:prstGeom prst="snip1Rect">
@@ -4751,8 +4751,8 @@
         </p:nvSpPr>
         <p:spPr>
           <a:xfrm>
-            <a:off x="4452692" y="4745677"/>
-            <a:ext cx="289086" cy="317292"/>
+            <a:off x="5311177" y="4804129"/>
+            <a:ext cx="316938" cy="317292"/>
           </a:xfrm>
           <a:prstGeom prst="snip1Rect">
             <a:avLst/>
@@ -4800,7 +4800,7 @@
         </p:nvSpPr>
         <p:spPr>
           <a:xfrm>
-            <a:off x="6086045" y="4804129"/>
+            <a:off x="6899178" y="4804129"/>
             <a:ext cx="289086" cy="317292"/>
           </a:xfrm>
           <a:prstGeom prst="snip1Rect">
@@ -4849,7 +4849,7 @@
         </p:nvSpPr>
         <p:spPr>
           <a:xfrm>
-            <a:off x="7628845" y="4804129"/>
+            <a:off x="8519495" y="4804129"/>
             <a:ext cx="289086" cy="317292"/>
           </a:xfrm>
           <a:prstGeom prst="snip1Rect">
@@ -4898,7 +4898,7 @@
         </p:nvSpPr>
         <p:spPr>
           <a:xfrm>
-            <a:off x="2059117" y="2826517"/>
+            <a:off x="4331157" y="2796415"/>
             <a:ext cx="289086" cy="317292"/>
           </a:xfrm>
           <a:prstGeom prst="snip1Rect">
@@ -5095,7 +5095,7 @@
         <p:spPr>
           <a:xfrm>
             <a:off x="9288448" y="2295932"/>
-            <a:ext cx="2063642" cy="646331"/>
+            <a:ext cx="1992918" cy="646331"/>
           </a:xfrm>
           <a:prstGeom prst="rect">
             <a:avLst/>
@@ -5110,13 +5110,13 @@
           <a:p>
             <a:r>
               <a:rPr lang="en-US" dirty="0"/>
-              <a:t>Worker: </a:t>
+              <a:t>Worker: Raspberry </a:t>
             </a:r>
           </a:p>
           <a:p>
             <a:r>
               <a:rPr lang="en-US" dirty="0"/>
-              <a:t>Raspberry Pi OS Lite</a:t>
+              <a:t>Pi OS Lite</a:t>
             </a:r>
           </a:p>
         </p:txBody>
@@ -5219,7 +5219,7 @@
         </p:nvSpPr>
         <p:spPr>
           <a:xfrm>
-            <a:off x="2401280" y="2929247"/>
+            <a:off x="3917855" y="2877750"/>
             <a:ext cx="434457" cy="158647"/>
           </a:xfrm>
           <a:prstGeom prst="leftRightArrow">
@@ -5355,7 +5355,7 @@
         </p:nvSpPr>
         <p:spPr>
           <a:xfrm>
-            <a:off x="3533707" y="1841278"/>
+            <a:off x="2471318" y="1841278"/>
             <a:ext cx="787075" cy="369332"/>
           </a:xfrm>
           <a:prstGeom prst="rect">
@@ -5390,7 +5390,7 @@
         </p:nvSpPr>
         <p:spPr>
           <a:xfrm>
-            <a:off x="3557730" y="2972130"/>
+            <a:off x="2471318" y="2894876"/>
             <a:ext cx="787075" cy="369332"/>
           </a:xfrm>
           <a:prstGeom prst="rect">
@@ -6281,7 +6281,7 @@
         </p:nvSpPr>
         <p:spPr>
           <a:xfrm>
-            <a:off x="2904526" y="2826517"/>
+            <a:off x="3747676" y="2826517"/>
             <a:ext cx="289086" cy="317292"/>
           </a:xfrm>
           <a:prstGeom prst="snip1Rect">
@@ -6330,7 +6330,7 @@
         </p:nvSpPr>
         <p:spPr>
           <a:xfrm>
-            <a:off x="2848533" y="4755512"/>
+            <a:off x="3723306" y="4784441"/>
             <a:ext cx="289086" cy="317292"/>
           </a:xfrm>
           <a:prstGeom prst="snip1Rect">
@@ -6379,7 +6379,7 @@
         </p:nvSpPr>
         <p:spPr>
           <a:xfrm>
-            <a:off x="4452692" y="4745677"/>
+            <a:off x="5311177" y="4790153"/>
             <a:ext cx="289086" cy="317292"/>
           </a:xfrm>
           <a:prstGeom prst="snip1Rect">
@@ -6428,7 +6428,7 @@
         </p:nvSpPr>
         <p:spPr>
           <a:xfrm>
-            <a:off x="6086045" y="4804129"/>
+            <a:off x="6931418" y="4755512"/>
             <a:ext cx="289086" cy="317292"/>
           </a:xfrm>
           <a:prstGeom prst="snip1Rect">
@@ -6477,7 +6477,7 @@
         </p:nvSpPr>
         <p:spPr>
           <a:xfrm>
-            <a:off x="7628845" y="4804129"/>
+            <a:off x="8519495" y="4804129"/>
             <a:ext cx="289086" cy="317292"/>
           </a:xfrm>
           <a:prstGeom prst="snip1Rect">
@@ -6526,7 +6526,7 @@
         </p:nvSpPr>
         <p:spPr>
           <a:xfrm>
-            <a:off x="2059117" y="2826517"/>
+            <a:off x="4503855" y="2821068"/>
             <a:ext cx="289086" cy="317292"/>
           </a:xfrm>
           <a:prstGeom prst="snip1Rect">
@@ -6723,7 +6723,7 @@
         <p:spPr>
           <a:xfrm>
             <a:off x="9288448" y="2295932"/>
-            <a:ext cx="2063642" cy="646331"/>
+            <a:ext cx="1992918" cy="646331"/>
           </a:xfrm>
           <a:prstGeom prst="rect">
             <a:avLst/>
@@ -6738,13 +6738,13 @@
           <a:p>
             <a:r>
               <a:rPr lang="en-US" dirty="0"/>
-              <a:t>Worker: </a:t>
+              <a:t>Worker: Raspberry </a:t>
             </a:r>
           </a:p>
           <a:p>
             <a:r>
               <a:rPr lang="en-US" dirty="0"/>
-              <a:t>Raspberry Pi OS Lite</a:t>
+              <a:t>Pi OS Lite</a:t>
             </a:r>
           </a:p>
         </p:txBody>
@@ -6847,7 +6847,7 @@
         </p:nvSpPr>
         <p:spPr>
           <a:xfrm>
-            <a:off x="2401280" y="2929247"/>
+            <a:off x="4053080" y="2910602"/>
             <a:ext cx="434457" cy="158647"/>
           </a:xfrm>
           <a:prstGeom prst="leftRightArrow">

</xml_diff>

<commit_message>
update network without burn pi
</commit_message>
<xml_diff>
--- a/images/network.pptx
+++ b/images/network.pptx
@@ -4796,7 +4796,7 @@
           <a:p>
             <a:pPr algn="ctr"/>
             <a:r>
-              <a:rPr lang="en-US" dirty="0"/>
+              <a:rPr lang="en-US" sz="1200" dirty="0"/>
               <a:t>M</a:t>
             </a:r>
           </a:p>
@@ -4845,7 +4845,7 @@
           <a:p>
             <a:pPr algn="ctr"/>
             <a:r>
-              <a:rPr lang="en-US" dirty="0"/>
+              <a:rPr lang="en-US" sz="1200" dirty="0"/>
               <a:t>W</a:t>
             </a:r>
           </a:p>
@@ -4894,7 +4894,7 @@
           <a:p>
             <a:pPr algn="ctr"/>
             <a:r>
-              <a:rPr lang="en-US" dirty="0"/>
+              <a:rPr lang="en-US" sz="1200" dirty="0"/>
               <a:t>W</a:t>
             </a:r>
           </a:p>
@@ -4943,7 +4943,7 @@
           <a:p>
             <a:pPr algn="ctr"/>
             <a:r>
-              <a:rPr lang="en-US" dirty="0"/>
+              <a:rPr lang="en-US" sz="1200" dirty="0"/>
               <a:t>W</a:t>
             </a:r>
           </a:p>
@@ -4992,106 +4992,8 @@
           <a:p>
             <a:pPr algn="ctr"/>
             <a:r>
-              <a:rPr lang="en-US" dirty="0"/>
+              <a:rPr lang="en-US" sz="1200" dirty="0"/>
               <a:t>W</a:t>
-            </a:r>
-          </a:p>
-        </p:txBody>
-      </p:sp>
-      <p:sp>
-        <p:nvSpPr>
-          <p:cNvPr id="32" name="Snip Single Corner Rectangle 31">
-            <a:extLst>
-              <a:ext uri="{FF2B5EF4-FFF2-40B4-BE49-F238E27FC236}">
-                <a16:creationId xmlns:a16="http://schemas.microsoft.com/office/drawing/2014/main" id="{AB2F65A0-6E52-AA49-895A-2CE0897BF8E3}"/>
-              </a:ext>
-            </a:extLst>
-          </p:cNvPr>
-          <p:cNvSpPr/>
-          <p:nvPr/>
-        </p:nvSpPr>
-        <p:spPr>
-          <a:xfrm>
-            <a:off x="4331157" y="2796415"/>
-            <a:ext cx="289086" cy="317292"/>
-          </a:xfrm>
-          <a:prstGeom prst="snip1Rect">
-            <a:avLst/>
-          </a:prstGeom>
-        </p:spPr>
-        <p:style>
-          <a:lnRef idx="2">
-            <a:schemeClr val="accent6">
-              <a:shade val="50000"/>
-            </a:schemeClr>
-          </a:lnRef>
-          <a:fillRef idx="1">
-            <a:schemeClr val="accent6"/>
-          </a:fillRef>
-          <a:effectRef idx="0">
-            <a:schemeClr val="accent6"/>
-          </a:effectRef>
-          <a:fontRef idx="minor">
-            <a:schemeClr val="lt1"/>
-          </a:fontRef>
-        </p:style>
-        <p:txBody>
-          <a:bodyPr rtlCol="0" anchor="ctr"/>
-          <a:lstStyle/>
-          <a:p>
-            <a:pPr algn="ctr"/>
-            <a:r>
-              <a:rPr lang="en-US" dirty="0"/>
-              <a:t>B</a:t>
-            </a:r>
-          </a:p>
-        </p:txBody>
-      </p:sp>
-      <p:sp>
-        <p:nvSpPr>
-          <p:cNvPr id="33" name="Snip Single Corner Rectangle 32">
-            <a:extLst>
-              <a:ext uri="{FF2B5EF4-FFF2-40B4-BE49-F238E27FC236}">
-                <a16:creationId xmlns:a16="http://schemas.microsoft.com/office/drawing/2014/main" id="{61014A9F-3070-C149-B9F9-246B0EF687E7}"/>
-              </a:ext>
-            </a:extLst>
-          </p:cNvPr>
-          <p:cNvSpPr/>
-          <p:nvPr/>
-        </p:nvSpPr>
-        <p:spPr>
-          <a:xfrm>
-            <a:off x="9046754" y="1174905"/>
-            <a:ext cx="289086" cy="317292"/>
-          </a:xfrm>
-          <a:prstGeom prst="snip1Rect">
-            <a:avLst/>
-          </a:prstGeom>
-        </p:spPr>
-        <p:style>
-          <a:lnRef idx="2">
-            <a:schemeClr val="accent6">
-              <a:shade val="50000"/>
-            </a:schemeClr>
-          </a:lnRef>
-          <a:fillRef idx="1">
-            <a:schemeClr val="accent6"/>
-          </a:fillRef>
-          <a:effectRef idx="0">
-            <a:schemeClr val="accent6"/>
-          </a:effectRef>
-          <a:fontRef idx="minor">
-            <a:schemeClr val="lt1"/>
-          </a:fontRef>
-        </p:style>
-        <p:txBody>
-          <a:bodyPr rtlCol="0" anchor="ctr"/>
-          <a:lstStyle/>
-          <a:p>
-            <a:pPr algn="ctr"/>
-            <a:r>
-              <a:rPr lang="en-US" sz="1200" dirty="0"/>
-              <a:t>B</a:t>
             </a:r>
           </a:p>
         </p:txBody>
@@ -5110,7 +5012,7 @@
         </p:nvSpPr>
         <p:spPr>
           <a:xfrm>
-            <a:off x="9046755" y="1686033"/>
+            <a:off x="9001503" y="1129490"/>
             <a:ext cx="289086" cy="317292"/>
           </a:xfrm>
           <a:prstGeom prst="snip1Rect">
@@ -5159,7 +5061,7 @@
         </p:nvSpPr>
         <p:spPr>
           <a:xfrm>
-            <a:off x="9027193" y="2335678"/>
+            <a:off x="8981941" y="1779135"/>
             <a:ext cx="289086" cy="317292"/>
           </a:xfrm>
           <a:prstGeom prst="snip1Rect">
@@ -5208,7 +5110,7 @@
         </p:nvSpPr>
         <p:spPr>
           <a:xfrm>
-            <a:off x="9288448" y="2295932"/>
+            <a:off x="9243196" y="1739389"/>
             <a:ext cx="1387496" cy="461665"/>
           </a:xfrm>
           <a:prstGeom prst="rect">
@@ -5249,7 +5151,7 @@
         </p:nvSpPr>
         <p:spPr>
           <a:xfrm>
-            <a:off x="9365024" y="1581226"/>
+            <a:off x="9319772" y="1024683"/>
             <a:ext cx="1371466" cy="646331"/>
           </a:xfrm>
           <a:prstGeom prst="rect">
@@ -5276,90 +5178,6 @@
           </a:p>
           <a:p>
             <a:endParaRPr lang="en-US" sz="1200" dirty="0"/>
-          </a:p>
-        </p:txBody>
-      </p:sp>
-      <p:sp>
-        <p:nvSpPr>
-          <p:cNvPr id="39" name="Rectangle 38">
-            <a:extLst>
-              <a:ext uri="{FF2B5EF4-FFF2-40B4-BE49-F238E27FC236}">
-                <a16:creationId xmlns:a16="http://schemas.microsoft.com/office/drawing/2014/main" id="{E348BC35-D858-BF42-A804-51B737E6B742}"/>
-              </a:ext>
-            </a:extLst>
-          </p:cNvPr>
-          <p:cNvSpPr/>
-          <p:nvPr/>
-        </p:nvSpPr>
-        <p:spPr>
-          <a:xfrm>
-            <a:off x="9417861" y="1051186"/>
-            <a:ext cx="2101994" cy="461665"/>
-          </a:xfrm>
-          <a:prstGeom prst="rect">
-            <a:avLst/>
-          </a:prstGeom>
-        </p:spPr>
-        <p:txBody>
-          <a:bodyPr wrap="square">
-            <a:spAutoFit/>
-          </a:bodyPr>
-          <a:lstStyle/>
-          <a:p>
-            <a:r>
-              <a:rPr lang="en-US" sz="1200" dirty="0"/>
-              <a:t>Burner: Raspberry </a:t>
-            </a:r>
-          </a:p>
-          <a:p>
-            <a:r>
-              <a:rPr lang="en-US" sz="1200" dirty="0"/>
-              <a:t>Pi OS with desktop</a:t>
-            </a:r>
-          </a:p>
-        </p:txBody>
-      </p:sp>
-      <p:sp>
-        <p:nvSpPr>
-          <p:cNvPr id="40" name="Left-Right Arrow 39">
-            <a:extLst>
-              <a:ext uri="{FF2B5EF4-FFF2-40B4-BE49-F238E27FC236}">
-                <a16:creationId xmlns:a16="http://schemas.microsoft.com/office/drawing/2014/main" id="{FDE58FAE-100D-3A4B-B3B1-0E315C09E0C3}"/>
-              </a:ext>
-            </a:extLst>
-          </p:cNvPr>
-          <p:cNvSpPr/>
-          <p:nvPr/>
-        </p:nvSpPr>
-        <p:spPr>
-          <a:xfrm>
-            <a:off x="3917855" y="2877750"/>
-            <a:ext cx="434457" cy="158647"/>
-          </a:xfrm>
-          <a:prstGeom prst="leftRightArrow">
-            <a:avLst/>
-          </a:prstGeom>
-        </p:spPr>
-        <p:style>
-          <a:lnRef idx="2">
-            <a:schemeClr val="dk1"/>
-          </a:lnRef>
-          <a:fillRef idx="1">
-            <a:schemeClr val="lt1"/>
-          </a:fillRef>
-          <a:effectRef idx="0">
-            <a:schemeClr val="dk1"/>
-          </a:effectRef>
-          <a:fontRef idx="minor">
-            <a:schemeClr val="dk1"/>
-          </a:fontRef>
-        </p:style>
-        <p:txBody>
-          <a:bodyPr rtlCol="0" anchor="ctr"/>
-          <a:lstStyle/>
-          <a:p>
-            <a:pPr algn="ctr"/>
-            <a:endParaRPr lang="en-US"/>
           </a:p>
         </p:txBody>
       </p:sp>
@@ -6789,104 +6607,6 @@
       </p:sp>
       <p:sp>
         <p:nvSpPr>
-          <p:cNvPr id="32" name="Snip Single Corner Rectangle 31">
-            <a:extLst>
-              <a:ext uri="{FF2B5EF4-FFF2-40B4-BE49-F238E27FC236}">
-                <a16:creationId xmlns:a16="http://schemas.microsoft.com/office/drawing/2014/main" id="{AB2F65A0-6E52-AA49-895A-2CE0897BF8E3}"/>
-              </a:ext>
-            </a:extLst>
-          </p:cNvPr>
-          <p:cNvSpPr/>
-          <p:nvPr/>
-        </p:nvSpPr>
-        <p:spPr>
-          <a:xfrm>
-            <a:off x="4900701" y="2904527"/>
-            <a:ext cx="291655" cy="317292"/>
-          </a:xfrm>
-          <a:prstGeom prst="snip1Rect">
-            <a:avLst/>
-          </a:prstGeom>
-        </p:spPr>
-        <p:style>
-          <a:lnRef idx="2">
-            <a:schemeClr val="accent6">
-              <a:shade val="50000"/>
-            </a:schemeClr>
-          </a:lnRef>
-          <a:fillRef idx="1">
-            <a:schemeClr val="accent6"/>
-          </a:fillRef>
-          <a:effectRef idx="0">
-            <a:schemeClr val="accent6"/>
-          </a:effectRef>
-          <a:fontRef idx="minor">
-            <a:schemeClr val="lt1"/>
-          </a:fontRef>
-        </p:style>
-        <p:txBody>
-          <a:bodyPr rtlCol="0" anchor="ctr"/>
-          <a:lstStyle/>
-          <a:p>
-            <a:pPr algn="ctr"/>
-            <a:r>
-              <a:rPr lang="en-US" dirty="0"/>
-              <a:t>B</a:t>
-            </a:r>
-          </a:p>
-        </p:txBody>
-      </p:sp>
-      <p:sp>
-        <p:nvSpPr>
-          <p:cNvPr id="33" name="Snip Single Corner Rectangle 32">
-            <a:extLst>
-              <a:ext uri="{FF2B5EF4-FFF2-40B4-BE49-F238E27FC236}">
-                <a16:creationId xmlns:a16="http://schemas.microsoft.com/office/drawing/2014/main" id="{61014A9F-3070-C149-B9F9-246B0EF687E7}"/>
-              </a:ext>
-            </a:extLst>
-          </p:cNvPr>
-          <p:cNvSpPr/>
-          <p:nvPr/>
-        </p:nvSpPr>
-        <p:spPr>
-          <a:xfrm>
-            <a:off x="9611734" y="1435474"/>
-            <a:ext cx="291655" cy="317292"/>
-          </a:xfrm>
-          <a:prstGeom prst="snip1Rect">
-            <a:avLst/>
-          </a:prstGeom>
-        </p:spPr>
-        <p:style>
-          <a:lnRef idx="2">
-            <a:schemeClr val="accent6">
-              <a:shade val="50000"/>
-            </a:schemeClr>
-          </a:lnRef>
-          <a:fillRef idx="1">
-            <a:schemeClr val="accent6"/>
-          </a:fillRef>
-          <a:effectRef idx="0">
-            <a:schemeClr val="accent6"/>
-          </a:effectRef>
-          <a:fontRef idx="minor">
-            <a:schemeClr val="lt1"/>
-          </a:fontRef>
-        </p:style>
-        <p:txBody>
-          <a:bodyPr rtlCol="0" anchor="ctr"/>
-          <a:lstStyle/>
-          <a:p>
-            <a:pPr algn="ctr"/>
-            <a:r>
-              <a:rPr lang="en-US" sz="1200" dirty="0"/>
-              <a:t>B</a:t>
-            </a:r>
-          </a:p>
-        </p:txBody>
-      </p:sp>
-      <p:sp>
-        <p:nvSpPr>
           <p:cNvPr id="35" name="Snip Single Corner Rectangle 34">
             <a:extLst>
               <a:ext uri="{FF2B5EF4-FFF2-40B4-BE49-F238E27FC236}">
@@ -6899,7 +6619,7 @@
         </p:nvSpPr>
         <p:spPr>
           <a:xfrm>
-            <a:off x="9611735" y="1986358"/>
+            <a:off x="9559629" y="1466562"/>
             <a:ext cx="291655" cy="317292"/>
           </a:xfrm>
           <a:prstGeom prst="snip1Rect">
@@ -6948,7 +6668,7 @@
         </p:nvSpPr>
         <p:spPr>
           <a:xfrm>
-            <a:off x="9592173" y="2596247"/>
+            <a:off x="9540067" y="2076451"/>
             <a:ext cx="291655" cy="317292"/>
           </a:xfrm>
           <a:prstGeom prst="snip1Rect">
@@ -6997,7 +6717,7 @@
         </p:nvSpPr>
         <p:spPr>
           <a:xfrm>
-            <a:off x="9936208" y="2612437"/>
+            <a:off x="9884102" y="2092641"/>
             <a:ext cx="2010627" cy="461665"/>
           </a:xfrm>
           <a:prstGeom prst="rect">
@@ -7038,7 +6758,7 @@
         </p:nvSpPr>
         <p:spPr>
           <a:xfrm>
-            <a:off x="9910220" y="1964658"/>
+            <a:off x="9858114" y="1444862"/>
             <a:ext cx="1985591" cy="461665"/>
           </a:xfrm>
           <a:prstGeom prst="rect">
@@ -7062,90 +6782,6 @@
               <a:rPr lang="en-US" sz="1200" dirty="0"/>
               <a:t>Pi OS with desktop</a:t>
             </a:r>
-          </a:p>
-        </p:txBody>
-      </p:sp>
-      <p:sp>
-        <p:nvSpPr>
-          <p:cNvPr id="39" name="Rectangle 38">
-            <a:extLst>
-              <a:ext uri="{FF2B5EF4-FFF2-40B4-BE49-F238E27FC236}">
-                <a16:creationId xmlns:a16="http://schemas.microsoft.com/office/drawing/2014/main" id="{E348BC35-D858-BF42-A804-51B737E6B742}"/>
-              </a:ext>
-            </a:extLst>
-          </p:cNvPr>
-          <p:cNvSpPr/>
-          <p:nvPr/>
-        </p:nvSpPr>
-        <p:spPr>
-          <a:xfrm>
-            <a:off x="9956115" y="1419886"/>
-            <a:ext cx="2042827" cy="461665"/>
-          </a:xfrm>
-          <a:prstGeom prst="rect">
-            <a:avLst/>
-          </a:prstGeom>
-        </p:spPr>
-        <p:txBody>
-          <a:bodyPr wrap="square">
-            <a:spAutoFit/>
-          </a:bodyPr>
-          <a:lstStyle/>
-          <a:p>
-            <a:r>
-              <a:rPr lang="en-US" sz="1200" dirty="0"/>
-              <a:t>Burner: Raspberry </a:t>
-            </a:r>
-          </a:p>
-          <a:p>
-            <a:r>
-              <a:rPr lang="en-US" sz="1200" dirty="0"/>
-              <a:t>Pi OS with desktop</a:t>
-            </a:r>
-          </a:p>
-        </p:txBody>
-      </p:sp>
-      <p:sp>
-        <p:nvSpPr>
-          <p:cNvPr id="40" name="Left-Right Arrow 39">
-            <a:extLst>
-              <a:ext uri="{FF2B5EF4-FFF2-40B4-BE49-F238E27FC236}">
-                <a16:creationId xmlns:a16="http://schemas.microsoft.com/office/drawing/2014/main" id="{FDE58FAE-100D-3A4B-B3B1-0E315C09E0C3}"/>
-              </a:ext>
-            </a:extLst>
-          </p:cNvPr>
-          <p:cNvSpPr/>
-          <p:nvPr/>
-        </p:nvSpPr>
-        <p:spPr>
-          <a:xfrm>
-            <a:off x="4448635" y="2994061"/>
-            <a:ext cx="438317" cy="158647"/>
-          </a:xfrm>
-          <a:prstGeom prst="leftRightArrow">
-            <a:avLst/>
-          </a:prstGeom>
-        </p:spPr>
-        <p:style>
-          <a:lnRef idx="2">
-            <a:schemeClr val="dk1"/>
-          </a:lnRef>
-          <a:fillRef idx="1">
-            <a:schemeClr val="lt1"/>
-          </a:fillRef>
-          <a:effectRef idx="0">
-            <a:schemeClr val="dk1"/>
-          </a:effectRef>
-          <a:fontRef idx="minor">
-            <a:schemeClr val="dk1"/>
-          </a:fontRef>
-        </p:style>
-        <p:txBody>
-          <a:bodyPr rtlCol="0" anchor="ctr"/>
-          <a:lstStyle/>
-          <a:p>
-            <a:pPr algn="ctr"/>
-            <a:endParaRPr lang="en-US"/>
           </a:p>
         </p:txBody>
       </p:sp>

</xml_diff>

<commit_message>
add network key diagram
</commit_message>
<xml_diff>
--- a/images/network.pptx
+++ b/images/network.pptx
@@ -6,9 +6,10 @@
   </p:sldMasterIdLst>
   <p:sldIdLst>
     <p:sldId id="256" r:id="rId2"/>
-    <p:sldId id="258" r:id="rId3"/>
-    <p:sldId id="259" r:id="rId4"/>
-    <p:sldId id="257" r:id="rId5"/>
+    <p:sldId id="260" r:id="rId3"/>
+    <p:sldId id="258" r:id="rId4"/>
+    <p:sldId id="259" r:id="rId5"/>
+    <p:sldId id="257" r:id="rId6"/>
   </p:sldIdLst>
   <p:sldSz cx="12192000" cy="6858000"/>
   <p:notesSz cx="6858000" cy="9144000"/>
@@ -244,7 +245,7 @@
           <a:p>
             <a:fld id="{0EC95C33-DAB6-4546-B06D-886B2BAD356F}" type="datetimeFigureOut">
               <a:rPr lang="en-US" smtClean="0"/>
-              <a:t>1/20/21</a:t>
+              <a:t>1/21/21</a:t>
             </a:fld>
             <a:endParaRPr lang="en-US"/>
           </a:p>
@@ -412,7 +413,7 @@
           <a:p>
             <a:fld id="{0EC95C33-DAB6-4546-B06D-886B2BAD356F}" type="datetimeFigureOut">
               <a:rPr lang="en-US" smtClean="0"/>
-              <a:t>1/20/21</a:t>
+              <a:t>1/21/21</a:t>
             </a:fld>
             <a:endParaRPr lang="en-US"/>
           </a:p>
@@ -590,7 +591,7 @@
           <a:p>
             <a:fld id="{0EC95C33-DAB6-4546-B06D-886B2BAD356F}" type="datetimeFigureOut">
               <a:rPr lang="en-US" smtClean="0"/>
-              <a:t>1/20/21</a:t>
+              <a:t>1/21/21</a:t>
             </a:fld>
             <a:endParaRPr lang="en-US"/>
           </a:p>
@@ -758,7 +759,7 @@
           <a:p>
             <a:fld id="{0EC95C33-DAB6-4546-B06D-886B2BAD356F}" type="datetimeFigureOut">
               <a:rPr lang="en-US" smtClean="0"/>
-              <a:t>1/20/21</a:t>
+              <a:t>1/21/21</a:t>
             </a:fld>
             <a:endParaRPr lang="en-US"/>
           </a:p>
@@ -1003,7 +1004,7 @@
           <a:p>
             <a:fld id="{0EC95C33-DAB6-4546-B06D-886B2BAD356F}" type="datetimeFigureOut">
               <a:rPr lang="en-US" smtClean="0"/>
-              <a:t>1/20/21</a:t>
+              <a:t>1/21/21</a:t>
             </a:fld>
             <a:endParaRPr lang="en-US"/>
           </a:p>
@@ -1232,7 +1233,7 @@
           <a:p>
             <a:fld id="{0EC95C33-DAB6-4546-B06D-886B2BAD356F}" type="datetimeFigureOut">
               <a:rPr lang="en-US" smtClean="0"/>
-              <a:t>1/20/21</a:t>
+              <a:t>1/21/21</a:t>
             </a:fld>
             <a:endParaRPr lang="en-US"/>
           </a:p>
@@ -1596,7 +1597,7 @@
           <a:p>
             <a:fld id="{0EC95C33-DAB6-4546-B06D-886B2BAD356F}" type="datetimeFigureOut">
               <a:rPr lang="en-US" smtClean="0"/>
-              <a:t>1/20/21</a:t>
+              <a:t>1/21/21</a:t>
             </a:fld>
             <a:endParaRPr lang="en-US"/>
           </a:p>
@@ -1713,7 +1714,7 @@
           <a:p>
             <a:fld id="{0EC95C33-DAB6-4546-B06D-886B2BAD356F}" type="datetimeFigureOut">
               <a:rPr lang="en-US" smtClean="0"/>
-              <a:t>1/20/21</a:t>
+              <a:t>1/21/21</a:t>
             </a:fld>
             <a:endParaRPr lang="en-US"/>
           </a:p>
@@ -1808,7 +1809,7 @@
           <a:p>
             <a:fld id="{0EC95C33-DAB6-4546-B06D-886B2BAD356F}" type="datetimeFigureOut">
               <a:rPr lang="en-US" smtClean="0"/>
-              <a:t>1/20/21</a:t>
+              <a:t>1/21/21</a:t>
             </a:fld>
             <a:endParaRPr lang="en-US"/>
           </a:p>
@@ -2083,7 +2084,7 @@
           <a:p>
             <a:fld id="{0EC95C33-DAB6-4546-B06D-886B2BAD356F}" type="datetimeFigureOut">
               <a:rPr lang="en-US" smtClean="0"/>
-              <a:t>1/20/21</a:t>
+              <a:t>1/21/21</a:t>
             </a:fld>
             <a:endParaRPr lang="en-US"/>
           </a:p>
@@ -2335,7 +2336,7 @@
           <a:p>
             <a:fld id="{0EC95C33-DAB6-4546-B06D-886B2BAD356F}" type="datetimeFigureOut">
               <a:rPr lang="en-US" smtClean="0"/>
-              <a:t>1/20/21</a:t>
+              <a:t>1/21/21</a:t>
             </a:fld>
             <a:endParaRPr lang="en-US"/>
           </a:p>
@@ -2546,7 +2547,7 @@
           <a:p>
             <a:fld id="{0EC95C33-DAB6-4546-B06D-886B2BAD356F}" type="datetimeFigureOut">
               <a:rPr lang="en-US" smtClean="0"/>
-              <a:t>1/20/21</a:t>
+              <a:t>1/21/21</a:t>
             </a:fld>
             <a:endParaRPr lang="en-US"/>
           </a:p>
@@ -3821,57 +3822,6 @@
       </p:grpSpPr>
       <p:sp>
         <p:nvSpPr>
-          <p:cNvPr id="11" name="Rectangle 10">
-            <a:extLst>
-              <a:ext uri="{FF2B5EF4-FFF2-40B4-BE49-F238E27FC236}">
-                <a16:creationId xmlns:a16="http://schemas.microsoft.com/office/drawing/2014/main" id="{2851BDD0-B270-3F4F-8D74-9313EE86B989}"/>
-              </a:ext>
-            </a:extLst>
-          </p:cNvPr>
-          <p:cNvSpPr/>
-          <p:nvPr/>
-        </p:nvSpPr>
-        <p:spPr>
-          <a:xfrm>
-            <a:off x="296883" y="95003"/>
-            <a:ext cx="11198431" cy="5415148"/>
-          </a:xfrm>
-          <a:prstGeom prst="rect">
-            <a:avLst/>
-          </a:prstGeom>
-          <a:effectLst>
-            <a:outerShdw blurRad="50800" dist="38100" dir="2700000" algn="tl" rotWithShape="0">
-              <a:prstClr val="black">
-                <a:alpha val="40000"/>
-              </a:prstClr>
-            </a:outerShdw>
-          </a:effectLst>
-        </p:spPr>
-        <p:style>
-          <a:lnRef idx="2">
-            <a:schemeClr val="accent6"/>
-          </a:lnRef>
-          <a:fillRef idx="1">
-            <a:schemeClr val="lt1"/>
-          </a:fillRef>
-          <a:effectRef idx="0">
-            <a:schemeClr val="accent6"/>
-          </a:effectRef>
-          <a:fontRef idx="minor">
-            <a:schemeClr val="dk1"/>
-          </a:fontRef>
-        </p:style>
-        <p:txBody>
-          <a:bodyPr rtlCol="0" anchor="ctr"/>
-          <a:lstStyle/>
-          <a:p>
-            <a:pPr algn="ctr"/>
-            <a:endParaRPr lang="en-US" dirty="0"/>
-          </a:p>
-        </p:txBody>
-      </p:sp>
-      <p:sp>
-        <p:nvSpPr>
           <p:cNvPr id="4" name="Rounded Rectangle 3"/>
           <p:cNvSpPr/>
           <p:nvPr/>
@@ -3890,13 +3840,6 @@
               <a:lumOff val="60000"/>
             </a:schemeClr>
           </a:solidFill>
-          <a:effectLst>
-            <a:outerShdw blurRad="50800" dist="38100" dir="2700000" algn="tl" rotWithShape="0">
-              <a:prstClr val="black">
-                <a:alpha val="40000"/>
-              </a:prstClr>
-            </a:outerShdw>
-          </a:effectLst>
         </p:spPr>
         <p:style>
           <a:lnRef idx="2">
@@ -3920,7 +3863,7 @@
           <a:p>
             <a:pPr algn="ctr"/>
             <a:r>
-              <a:rPr lang="en-US">
+              <a:rPr lang="en-US" dirty="0">
                 <a:solidFill>
                   <a:schemeClr val="tx1"/>
                 </a:solidFill>
@@ -3950,13 +3893,6 @@
               <a:lumOff val="60000"/>
             </a:schemeClr>
           </a:solidFill>
-          <a:effectLst>
-            <a:outerShdw blurRad="50800" dist="38100" dir="2700000" algn="tl" rotWithShape="0">
-              <a:prstClr val="black">
-                <a:alpha val="40000"/>
-              </a:prstClr>
-            </a:outerShdw>
-          </a:effectLst>
         </p:spPr>
         <p:style>
           <a:lnRef idx="2">
@@ -4015,13 +3951,6 @@
               <a:lumOff val="60000"/>
             </a:schemeClr>
           </a:solidFill>
-          <a:effectLst>
-            <a:outerShdw blurRad="50800" dist="38100" dir="2700000" algn="tl" rotWithShape="0">
-              <a:prstClr val="black">
-                <a:alpha val="40000"/>
-              </a:prstClr>
-            </a:outerShdw>
-          </a:effectLst>
         </p:spPr>
         <p:style>
           <a:lnRef idx="2">
@@ -4075,13 +4004,6 @@
               <a:lumOff val="60000"/>
             </a:schemeClr>
           </a:solidFill>
-          <a:effectLst>
-            <a:outerShdw blurRad="50800" dist="38100" dir="2700000" algn="tl" rotWithShape="0">
-              <a:prstClr val="black">
-                <a:alpha val="40000"/>
-              </a:prstClr>
-            </a:outerShdw>
-          </a:effectLst>
         </p:spPr>
         <p:style>
           <a:lnRef idx="2">
@@ -4135,13 +4057,6 @@
               <a:lumOff val="60000"/>
             </a:schemeClr>
           </a:solidFill>
-          <a:effectLst>
-            <a:outerShdw blurRad="50800" dist="38100" dir="2700000" algn="tl" rotWithShape="0">
-              <a:prstClr val="black">
-                <a:alpha val="40000"/>
-              </a:prstClr>
-            </a:outerShdw>
-          </a:effectLst>
         </p:spPr>
         <p:style>
           <a:lnRef idx="2">
@@ -4192,13 +4107,6 @@
           <a:solidFill>
             <a:schemeClr val="accent1"/>
           </a:solidFill>
-          <a:effectLst>
-            <a:outerShdw blurRad="50800" dist="38100" dir="2700000" algn="tl" rotWithShape="0">
-              <a:prstClr val="black">
-                <a:alpha val="40000"/>
-              </a:prstClr>
-            </a:outerShdw>
-          </a:effectLst>
         </p:spPr>
         <p:style>
           <a:lnRef idx="2">
@@ -4228,6 +4136,42 @@
           </a:p>
         </p:txBody>
       </p:sp>
+      <p:cxnSp>
+        <p:nvCxnSpPr>
+          <p:cNvPr id="11" name="Straight Arrow Connector 10"/>
+          <p:cNvCxnSpPr>
+            <a:stCxn id="5" idx="2"/>
+          </p:cNvCxnSpPr>
+          <p:nvPr/>
+        </p:nvCxnSpPr>
+        <p:spPr>
+          <a:xfrm>
+            <a:off x="3408712" y="2935186"/>
+            <a:ext cx="0" cy="430233"/>
+          </a:xfrm>
+          <a:prstGeom prst="straightConnector1">
+            <a:avLst/>
+          </a:prstGeom>
+          <a:ln>
+            <a:headEnd type="triangle"/>
+            <a:tailEnd type="triangle"/>
+          </a:ln>
+        </p:spPr>
+        <p:style>
+          <a:lnRef idx="1">
+            <a:schemeClr val="accent1"/>
+          </a:lnRef>
+          <a:fillRef idx="0">
+            <a:schemeClr val="accent1"/>
+          </a:fillRef>
+          <a:effectRef idx="0">
+            <a:schemeClr val="accent1"/>
+          </a:effectRef>
+          <a:fontRef idx="minor">
+            <a:schemeClr val="tx1"/>
+          </a:fontRef>
+        </p:style>
+      </p:cxnSp>
       <p:cxnSp>
         <p:nvCxnSpPr>
           <p:cNvPr id="12" name="Straight Arrow Connector 11"/>
@@ -4372,7 +4316,7 @@
         </p:nvSpPr>
         <p:spPr>
           <a:xfrm>
-            <a:off x="573727" y="246657"/>
+            <a:off x="529441" y="2227614"/>
             <a:ext cx="1360714" cy="707572"/>
           </a:xfrm>
           <a:prstGeom prst="roundRect">
@@ -4384,13 +4328,6 @@
               <a:lumOff val="60000"/>
             </a:schemeClr>
           </a:solidFill>
-          <a:effectLst>
-            <a:outerShdw blurRad="50800" dist="38100" dir="2700000" algn="tl" rotWithShape="0">
-              <a:prstClr val="black">
-                <a:alpha val="40000"/>
-              </a:prstClr>
-            </a:outerShdw>
-          </a:effectLst>
         </p:spPr>
         <p:style>
           <a:lnRef idx="2">
@@ -4419,7 +4356,7 @@
                   <a:schemeClr val="tx1"/>
                 </a:solidFill>
               </a:rPr>
-              <a:t>Internet</a:t>
+              <a:t>Laptop</a:t>
             </a:r>
           </a:p>
         </p:txBody>
@@ -4432,8 +4369,8 @@
         </p:nvSpPr>
         <p:spPr>
           <a:xfrm>
-            <a:off x="525248" y="1379475"/>
-            <a:ext cx="3719558" cy="410934"/>
+            <a:off x="529441" y="1405746"/>
+            <a:ext cx="1360714" cy="410934"/>
           </a:xfrm>
           <a:prstGeom prst="roundRect">
             <a:avLst/>
@@ -4441,13 +4378,6 @@
           <a:solidFill>
             <a:schemeClr val="accent1"/>
           </a:solidFill>
-          <a:effectLst>
-            <a:outerShdw blurRad="50800" dist="38100" dir="2700000" algn="tl" rotWithShape="0">
-              <a:prstClr val="black">
-                <a:alpha val="40000"/>
-              </a:prstClr>
-            </a:outerShdw>
-          </a:effectLst>
         </p:spPr>
         <p:style>
           <a:lnRef idx="2">
@@ -4478,6 +4408,87 @@
           </a:p>
         </p:txBody>
       </p:sp>
+      <p:sp>
+        <p:nvSpPr>
+          <p:cNvPr id="18" name="Rounded Rectangle 17"/>
+          <p:cNvSpPr/>
+          <p:nvPr/>
+        </p:nvSpPr>
+        <p:spPr>
+          <a:xfrm>
+            <a:off x="2728355" y="1405746"/>
+            <a:ext cx="1360714" cy="410934"/>
+          </a:xfrm>
+          <a:prstGeom prst="roundRect">
+            <a:avLst/>
+          </a:prstGeom>
+          <a:solidFill>
+            <a:schemeClr val="accent1"/>
+          </a:solidFill>
+        </p:spPr>
+        <p:style>
+          <a:lnRef idx="2">
+            <a:schemeClr val="accent1">
+              <a:shade val="50000"/>
+            </a:schemeClr>
+          </a:lnRef>
+          <a:fillRef idx="1">
+            <a:schemeClr val="accent1"/>
+          </a:fillRef>
+          <a:effectRef idx="0">
+            <a:schemeClr val="accent1"/>
+          </a:effectRef>
+          <a:fontRef idx="minor">
+            <a:schemeClr val="lt1"/>
+          </a:fontRef>
+        </p:style>
+        <p:txBody>
+          <a:bodyPr rtlCol="0" anchor="ctr"/>
+          <a:lstStyle/>
+          <a:p>
+            <a:pPr algn="ctr"/>
+            <a:r>
+              <a:rPr lang="en-US" dirty="0" err="1"/>
+              <a:t>Wifi</a:t>
+            </a:r>
+            <a:endParaRPr lang="en-US" dirty="0"/>
+          </a:p>
+        </p:txBody>
+      </p:sp>
+      <p:cxnSp>
+        <p:nvCxnSpPr>
+          <p:cNvPr id="19" name="Straight Arrow Connector 18"/>
+          <p:cNvCxnSpPr/>
+          <p:nvPr/>
+        </p:nvCxnSpPr>
+        <p:spPr>
+          <a:xfrm>
+            <a:off x="3419102" y="1797381"/>
+            <a:ext cx="0" cy="430233"/>
+          </a:xfrm>
+          <a:prstGeom prst="straightConnector1">
+            <a:avLst/>
+          </a:prstGeom>
+          <a:ln>
+            <a:headEnd type="triangle"/>
+            <a:tailEnd type="triangle"/>
+          </a:ln>
+        </p:spPr>
+        <p:style>
+          <a:lnRef idx="1">
+            <a:schemeClr val="accent1"/>
+          </a:lnRef>
+          <a:fillRef idx="0">
+            <a:schemeClr val="accent1"/>
+          </a:fillRef>
+          <a:effectRef idx="0">
+            <a:schemeClr val="accent1"/>
+          </a:effectRef>
+          <a:fontRef idx="minor">
+            <a:schemeClr val="tx1"/>
+          </a:fontRef>
+        </p:style>
+      </p:cxnSp>
       <p:cxnSp>
         <p:nvCxnSpPr>
           <p:cNvPr id="20" name="Straight Arrow Connector 19"/>
@@ -4486,7 +4497,7 @@
         </p:nvCxnSpPr>
         <p:spPr>
           <a:xfrm>
-            <a:off x="1209798" y="949242"/>
+            <a:off x="1209798" y="1798743"/>
             <a:ext cx="0" cy="430233"/>
           </a:xfrm>
           <a:prstGeom prst="straightConnector1">
@@ -4649,10 +4660,10 @@
       </p:sp>
       <p:sp>
         <p:nvSpPr>
-          <p:cNvPr id="23" name="Rounded Rectangle 22">
+          <p:cNvPr id="22" name="Heptagon 21">
             <a:extLst>
               <a:ext uri="{FF2B5EF4-FFF2-40B4-BE49-F238E27FC236}">
-                <a16:creationId xmlns:a16="http://schemas.microsoft.com/office/drawing/2014/main" id="{F94134C2-F81E-FF4D-935A-39569E1CB389}"/>
+                <a16:creationId xmlns:a16="http://schemas.microsoft.com/office/drawing/2014/main" id="{B8BF7B89-D088-6C48-B90A-6199AFBFF5A3}"/>
               </a:ext>
             </a:extLst>
           </p:cNvPr>
@@ -4661,40 +4672,25 @@
         </p:nvSpPr>
         <p:spPr>
           <a:xfrm>
-            <a:off x="2738745" y="258532"/>
-            <a:ext cx="1360714" cy="707572"/>
-          </a:xfrm>
-          <a:prstGeom prst="roundRect">
-            <a:avLst/>
-          </a:prstGeom>
-          <a:solidFill>
-            <a:schemeClr val="accent3">
-              <a:lumMod val="40000"/>
-              <a:lumOff val="60000"/>
-            </a:schemeClr>
-          </a:solidFill>
-          <a:effectLst>
-            <a:outerShdw blurRad="50800" dist="38100" dir="2700000" algn="tl" rotWithShape="0">
-              <a:prstClr val="black">
-                <a:alpha val="40000"/>
-              </a:prstClr>
-            </a:outerShdw>
-          </a:effectLst>
+            <a:off x="673162" y="2063816"/>
+            <a:ext cx="271272" cy="270456"/>
+          </a:xfrm>
+          <a:prstGeom prst="heptagon">
+            <a:avLst/>
+          </a:prstGeom>
         </p:spPr>
         <p:style>
-          <a:lnRef idx="2">
-            <a:schemeClr val="accent1">
-              <a:shade val="50000"/>
-            </a:schemeClr>
+          <a:lnRef idx="1">
+            <a:schemeClr val="accent2"/>
           </a:lnRef>
-          <a:fillRef idx="1">
-            <a:schemeClr val="accent1"/>
+          <a:fillRef idx="2">
+            <a:schemeClr val="accent2"/>
           </a:fillRef>
-          <a:effectRef idx="0">
-            <a:schemeClr val="accent1"/>
+          <a:effectRef idx="1">
+            <a:schemeClr val="accent2"/>
           </a:effectRef>
           <a:fontRef idx="minor">
-            <a:schemeClr val="lt1"/>
+            <a:schemeClr val="dk1"/>
           </a:fontRef>
         </p:style>
         <p:txBody>
@@ -4703,62 +4699,18 @@
           <a:p>
             <a:pPr algn="ctr"/>
             <a:r>
-              <a:rPr lang="en-US" dirty="0">
-                <a:solidFill>
-                  <a:schemeClr val="tx1"/>
-                </a:solidFill>
-              </a:rPr>
-              <a:t>Laptop</a:t>
-            </a:r>
-          </a:p>
-        </p:txBody>
-      </p:sp>
-      <p:cxnSp>
-        <p:nvCxnSpPr>
-          <p:cNvPr id="24" name="Straight Arrow Connector 23">
+              <a:rPr lang="en-US" sz="1200" dirty="0"/>
+              <a:t>L</a:t>
+            </a:r>
+          </a:p>
+        </p:txBody>
+      </p:sp>
+      <p:sp>
+        <p:nvSpPr>
+          <p:cNvPr id="26" name="Heptagon 25">
             <a:extLst>
               <a:ext uri="{FF2B5EF4-FFF2-40B4-BE49-F238E27FC236}">
-                <a16:creationId xmlns:a16="http://schemas.microsoft.com/office/drawing/2014/main" id="{78518C1B-A23B-2D4F-BC73-064275EC105A}"/>
-              </a:ext>
-            </a:extLst>
-          </p:cNvPr>
-          <p:cNvCxnSpPr/>
-          <p:nvPr/>
-        </p:nvCxnSpPr>
-        <p:spPr>
-          <a:xfrm>
-            <a:off x="3419102" y="966104"/>
-            <a:ext cx="0" cy="430233"/>
-          </a:xfrm>
-          <a:prstGeom prst="straightConnector1">
-            <a:avLst/>
-          </a:prstGeom>
-          <a:ln>
-            <a:headEnd type="triangle"/>
-            <a:tailEnd type="triangle"/>
-          </a:ln>
-        </p:spPr>
-        <p:style>
-          <a:lnRef idx="1">
-            <a:schemeClr val="accent1"/>
-          </a:lnRef>
-          <a:fillRef idx="0">
-            <a:schemeClr val="accent1"/>
-          </a:fillRef>
-          <a:effectRef idx="0">
-            <a:schemeClr val="accent1"/>
-          </a:effectRef>
-          <a:fontRef idx="minor">
-            <a:schemeClr val="tx1"/>
-          </a:fontRef>
-        </p:style>
-      </p:cxnSp>
-      <p:sp>
-        <p:nvSpPr>
-          <p:cNvPr id="22" name="Snip Single Corner Rectangle 21">
-            <a:extLst>
-              <a:ext uri="{FF2B5EF4-FFF2-40B4-BE49-F238E27FC236}">
-                <a16:creationId xmlns:a16="http://schemas.microsoft.com/office/drawing/2014/main" id="{F8C45667-EB4F-3842-9F2D-FE8769BB9D1D}"/>
+                <a16:creationId xmlns:a16="http://schemas.microsoft.com/office/drawing/2014/main" id="{CF00F712-420A-4440-BD1D-5FB99A1042A7}"/>
               </a:ext>
             </a:extLst>
           </p:cNvPr>
@@ -4767,27 +4719,25 @@
         </p:nvSpPr>
         <p:spPr>
           <a:xfrm>
-            <a:off x="3624959" y="2796415"/>
-            <a:ext cx="289086" cy="317292"/>
-          </a:xfrm>
-          <a:prstGeom prst="snip1Rect">
+            <a:off x="2860713" y="2092386"/>
+            <a:ext cx="271272" cy="270456"/>
+          </a:xfrm>
+          <a:prstGeom prst="heptagon">
             <a:avLst/>
           </a:prstGeom>
         </p:spPr>
         <p:style>
-          <a:lnRef idx="2">
-            <a:schemeClr val="accent4">
-              <a:shade val="50000"/>
-            </a:schemeClr>
+          <a:lnRef idx="1">
+            <a:schemeClr val="accent2"/>
           </a:lnRef>
-          <a:fillRef idx="1">
-            <a:schemeClr val="accent4"/>
+          <a:fillRef idx="2">
+            <a:schemeClr val="accent2"/>
           </a:fillRef>
-          <a:effectRef idx="0">
-            <a:schemeClr val="accent4"/>
+          <a:effectRef idx="1">
+            <a:schemeClr val="accent2"/>
           </a:effectRef>
           <a:fontRef idx="minor">
-            <a:schemeClr val="lt1"/>
+            <a:schemeClr val="dk1"/>
           </a:fontRef>
         </p:style>
         <p:txBody>
@@ -4796,7 +4746,7 @@
           <a:p>
             <a:pPr algn="ctr"/>
             <a:r>
-              <a:rPr lang="en-US" sz="1200" dirty="0"/>
+              <a:rPr lang="en-US" sz="800" dirty="0"/>
               <a:t>M</a:t>
             </a:r>
           </a:p>
@@ -4804,10 +4754,63 @@
       </p:sp>
       <p:sp>
         <p:nvSpPr>
-          <p:cNvPr id="28" name="Snip Single Corner Rectangle 27">
+          <p:cNvPr id="47" name="TextBox 46">
             <a:extLst>
               <a:ext uri="{FF2B5EF4-FFF2-40B4-BE49-F238E27FC236}">
-                <a16:creationId xmlns:a16="http://schemas.microsoft.com/office/drawing/2014/main" id="{376A0602-DB5B-5E40-BE3E-862271695BEF}"/>
+                <a16:creationId xmlns:a16="http://schemas.microsoft.com/office/drawing/2014/main" id="{F68C562C-1EC3-0944-BD1B-212C2B8E5B49}"/>
+              </a:ext>
+            </a:extLst>
+          </p:cNvPr>
+          <p:cNvSpPr txBox="1"/>
+          <p:nvPr/>
+        </p:nvSpPr>
+        <p:spPr>
+          <a:xfrm>
+            <a:off x="1932432" y="2448301"/>
+            <a:ext cx="886589" cy="830997"/>
+          </a:xfrm>
+          <a:prstGeom prst="rect">
+            <a:avLst/>
+          </a:prstGeom>
+          <a:noFill/>
+        </p:spPr>
+        <p:txBody>
+          <a:bodyPr wrap="none" rtlCol="0">
+            <a:spAutoFit/>
+          </a:bodyPr>
+          <a:lstStyle/>
+          <a:p>
+            <a:r>
+              <a:rPr lang="en-US" sz="1200" dirty="0"/>
+              <a:t>SSH</a:t>
+            </a:r>
+          </a:p>
+          <a:p>
+            <a:r>
+              <a:rPr lang="en-US" sz="1200" dirty="0"/>
+              <a:t>Tunnel</a:t>
+            </a:r>
+          </a:p>
+          <a:p>
+            <a:r>
+              <a:rPr lang="en-US" sz="1200" dirty="0"/>
+              <a:t>Via master </a:t>
+            </a:r>
+          </a:p>
+          <a:p>
+            <a:r>
+              <a:rPr lang="en-US" sz="1200" dirty="0"/>
+              <a:t>to workers</a:t>
+            </a:r>
+          </a:p>
+        </p:txBody>
+      </p:sp>
+      <p:sp>
+        <p:nvSpPr>
+          <p:cNvPr id="48" name="Heptagon 47">
+            <a:extLst>
+              <a:ext uri="{FF2B5EF4-FFF2-40B4-BE49-F238E27FC236}">
+                <a16:creationId xmlns:a16="http://schemas.microsoft.com/office/drawing/2014/main" id="{0479A4CB-DE28-AB4A-A9ED-27C2FD82A497}"/>
               </a:ext>
             </a:extLst>
           </p:cNvPr>
@@ -4816,27 +4819,25 @@
         </p:nvSpPr>
         <p:spPr>
           <a:xfrm>
-            <a:off x="3691775" y="4804129"/>
-            <a:ext cx="289086" cy="317292"/>
-          </a:xfrm>
-          <a:prstGeom prst="snip1Rect">
+            <a:off x="3529416" y="4069065"/>
+            <a:ext cx="271272" cy="270456"/>
+          </a:xfrm>
+          <a:prstGeom prst="heptagon">
             <a:avLst/>
           </a:prstGeom>
         </p:spPr>
         <p:style>
-          <a:lnRef idx="2">
-            <a:schemeClr val="accent2">
-              <a:shade val="50000"/>
-            </a:schemeClr>
+          <a:lnRef idx="1">
+            <a:schemeClr val="accent2"/>
           </a:lnRef>
-          <a:fillRef idx="1">
+          <a:fillRef idx="2">
             <a:schemeClr val="accent2"/>
           </a:fillRef>
-          <a:effectRef idx="0">
+          <a:effectRef idx="1">
             <a:schemeClr val="accent2"/>
           </a:effectRef>
           <a:fontRef idx="minor">
-            <a:schemeClr val="lt1"/>
+            <a:schemeClr val="dk1"/>
           </a:fontRef>
         </p:style>
         <p:txBody>
@@ -4845,18 +4846,18 @@
           <a:p>
             <a:pPr algn="ctr"/>
             <a:r>
-              <a:rPr lang="en-US" sz="1200" dirty="0"/>
-              <a:t>W</a:t>
-            </a:r>
-          </a:p>
-        </p:txBody>
-      </p:sp>
-      <p:sp>
-        <p:nvSpPr>
-          <p:cNvPr id="29" name="Snip Single Corner Rectangle 28">
+              <a:rPr lang="en-US" sz="800" dirty="0"/>
+              <a:t>1</a:t>
+            </a:r>
+          </a:p>
+        </p:txBody>
+      </p:sp>
+      <p:sp>
+        <p:nvSpPr>
+          <p:cNvPr id="49" name="Heptagon 48">
             <a:extLst>
               <a:ext uri="{FF2B5EF4-FFF2-40B4-BE49-F238E27FC236}">
-                <a16:creationId xmlns:a16="http://schemas.microsoft.com/office/drawing/2014/main" id="{D8C856D9-17AB-E54D-BE31-7FBCD4A07537}"/>
+                <a16:creationId xmlns:a16="http://schemas.microsoft.com/office/drawing/2014/main" id="{4AA4DFB9-3F66-AA48-B6B1-79A429D7CDC3}"/>
               </a:ext>
             </a:extLst>
           </p:cNvPr>
@@ -4865,27 +4866,25 @@
         </p:nvSpPr>
         <p:spPr>
           <a:xfrm>
-            <a:off x="5311177" y="4804129"/>
-            <a:ext cx="316938" cy="317292"/>
-          </a:xfrm>
-          <a:prstGeom prst="snip1Rect">
+            <a:off x="5200591" y="4075834"/>
+            <a:ext cx="271272" cy="270456"/>
+          </a:xfrm>
+          <a:prstGeom prst="heptagon">
             <a:avLst/>
           </a:prstGeom>
         </p:spPr>
         <p:style>
-          <a:lnRef idx="2">
-            <a:schemeClr val="accent2">
-              <a:shade val="50000"/>
-            </a:schemeClr>
+          <a:lnRef idx="1">
+            <a:schemeClr val="accent2"/>
           </a:lnRef>
-          <a:fillRef idx="1">
+          <a:fillRef idx="2">
             <a:schemeClr val="accent2"/>
           </a:fillRef>
-          <a:effectRef idx="0">
+          <a:effectRef idx="1">
             <a:schemeClr val="accent2"/>
           </a:effectRef>
           <a:fontRef idx="minor">
-            <a:schemeClr val="lt1"/>
+            <a:schemeClr val="dk1"/>
           </a:fontRef>
         </p:style>
         <p:txBody>
@@ -4894,18 +4893,18 @@
           <a:p>
             <a:pPr algn="ctr"/>
             <a:r>
-              <a:rPr lang="en-US" sz="1200" dirty="0"/>
-              <a:t>W</a:t>
-            </a:r>
-          </a:p>
-        </p:txBody>
-      </p:sp>
-      <p:sp>
-        <p:nvSpPr>
-          <p:cNvPr id="30" name="Snip Single Corner Rectangle 29">
+              <a:rPr lang="en-US" sz="800" dirty="0"/>
+              <a:t>2</a:t>
+            </a:r>
+          </a:p>
+        </p:txBody>
+      </p:sp>
+      <p:sp>
+        <p:nvSpPr>
+          <p:cNvPr id="50" name="Heptagon 49">
             <a:extLst>
               <a:ext uri="{FF2B5EF4-FFF2-40B4-BE49-F238E27FC236}">
-                <a16:creationId xmlns:a16="http://schemas.microsoft.com/office/drawing/2014/main" id="{28F08A7F-B052-A542-80B3-9D0D27EC5955}"/>
+                <a16:creationId xmlns:a16="http://schemas.microsoft.com/office/drawing/2014/main" id="{6D61E18B-0FF9-CE4E-9F2C-0971A12A293C}"/>
               </a:ext>
             </a:extLst>
           </p:cNvPr>
@@ -4914,27 +4913,25 @@
         </p:nvSpPr>
         <p:spPr>
           <a:xfrm>
-            <a:off x="6899178" y="4804129"/>
-            <a:ext cx="289086" cy="317292"/>
-          </a:xfrm>
-          <a:prstGeom prst="snip1Rect">
+            <a:off x="6845325" y="4069065"/>
+            <a:ext cx="271272" cy="270456"/>
+          </a:xfrm>
+          <a:prstGeom prst="heptagon">
             <a:avLst/>
           </a:prstGeom>
         </p:spPr>
         <p:style>
-          <a:lnRef idx="2">
-            <a:schemeClr val="accent2">
-              <a:shade val="50000"/>
-            </a:schemeClr>
+          <a:lnRef idx="1">
+            <a:schemeClr val="accent2"/>
           </a:lnRef>
-          <a:fillRef idx="1">
+          <a:fillRef idx="2">
             <a:schemeClr val="accent2"/>
           </a:fillRef>
-          <a:effectRef idx="0">
+          <a:effectRef idx="1">
             <a:schemeClr val="accent2"/>
           </a:effectRef>
           <a:fontRef idx="minor">
-            <a:schemeClr val="lt1"/>
+            <a:schemeClr val="dk1"/>
           </a:fontRef>
         </p:style>
         <p:txBody>
@@ -4943,18 +4940,18 @@
           <a:p>
             <a:pPr algn="ctr"/>
             <a:r>
-              <a:rPr lang="en-US" sz="1200" dirty="0"/>
-              <a:t>W</a:t>
-            </a:r>
-          </a:p>
-        </p:txBody>
-      </p:sp>
-      <p:sp>
-        <p:nvSpPr>
-          <p:cNvPr id="31" name="Snip Single Corner Rectangle 30">
+              <a:rPr lang="en-US" sz="800" dirty="0"/>
+              <a:t>3</a:t>
+            </a:r>
+          </a:p>
+        </p:txBody>
+      </p:sp>
+      <p:sp>
+        <p:nvSpPr>
+          <p:cNvPr id="51" name="Heptagon 50">
             <a:extLst>
               <a:ext uri="{FF2B5EF4-FFF2-40B4-BE49-F238E27FC236}">
-                <a16:creationId xmlns:a16="http://schemas.microsoft.com/office/drawing/2014/main" id="{F1E362E6-1F53-9644-9976-F35F2A2F16C5}"/>
+                <a16:creationId xmlns:a16="http://schemas.microsoft.com/office/drawing/2014/main" id="{50943DFB-0EE8-5E4B-A06D-CF5330D9B6AF}"/>
               </a:ext>
             </a:extLst>
           </p:cNvPr>
@@ -4963,27 +4960,25 @@
         </p:nvSpPr>
         <p:spPr>
           <a:xfrm>
-            <a:off x="8519495" y="4804129"/>
-            <a:ext cx="289086" cy="317292"/>
-          </a:xfrm>
-          <a:prstGeom prst="snip1Rect">
+            <a:off x="8400010" y="4069065"/>
+            <a:ext cx="271272" cy="270456"/>
+          </a:xfrm>
+          <a:prstGeom prst="heptagon">
             <a:avLst/>
           </a:prstGeom>
         </p:spPr>
         <p:style>
-          <a:lnRef idx="2">
-            <a:schemeClr val="accent2">
-              <a:shade val="50000"/>
-            </a:schemeClr>
+          <a:lnRef idx="1">
+            <a:schemeClr val="accent2"/>
           </a:lnRef>
-          <a:fillRef idx="1">
+          <a:fillRef idx="2">
             <a:schemeClr val="accent2"/>
           </a:fillRef>
-          <a:effectRef idx="0">
+          <a:effectRef idx="1">
             <a:schemeClr val="accent2"/>
           </a:effectRef>
           <a:fontRef idx="minor">
-            <a:schemeClr val="lt1"/>
+            <a:schemeClr val="dk1"/>
           </a:fontRef>
         </p:style>
         <p:txBody>
@@ -4992,18 +4987,18 @@
           <a:p>
             <a:pPr algn="ctr"/>
             <a:r>
-              <a:rPr lang="en-US" sz="1200" dirty="0"/>
-              <a:t>W</a:t>
-            </a:r>
-          </a:p>
-        </p:txBody>
-      </p:sp>
-      <p:sp>
-        <p:nvSpPr>
-          <p:cNvPr id="35" name="Snip Single Corner Rectangle 34">
+              <a:rPr lang="en-US" sz="800" dirty="0"/>
+              <a:t>4</a:t>
+            </a:r>
+          </a:p>
+        </p:txBody>
+      </p:sp>
+      <p:sp>
+        <p:nvSpPr>
+          <p:cNvPr id="52" name="Round Same Side Corner Rectangle 51">
             <a:extLst>
               <a:ext uri="{FF2B5EF4-FFF2-40B4-BE49-F238E27FC236}">
-                <a16:creationId xmlns:a16="http://schemas.microsoft.com/office/drawing/2014/main" id="{E83815B2-5932-D94A-AFFB-6C2073CAEE4C}"/>
+                <a16:creationId xmlns:a16="http://schemas.microsoft.com/office/drawing/2014/main" id="{C4CE2462-D98E-7F48-9CA9-20D49C850016}"/>
               </a:ext>
             </a:extLst>
           </p:cNvPr>
@@ -5012,27 +5007,25 @@
         </p:nvSpPr>
         <p:spPr>
           <a:xfrm>
-            <a:off x="9001503" y="1129490"/>
-            <a:ext cx="289086" cy="317292"/>
-          </a:xfrm>
-          <a:prstGeom prst="snip1Rect">
+            <a:off x="3482649" y="4769752"/>
+            <a:ext cx="532483" cy="948468"/>
+          </a:xfrm>
+          <a:prstGeom prst="round2SameRect">
             <a:avLst/>
           </a:prstGeom>
         </p:spPr>
         <p:style>
-          <a:lnRef idx="2">
-            <a:schemeClr val="accent4">
-              <a:shade val="50000"/>
-            </a:schemeClr>
+          <a:lnRef idx="1">
+            <a:schemeClr val="accent6"/>
           </a:lnRef>
-          <a:fillRef idx="1">
-            <a:schemeClr val="accent4"/>
+          <a:fillRef idx="2">
+            <a:schemeClr val="accent6"/>
           </a:fillRef>
-          <a:effectRef idx="0">
-            <a:schemeClr val="accent4"/>
+          <a:effectRef idx="1">
+            <a:schemeClr val="accent6"/>
           </a:effectRef>
           <a:fontRef idx="minor">
-            <a:schemeClr val="lt1"/>
+            <a:schemeClr val="dk1"/>
           </a:fontRef>
         </p:style>
         <p:txBody>
@@ -5041,18 +5034,53 @@
           <a:p>
             <a:pPr algn="ctr"/>
             <a:r>
-              <a:rPr lang="en-US" sz="1200" dirty="0"/>
-              <a:t>M</a:t>
-            </a:r>
-          </a:p>
-        </p:txBody>
-      </p:sp>
-      <p:sp>
-        <p:nvSpPr>
-          <p:cNvPr id="36" name="Snip Single Corner Rectangle 35">
+              <a:rPr lang="en-US" sz="800" dirty="0"/>
+              <a:t>MP</a:t>
+            </a:r>
+          </a:p>
+          <a:p>
+            <a:pPr algn="ctr"/>
+            <a:r>
+              <a:rPr lang="en-US" sz="800" dirty="0"/>
+              <a:t>LP</a:t>
+            </a:r>
+          </a:p>
+          <a:p>
+            <a:pPr algn="ctr"/>
+            <a:r>
+              <a:rPr lang="en-US" sz="800" dirty="0"/>
+              <a:t>1P</a:t>
+            </a:r>
+          </a:p>
+          <a:p>
+            <a:pPr algn="ctr"/>
+            <a:r>
+              <a:rPr lang="en-US" sz="800" dirty="0"/>
+              <a:t>2P</a:t>
+            </a:r>
+          </a:p>
+          <a:p>
+            <a:pPr algn="ctr"/>
+            <a:r>
+              <a:rPr lang="en-US" sz="800" dirty="0"/>
+              <a:t>3P</a:t>
+            </a:r>
+          </a:p>
+          <a:p>
+            <a:pPr algn="ctr"/>
+            <a:r>
+              <a:rPr lang="en-US" sz="800" dirty="0"/>
+              <a:t>4P</a:t>
+            </a:r>
+          </a:p>
+        </p:txBody>
+      </p:sp>
+      <p:sp>
+        <p:nvSpPr>
+          <p:cNvPr id="53" name="Round Same Side Corner Rectangle 52">
             <a:extLst>
               <a:ext uri="{FF2B5EF4-FFF2-40B4-BE49-F238E27FC236}">
-                <a16:creationId xmlns:a16="http://schemas.microsoft.com/office/drawing/2014/main" id="{FBE39F69-4280-4049-AA21-3D4DC4E27573}"/>
+                <a16:creationId xmlns:a16="http://schemas.microsoft.com/office/drawing/2014/main" id="{31203198-E9B9-2C48-AAFD-B69279889E7F}"/>
               </a:ext>
             </a:extLst>
           </p:cNvPr>
@@ -5061,27 +5089,25 @@
         </p:nvSpPr>
         <p:spPr>
           <a:xfrm>
-            <a:off x="8981941" y="1779135"/>
-            <a:ext cx="289086" cy="317292"/>
-          </a:xfrm>
-          <a:prstGeom prst="snip1Rect">
+            <a:off x="5103568" y="4769753"/>
+            <a:ext cx="532483" cy="948468"/>
+          </a:xfrm>
+          <a:prstGeom prst="round2SameRect">
             <a:avLst/>
           </a:prstGeom>
         </p:spPr>
         <p:style>
-          <a:lnRef idx="2">
-            <a:schemeClr val="accent2">
-              <a:shade val="50000"/>
-            </a:schemeClr>
+          <a:lnRef idx="1">
+            <a:schemeClr val="accent6"/>
           </a:lnRef>
-          <a:fillRef idx="1">
-            <a:schemeClr val="accent2"/>
+          <a:fillRef idx="2">
+            <a:schemeClr val="accent6"/>
           </a:fillRef>
-          <a:effectRef idx="0">
-            <a:schemeClr val="accent2"/>
+          <a:effectRef idx="1">
+            <a:schemeClr val="accent6"/>
           </a:effectRef>
           <a:fontRef idx="minor">
-            <a:schemeClr val="lt1"/>
+            <a:schemeClr val="dk1"/>
           </a:fontRef>
         </p:style>
         <p:txBody>
@@ -5090,103 +5116,53 @@
           <a:p>
             <a:pPr algn="ctr"/>
             <a:r>
-              <a:rPr lang="en-US" sz="1200" dirty="0"/>
-              <a:t>W</a:t>
-            </a:r>
-          </a:p>
-        </p:txBody>
-      </p:sp>
-      <p:sp>
-        <p:nvSpPr>
-          <p:cNvPr id="37" name="TextBox 36">
+              <a:rPr lang="en-US" sz="800" dirty="0"/>
+              <a:t>MP</a:t>
+            </a:r>
+          </a:p>
+          <a:p>
+            <a:pPr algn="ctr"/>
+            <a:r>
+              <a:rPr lang="en-US" sz="800" dirty="0"/>
+              <a:t>LP</a:t>
+            </a:r>
+          </a:p>
+          <a:p>
+            <a:pPr algn="ctr"/>
+            <a:r>
+              <a:rPr lang="en-US" sz="800" dirty="0"/>
+              <a:t>1P</a:t>
+            </a:r>
+          </a:p>
+          <a:p>
+            <a:pPr algn="ctr"/>
+            <a:r>
+              <a:rPr lang="en-US" sz="800" dirty="0"/>
+              <a:t>2P</a:t>
+            </a:r>
+          </a:p>
+          <a:p>
+            <a:pPr algn="ctr"/>
+            <a:r>
+              <a:rPr lang="en-US" sz="800" dirty="0"/>
+              <a:t>3P</a:t>
+            </a:r>
+          </a:p>
+          <a:p>
+            <a:pPr algn="ctr"/>
+            <a:r>
+              <a:rPr lang="en-US" sz="800" dirty="0"/>
+              <a:t>4P</a:t>
+            </a:r>
+          </a:p>
+        </p:txBody>
+      </p:sp>
+      <p:sp>
+        <p:nvSpPr>
+          <p:cNvPr id="54" name="Round Same Side Corner Rectangle 53">
             <a:extLst>
               <a:ext uri="{FF2B5EF4-FFF2-40B4-BE49-F238E27FC236}">
-                <a16:creationId xmlns:a16="http://schemas.microsoft.com/office/drawing/2014/main" id="{CBDAB471-40AB-0742-9274-9A0650CE2224}"/>
-              </a:ext>
-            </a:extLst>
-          </p:cNvPr>
-          <p:cNvSpPr txBox="1"/>
-          <p:nvPr/>
-        </p:nvSpPr>
-        <p:spPr>
-          <a:xfrm>
-            <a:off x="9243196" y="1739389"/>
-            <a:ext cx="1387496" cy="461665"/>
-          </a:xfrm>
-          <a:prstGeom prst="rect">
-            <a:avLst/>
-          </a:prstGeom>
-          <a:noFill/>
-        </p:spPr>
-        <p:txBody>
-          <a:bodyPr wrap="none" rtlCol="0">
-            <a:spAutoFit/>
-          </a:bodyPr>
-          <a:lstStyle/>
-          <a:p>
-            <a:r>
-              <a:rPr lang="en-US" sz="1200" dirty="0"/>
-              <a:t>Worker: Raspberry </a:t>
-            </a:r>
-          </a:p>
-          <a:p>
-            <a:r>
-              <a:rPr lang="en-US" sz="1200" dirty="0"/>
-              <a:t>Pi OS Lite</a:t>
-            </a:r>
-          </a:p>
-        </p:txBody>
-      </p:sp>
-      <p:sp>
-        <p:nvSpPr>
-          <p:cNvPr id="38" name="TextBox 37">
-            <a:extLst>
-              <a:ext uri="{FF2B5EF4-FFF2-40B4-BE49-F238E27FC236}">
-                <a16:creationId xmlns:a16="http://schemas.microsoft.com/office/drawing/2014/main" id="{15E9E79F-3DB7-734C-806E-340CB02B5120}"/>
-              </a:ext>
-            </a:extLst>
-          </p:cNvPr>
-          <p:cNvSpPr txBox="1"/>
-          <p:nvPr/>
-        </p:nvSpPr>
-        <p:spPr>
-          <a:xfrm>
-            <a:off x="9319772" y="1024683"/>
-            <a:ext cx="1371466" cy="646331"/>
-          </a:xfrm>
-          <a:prstGeom prst="rect">
-            <a:avLst/>
-          </a:prstGeom>
-          <a:noFill/>
-        </p:spPr>
-        <p:txBody>
-          <a:bodyPr wrap="none" rtlCol="0">
-            <a:spAutoFit/>
-          </a:bodyPr>
-          <a:lstStyle/>
-          <a:p>
-            <a:r>
-              <a:rPr lang="en-US" sz="1200" dirty="0"/>
-              <a:t>Master: Raspberry </a:t>
-            </a:r>
-          </a:p>
-          <a:p>
-            <a:r>
-              <a:rPr lang="en-US" sz="1200" dirty="0"/>
-              <a:t>Pi OS with desktop</a:t>
-            </a:r>
-          </a:p>
-          <a:p>
-            <a:endParaRPr lang="en-US" sz="1200" dirty="0"/>
-          </a:p>
-        </p:txBody>
-      </p:sp>
-      <p:sp>
-        <p:nvSpPr>
-          <p:cNvPr id="43" name="Up-Down Arrow 42">
-            <a:extLst>
-              <a:ext uri="{FF2B5EF4-FFF2-40B4-BE49-F238E27FC236}">
-                <a16:creationId xmlns:a16="http://schemas.microsoft.com/office/drawing/2014/main" id="{A7CD07C8-77ED-0248-BCED-A556A5F91A2A}"/>
+                <a16:creationId xmlns:a16="http://schemas.microsoft.com/office/drawing/2014/main" id="{3430045E-0A6A-8143-B44A-93BF6231C652}"/>
               </a:ext>
             </a:extLst>
           </p:cNvPr>
@@ -5195,27 +5171,25 @@
         </p:nvSpPr>
         <p:spPr>
           <a:xfrm>
-            <a:off x="3281968" y="2945218"/>
-            <a:ext cx="274268" cy="423156"/>
-          </a:xfrm>
-          <a:prstGeom prst="upDownArrow">
+            <a:off x="6707727" y="4769752"/>
+            <a:ext cx="532483" cy="948468"/>
+          </a:xfrm>
+          <a:prstGeom prst="round2SameRect">
             <a:avLst/>
           </a:prstGeom>
         </p:spPr>
         <p:style>
-          <a:lnRef idx="2">
-            <a:schemeClr val="accent1">
-              <a:shade val="50000"/>
-            </a:schemeClr>
+          <a:lnRef idx="1">
+            <a:schemeClr val="accent6"/>
           </a:lnRef>
-          <a:fillRef idx="1">
-            <a:schemeClr val="accent1"/>
+          <a:fillRef idx="2">
+            <a:schemeClr val="accent6"/>
           </a:fillRef>
-          <a:effectRef idx="0">
-            <a:schemeClr val="accent1"/>
+          <a:effectRef idx="1">
+            <a:schemeClr val="accent6"/>
           </a:effectRef>
           <a:fontRef idx="minor">
-            <a:schemeClr val="lt1"/>
+            <a:schemeClr val="dk1"/>
           </a:fontRef>
         </p:style>
         <p:txBody>
@@ -5223,16 +5197,54 @@
           <a:lstStyle/>
           <a:p>
             <a:pPr algn="ctr"/>
-            <a:endParaRPr lang="en-US" dirty="0"/>
-          </a:p>
-        </p:txBody>
-      </p:sp>
-      <p:sp>
-        <p:nvSpPr>
-          <p:cNvPr id="44" name="Up-Down Arrow 43">
+            <a:r>
+              <a:rPr lang="en-US" sz="800" dirty="0"/>
+              <a:t>MP</a:t>
+            </a:r>
+          </a:p>
+          <a:p>
+            <a:pPr algn="ctr"/>
+            <a:r>
+              <a:rPr lang="en-US" sz="800" dirty="0"/>
+              <a:t>LP</a:t>
+            </a:r>
+          </a:p>
+          <a:p>
+            <a:pPr algn="ctr"/>
+            <a:r>
+              <a:rPr lang="en-US" sz="800" dirty="0"/>
+              <a:t>1P</a:t>
+            </a:r>
+          </a:p>
+          <a:p>
+            <a:pPr algn="ctr"/>
+            <a:r>
+              <a:rPr lang="en-US" sz="800" dirty="0"/>
+              <a:t>2P</a:t>
+            </a:r>
+          </a:p>
+          <a:p>
+            <a:pPr algn="ctr"/>
+            <a:r>
+              <a:rPr lang="en-US" sz="800" dirty="0"/>
+              <a:t>3P</a:t>
+            </a:r>
+          </a:p>
+          <a:p>
+            <a:pPr algn="ctr"/>
+            <a:r>
+              <a:rPr lang="en-US" sz="800" dirty="0"/>
+              <a:t>4P</a:t>
+            </a:r>
+          </a:p>
+        </p:txBody>
+      </p:sp>
+      <p:sp>
+        <p:nvSpPr>
+          <p:cNvPr id="55" name="Round Same Side Corner Rectangle 54">
             <a:extLst>
               <a:ext uri="{FF2B5EF4-FFF2-40B4-BE49-F238E27FC236}">
-                <a16:creationId xmlns:a16="http://schemas.microsoft.com/office/drawing/2014/main" id="{897FF324-6238-B747-B1F6-76EE920FDAB7}"/>
+                <a16:creationId xmlns:a16="http://schemas.microsoft.com/office/drawing/2014/main" id="{EA34F413-278C-C34E-99DD-0705DB6FFADF}"/>
               </a:ext>
             </a:extLst>
           </p:cNvPr>
@@ -5241,27 +5253,25 @@
         </p:nvSpPr>
         <p:spPr>
           <a:xfrm>
-            <a:off x="3281968" y="1802213"/>
-            <a:ext cx="274268" cy="423156"/>
-          </a:xfrm>
-          <a:prstGeom prst="upDownArrow">
+            <a:off x="8295162" y="4769752"/>
+            <a:ext cx="532483" cy="948468"/>
+          </a:xfrm>
+          <a:prstGeom prst="round2SameRect">
             <a:avLst/>
           </a:prstGeom>
         </p:spPr>
         <p:style>
-          <a:lnRef idx="2">
-            <a:schemeClr val="accent1">
-              <a:shade val="50000"/>
-            </a:schemeClr>
+          <a:lnRef idx="1">
+            <a:schemeClr val="accent6"/>
           </a:lnRef>
-          <a:fillRef idx="1">
-            <a:schemeClr val="accent1"/>
+          <a:fillRef idx="2">
+            <a:schemeClr val="accent6"/>
           </a:fillRef>
-          <a:effectRef idx="0">
-            <a:schemeClr val="accent1"/>
+          <a:effectRef idx="1">
+            <a:schemeClr val="accent6"/>
           </a:effectRef>
           <a:fontRef idx="minor">
-            <a:schemeClr val="lt1"/>
+            <a:schemeClr val="dk1"/>
           </a:fontRef>
         </p:style>
         <p:txBody>
@@ -5269,111 +5279,91 @@
           <a:lstStyle/>
           <a:p>
             <a:pPr algn="ctr"/>
-            <a:endParaRPr lang="en-US" dirty="0"/>
-          </a:p>
-        </p:txBody>
-      </p:sp>
-      <p:sp>
-        <p:nvSpPr>
-          <p:cNvPr id="45" name="TextBox 44">
+            <a:r>
+              <a:rPr lang="en-US" sz="800" dirty="0"/>
+              <a:t>MP</a:t>
+            </a:r>
+          </a:p>
+          <a:p>
+            <a:pPr algn="ctr"/>
+            <a:r>
+              <a:rPr lang="en-US" sz="800" dirty="0"/>
+              <a:t>LP</a:t>
+            </a:r>
+          </a:p>
+          <a:p>
+            <a:pPr algn="ctr"/>
+            <a:r>
+              <a:rPr lang="en-US" sz="800" dirty="0"/>
+              <a:t>1P</a:t>
+            </a:r>
+          </a:p>
+          <a:p>
+            <a:pPr algn="ctr"/>
+            <a:r>
+              <a:rPr lang="en-US" sz="800" dirty="0"/>
+              <a:t>2P</a:t>
+            </a:r>
+          </a:p>
+          <a:p>
+            <a:pPr algn="ctr"/>
+            <a:r>
+              <a:rPr lang="en-US" sz="800" dirty="0"/>
+              <a:t>3P</a:t>
+            </a:r>
+          </a:p>
+          <a:p>
+            <a:pPr algn="ctr"/>
+            <a:r>
+              <a:rPr lang="en-US" sz="800" dirty="0"/>
+              <a:t>4P</a:t>
+            </a:r>
+          </a:p>
+        </p:txBody>
+      </p:sp>
+      <p:sp>
+        <p:nvSpPr>
+          <p:cNvPr id="56" name="Round Same Side Corner Rectangle 55">
             <a:extLst>
               <a:ext uri="{FF2B5EF4-FFF2-40B4-BE49-F238E27FC236}">
-                <a16:creationId xmlns:a16="http://schemas.microsoft.com/office/drawing/2014/main" id="{CE1AA2E9-923F-7948-8F65-4E1C4D245D18}"/>
+                <a16:creationId xmlns:a16="http://schemas.microsoft.com/office/drawing/2014/main" id="{B8D85B70-23B7-F548-B905-EF0A29DFB88D}"/>
               </a:ext>
             </a:extLst>
           </p:cNvPr>
-          <p:cNvSpPr txBox="1"/>
-          <p:nvPr/>
-        </p:nvSpPr>
-        <p:spPr>
-          <a:xfrm>
-            <a:off x="2471318" y="1841278"/>
-            <a:ext cx="787075" cy="369332"/>
-          </a:xfrm>
-          <a:prstGeom prst="rect">
-            <a:avLst/>
-          </a:prstGeom>
-          <a:noFill/>
-        </p:spPr>
-        <p:txBody>
-          <a:bodyPr wrap="none" rtlCol="0">
-            <a:spAutoFit/>
-          </a:bodyPr>
-          <a:lstStyle/>
-          <a:p>
-            <a:r>
-              <a:rPr lang="en-US" dirty="0"/>
-              <a:t>Bridge</a:t>
-            </a:r>
-          </a:p>
-        </p:txBody>
-      </p:sp>
-      <p:sp>
-        <p:nvSpPr>
-          <p:cNvPr id="46" name="TextBox 45">
-            <a:extLst>
-              <a:ext uri="{FF2B5EF4-FFF2-40B4-BE49-F238E27FC236}">
-                <a16:creationId xmlns:a16="http://schemas.microsoft.com/office/drawing/2014/main" id="{105CEA48-D7C4-7E4C-8587-F9B06D886391}"/>
-              </a:ext>
-            </a:extLst>
-          </p:cNvPr>
-          <p:cNvSpPr txBox="1"/>
-          <p:nvPr/>
-        </p:nvSpPr>
-        <p:spPr>
-          <a:xfrm>
-            <a:off x="2471318" y="2894876"/>
-            <a:ext cx="787075" cy="369332"/>
-          </a:xfrm>
-          <a:prstGeom prst="rect">
-            <a:avLst/>
-          </a:prstGeom>
-          <a:noFill/>
-        </p:spPr>
-        <p:txBody>
-          <a:bodyPr wrap="none" rtlCol="0">
-            <a:spAutoFit/>
-          </a:bodyPr>
-          <a:lstStyle/>
-          <a:p>
-            <a:r>
-              <a:rPr lang="en-US" dirty="0"/>
-              <a:t>Bridge</a:t>
-            </a:r>
-          </a:p>
-        </p:txBody>
-      </p:sp>
-      <p:sp>
-        <p:nvSpPr>
-          <p:cNvPr id="18" name="TextBox 17">
-            <a:extLst>
-              <a:ext uri="{FF2B5EF4-FFF2-40B4-BE49-F238E27FC236}">
-                <a16:creationId xmlns:a16="http://schemas.microsoft.com/office/drawing/2014/main" id="{4F2A31F8-5896-F94E-B08E-DC3F6F4D92AF}"/>
-              </a:ext>
-            </a:extLst>
-          </p:cNvPr>
-          <p:cNvSpPr txBox="1"/>
-          <p:nvPr/>
-        </p:nvSpPr>
-        <p:spPr>
-          <a:xfrm>
-            <a:off x="8901546" y="577227"/>
-            <a:ext cx="1008674" cy="369332"/>
-          </a:xfrm>
-          <a:prstGeom prst="rect">
-            <a:avLst/>
-          </a:prstGeom>
-          <a:noFill/>
-        </p:spPr>
-        <p:txBody>
-          <a:bodyPr wrap="none" rtlCol="0">
-            <a:spAutoFit/>
-          </a:bodyPr>
-          <a:lstStyle/>
-          <a:p>
-            <a:r>
-              <a:rPr lang="en-US" dirty="0"/>
-              <a:t>SD Cards</a:t>
+          <p:cNvSpPr/>
+          <p:nvPr/>
+        </p:nvSpPr>
+        <p:spPr>
+          <a:xfrm>
+            <a:off x="3482649" y="2781980"/>
+            <a:ext cx="532483" cy="410935"/>
+          </a:xfrm>
+          <a:prstGeom prst="round2SameRect">
+            <a:avLst/>
+          </a:prstGeom>
+        </p:spPr>
+        <p:style>
+          <a:lnRef idx="1">
+            <a:schemeClr val="accent6"/>
+          </a:lnRef>
+          <a:fillRef idx="2">
+            <a:schemeClr val="accent6"/>
+          </a:fillRef>
+          <a:effectRef idx="1">
+            <a:schemeClr val="accent6"/>
+          </a:effectRef>
+          <a:fontRef idx="minor">
+            <a:schemeClr val="dk1"/>
+          </a:fontRef>
+        </p:style>
+        <p:txBody>
+          <a:bodyPr rtlCol="0" anchor="ctr"/>
+          <a:lstStyle/>
+          <a:p>
+            <a:pPr algn="ctr"/>
+            <a:r>
+              <a:rPr lang="en-US" sz="800" dirty="0"/>
+              <a:t>LP</a:t>
             </a:r>
           </a:p>
         </p:txBody>
@@ -5381,7 +5371,7 @@
     </p:spTree>
     <p:extLst>
       <p:ext uri="{BB962C8B-B14F-4D97-AF65-F5344CB8AC3E}">
-        <p14:creationId xmlns:p14="http://schemas.microsoft.com/office/powerpoint/2010/main" val="837495575"/>
+        <p14:creationId xmlns:p14="http://schemas.microsoft.com/office/powerpoint/2010/main" val="3474944330"/>
       </p:ext>
     </p:extLst>
   </p:cSld>
@@ -5410,10 +5400,10 @@
       </p:grpSpPr>
       <p:sp>
         <p:nvSpPr>
-          <p:cNvPr id="41" name="Rectangle 40">
+          <p:cNvPr id="11" name="Rectangle 10">
             <a:extLst>
               <a:ext uri="{FF2B5EF4-FFF2-40B4-BE49-F238E27FC236}">
-                <a16:creationId xmlns:a16="http://schemas.microsoft.com/office/drawing/2014/main" id="{22ECFE8D-4994-8344-B69C-E368B9F752AD}"/>
+                <a16:creationId xmlns:a16="http://schemas.microsoft.com/office/drawing/2014/main" id="{2851BDD0-B270-3F4F-8D74-9313EE86B989}"/>
               </a:ext>
             </a:extLst>
           </p:cNvPr>
@@ -5422,8 +5412,8 @@
         </p:nvSpPr>
         <p:spPr>
           <a:xfrm>
-            <a:off x="297270" y="834886"/>
-            <a:ext cx="11597459" cy="4758723"/>
+            <a:off x="296883" y="95003"/>
+            <a:ext cx="11198431" cy="5415148"/>
           </a:xfrm>
           <a:prstGeom prst="rect">
             <a:avLst/>
@@ -5455,7 +5445,7 @@
           <a:lstStyle/>
           <a:p>
             <a:pPr algn="ctr"/>
-            <a:endParaRPr lang="en-US"/>
+            <a:endParaRPr lang="en-US" dirty="0"/>
           </a:p>
         </p:txBody>
       </p:sp>
@@ -5467,8 +5457,8 @@
         </p:nvSpPr>
         <p:spPr>
           <a:xfrm>
-            <a:off x="3115679" y="4290045"/>
-            <a:ext cx="1372805" cy="707572"/>
+            <a:off x="2728355" y="4206586"/>
+            <a:ext cx="1360714" cy="707572"/>
           </a:xfrm>
           <a:prstGeom prst="roundRect">
             <a:avLst/>
@@ -5527,8 +5517,8 @@
         </p:nvSpPr>
         <p:spPr>
           <a:xfrm>
-            <a:off x="3115679" y="2311073"/>
-            <a:ext cx="1372805" cy="707572"/>
+            <a:off x="2728355" y="2227614"/>
+            <a:ext cx="1360714" cy="707572"/>
           </a:xfrm>
           <a:prstGeom prst="roundRect">
             <a:avLst/>
@@ -5592,8 +5582,8 @@
         </p:nvSpPr>
         <p:spPr>
           <a:xfrm>
-            <a:off x="7928156" y="4290045"/>
-            <a:ext cx="1372805" cy="707572"/>
+            <a:off x="7540832" y="4206586"/>
+            <a:ext cx="1360714" cy="707572"/>
           </a:xfrm>
           <a:prstGeom prst="roundRect">
             <a:avLst/>
@@ -5652,8 +5642,8 @@
         </p:nvSpPr>
         <p:spPr>
           <a:xfrm>
-            <a:off x="6323997" y="4295984"/>
-            <a:ext cx="1372805" cy="707572"/>
+            <a:off x="5936673" y="4212525"/>
+            <a:ext cx="1360714" cy="707572"/>
           </a:xfrm>
           <a:prstGeom prst="roundRect">
             <a:avLst/>
@@ -5712,8 +5702,8 @@
         </p:nvSpPr>
         <p:spPr>
           <a:xfrm>
-            <a:off x="4719838" y="4290045"/>
-            <a:ext cx="1372805" cy="707572"/>
+            <a:off x="4332514" y="4206586"/>
+            <a:ext cx="1360714" cy="707572"/>
           </a:xfrm>
           <a:prstGeom prst="roundRect">
             <a:avLst/>
@@ -5754,7 +5744,7 @@
           <a:p>
             <a:pPr algn="ctr"/>
             <a:r>
-              <a:rPr lang="en-US" dirty="0">
+              <a:rPr lang="en-US">
                 <a:solidFill>
                   <a:schemeClr val="tx1"/>
                 </a:solidFill>
@@ -5772,8 +5762,8 @@
         </p:nvSpPr>
         <p:spPr>
           <a:xfrm>
-            <a:off x="3072916" y="3448878"/>
-            <a:ext cx="6228045" cy="410934"/>
+            <a:off x="2728355" y="3365419"/>
+            <a:ext cx="6173191" cy="410934"/>
           </a:xfrm>
           <a:prstGeom prst="roundRect">
             <a:avLst/>
@@ -5820,14 +5810,12 @@
       <p:cxnSp>
         <p:nvCxnSpPr>
           <p:cNvPr id="12" name="Straight Arrow Connector 11"/>
-          <p:cNvCxnSpPr>
-            <a:cxnSpLocks/>
-          </p:cNvCxnSpPr>
+          <p:cNvCxnSpPr/>
           <p:nvPr/>
         </p:nvCxnSpPr>
         <p:spPr>
           <a:xfrm>
-            <a:off x="3818517" y="3859812"/>
+            <a:off x="3419102" y="3776353"/>
             <a:ext cx="0" cy="430233"/>
           </a:xfrm>
           <a:prstGeom prst="straightConnector1">
@@ -5856,14 +5844,12 @@
       <p:cxnSp>
         <p:nvCxnSpPr>
           <p:cNvPr id="13" name="Straight Arrow Connector 12"/>
-          <p:cNvCxnSpPr>
-            <a:cxnSpLocks/>
-          </p:cNvCxnSpPr>
+          <p:cNvCxnSpPr/>
           <p:nvPr/>
         </p:nvCxnSpPr>
         <p:spPr>
           <a:xfrm>
-            <a:off x="5455332" y="3859812"/>
+            <a:off x="5055917" y="3776353"/>
             <a:ext cx="0" cy="430233"/>
           </a:xfrm>
           <a:prstGeom prst="straightConnector1">
@@ -5892,14 +5878,12 @@
       <p:cxnSp>
         <p:nvCxnSpPr>
           <p:cNvPr id="14" name="Straight Arrow Connector 13"/>
-          <p:cNvCxnSpPr>
-            <a:cxnSpLocks/>
-          </p:cNvCxnSpPr>
+          <p:cNvCxnSpPr/>
           <p:nvPr/>
         </p:nvCxnSpPr>
         <p:spPr>
           <a:xfrm>
-            <a:off x="6987250" y="3859812"/>
+            <a:off x="6587835" y="3776353"/>
             <a:ext cx="0" cy="430233"/>
           </a:xfrm>
           <a:prstGeom prst="straightConnector1">
@@ -5928,14 +5912,12 @@
       <p:cxnSp>
         <p:nvCxnSpPr>
           <p:cNvPr id="15" name="Straight Arrow Connector 14"/>
-          <p:cNvCxnSpPr>
-            <a:cxnSpLocks/>
-          </p:cNvCxnSpPr>
+          <p:cNvCxnSpPr/>
           <p:nvPr/>
         </p:nvCxnSpPr>
         <p:spPr>
           <a:xfrm>
-            <a:off x="8588439" y="3859812"/>
+            <a:off x="8189024" y="3776353"/>
             <a:ext cx="0" cy="430233"/>
           </a:xfrm>
           <a:prstGeom prst="straightConnector1">
@@ -5969,8 +5951,8 @@
         </p:nvSpPr>
         <p:spPr>
           <a:xfrm>
-            <a:off x="534003" y="1069812"/>
-            <a:ext cx="1372805" cy="707572"/>
+            <a:off x="573727" y="246657"/>
+            <a:ext cx="1360714" cy="707572"/>
           </a:xfrm>
           <a:prstGeom prst="roundRect">
             <a:avLst/>
@@ -6029,8 +6011,8 @@
         </p:nvSpPr>
         <p:spPr>
           <a:xfrm>
-            <a:off x="459991" y="3464733"/>
-            <a:ext cx="2560396" cy="410934"/>
+            <a:off x="525248" y="1379475"/>
+            <a:ext cx="3719558" cy="410934"/>
           </a:xfrm>
           <a:prstGeom prst="roundRect">
             <a:avLst/>
@@ -6068,10 +6050,6 @@
           <a:p>
             <a:pPr algn="ctr"/>
             <a:r>
-              <a:rPr lang="en-US" dirty="0"/>
-              <a:t>Mesh </a:t>
-            </a:r>
-            <a:r>
               <a:rPr lang="en-US" dirty="0" err="1"/>
               <a:t>Wifi</a:t>
             </a:r>
@@ -6082,15 +6060,13 @@
       <p:cxnSp>
         <p:nvCxnSpPr>
           <p:cNvPr id="20" name="Straight Arrow Connector 19"/>
-          <p:cNvCxnSpPr>
-            <a:cxnSpLocks/>
-          </p:cNvCxnSpPr>
+          <p:cNvCxnSpPr/>
           <p:nvPr/>
         </p:nvCxnSpPr>
         <p:spPr>
           <a:xfrm>
-            <a:off x="754190" y="1769492"/>
-            <a:ext cx="0" cy="1695241"/>
+            <a:off x="1209798" y="949242"/>
+            <a:ext cx="0" cy="430233"/>
           </a:xfrm>
           <a:prstGeom prst="straightConnector1">
             <a:avLst/>
@@ -6131,8 +6107,8 @@
         </p:blipFill>
         <p:spPr>
           <a:xfrm>
-            <a:off x="6601394" y="1503546"/>
-            <a:ext cx="1195347" cy="1184819"/>
+            <a:off x="6212507" y="1420087"/>
+            <a:ext cx="1184819" cy="1184819"/>
           </a:xfrm>
           <a:prstGeom prst="rect">
             <a:avLst/>
@@ -6155,8 +6131,8 @@
         </p:blipFill>
         <p:spPr>
           <a:xfrm flipH="1">
-            <a:off x="5515315" y="1664685"/>
-            <a:ext cx="995461" cy="986693"/>
+            <a:off x="5124669" y="1581226"/>
+            <a:ext cx="986693" cy="986693"/>
           </a:xfrm>
           <a:prstGeom prst="rect">
             <a:avLst/>
@@ -6179,8 +6155,8 @@
         </p:blipFill>
         <p:spPr>
           <a:xfrm>
-            <a:off x="5007642" y="2049780"/>
-            <a:ext cx="469583" cy="465447"/>
+            <a:off x="4612363" y="1966321"/>
+            <a:ext cx="465447" cy="465447"/>
           </a:xfrm>
           <a:prstGeom prst="rect">
             <a:avLst/>
@@ -6190,15 +6166,13 @@
       <p:cxnSp>
         <p:nvCxnSpPr>
           <p:cNvPr id="21" name="Straight Arrow Connector 20"/>
-          <p:cNvCxnSpPr>
-            <a:cxnSpLocks/>
-          </p:cNvCxnSpPr>
+          <p:cNvCxnSpPr/>
           <p:nvPr/>
         </p:nvCxnSpPr>
         <p:spPr>
-          <a:xfrm>
-            <a:off x="4699640" y="2641732"/>
-            <a:ext cx="3666081" cy="9647"/>
+          <a:xfrm flipV="1">
+            <a:off x="4332514" y="2567919"/>
+            <a:ext cx="3633792" cy="19291"/>
           </a:xfrm>
           <a:prstGeom prst="straightConnector1">
             <a:avLst/>
@@ -6231,8 +6205,8 @@
         </p:nvSpPr>
         <p:spPr>
           <a:xfrm>
-            <a:off x="5539998" y="2670260"/>
-            <a:ext cx="1758595" cy="276999"/>
+            <a:off x="5156072" y="2586801"/>
+            <a:ext cx="1743106" cy="276999"/>
           </a:xfrm>
           <a:prstGeom prst="rect">
             <a:avLst/>
@@ -6240,7 +6214,7 @@
           <a:noFill/>
         </p:spPr>
         <p:txBody>
-          <a:bodyPr wrap="square" rtlCol="0">
+          <a:bodyPr wrap="none" rtlCol="0">
             <a:spAutoFit/>
           </a:bodyPr>
           <a:lstStyle/>
@@ -6266,8 +6240,8 @@
         </p:nvSpPr>
         <p:spPr>
           <a:xfrm>
-            <a:off x="902636" y="2334579"/>
-            <a:ext cx="1372805" cy="707572"/>
+            <a:off x="2738745" y="258532"/>
+            <a:ext cx="1360714" cy="707572"/>
           </a:xfrm>
           <a:prstGeom prst="roundRect">
             <a:avLst/>
@@ -6327,14 +6301,12 @@
               </a:ext>
             </a:extLst>
           </p:cNvPr>
-          <p:cNvCxnSpPr>
-            <a:cxnSpLocks/>
-          </p:cNvCxnSpPr>
+          <p:cNvCxnSpPr/>
           <p:nvPr/>
         </p:nvCxnSpPr>
         <p:spPr>
           <a:xfrm>
-            <a:off x="1595084" y="3042151"/>
+            <a:off x="3419102" y="966104"/>
             <a:ext cx="0" cy="430233"/>
           </a:xfrm>
           <a:prstGeom prst="straightConnector1">
@@ -6374,8 +6346,8 @@
         </p:nvSpPr>
         <p:spPr>
           <a:xfrm>
-            <a:off x="4144522" y="2909976"/>
-            <a:ext cx="291655" cy="317292"/>
+            <a:off x="3624959" y="2796415"/>
+            <a:ext cx="289086" cy="317292"/>
           </a:xfrm>
           <a:prstGeom prst="snip1Rect">
             <a:avLst/>
@@ -6403,7 +6375,7 @@
           <a:p>
             <a:pPr algn="ctr"/>
             <a:r>
-              <a:rPr lang="en-US" dirty="0"/>
+              <a:rPr lang="en-US" sz="1200" dirty="0"/>
               <a:t>M</a:t>
             </a:r>
           </a:p>
@@ -6423,8 +6395,8 @@
         </p:nvSpPr>
         <p:spPr>
           <a:xfrm>
-            <a:off x="4120152" y="4867900"/>
-            <a:ext cx="291655" cy="317292"/>
+            <a:off x="3691775" y="4804129"/>
+            <a:ext cx="289086" cy="317292"/>
           </a:xfrm>
           <a:prstGeom prst="snip1Rect">
             <a:avLst/>
@@ -6452,7 +6424,7 @@
           <a:p>
             <a:pPr algn="ctr"/>
             <a:r>
-              <a:rPr lang="en-US" dirty="0"/>
+              <a:rPr lang="en-US" sz="1200" dirty="0"/>
               <a:t>W</a:t>
             </a:r>
           </a:p>
@@ -6472,8 +6444,8 @@
         </p:nvSpPr>
         <p:spPr>
           <a:xfrm>
-            <a:off x="5708023" y="4873612"/>
-            <a:ext cx="291655" cy="317292"/>
+            <a:off x="5311177" y="4804129"/>
+            <a:ext cx="316938" cy="317292"/>
           </a:xfrm>
           <a:prstGeom prst="snip1Rect">
             <a:avLst/>
@@ -6501,7 +6473,7 @@
           <a:p>
             <a:pPr algn="ctr"/>
             <a:r>
-              <a:rPr lang="en-US" dirty="0"/>
+              <a:rPr lang="en-US" sz="1200" dirty="0"/>
               <a:t>W</a:t>
             </a:r>
           </a:p>
@@ -6521,8 +6493,8 @@
         </p:nvSpPr>
         <p:spPr>
           <a:xfrm>
-            <a:off x="7328264" y="4838971"/>
-            <a:ext cx="291655" cy="317292"/>
+            <a:off x="6899178" y="4804129"/>
+            <a:ext cx="289086" cy="317292"/>
           </a:xfrm>
           <a:prstGeom prst="snip1Rect">
             <a:avLst/>
@@ -6550,7 +6522,7 @@
           <a:p>
             <a:pPr algn="ctr"/>
             <a:r>
-              <a:rPr lang="en-US" dirty="0"/>
+              <a:rPr lang="en-US" sz="1200" dirty="0"/>
               <a:t>W</a:t>
             </a:r>
           </a:p>
@@ -6570,8 +6542,8 @@
         </p:nvSpPr>
         <p:spPr>
           <a:xfrm>
-            <a:off x="8916341" y="4887588"/>
-            <a:ext cx="291655" cy="317292"/>
+            <a:off x="8519495" y="4804129"/>
+            <a:ext cx="289086" cy="317292"/>
           </a:xfrm>
           <a:prstGeom prst="snip1Rect">
             <a:avLst/>
@@ -6599,7 +6571,7 @@
           <a:p>
             <a:pPr algn="ctr"/>
             <a:r>
-              <a:rPr lang="en-US" dirty="0"/>
+              <a:rPr lang="en-US" sz="1200" dirty="0"/>
               <a:t>W</a:t>
             </a:r>
           </a:p>
@@ -6619,8 +6591,8 @@
         </p:nvSpPr>
         <p:spPr>
           <a:xfrm>
-            <a:off x="9559629" y="1466562"/>
-            <a:ext cx="291655" cy="317292"/>
+            <a:off x="9001503" y="1129490"/>
+            <a:ext cx="289086" cy="317292"/>
           </a:xfrm>
           <a:prstGeom prst="snip1Rect">
             <a:avLst/>
@@ -6668,8 +6640,8 @@
         </p:nvSpPr>
         <p:spPr>
           <a:xfrm>
-            <a:off x="9540067" y="2076451"/>
-            <a:ext cx="291655" cy="317292"/>
+            <a:off x="8981941" y="1779135"/>
+            <a:ext cx="289086" cy="317292"/>
           </a:xfrm>
           <a:prstGeom prst="snip1Rect">
             <a:avLst/>
@@ -6717,6 +6689,1613 @@
         </p:nvSpPr>
         <p:spPr>
           <a:xfrm>
+            <a:off x="9243196" y="1739389"/>
+            <a:ext cx="1387496" cy="461665"/>
+          </a:xfrm>
+          <a:prstGeom prst="rect">
+            <a:avLst/>
+          </a:prstGeom>
+          <a:noFill/>
+        </p:spPr>
+        <p:txBody>
+          <a:bodyPr wrap="none" rtlCol="0">
+            <a:spAutoFit/>
+          </a:bodyPr>
+          <a:lstStyle/>
+          <a:p>
+            <a:r>
+              <a:rPr lang="en-US" sz="1200" dirty="0"/>
+              <a:t>Worker: Raspberry </a:t>
+            </a:r>
+          </a:p>
+          <a:p>
+            <a:r>
+              <a:rPr lang="en-US" sz="1200" dirty="0"/>
+              <a:t>Pi OS Lite</a:t>
+            </a:r>
+          </a:p>
+        </p:txBody>
+      </p:sp>
+      <p:sp>
+        <p:nvSpPr>
+          <p:cNvPr id="38" name="TextBox 37">
+            <a:extLst>
+              <a:ext uri="{FF2B5EF4-FFF2-40B4-BE49-F238E27FC236}">
+                <a16:creationId xmlns:a16="http://schemas.microsoft.com/office/drawing/2014/main" id="{15E9E79F-3DB7-734C-806E-340CB02B5120}"/>
+              </a:ext>
+            </a:extLst>
+          </p:cNvPr>
+          <p:cNvSpPr txBox="1"/>
+          <p:nvPr/>
+        </p:nvSpPr>
+        <p:spPr>
+          <a:xfrm>
+            <a:off x="9319772" y="1024683"/>
+            <a:ext cx="1371466" cy="646331"/>
+          </a:xfrm>
+          <a:prstGeom prst="rect">
+            <a:avLst/>
+          </a:prstGeom>
+          <a:noFill/>
+        </p:spPr>
+        <p:txBody>
+          <a:bodyPr wrap="none" rtlCol="0">
+            <a:spAutoFit/>
+          </a:bodyPr>
+          <a:lstStyle/>
+          <a:p>
+            <a:r>
+              <a:rPr lang="en-US" sz="1200" dirty="0"/>
+              <a:t>Master: Raspberry </a:t>
+            </a:r>
+          </a:p>
+          <a:p>
+            <a:r>
+              <a:rPr lang="en-US" sz="1200" dirty="0"/>
+              <a:t>Pi OS with desktop</a:t>
+            </a:r>
+          </a:p>
+          <a:p>
+            <a:endParaRPr lang="en-US" sz="1200" dirty="0"/>
+          </a:p>
+        </p:txBody>
+      </p:sp>
+      <p:sp>
+        <p:nvSpPr>
+          <p:cNvPr id="43" name="Up-Down Arrow 42">
+            <a:extLst>
+              <a:ext uri="{FF2B5EF4-FFF2-40B4-BE49-F238E27FC236}">
+                <a16:creationId xmlns:a16="http://schemas.microsoft.com/office/drawing/2014/main" id="{A7CD07C8-77ED-0248-BCED-A556A5F91A2A}"/>
+              </a:ext>
+            </a:extLst>
+          </p:cNvPr>
+          <p:cNvSpPr/>
+          <p:nvPr/>
+        </p:nvSpPr>
+        <p:spPr>
+          <a:xfrm>
+            <a:off x="3281968" y="2945218"/>
+            <a:ext cx="274268" cy="423156"/>
+          </a:xfrm>
+          <a:prstGeom prst="upDownArrow">
+            <a:avLst/>
+          </a:prstGeom>
+        </p:spPr>
+        <p:style>
+          <a:lnRef idx="2">
+            <a:schemeClr val="accent1">
+              <a:shade val="50000"/>
+            </a:schemeClr>
+          </a:lnRef>
+          <a:fillRef idx="1">
+            <a:schemeClr val="accent1"/>
+          </a:fillRef>
+          <a:effectRef idx="0">
+            <a:schemeClr val="accent1"/>
+          </a:effectRef>
+          <a:fontRef idx="minor">
+            <a:schemeClr val="lt1"/>
+          </a:fontRef>
+        </p:style>
+        <p:txBody>
+          <a:bodyPr rtlCol="0" anchor="ctr"/>
+          <a:lstStyle/>
+          <a:p>
+            <a:pPr algn="ctr"/>
+            <a:endParaRPr lang="en-US" dirty="0"/>
+          </a:p>
+        </p:txBody>
+      </p:sp>
+      <p:sp>
+        <p:nvSpPr>
+          <p:cNvPr id="44" name="Up-Down Arrow 43">
+            <a:extLst>
+              <a:ext uri="{FF2B5EF4-FFF2-40B4-BE49-F238E27FC236}">
+                <a16:creationId xmlns:a16="http://schemas.microsoft.com/office/drawing/2014/main" id="{897FF324-6238-B747-B1F6-76EE920FDAB7}"/>
+              </a:ext>
+            </a:extLst>
+          </p:cNvPr>
+          <p:cNvSpPr/>
+          <p:nvPr/>
+        </p:nvSpPr>
+        <p:spPr>
+          <a:xfrm>
+            <a:off x="3281968" y="1802213"/>
+            <a:ext cx="274268" cy="423156"/>
+          </a:xfrm>
+          <a:prstGeom prst="upDownArrow">
+            <a:avLst/>
+          </a:prstGeom>
+        </p:spPr>
+        <p:style>
+          <a:lnRef idx="2">
+            <a:schemeClr val="accent1">
+              <a:shade val="50000"/>
+            </a:schemeClr>
+          </a:lnRef>
+          <a:fillRef idx="1">
+            <a:schemeClr val="accent1"/>
+          </a:fillRef>
+          <a:effectRef idx="0">
+            <a:schemeClr val="accent1"/>
+          </a:effectRef>
+          <a:fontRef idx="minor">
+            <a:schemeClr val="lt1"/>
+          </a:fontRef>
+        </p:style>
+        <p:txBody>
+          <a:bodyPr rtlCol="0" anchor="ctr"/>
+          <a:lstStyle/>
+          <a:p>
+            <a:pPr algn="ctr"/>
+            <a:endParaRPr lang="en-US" dirty="0"/>
+          </a:p>
+        </p:txBody>
+      </p:sp>
+      <p:sp>
+        <p:nvSpPr>
+          <p:cNvPr id="45" name="TextBox 44">
+            <a:extLst>
+              <a:ext uri="{FF2B5EF4-FFF2-40B4-BE49-F238E27FC236}">
+                <a16:creationId xmlns:a16="http://schemas.microsoft.com/office/drawing/2014/main" id="{CE1AA2E9-923F-7948-8F65-4E1C4D245D18}"/>
+              </a:ext>
+            </a:extLst>
+          </p:cNvPr>
+          <p:cNvSpPr txBox="1"/>
+          <p:nvPr/>
+        </p:nvSpPr>
+        <p:spPr>
+          <a:xfrm>
+            <a:off x="2471318" y="1841278"/>
+            <a:ext cx="787075" cy="369332"/>
+          </a:xfrm>
+          <a:prstGeom prst="rect">
+            <a:avLst/>
+          </a:prstGeom>
+          <a:noFill/>
+        </p:spPr>
+        <p:txBody>
+          <a:bodyPr wrap="none" rtlCol="0">
+            <a:spAutoFit/>
+          </a:bodyPr>
+          <a:lstStyle/>
+          <a:p>
+            <a:r>
+              <a:rPr lang="en-US" dirty="0"/>
+              <a:t>Bridge</a:t>
+            </a:r>
+          </a:p>
+        </p:txBody>
+      </p:sp>
+      <p:sp>
+        <p:nvSpPr>
+          <p:cNvPr id="46" name="TextBox 45">
+            <a:extLst>
+              <a:ext uri="{FF2B5EF4-FFF2-40B4-BE49-F238E27FC236}">
+                <a16:creationId xmlns:a16="http://schemas.microsoft.com/office/drawing/2014/main" id="{105CEA48-D7C4-7E4C-8587-F9B06D886391}"/>
+              </a:ext>
+            </a:extLst>
+          </p:cNvPr>
+          <p:cNvSpPr txBox="1"/>
+          <p:nvPr/>
+        </p:nvSpPr>
+        <p:spPr>
+          <a:xfrm>
+            <a:off x="2471318" y="2894876"/>
+            <a:ext cx="787075" cy="369332"/>
+          </a:xfrm>
+          <a:prstGeom prst="rect">
+            <a:avLst/>
+          </a:prstGeom>
+          <a:noFill/>
+        </p:spPr>
+        <p:txBody>
+          <a:bodyPr wrap="none" rtlCol="0">
+            <a:spAutoFit/>
+          </a:bodyPr>
+          <a:lstStyle/>
+          <a:p>
+            <a:r>
+              <a:rPr lang="en-US" dirty="0"/>
+              <a:t>Bridge</a:t>
+            </a:r>
+          </a:p>
+        </p:txBody>
+      </p:sp>
+      <p:sp>
+        <p:nvSpPr>
+          <p:cNvPr id="18" name="TextBox 17">
+            <a:extLst>
+              <a:ext uri="{FF2B5EF4-FFF2-40B4-BE49-F238E27FC236}">
+                <a16:creationId xmlns:a16="http://schemas.microsoft.com/office/drawing/2014/main" id="{4F2A31F8-5896-F94E-B08E-DC3F6F4D92AF}"/>
+              </a:ext>
+            </a:extLst>
+          </p:cNvPr>
+          <p:cNvSpPr txBox="1"/>
+          <p:nvPr/>
+        </p:nvSpPr>
+        <p:spPr>
+          <a:xfrm>
+            <a:off x="8901546" y="577227"/>
+            <a:ext cx="1008674" cy="369332"/>
+          </a:xfrm>
+          <a:prstGeom prst="rect">
+            <a:avLst/>
+          </a:prstGeom>
+          <a:noFill/>
+        </p:spPr>
+        <p:txBody>
+          <a:bodyPr wrap="none" rtlCol="0">
+            <a:spAutoFit/>
+          </a:bodyPr>
+          <a:lstStyle/>
+          <a:p>
+            <a:r>
+              <a:rPr lang="en-US" dirty="0"/>
+              <a:t>SD Cards</a:t>
+            </a:r>
+          </a:p>
+        </p:txBody>
+      </p:sp>
+    </p:spTree>
+    <p:extLst>
+      <p:ext uri="{BB962C8B-B14F-4D97-AF65-F5344CB8AC3E}">
+        <p14:creationId xmlns:p14="http://schemas.microsoft.com/office/powerpoint/2010/main" val="837495575"/>
+      </p:ext>
+    </p:extLst>
+  </p:cSld>
+  <p:clrMapOvr>
+    <a:masterClrMapping/>
+  </p:clrMapOvr>
+</p:sld>
+</file>
+
+<file path=ppt/slides/slide4.xml><?xml version="1.0" encoding="utf-8"?>
+<p:sld xmlns:a="http://schemas.openxmlformats.org/drawingml/2006/main" xmlns:r="http://schemas.openxmlformats.org/officeDocument/2006/relationships" xmlns:p="http://schemas.openxmlformats.org/presentationml/2006/main">
+  <p:cSld>
+    <p:spTree>
+      <p:nvGrpSpPr>
+        <p:cNvPr id="1" name=""/>
+        <p:cNvGrpSpPr/>
+        <p:nvPr/>
+      </p:nvGrpSpPr>
+      <p:grpSpPr>
+        <a:xfrm>
+          <a:off x="0" y="0"/>
+          <a:ext cx="0" cy="0"/>
+          <a:chOff x="0" y="0"/>
+          <a:chExt cx="0" cy="0"/>
+        </a:xfrm>
+      </p:grpSpPr>
+      <p:sp>
+        <p:nvSpPr>
+          <p:cNvPr id="41" name="Rectangle 40">
+            <a:extLst>
+              <a:ext uri="{FF2B5EF4-FFF2-40B4-BE49-F238E27FC236}">
+                <a16:creationId xmlns:a16="http://schemas.microsoft.com/office/drawing/2014/main" id="{22ECFE8D-4994-8344-B69C-E368B9F752AD}"/>
+              </a:ext>
+            </a:extLst>
+          </p:cNvPr>
+          <p:cNvSpPr/>
+          <p:nvPr/>
+        </p:nvSpPr>
+        <p:spPr>
+          <a:xfrm>
+            <a:off x="297270" y="834886"/>
+            <a:ext cx="11597459" cy="4758723"/>
+          </a:xfrm>
+          <a:prstGeom prst="rect">
+            <a:avLst/>
+          </a:prstGeom>
+          <a:effectLst>
+            <a:outerShdw blurRad="50800" dist="38100" dir="2700000" algn="tl" rotWithShape="0">
+              <a:prstClr val="black">
+                <a:alpha val="40000"/>
+              </a:prstClr>
+            </a:outerShdw>
+          </a:effectLst>
+        </p:spPr>
+        <p:style>
+          <a:lnRef idx="2">
+            <a:schemeClr val="accent6"/>
+          </a:lnRef>
+          <a:fillRef idx="1">
+            <a:schemeClr val="lt1"/>
+          </a:fillRef>
+          <a:effectRef idx="0">
+            <a:schemeClr val="accent6"/>
+          </a:effectRef>
+          <a:fontRef idx="minor">
+            <a:schemeClr val="dk1"/>
+          </a:fontRef>
+        </p:style>
+        <p:txBody>
+          <a:bodyPr rtlCol="0" anchor="ctr"/>
+          <a:lstStyle/>
+          <a:p>
+            <a:pPr algn="ctr"/>
+            <a:endParaRPr lang="en-US"/>
+          </a:p>
+        </p:txBody>
+      </p:sp>
+      <p:sp>
+        <p:nvSpPr>
+          <p:cNvPr id="4" name="Rounded Rectangle 3"/>
+          <p:cNvSpPr/>
+          <p:nvPr/>
+        </p:nvSpPr>
+        <p:spPr>
+          <a:xfrm>
+            <a:off x="3115679" y="4290045"/>
+            <a:ext cx="1372805" cy="707572"/>
+          </a:xfrm>
+          <a:prstGeom prst="roundRect">
+            <a:avLst/>
+          </a:prstGeom>
+          <a:solidFill>
+            <a:schemeClr val="accent3">
+              <a:lumMod val="40000"/>
+              <a:lumOff val="60000"/>
+            </a:schemeClr>
+          </a:solidFill>
+          <a:effectLst>
+            <a:outerShdw blurRad="50800" dist="38100" dir="2700000" algn="tl" rotWithShape="0">
+              <a:prstClr val="black">
+                <a:alpha val="40000"/>
+              </a:prstClr>
+            </a:outerShdw>
+          </a:effectLst>
+        </p:spPr>
+        <p:style>
+          <a:lnRef idx="2">
+            <a:schemeClr val="accent1">
+              <a:shade val="50000"/>
+            </a:schemeClr>
+          </a:lnRef>
+          <a:fillRef idx="1">
+            <a:schemeClr val="accent1"/>
+          </a:fillRef>
+          <a:effectRef idx="0">
+            <a:schemeClr val="accent1"/>
+          </a:effectRef>
+          <a:fontRef idx="minor">
+            <a:schemeClr val="lt1"/>
+          </a:fontRef>
+        </p:style>
+        <p:txBody>
+          <a:bodyPr rtlCol="0" anchor="ctr"/>
+          <a:lstStyle/>
+          <a:p>
+            <a:pPr algn="ctr"/>
+            <a:r>
+              <a:rPr lang="en-US">
+                <a:solidFill>
+                  <a:schemeClr val="tx1"/>
+                </a:solidFill>
+              </a:rPr>
+              <a:t>PI Worker</a:t>
+            </a:r>
+          </a:p>
+        </p:txBody>
+      </p:sp>
+      <p:sp>
+        <p:nvSpPr>
+          <p:cNvPr id="5" name="Rounded Rectangle 4"/>
+          <p:cNvSpPr/>
+          <p:nvPr/>
+        </p:nvSpPr>
+        <p:spPr>
+          <a:xfrm>
+            <a:off x="3115679" y="2311073"/>
+            <a:ext cx="1372805" cy="707572"/>
+          </a:xfrm>
+          <a:prstGeom prst="roundRect">
+            <a:avLst/>
+          </a:prstGeom>
+          <a:solidFill>
+            <a:schemeClr val="accent3">
+              <a:lumMod val="40000"/>
+              <a:lumOff val="60000"/>
+            </a:schemeClr>
+          </a:solidFill>
+          <a:effectLst>
+            <a:outerShdw blurRad="50800" dist="38100" dir="2700000" algn="tl" rotWithShape="0">
+              <a:prstClr val="black">
+                <a:alpha val="40000"/>
+              </a:prstClr>
+            </a:outerShdw>
+          </a:effectLst>
+        </p:spPr>
+        <p:style>
+          <a:lnRef idx="2">
+            <a:schemeClr val="accent1">
+              <a:shade val="50000"/>
+            </a:schemeClr>
+          </a:lnRef>
+          <a:fillRef idx="1">
+            <a:schemeClr val="accent1"/>
+          </a:fillRef>
+          <a:effectRef idx="0">
+            <a:schemeClr val="accent1"/>
+          </a:effectRef>
+          <a:fontRef idx="minor">
+            <a:schemeClr val="lt1"/>
+          </a:fontRef>
+        </p:style>
+        <p:txBody>
+          <a:bodyPr rtlCol="0" anchor="ctr"/>
+          <a:lstStyle/>
+          <a:p>
+            <a:pPr algn="ctr"/>
+            <a:r>
+              <a:rPr lang="en-US">
+                <a:solidFill>
+                  <a:schemeClr val="tx1"/>
+                </a:solidFill>
+              </a:rPr>
+              <a:t>PI Master </a:t>
+            </a:r>
+            <a:endParaRPr lang="en-US" dirty="0">
+              <a:solidFill>
+                <a:schemeClr val="tx1"/>
+              </a:solidFill>
+            </a:endParaRPr>
+          </a:p>
+        </p:txBody>
+      </p:sp>
+      <p:sp>
+        <p:nvSpPr>
+          <p:cNvPr id="6" name="Rounded Rectangle 5"/>
+          <p:cNvSpPr/>
+          <p:nvPr/>
+        </p:nvSpPr>
+        <p:spPr>
+          <a:xfrm>
+            <a:off x="7928156" y="4290045"/>
+            <a:ext cx="1372805" cy="707572"/>
+          </a:xfrm>
+          <a:prstGeom prst="roundRect">
+            <a:avLst/>
+          </a:prstGeom>
+          <a:solidFill>
+            <a:schemeClr val="accent3">
+              <a:lumMod val="40000"/>
+              <a:lumOff val="60000"/>
+            </a:schemeClr>
+          </a:solidFill>
+          <a:effectLst>
+            <a:outerShdw blurRad="50800" dist="38100" dir="2700000" algn="tl" rotWithShape="0">
+              <a:prstClr val="black">
+                <a:alpha val="40000"/>
+              </a:prstClr>
+            </a:outerShdw>
+          </a:effectLst>
+        </p:spPr>
+        <p:style>
+          <a:lnRef idx="2">
+            <a:schemeClr val="accent1">
+              <a:shade val="50000"/>
+            </a:schemeClr>
+          </a:lnRef>
+          <a:fillRef idx="1">
+            <a:schemeClr val="accent1"/>
+          </a:fillRef>
+          <a:effectRef idx="0">
+            <a:schemeClr val="accent1"/>
+          </a:effectRef>
+          <a:fontRef idx="minor">
+            <a:schemeClr val="lt1"/>
+          </a:fontRef>
+        </p:style>
+        <p:txBody>
+          <a:bodyPr rtlCol="0" anchor="ctr"/>
+          <a:lstStyle/>
+          <a:p>
+            <a:pPr algn="ctr"/>
+            <a:r>
+              <a:rPr lang="en-US">
+                <a:solidFill>
+                  <a:schemeClr val="tx1"/>
+                </a:solidFill>
+              </a:rPr>
+              <a:t>PI Worker</a:t>
+            </a:r>
+          </a:p>
+        </p:txBody>
+      </p:sp>
+      <p:sp>
+        <p:nvSpPr>
+          <p:cNvPr id="7" name="Rounded Rectangle 6"/>
+          <p:cNvSpPr/>
+          <p:nvPr/>
+        </p:nvSpPr>
+        <p:spPr>
+          <a:xfrm>
+            <a:off x="6323997" y="4295984"/>
+            <a:ext cx="1372805" cy="707572"/>
+          </a:xfrm>
+          <a:prstGeom prst="roundRect">
+            <a:avLst/>
+          </a:prstGeom>
+          <a:solidFill>
+            <a:schemeClr val="accent3">
+              <a:lumMod val="40000"/>
+              <a:lumOff val="60000"/>
+            </a:schemeClr>
+          </a:solidFill>
+          <a:effectLst>
+            <a:outerShdw blurRad="50800" dist="38100" dir="2700000" algn="tl" rotWithShape="0">
+              <a:prstClr val="black">
+                <a:alpha val="40000"/>
+              </a:prstClr>
+            </a:outerShdw>
+          </a:effectLst>
+        </p:spPr>
+        <p:style>
+          <a:lnRef idx="2">
+            <a:schemeClr val="accent1">
+              <a:shade val="50000"/>
+            </a:schemeClr>
+          </a:lnRef>
+          <a:fillRef idx="1">
+            <a:schemeClr val="accent1"/>
+          </a:fillRef>
+          <a:effectRef idx="0">
+            <a:schemeClr val="accent1"/>
+          </a:effectRef>
+          <a:fontRef idx="minor">
+            <a:schemeClr val="lt1"/>
+          </a:fontRef>
+        </p:style>
+        <p:txBody>
+          <a:bodyPr rtlCol="0" anchor="ctr"/>
+          <a:lstStyle/>
+          <a:p>
+            <a:pPr algn="ctr"/>
+            <a:r>
+              <a:rPr lang="en-US">
+                <a:solidFill>
+                  <a:schemeClr val="tx1"/>
+                </a:solidFill>
+              </a:rPr>
+              <a:t>PI Worker</a:t>
+            </a:r>
+          </a:p>
+        </p:txBody>
+      </p:sp>
+      <p:sp>
+        <p:nvSpPr>
+          <p:cNvPr id="8" name="Rounded Rectangle 7"/>
+          <p:cNvSpPr/>
+          <p:nvPr/>
+        </p:nvSpPr>
+        <p:spPr>
+          <a:xfrm>
+            <a:off x="4719838" y="4290045"/>
+            <a:ext cx="1372805" cy="707572"/>
+          </a:xfrm>
+          <a:prstGeom prst="roundRect">
+            <a:avLst/>
+          </a:prstGeom>
+          <a:solidFill>
+            <a:schemeClr val="accent3">
+              <a:lumMod val="40000"/>
+              <a:lumOff val="60000"/>
+            </a:schemeClr>
+          </a:solidFill>
+          <a:effectLst>
+            <a:outerShdw blurRad="50800" dist="38100" dir="2700000" algn="tl" rotWithShape="0">
+              <a:prstClr val="black">
+                <a:alpha val="40000"/>
+              </a:prstClr>
+            </a:outerShdw>
+          </a:effectLst>
+        </p:spPr>
+        <p:style>
+          <a:lnRef idx="2">
+            <a:schemeClr val="accent1">
+              <a:shade val="50000"/>
+            </a:schemeClr>
+          </a:lnRef>
+          <a:fillRef idx="1">
+            <a:schemeClr val="accent1"/>
+          </a:fillRef>
+          <a:effectRef idx="0">
+            <a:schemeClr val="accent1"/>
+          </a:effectRef>
+          <a:fontRef idx="minor">
+            <a:schemeClr val="lt1"/>
+          </a:fontRef>
+        </p:style>
+        <p:txBody>
+          <a:bodyPr rtlCol="0" anchor="ctr"/>
+          <a:lstStyle/>
+          <a:p>
+            <a:pPr algn="ctr"/>
+            <a:r>
+              <a:rPr lang="en-US" dirty="0">
+                <a:solidFill>
+                  <a:schemeClr val="tx1"/>
+                </a:solidFill>
+              </a:rPr>
+              <a:t>PI Worker</a:t>
+            </a:r>
+          </a:p>
+        </p:txBody>
+      </p:sp>
+      <p:sp>
+        <p:nvSpPr>
+          <p:cNvPr id="9" name="Rounded Rectangle 8"/>
+          <p:cNvSpPr/>
+          <p:nvPr/>
+        </p:nvSpPr>
+        <p:spPr>
+          <a:xfrm>
+            <a:off x="3072916" y="3448878"/>
+            <a:ext cx="6228045" cy="410934"/>
+          </a:xfrm>
+          <a:prstGeom prst="roundRect">
+            <a:avLst/>
+          </a:prstGeom>
+          <a:solidFill>
+            <a:schemeClr val="accent1"/>
+          </a:solidFill>
+          <a:effectLst>
+            <a:outerShdw blurRad="50800" dist="38100" dir="2700000" algn="tl" rotWithShape="0">
+              <a:prstClr val="black">
+                <a:alpha val="40000"/>
+              </a:prstClr>
+            </a:outerShdw>
+          </a:effectLst>
+        </p:spPr>
+        <p:style>
+          <a:lnRef idx="2">
+            <a:schemeClr val="accent1">
+              <a:shade val="50000"/>
+            </a:schemeClr>
+          </a:lnRef>
+          <a:fillRef idx="1">
+            <a:schemeClr val="accent1"/>
+          </a:fillRef>
+          <a:effectRef idx="0">
+            <a:schemeClr val="accent1"/>
+          </a:effectRef>
+          <a:fontRef idx="minor">
+            <a:schemeClr val="lt1"/>
+          </a:fontRef>
+        </p:style>
+        <p:txBody>
+          <a:bodyPr rtlCol="0" anchor="ctr"/>
+          <a:lstStyle/>
+          <a:p>
+            <a:pPr algn="ctr"/>
+            <a:r>
+              <a:rPr lang="en-US" dirty="0"/>
+              <a:t>Network Switch</a:t>
+            </a:r>
+          </a:p>
+        </p:txBody>
+      </p:sp>
+      <p:cxnSp>
+        <p:nvCxnSpPr>
+          <p:cNvPr id="12" name="Straight Arrow Connector 11"/>
+          <p:cNvCxnSpPr>
+            <a:cxnSpLocks/>
+          </p:cNvCxnSpPr>
+          <p:nvPr/>
+        </p:nvCxnSpPr>
+        <p:spPr>
+          <a:xfrm>
+            <a:off x="3818517" y="3859812"/>
+            <a:ext cx="0" cy="430233"/>
+          </a:xfrm>
+          <a:prstGeom prst="straightConnector1">
+            <a:avLst/>
+          </a:prstGeom>
+          <a:ln>
+            <a:headEnd type="triangle"/>
+            <a:tailEnd type="triangle"/>
+          </a:ln>
+        </p:spPr>
+        <p:style>
+          <a:lnRef idx="1">
+            <a:schemeClr val="accent1"/>
+          </a:lnRef>
+          <a:fillRef idx="0">
+            <a:schemeClr val="accent1"/>
+          </a:fillRef>
+          <a:effectRef idx="0">
+            <a:schemeClr val="accent1"/>
+          </a:effectRef>
+          <a:fontRef idx="minor">
+            <a:schemeClr val="tx1"/>
+          </a:fontRef>
+        </p:style>
+      </p:cxnSp>
+      <p:cxnSp>
+        <p:nvCxnSpPr>
+          <p:cNvPr id="13" name="Straight Arrow Connector 12"/>
+          <p:cNvCxnSpPr>
+            <a:cxnSpLocks/>
+          </p:cNvCxnSpPr>
+          <p:nvPr/>
+        </p:nvCxnSpPr>
+        <p:spPr>
+          <a:xfrm>
+            <a:off x="5455332" y="3859812"/>
+            <a:ext cx="0" cy="430233"/>
+          </a:xfrm>
+          <a:prstGeom prst="straightConnector1">
+            <a:avLst/>
+          </a:prstGeom>
+          <a:ln>
+            <a:headEnd type="triangle"/>
+            <a:tailEnd type="triangle"/>
+          </a:ln>
+        </p:spPr>
+        <p:style>
+          <a:lnRef idx="1">
+            <a:schemeClr val="accent1"/>
+          </a:lnRef>
+          <a:fillRef idx="0">
+            <a:schemeClr val="accent1"/>
+          </a:fillRef>
+          <a:effectRef idx="0">
+            <a:schemeClr val="accent1"/>
+          </a:effectRef>
+          <a:fontRef idx="minor">
+            <a:schemeClr val="tx1"/>
+          </a:fontRef>
+        </p:style>
+      </p:cxnSp>
+      <p:cxnSp>
+        <p:nvCxnSpPr>
+          <p:cNvPr id="14" name="Straight Arrow Connector 13"/>
+          <p:cNvCxnSpPr>
+            <a:cxnSpLocks/>
+          </p:cNvCxnSpPr>
+          <p:nvPr/>
+        </p:nvCxnSpPr>
+        <p:spPr>
+          <a:xfrm>
+            <a:off x="6987250" y="3859812"/>
+            <a:ext cx="0" cy="430233"/>
+          </a:xfrm>
+          <a:prstGeom prst="straightConnector1">
+            <a:avLst/>
+          </a:prstGeom>
+          <a:ln>
+            <a:headEnd type="triangle"/>
+            <a:tailEnd type="triangle"/>
+          </a:ln>
+        </p:spPr>
+        <p:style>
+          <a:lnRef idx="1">
+            <a:schemeClr val="accent1"/>
+          </a:lnRef>
+          <a:fillRef idx="0">
+            <a:schemeClr val="accent1"/>
+          </a:fillRef>
+          <a:effectRef idx="0">
+            <a:schemeClr val="accent1"/>
+          </a:effectRef>
+          <a:fontRef idx="minor">
+            <a:schemeClr val="tx1"/>
+          </a:fontRef>
+        </p:style>
+      </p:cxnSp>
+      <p:cxnSp>
+        <p:nvCxnSpPr>
+          <p:cNvPr id="15" name="Straight Arrow Connector 14"/>
+          <p:cNvCxnSpPr>
+            <a:cxnSpLocks/>
+          </p:cNvCxnSpPr>
+          <p:nvPr/>
+        </p:nvCxnSpPr>
+        <p:spPr>
+          <a:xfrm>
+            <a:off x="8588439" y="3859812"/>
+            <a:ext cx="0" cy="430233"/>
+          </a:xfrm>
+          <a:prstGeom prst="straightConnector1">
+            <a:avLst/>
+          </a:prstGeom>
+          <a:ln>
+            <a:headEnd type="triangle"/>
+            <a:tailEnd type="triangle"/>
+          </a:ln>
+        </p:spPr>
+        <p:style>
+          <a:lnRef idx="1">
+            <a:schemeClr val="accent1"/>
+          </a:lnRef>
+          <a:fillRef idx="0">
+            <a:schemeClr val="accent1"/>
+          </a:fillRef>
+          <a:effectRef idx="0">
+            <a:schemeClr val="accent1"/>
+          </a:effectRef>
+          <a:fontRef idx="minor">
+            <a:schemeClr val="tx1"/>
+          </a:fontRef>
+        </p:style>
+      </p:cxnSp>
+      <p:sp>
+        <p:nvSpPr>
+          <p:cNvPr id="16" name="Rounded Rectangle 15"/>
+          <p:cNvSpPr/>
+          <p:nvPr/>
+        </p:nvSpPr>
+        <p:spPr>
+          <a:xfrm>
+            <a:off x="534003" y="1069812"/>
+            <a:ext cx="1372805" cy="707572"/>
+          </a:xfrm>
+          <a:prstGeom prst="roundRect">
+            <a:avLst/>
+          </a:prstGeom>
+          <a:solidFill>
+            <a:schemeClr val="accent3">
+              <a:lumMod val="40000"/>
+              <a:lumOff val="60000"/>
+            </a:schemeClr>
+          </a:solidFill>
+          <a:effectLst>
+            <a:outerShdw blurRad="50800" dist="38100" dir="2700000" algn="tl" rotWithShape="0">
+              <a:prstClr val="black">
+                <a:alpha val="40000"/>
+              </a:prstClr>
+            </a:outerShdw>
+          </a:effectLst>
+        </p:spPr>
+        <p:style>
+          <a:lnRef idx="2">
+            <a:schemeClr val="accent1">
+              <a:shade val="50000"/>
+            </a:schemeClr>
+          </a:lnRef>
+          <a:fillRef idx="1">
+            <a:schemeClr val="accent1"/>
+          </a:fillRef>
+          <a:effectRef idx="0">
+            <a:schemeClr val="accent1"/>
+          </a:effectRef>
+          <a:fontRef idx="minor">
+            <a:schemeClr val="lt1"/>
+          </a:fontRef>
+        </p:style>
+        <p:txBody>
+          <a:bodyPr rtlCol="0" anchor="ctr"/>
+          <a:lstStyle/>
+          <a:p>
+            <a:pPr algn="ctr"/>
+            <a:r>
+              <a:rPr lang="en-US" dirty="0">
+                <a:solidFill>
+                  <a:schemeClr val="tx1"/>
+                </a:solidFill>
+              </a:rPr>
+              <a:t>Internet</a:t>
+            </a:r>
+          </a:p>
+        </p:txBody>
+      </p:sp>
+      <p:sp>
+        <p:nvSpPr>
+          <p:cNvPr id="17" name="Rounded Rectangle 16"/>
+          <p:cNvSpPr/>
+          <p:nvPr/>
+        </p:nvSpPr>
+        <p:spPr>
+          <a:xfrm>
+            <a:off x="459991" y="3464733"/>
+            <a:ext cx="2560396" cy="410934"/>
+          </a:xfrm>
+          <a:prstGeom prst="roundRect">
+            <a:avLst/>
+          </a:prstGeom>
+          <a:solidFill>
+            <a:schemeClr val="accent1"/>
+          </a:solidFill>
+          <a:effectLst>
+            <a:outerShdw blurRad="50800" dist="38100" dir="2700000" algn="tl" rotWithShape="0">
+              <a:prstClr val="black">
+                <a:alpha val="40000"/>
+              </a:prstClr>
+            </a:outerShdw>
+          </a:effectLst>
+        </p:spPr>
+        <p:style>
+          <a:lnRef idx="2">
+            <a:schemeClr val="accent1">
+              <a:shade val="50000"/>
+            </a:schemeClr>
+          </a:lnRef>
+          <a:fillRef idx="1">
+            <a:schemeClr val="accent1"/>
+          </a:fillRef>
+          <a:effectRef idx="0">
+            <a:schemeClr val="accent1"/>
+          </a:effectRef>
+          <a:fontRef idx="minor">
+            <a:schemeClr val="lt1"/>
+          </a:fontRef>
+        </p:style>
+        <p:txBody>
+          <a:bodyPr rtlCol="0" anchor="ctr"/>
+          <a:lstStyle/>
+          <a:p>
+            <a:pPr algn="ctr"/>
+            <a:r>
+              <a:rPr lang="en-US" dirty="0"/>
+              <a:t>Mesh </a:t>
+            </a:r>
+            <a:r>
+              <a:rPr lang="en-US" dirty="0" err="1"/>
+              <a:t>Wifi</a:t>
+            </a:r>
+            <a:endParaRPr lang="en-US" dirty="0"/>
+          </a:p>
+        </p:txBody>
+      </p:sp>
+      <p:cxnSp>
+        <p:nvCxnSpPr>
+          <p:cNvPr id="20" name="Straight Arrow Connector 19"/>
+          <p:cNvCxnSpPr>
+            <a:cxnSpLocks/>
+          </p:cNvCxnSpPr>
+          <p:nvPr/>
+        </p:nvCxnSpPr>
+        <p:spPr>
+          <a:xfrm>
+            <a:off x="754190" y="1769492"/>
+            <a:ext cx="0" cy="1695241"/>
+          </a:xfrm>
+          <a:prstGeom prst="straightConnector1">
+            <a:avLst/>
+          </a:prstGeom>
+          <a:ln>
+            <a:headEnd type="triangle"/>
+            <a:tailEnd type="triangle"/>
+          </a:ln>
+        </p:spPr>
+        <p:style>
+          <a:lnRef idx="1">
+            <a:schemeClr val="accent1"/>
+          </a:lnRef>
+          <a:fillRef idx="0">
+            <a:schemeClr val="accent1"/>
+          </a:fillRef>
+          <a:effectRef idx="0">
+            <a:schemeClr val="accent1"/>
+          </a:effectRef>
+          <a:fontRef idx="minor">
+            <a:schemeClr val="tx1"/>
+          </a:fontRef>
+        </p:style>
+      </p:cxnSp>
+      <p:pic>
+        <p:nvPicPr>
+          <p:cNvPr id="2" name="Picture 1"/>
+          <p:cNvPicPr>
+            <a:picLocks noChangeAspect="1"/>
+          </p:cNvPicPr>
+          <p:nvPr/>
+        </p:nvPicPr>
+        <p:blipFill>
+          <a:blip r:embed="rId2"/>
+          <a:stretch>
+            <a:fillRect/>
+          </a:stretch>
+        </p:blipFill>
+        <p:spPr>
+          <a:xfrm>
+            <a:off x="6601394" y="1503546"/>
+            <a:ext cx="1195347" cy="1184819"/>
+          </a:xfrm>
+          <a:prstGeom prst="rect">
+            <a:avLst/>
+          </a:prstGeom>
+        </p:spPr>
+      </p:pic>
+      <p:pic>
+        <p:nvPicPr>
+          <p:cNvPr id="3" name="Picture 2"/>
+          <p:cNvPicPr>
+            <a:picLocks noChangeAspect="1"/>
+          </p:cNvPicPr>
+          <p:nvPr/>
+        </p:nvPicPr>
+        <p:blipFill>
+          <a:blip r:embed="rId3"/>
+          <a:stretch>
+            <a:fillRect/>
+          </a:stretch>
+        </p:blipFill>
+        <p:spPr>
+          <a:xfrm flipH="1">
+            <a:off x="5515315" y="1664685"/>
+            <a:ext cx="995461" cy="986693"/>
+          </a:xfrm>
+          <a:prstGeom prst="rect">
+            <a:avLst/>
+          </a:prstGeom>
+        </p:spPr>
+      </p:pic>
+      <p:pic>
+        <p:nvPicPr>
+          <p:cNvPr id="10" name="Picture 9"/>
+          <p:cNvPicPr>
+            <a:picLocks noChangeAspect="1"/>
+          </p:cNvPicPr>
+          <p:nvPr/>
+        </p:nvPicPr>
+        <p:blipFill>
+          <a:blip r:embed="rId4"/>
+          <a:stretch>
+            <a:fillRect/>
+          </a:stretch>
+        </p:blipFill>
+        <p:spPr>
+          <a:xfrm>
+            <a:off x="5007642" y="2049780"/>
+            <a:ext cx="469583" cy="465447"/>
+          </a:xfrm>
+          <a:prstGeom prst="rect">
+            <a:avLst/>
+          </a:prstGeom>
+        </p:spPr>
+      </p:pic>
+      <p:cxnSp>
+        <p:nvCxnSpPr>
+          <p:cNvPr id="21" name="Straight Arrow Connector 20"/>
+          <p:cNvCxnSpPr>
+            <a:cxnSpLocks/>
+          </p:cNvCxnSpPr>
+          <p:nvPr/>
+        </p:nvCxnSpPr>
+        <p:spPr>
+          <a:xfrm>
+            <a:off x="4699640" y="2641732"/>
+            <a:ext cx="3666081" cy="9647"/>
+          </a:xfrm>
+          <a:prstGeom prst="straightConnector1">
+            <a:avLst/>
+          </a:prstGeom>
+          <a:ln>
+            <a:headEnd type="triangle"/>
+            <a:tailEnd type="triangle"/>
+          </a:ln>
+        </p:spPr>
+        <p:style>
+          <a:lnRef idx="1">
+            <a:schemeClr val="accent1"/>
+          </a:lnRef>
+          <a:fillRef idx="0">
+            <a:schemeClr val="accent1"/>
+          </a:fillRef>
+          <a:effectRef idx="0">
+            <a:schemeClr val="accent1"/>
+          </a:effectRef>
+          <a:fontRef idx="minor">
+            <a:schemeClr val="tx1"/>
+          </a:fontRef>
+        </p:style>
+      </p:cxnSp>
+      <p:sp>
+        <p:nvSpPr>
+          <p:cNvPr id="25" name="TextBox 24"/>
+          <p:cNvSpPr txBox="1"/>
+          <p:nvPr/>
+        </p:nvSpPr>
+        <p:spPr>
+          <a:xfrm>
+            <a:off x="5539998" y="2670260"/>
+            <a:ext cx="1758595" cy="276999"/>
+          </a:xfrm>
+          <a:prstGeom prst="rect">
+            <a:avLst/>
+          </a:prstGeom>
+          <a:noFill/>
+        </p:spPr>
+        <p:txBody>
+          <a:bodyPr wrap="square" rtlCol="0">
+            <a:spAutoFit/>
+          </a:bodyPr>
+          <a:lstStyle/>
+          <a:p>
+            <a:r>
+              <a:rPr lang="en-US" sz="1200" dirty="0"/>
+              <a:t>Recommended, Optional</a:t>
+            </a:r>
+          </a:p>
+        </p:txBody>
+      </p:sp>
+      <p:sp>
+        <p:nvSpPr>
+          <p:cNvPr id="23" name="Rounded Rectangle 22">
+            <a:extLst>
+              <a:ext uri="{FF2B5EF4-FFF2-40B4-BE49-F238E27FC236}">
+                <a16:creationId xmlns:a16="http://schemas.microsoft.com/office/drawing/2014/main" id="{F94134C2-F81E-FF4D-935A-39569E1CB389}"/>
+              </a:ext>
+            </a:extLst>
+          </p:cNvPr>
+          <p:cNvSpPr/>
+          <p:nvPr/>
+        </p:nvSpPr>
+        <p:spPr>
+          <a:xfrm>
+            <a:off x="902636" y="2334579"/>
+            <a:ext cx="1372805" cy="707572"/>
+          </a:xfrm>
+          <a:prstGeom prst="roundRect">
+            <a:avLst/>
+          </a:prstGeom>
+          <a:solidFill>
+            <a:schemeClr val="accent3">
+              <a:lumMod val="40000"/>
+              <a:lumOff val="60000"/>
+            </a:schemeClr>
+          </a:solidFill>
+          <a:effectLst>
+            <a:outerShdw blurRad="50800" dist="38100" dir="2700000" algn="tl" rotWithShape="0">
+              <a:prstClr val="black">
+                <a:alpha val="40000"/>
+              </a:prstClr>
+            </a:outerShdw>
+          </a:effectLst>
+        </p:spPr>
+        <p:style>
+          <a:lnRef idx="2">
+            <a:schemeClr val="accent1">
+              <a:shade val="50000"/>
+            </a:schemeClr>
+          </a:lnRef>
+          <a:fillRef idx="1">
+            <a:schemeClr val="accent1"/>
+          </a:fillRef>
+          <a:effectRef idx="0">
+            <a:schemeClr val="accent1"/>
+          </a:effectRef>
+          <a:fontRef idx="minor">
+            <a:schemeClr val="lt1"/>
+          </a:fontRef>
+        </p:style>
+        <p:txBody>
+          <a:bodyPr rtlCol="0" anchor="ctr"/>
+          <a:lstStyle/>
+          <a:p>
+            <a:pPr algn="ctr"/>
+            <a:r>
+              <a:rPr lang="en-US" dirty="0">
+                <a:solidFill>
+                  <a:schemeClr val="tx1"/>
+                </a:solidFill>
+              </a:rPr>
+              <a:t>Laptop</a:t>
+            </a:r>
+          </a:p>
+        </p:txBody>
+      </p:sp>
+      <p:cxnSp>
+        <p:nvCxnSpPr>
+          <p:cNvPr id="24" name="Straight Arrow Connector 23">
+            <a:extLst>
+              <a:ext uri="{FF2B5EF4-FFF2-40B4-BE49-F238E27FC236}">
+                <a16:creationId xmlns:a16="http://schemas.microsoft.com/office/drawing/2014/main" id="{78518C1B-A23B-2D4F-BC73-064275EC105A}"/>
+              </a:ext>
+            </a:extLst>
+          </p:cNvPr>
+          <p:cNvCxnSpPr>
+            <a:cxnSpLocks/>
+          </p:cNvCxnSpPr>
+          <p:nvPr/>
+        </p:nvCxnSpPr>
+        <p:spPr>
+          <a:xfrm>
+            <a:off x="1595084" y="3042151"/>
+            <a:ext cx="0" cy="430233"/>
+          </a:xfrm>
+          <a:prstGeom prst="straightConnector1">
+            <a:avLst/>
+          </a:prstGeom>
+          <a:ln>
+            <a:headEnd type="triangle"/>
+            <a:tailEnd type="triangle"/>
+          </a:ln>
+        </p:spPr>
+        <p:style>
+          <a:lnRef idx="1">
+            <a:schemeClr val="accent1"/>
+          </a:lnRef>
+          <a:fillRef idx="0">
+            <a:schemeClr val="accent1"/>
+          </a:fillRef>
+          <a:effectRef idx="0">
+            <a:schemeClr val="accent1"/>
+          </a:effectRef>
+          <a:fontRef idx="minor">
+            <a:schemeClr val="tx1"/>
+          </a:fontRef>
+        </p:style>
+      </p:cxnSp>
+      <p:sp>
+        <p:nvSpPr>
+          <p:cNvPr id="22" name="Snip Single Corner Rectangle 21">
+            <a:extLst>
+              <a:ext uri="{FF2B5EF4-FFF2-40B4-BE49-F238E27FC236}">
+                <a16:creationId xmlns:a16="http://schemas.microsoft.com/office/drawing/2014/main" id="{F8C45667-EB4F-3842-9F2D-FE8769BB9D1D}"/>
+              </a:ext>
+            </a:extLst>
+          </p:cNvPr>
+          <p:cNvSpPr/>
+          <p:nvPr/>
+        </p:nvSpPr>
+        <p:spPr>
+          <a:xfrm>
+            <a:off x="4144522" y="2909976"/>
+            <a:ext cx="291655" cy="317292"/>
+          </a:xfrm>
+          <a:prstGeom prst="snip1Rect">
+            <a:avLst/>
+          </a:prstGeom>
+        </p:spPr>
+        <p:style>
+          <a:lnRef idx="2">
+            <a:schemeClr val="accent4">
+              <a:shade val="50000"/>
+            </a:schemeClr>
+          </a:lnRef>
+          <a:fillRef idx="1">
+            <a:schemeClr val="accent4"/>
+          </a:fillRef>
+          <a:effectRef idx="0">
+            <a:schemeClr val="accent4"/>
+          </a:effectRef>
+          <a:fontRef idx="minor">
+            <a:schemeClr val="lt1"/>
+          </a:fontRef>
+        </p:style>
+        <p:txBody>
+          <a:bodyPr rtlCol="0" anchor="ctr"/>
+          <a:lstStyle/>
+          <a:p>
+            <a:pPr algn="ctr"/>
+            <a:r>
+              <a:rPr lang="en-US" dirty="0"/>
+              <a:t>M</a:t>
+            </a:r>
+          </a:p>
+        </p:txBody>
+      </p:sp>
+      <p:sp>
+        <p:nvSpPr>
+          <p:cNvPr id="28" name="Snip Single Corner Rectangle 27">
+            <a:extLst>
+              <a:ext uri="{FF2B5EF4-FFF2-40B4-BE49-F238E27FC236}">
+                <a16:creationId xmlns:a16="http://schemas.microsoft.com/office/drawing/2014/main" id="{376A0602-DB5B-5E40-BE3E-862271695BEF}"/>
+              </a:ext>
+            </a:extLst>
+          </p:cNvPr>
+          <p:cNvSpPr/>
+          <p:nvPr/>
+        </p:nvSpPr>
+        <p:spPr>
+          <a:xfrm>
+            <a:off x="4120152" y="4867900"/>
+            <a:ext cx="291655" cy="317292"/>
+          </a:xfrm>
+          <a:prstGeom prst="snip1Rect">
+            <a:avLst/>
+          </a:prstGeom>
+        </p:spPr>
+        <p:style>
+          <a:lnRef idx="2">
+            <a:schemeClr val="accent2">
+              <a:shade val="50000"/>
+            </a:schemeClr>
+          </a:lnRef>
+          <a:fillRef idx="1">
+            <a:schemeClr val="accent2"/>
+          </a:fillRef>
+          <a:effectRef idx="0">
+            <a:schemeClr val="accent2"/>
+          </a:effectRef>
+          <a:fontRef idx="minor">
+            <a:schemeClr val="lt1"/>
+          </a:fontRef>
+        </p:style>
+        <p:txBody>
+          <a:bodyPr rtlCol="0" anchor="ctr"/>
+          <a:lstStyle/>
+          <a:p>
+            <a:pPr algn="ctr"/>
+            <a:r>
+              <a:rPr lang="en-US" dirty="0"/>
+              <a:t>W</a:t>
+            </a:r>
+          </a:p>
+        </p:txBody>
+      </p:sp>
+      <p:sp>
+        <p:nvSpPr>
+          <p:cNvPr id="29" name="Snip Single Corner Rectangle 28">
+            <a:extLst>
+              <a:ext uri="{FF2B5EF4-FFF2-40B4-BE49-F238E27FC236}">
+                <a16:creationId xmlns:a16="http://schemas.microsoft.com/office/drawing/2014/main" id="{D8C856D9-17AB-E54D-BE31-7FBCD4A07537}"/>
+              </a:ext>
+            </a:extLst>
+          </p:cNvPr>
+          <p:cNvSpPr/>
+          <p:nvPr/>
+        </p:nvSpPr>
+        <p:spPr>
+          <a:xfrm>
+            <a:off x="5708023" y="4873612"/>
+            <a:ext cx="291655" cy="317292"/>
+          </a:xfrm>
+          <a:prstGeom prst="snip1Rect">
+            <a:avLst/>
+          </a:prstGeom>
+        </p:spPr>
+        <p:style>
+          <a:lnRef idx="2">
+            <a:schemeClr val="accent2">
+              <a:shade val="50000"/>
+            </a:schemeClr>
+          </a:lnRef>
+          <a:fillRef idx="1">
+            <a:schemeClr val="accent2"/>
+          </a:fillRef>
+          <a:effectRef idx="0">
+            <a:schemeClr val="accent2"/>
+          </a:effectRef>
+          <a:fontRef idx="minor">
+            <a:schemeClr val="lt1"/>
+          </a:fontRef>
+        </p:style>
+        <p:txBody>
+          <a:bodyPr rtlCol="0" anchor="ctr"/>
+          <a:lstStyle/>
+          <a:p>
+            <a:pPr algn="ctr"/>
+            <a:r>
+              <a:rPr lang="en-US" dirty="0"/>
+              <a:t>W</a:t>
+            </a:r>
+          </a:p>
+        </p:txBody>
+      </p:sp>
+      <p:sp>
+        <p:nvSpPr>
+          <p:cNvPr id="30" name="Snip Single Corner Rectangle 29">
+            <a:extLst>
+              <a:ext uri="{FF2B5EF4-FFF2-40B4-BE49-F238E27FC236}">
+                <a16:creationId xmlns:a16="http://schemas.microsoft.com/office/drawing/2014/main" id="{28F08A7F-B052-A542-80B3-9D0D27EC5955}"/>
+              </a:ext>
+            </a:extLst>
+          </p:cNvPr>
+          <p:cNvSpPr/>
+          <p:nvPr/>
+        </p:nvSpPr>
+        <p:spPr>
+          <a:xfrm>
+            <a:off x="7328264" y="4838971"/>
+            <a:ext cx="291655" cy="317292"/>
+          </a:xfrm>
+          <a:prstGeom prst="snip1Rect">
+            <a:avLst/>
+          </a:prstGeom>
+        </p:spPr>
+        <p:style>
+          <a:lnRef idx="2">
+            <a:schemeClr val="accent2">
+              <a:shade val="50000"/>
+            </a:schemeClr>
+          </a:lnRef>
+          <a:fillRef idx="1">
+            <a:schemeClr val="accent2"/>
+          </a:fillRef>
+          <a:effectRef idx="0">
+            <a:schemeClr val="accent2"/>
+          </a:effectRef>
+          <a:fontRef idx="minor">
+            <a:schemeClr val="lt1"/>
+          </a:fontRef>
+        </p:style>
+        <p:txBody>
+          <a:bodyPr rtlCol="0" anchor="ctr"/>
+          <a:lstStyle/>
+          <a:p>
+            <a:pPr algn="ctr"/>
+            <a:r>
+              <a:rPr lang="en-US" dirty="0"/>
+              <a:t>W</a:t>
+            </a:r>
+          </a:p>
+        </p:txBody>
+      </p:sp>
+      <p:sp>
+        <p:nvSpPr>
+          <p:cNvPr id="31" name="Snip Single Corner Rectangle 30">
+            <a:extLst>
+              <a:ext uri="{FF2B5EF4-FFF2-40B4-BE49-F238E27FC236}">
+                <a16:creationId xmlns:a16="http://schemas.microsoft.com/office/drawing/2014/main" id="{F1E362E6-1F53-9644-9976-F35F2A2F16C5}"/>
+              </a:ext>
+            </a:extLst>
+          </p:cNvPr>
+          <p:cNvSpPr/>
+          <p:nvPr/>
+        </p:nvSpPr>
+        <p:spPr>
+          <a:xfrm>
+            <a:off x="8916341" y="4887588"/>
+            <a:ext cx="291655" cy="317292"/>
+          </a:xfrm>
+          <a:prstGeom prst="snip1Rect">
+            <a:avLst/>
+          </a:prstGeom>
+        </p:spPr>
+        <p:style>
+          <a:lnRef idx="2">
+            <a:schemeClr val="accent2">
+              <a:shade val="50000"/>
+            </a:schemeClr>
+          </a:lnRef>
+          <a:fillRef idx="1">
+            <a:schemeClr val="accent2"/>
+          </a:fillRef>
+          <a:effectRef idx="0">
+            <a:schemeClr val="accent2"/>
+          </a:effectRef>
+          <a:fontRef idx="minor">
+            <a:schemeClr val="lt1"/>
+          </a:fontRef>
+        </p:style>
+        <p:txBody>
+          <a:bodyPr rtlCol="0" anchor="ctr"/>
+          <a:lstStyle/>
+          <a:p>
+            <a:pPr algn="ctr"/>
+            <a:r>
+              <a:rPr lang="en-US" dirty="0"/>
+              <a:t>W</a:t>
+            </a:r>
+          </a:p>
+        </p:txBody>
+      </p:sp>
+      <p:sp>
+        <p:nvSpPr>
+          <p:cNvPr id="35" name="Snip Single Corner Rectangle 34">
+            <a:extLst>
+              <a:ext uri="{FF2B5EF4-FFF2-40B4-BE49-F238E27FC236}">
+                <a16:creationId xmlns:a16="http://schemas.microsoft.com/office/drawing/2014/main" id="{E83815B2-5932-D94A-AFFB-6C2073CAEE4C}"/>
+              </a:ext>
+            </a:extLst>
+          </p:cNvPr>
+          <p:cNvSpPr/>
+          <p:nvPr/>
+        </p:nvSpPr>
+        <p:spPr>
+          <a:xfrm>
+            <a:off x="9559629" y="1466562"/>
+            <a:ext cx="291655" cy="317292"/>
+          </a:xfrm>
+          <a:prstGeom prst="snip1Rect">
+            <a:avLst/>
+          </a:prstGeom>
+        </p:spPr>
+        <p:style>
+          <a:lnRef idx="2">
+            <a:schemeClr val="accent4">
+              <a:shade val="50000"/>
+            </a:schemeClr>
+          </a:lnRef>
+          <a:fillRef idx="1">
+            <a:schemeClr val="accent4"/>
+          </a:fillRef>
+          <a:effectRef idx="0">
+            <a:schemeClr val="accent4"/>
+          </a:effectRef>
+          <a:fontRef idx="minor">
+            <a:schemeClr val="lt1"/>
+          </a:fontRef>
+        </p:style>
+        <p:txBody>
+          <a:bodyPr rtlCol="0" anchor="ctr"/>
+          <a:lstStyle/>
+          <a:p>
+            <a:pPr algn="ctr"/>
+            <a:r>
+              <a:rPr lang="en-US" sz="1200" dirty="0"/>
+              <a:t>M</a:t>
+            </a:r>
+          </a:p>
+        </p:txBody>
+      </p:sp>
+      <p:sp>
+        <p:nvSpPr>
+          <p:cNvPr id="36" name="Snip Single Corner Rectangle 35">
+            <a:extLst>
+              <a:ext uri="{FF2B5EF4-FFF2-40B4-BE49-F238E27FC236}">
+                <a16:creationId xmlns:a16="http://schemas.microsoft.com/office/drawing/2014/main" id="{FBE39F69-4280-4049-AA21-3D4DC4E27573}"/>
+              </a:ext>
+            </a:extLst>
+          </p:cNvPr>
+          <p:cNvSpPr/>
+          <p:nvPr/>
+        </p:nvSpPr>
+        <p:spPr>
+          <a:xfrm>
+            <a:off x="9540067" y="2076451"/>
+            <a:ext cx="291655" cy="317292"/>
+          </a:xfrm>
+          <a:prstGeom prst="snip1Rect">
+            <a:avLst/>
+          </a:prstGeom>
+        </p:spPr>
+        <p:style>
+          <a:lnRef idx="2">
+            <a:schemeClr val="accent2">
+              <a:shade val="50000"/>
+            </a:schemeClr>
+          </a:lnRef>
+          <a:fillRef idx="1">
+            <a:schemeClr val="accent2"/>
+          </a:fillRef>
+          <a:effectRef idx="0">
+            <a:schemeClr val="accent2"/>
+          </a:effectRef>
+          <a:fontRef idx="minor">
+            <a:schemeClr val="lt1"/>
+          </a:fontRef>
+        </p:style>
+        <p:txBody>
+          <a:bodyPr rtlCol="0" anchor="ctr"/>
+          <a:lstStyle/>
+          <a:p>
+            <a:pPr algn="ctr"/>
+            <a:r>
+              <a:rPr lang="en-US" sz="1200" dirty="0"/>
+              <a:t>W</a:t>
+            </a:r>
+          </a:p>
+        </p:txBody>
+      </p:sp>
+      <p:sp>
+        <p:nvSpPr>
+          <p:cNvPr id="37" name="TextBox 36">
+            <a:extLst>
+              <a:ext uri="{FF2B5EF4-FFF2-40B4-BE49-F238E27FC236}">
+                <a16:creationId xmlns:a16="http://schemas.microsoft.com/office/drawing/2014/main" id="{CBDAB471-40AB-0742-9274-9A0650CE2224}"/>
+              </a:ext>
+            </a:extLst>
+          </p:cNvPr>
+          <p:cNvSpPr txBox="1"/>
+          <p:nvPr/>
+        </p:nvSpPr>
+        <p:spPr>
+          <a:xfrm>
             <a:off x="9884102" y="2092641"/>
             <a:ext cx="2010627" cy="461665"/>
           </a:xfrm>
@@ -6919,7 +8498,7 @@
 </p:sld>
 </file>
 
-<file path=ppt/slides/slide4.xml><?xml version="1.0" encoding="utf-8"?>
+<file path=ppt/slides/slide5.xml><?xml version="1.0" encoding="utf-8"?>
 <p:sld xmlns:a="http://schemas.openxmlformats.org/drawingml/2006/main" xmlns:r="http://schemas.openxmlformats.org/officeDocument/2006/relationships" xmlns:p="http://schemas.openxmlformats.org/presentationml/2006/main">
   <p:cSld>
     <p:spTree>

</xml_diff>

<commit_message>
add mesh network images
</commit_message>
<xml_diff>
--- a/images/network.pptx
+++ b/images/network.pptx
@@ -4,12 +4,17 @@
   <p:sldMasterIdLst>
     <p:sldMasterId id="2147483648" r:id="rId1"/>
   </p:sldMasterIdLst>
+  <p:notesMasterIdLst>
+    <p:notesMasterId r:id="rId9"/>
+  </p:notesMasterIdLst>
   <p:sldIdLst>
     <p:sldId id="256" r:id="rId2"/>
     <p:sldId id="260" r:id="rId3"/>
     <p:sldId id="258" r:id="rId4"/>
     <p:sldId id="259" r:id="rId5"/>
-    <p:sldId id="257" r:id="rId6"/>
+    <p:sldId id="261" r:id="rId6"/>
+    <p:sldId id="262" r:id="rId7"/>
+    <p:sldId id="257" r:id="rId8"/>
   </p:sldIdLst>
   <p:sldSz cx="12192000" cy="6858000"/>
   <p:notesSz cx="6858000" cy="9144000"/>
@@ -116,6 +121,523 @@
 </p:presentation>
 </file>
 
+<file path=ppt/notesMasters/notesMaster1.xml><?xml version="1.0" encoding="utf-8"?>
+<p:notesMaster xmlns:a="http://schemas.openxmlformats.org/drawingml/2006/main" xmlns:r="http://schemas.openxmlformats.org/officeDocument/2006/relationships" xmlns:p="http://schemas.openxmlformats.org/presentationml/2006/main">
+  <p:cSld>
+    <p:bg>
+      <p:bgRef idx="1001">
+        <a:schemeClr val="bg1"/>
+      </p:bgRef>
+    </p:bg>
+    <p:spTree>
+      <p:nvGrpSpPr>
+        <p:cNvPr id="1" name=""/>
+        <p:cNvGrpSpPr/>
+        <p:nvPr/>
+      </p:nvGrpSpPr>
+      <p:grpSpPr>
+        <a:xfrm>
+          <a:off x="0" y="0"/>
+          <a:ext cx="0" cy="0"/>
+          <a:chOff x="0" y="0"/>
+          <a:chExt cx="0" cy="0"/>
+        </a:xfrm>
+      </p:grpSpPr>
+      <p:sp>
+        <p:nvSpPr>
+          <p:cNvPr id="2" name="Header Placeholder 1"/>
+          <p:cNvSpPr>
+            <a:spLocks noGrp="1"/>
+          </p:cNvSpPr>
+          <p:nvPr>
+            <p:ph type="hdr" sz="quarter"/>
+          </p:nvPr>
+        </p:nvSpPr>
+        <p:spPr>
+          <a:xfrm>
+            <a:off x="0" y="0"/>
+            <a:ext cx="2971800" cy="458788"/>
+          </a:xfrm>
+          <a:prstGeom prst="rect">
+            <a:avLst/>
+          </a:prstGeom>
+        </p:spPr>
+        <p:txBody>
+          <a:bodyPr vert="horz" lIns="91440" tIns="45720" rIns="91440" bIns="45720" rtlCol="0"/>
+          <a:lstStyle>
+            <a:lvl1pPr algn="l">
+              <a:defRPr sz="1200"/>
+            </a:lvl1pPr>
+          </a:lstStyle>
+          <a:p>
+            <a:endParaRPr lang="en-US"/>
+          </a:p>
+        </p:txBody>
+      </p:sp>
+      <p:sp>
+        <p:nvSpPr>
+          <p:cNvPr id="3" name="Date Placeholder 2"/>
+          <p:cNvSpPr>
+            <a:spLocks noGrp="1"/>
+          </p:cNvSpPr>
+          <p:nvPr>
+            <p:ph type="dt" idx="1"/>
+          </p:nvPr>
+        </p:nvSpPr>
+        <p:spPr>
+          <a:xfrm>
+            <a:off x="3884613" y="0"/>
+            <a:ext cx="2971800" cy="458788"/>
+          </a:xfrm>
+          <a:prstGeom prst="rect">
+            <a:avLst/>
+          </a:prstGeom>
+        </p:spPr>
+        <p:txBody>
+          <a:bodyPr vert="horz" lIns="91440" tIns="45720" rIns="91440" bIns="45720" rtlCol="0"/>
+          <a:lstStyle>
+            <a:lvl1pPr algn="r">
+              <a:defRPr sz="1200"/>
+            </a:lvl1pPr>
+          </a:lstStyle>
+          <a:p>
+            <a:fld id="{372C1C74-93C0-064E-97E2-A38DE4EBBECA}" type="datetimeFigureOut">
+              <a:rPr lang="en-US" smtClean="0"/>
+              <a:t>4/14/22</a:t>
+            </a:fld>
+            <a:endParaRPr lang="en-US"/>
+          </a:p>
+        </p:txBody>
+      </p:sp>
+      <p:sp>
+        <p:nvSpPr>
+          <p:cNvPr id="4" name="Slide Image Placeholder 3"/>
+          <p:cNvSpPr>
+            <a:spLocks noGrp="1" noRot="1" noChangeAspect="1"/>
+          </p:cNvSpPr>
+          <p:nvPr>
+            <p:ph type="sldImg" idx="2"/>
+          </p:nvPr>
+        </p:nvSpPr>
+        <p:spPr>
+          <a:xfrm>
+            <a:off x="685800" y="1143000"/>
+            <a:ext cx="5486400" cy="3086100"/>
+          </a:xfrm>
+          <a:prstGeom prst="rect">
+            <a:avLst/>
+          </a:prstGeom>
+          <a:noFill/>
+          <a:ln w="12700">
+            <a:solidFill>
+              <a:prstClr val="black"/>
+            </a:solidFill>
+          </a:ln>
+        </p:spPr>
+        <p:txBody>
+          <a:bodyPr vert="horz" lIns="91440" tIns="45720" rIns="91440" bIns="45720" rtlCol="0" anchor="ctr"/>
+          <a:lstStyle/>
+          <a:p>
+            <a:endParaRPr lang="en-US"/>
+          </a:p>
+        </p:txBody>
+      </p:sp>
+      <p:sp>
+        <p:nvSpPr>
+          <p:cNvPr id="5" name="Notes Placeholder 4"/>
+          <p:cNvSpPr>
+            <a:spLocks noGrp="1"/>
+          </p:cNvSpPr>
+          <p:nvPr>
+            <p:ph type="body" sz="quarter" idx="3"/>
+          </p:nvPr>
+        </p:nvSpPr>
+        <p:spPr>
+          <a:xfrm>
+            <a:off x="685800" y="4400550"/>
+            <a:ext cx="5486400" cy="3600450"/>
+          </a:xfrm>
+          <a:prstGeom prst="rect">
+            <a:avLst/>
+          </a:prstGeom>
+        </p:spPr>
+        <p:txBody>
+          <a:bodyPr vert="horz" lIns="91440" tIns="45720" rIns="91440" bIns="45720" rtlCol="0"/>
+          <a:lstStyle/>
+          <a:p>
+            <a:pPr lvl="0"/>
+            <a:r>
+              <a:rPr lang="en-US"/>
+              <a:t>Click to edit Master text styles</a:t>
+            </a:r>
+          </a:p>
+          <a:p>
+            <a:pPr lvl="1"/>
+            <a:r>
+              <a:rPr lang="en-US"/>
+              <a:t>Second level</a:t>
+            </a:r>
+          </a:p>
+          <a:p>
+            <a:pPr lvl="2"/>
+            <a:r>
+              <a:rPr lang="en-US"/>
+              <a:t>Third level</a:t>
+            </a:r>
+          </a:p>
+          <a:p>
+            <a:pPr lvl="3"/>
+            <a:r>
+              <a:rPr lang="en-US"/>
+              <a:t>Fourth level</a:t>
+            </a:r>
+          </a:p>
+          <a:p>
+            <a:pPr lvl="4"/>
+            <a:r>
+              <a:rPr lang="en-US"/>
+              <a:t>Fifth level</a:t>
+            </a:r>
+          </a:p>
+        </p:txBody>
+      </p:sp>
+      <p:sp>
+        <p:nvSpPr>
+          <p:cNvPr id="6" name="Footer Placeholder 5"/>
+          <p:cNvSpPr>
+            <a:spLocks noGrp="1"/>
+          </p:cNvSpPr>
+          <p:nvPr>
+            <p:ph type="ftr" sz="quarter" idx="4"/>
+          </p:nvPr>
+        </p:nvSpPr>
+        <p:spPr>
+          <a:xfrm>
+            <a:off x="0" y="8685213"/>
+            <a:ext cx="2971800" cy="458787"/>
+          </a:xfrm>
+          <a:prstGeom prst="rect">
+            <a:avLst/>
+          </a:prstGeom>
+        </p:spPr>
+        <p:txBody>
+          <a:bodyPr vert="horz" lIns="91440" tIns="45720" rIns="91440" bIns="45720" rtlCol="0" anchor="b"/>
+          <a:lstStyle>
+            <a:lvl1pPr algn="l">
+              <a:defRPr sz="1200"/>
+            </a:lvl1pPr>
+          </a:lstStyle>
+          <a:p>
+            <a:endParaRPr lang="en-US"/>
+          </a:p>
+        </p:txBody>
+      </p:sp>
+      <p:sp>
+        <p:nvSpPr>
+          <p:cNvPr id="7" name="Slide Number Placeholder 6"/>
+          <p:cNvSpPr>
+            <a:spLocks noGrp="1"/>
+          </p:cNvSpPr>
+          <p:nvPr>
+            <p:ph type="sldNum" sz="quarter" idx="5"/>
+          </p:nvPr>
+        </p:nvSpPr>
+        <p:spPr>
+          <a:xfrm>
+            <a:off x="3884613" y="8685213"/>
+            <a:ext cx="2971800" cy="458787"/>
+          </a:xfrm>
+          <a:prstGeom prst="rect">
+            <a:avLst/>
+          </a:prstGeom>
+        </p:spPr>
+        <p:txBody>
+          <a:bodyPr vert="horz" lIns="91440" tIns="45720" rIns="91440" bIns="45720" rtlCol="0" anchor="b"/>
+          <a:lstStyle>
+            <a:lvl1pPr algn="r">
+              <a:defRPr sz="1200"/>
+            </a:lvl1pPr>
+          </a:lstStyle>
+          <a:p>
+            <a:fld id="{75C9799E-A595-5147-881F-6C525CAF4F25}" type="slidenum">
+              <a:rPr lang="en-US" smtClean="0"/>
+              <a:t>‹#›</a:t>
+            </a:fld>
+            <a:endParaRPr lang="en-US"/>
+          </a:p>
+        </p:txBody>
+      </p:sp>
+    </p:spTree>
+    <p:extLst>
+      <p:ext uri="{BB962C8B-B14F-4D97-AF65-F5344CB8AC3E}">
+        <p14:creationId xmlns:p14="http://schemas.microsoft.com/office/powerpoint/2010/main" val="3870039102"/>
+      </p:ext>
+    </p:extLst>
+  </p:cSld>
+  <p:clrMap bg1="lt1" tx1="dk1" bg2="lt2" tx2="dk2" accent1="accent1" accent2="accent2" accent3="accent3" accent4="accent4" accent5="accent5" accent6="accent6" hlink="hlink" folHlink="folHlink"/>
+  <p:notesStyle>
+    <a:lvl1pPr marL="0" algn="l" defTabSz="914400" rtl="0" eaLnBrk="1" latinLnBrk="0" hangingPunct="1">
+      <a:defRPr sz="1200" kern="1200">
+        <a:solidFill>
+          <a:schemeClr val="tx1"/>
+        </a:solidFill>
+        <a:latin typeface="+mn-lt"/>
+        <a:ea typeface="+mn-ea"/>
+        <a:cs typeface="+mn-cs"/>
+      </a:defRPr>
+    </a:lvl1pPr>
+    <a:lvl2pPr marL="457200" algn="l" defTabSz="914400" rtl="0" eaLnBrk="1" latinLnBrk="0" hangingPunct="1">
+      <a:defRPr sz="1200" kern="1200">
+        <a:solidFill>
+          <a:schemeClr val="tx1"/>
+        </a:solidFill>
+        <a:latin typeface="+mn-lt"/>
+        <a:ea typeface="+mn-ea"/>
+        <a:cs typeface="+mn-cs"/>
+      </a:defRPr>
+    </a:lvl2pPr>
+    <a:lvl3pPr marL="914400" algn="l" defTabSz="914400" rtl="0" eaLnBrk="1" latinLnBrk="0" hangingPunct="1">
+      <a:defRPr sz="1200" kern="1200">
+        <a:solidFill>
+          <a:schemeClr val="tx1"/>
+        </a:solidFill>
+        <a:latin typeface="+mn-lt"/>
+        <a:ea typeface="+mn-ea"/>
+        <a:cs typeface="+mn-cs"/>
+      </a:defRPr>
+    </a:lvl3pPr>
+    <a:lvl4pPr marL="1371600" algn="l" defTabSz="914400" rtl="0" eaLnBrk="1" latinLnBrk="0" hangingPunct="1">
+      <a:defRPr sz="1200" kern="1200">
+        <a:solidFill>
+          <a:schemeClr val="tx1"/>
+        </a:solidFill>
+        <a:latin typeface="+mn-lt"/>
+        <a:ea typeface="+mn-ea"/>
+        <a:cs typeface="+mn-cs"/>
+      </a:defRPr>
+    </a:lvl4pPr>
+    <a:lvl5pPr marL="1828800" algn="l" defTabSz="914400" rtl="0" eaLnBrk="1" latinLnBrk="0" hangingPunct="1">
+      <a:defRPr sz="1200" kern="1200">
+        <a:solidFill>
+          <a:schemeClr val="tx1"/>
+        </a:solidFill>
+        <a:latin typeface="+mn-lt"/>
+        <a:ea typeface="+mn-ea"/>
+        <a:cs typeface="+mn-cs"/>
+      </a:defRPr>
+    </a:lvl5pPr>
+    <a:lvl6pPr marL="2286000" algn="l" defTabSz="914400" rtl="0" eaLnBrk="1" latinLnBrk="0" hangingPunct="1">
+      <a:defRPr sz="1200" kern="1200">
+        <a:solidFill>
+          <a:schemeClr val="tx1"/>
+        </a:solidFill>
+        <a:latin typeface="+mn-lt"/>
+        <a:ea typeface="+mn-ea"/>
+        <a:cs typeface="+mn-cs"/>
+      </a:defRPr>
+    </a:lvl6pPr>
+    <a:lvl7pPr marL="2743200" algn="l" defTabSz="914400" rtl="0" eaLnBrk="1" latinLnBrk="0" hangingPunct="1">
+      <a:defRPr sz="1200" kern="1200">
+        <a:solidFill>
+          <a:schemeClr val="tx1"/>
+        </a:solidFill>
+        <a:latin typeface="+mn-lt"/>
+        <a:ea typeface="+mn-ea"/>
+        <a:cs typeface="+mn-cs"/>
+      </a:defRPr>
+    </a:lvl7pPr>
+    <a:lvl8pPr marL="3200400" algn="l" defTabSz="914400" rtl="0" eaLnBrk="1" latinLnBrk="0" hangingPunct="1">
+      <a:defRPr sz="1200" kern="1200">
+        <a:solidFill>
+          <a:schemeClr val="tx1"/>
+        </a:solidFill>
+        <a:latin typeface="+mn-lt"/>
+        <a:ea typeface="+mn-ea"/>
+        <a:cs typeface="+mn-cs"/>
+      </a:defRPr>
+    </a:lvl8pPr>
+    <a:lvl9pPr marL="3657600" algn="l" defTabSz="914400" rtl="0" eaLnBrk="1" latinLnBrk="0" hangingPunct="1">
+      <a:defRPr sz="1200" kern="1200">
+        <a:solidFill>
+          <a:schemeClr val="tx1"/>
+        </a:solidFill>
+        <a:latin typeface="+mn-lt"/>
+        <a:ea typeface="+mn-ea"/>
+        <a:cs typeface="+mn-cs"/>
+      </a:defRPr>
+    </a:lvl9pPr>
+  </p:notesStyle>
+</p:notesMaster>
+</file>
+
+<file path=ppt/notesSlides/notesSlide1.xml><?xml version="1.0" encoding="utf-8"?>
+<p:notes xmlns:a="http://schemas.openxmlformats.org/drawingml/2006/main" xmlns:r="http://schemas.openxmlformats.org/officeDocument/2006/relationships" xmlns:p="http://schemas.openxmlformats.org/presentationml/2006/main">
+  <p:cSld>
+    <p:spTree>
+      <p:nvGrpSpPr>
+        <p:cNvPr id="1" name=""/>
+        <p:cNvGrpSpPr/>
+        <p:nvPr/>
+      </p:nvGrpSpPr>
+      <p:grpSpPr>
+        <a:xfrm>
+          <a:off x="0" y="0"/>
+          <a:ext cx="0" cy="0"/>
+          <a:chOff x="0" y="0"/>
+          <a:chExt cx="0" cy="0"/>
+        </a:xfrm>
+      </p:grpSpPr>
+      <p:sp>
+        <p:nvSpPr>
+          <p:cNvPr id="2" name="Slide Image Placeholder 1"/>
+          <p:cNvSpPr>
+            <a:spLocks noGrp="1" noRot="1" noChangeAspect="1"/>
+          </p:cNvSpPr>
+          <p:nvPr>
+            <p:ph type="sldImg"/>
+          </p:nvPr>
+        </p:nvSpPr>
+        <p:spPr/>
+      </p:sp>
+      <p:sp>
+        <p:nvSpPr>
+          <p:cNvPr id="3" name="Notes Placeholder 2"/>
+          <p:cNvSpPr>
+            <a:spLocks noGrp="1"/>
+          </p:cNvSpPr>
+          <p:nvPr>
+            <p:ph type="body" idx="1"/>
+          </p:nvPr>
+        </p:nvSpPr>
+        <p:spPr/>
+        <p:txBody>
+          <a:bodyPr/>
+          <a:lstStyle/>
+          <a:p>
+            <a:endParaRPr lang="en-US" dirty="0"/>
+          </a:p>
+        </p:txBody>
+      </p:sp>
+      <p:sp>
+        <p:nvSpPr>
+          <p:cNvPr id="4" name="Slide Number Placeholder 3"/>
+          <p:cNvSpPr>
+            <a:spLocks noGrp="1"/>
+          </p:cNvSpPr>
+          <p:nvPr>
+            <p:ph type="sldNum" sz="quarter" idx="5"/>
+          </p:nvPr>
+        </p:nvSpPr>
+        <p:spPr/>
+        <p:txBody>
+          <a:bodyPr/>
+          <a:lstStyle/>
+          <a:p>
+            <a:fld id="{75C9799E-A595-5147-881F-6C525CAF4F25}" type="slidenum">
+              <a:rPr lang="en-US" smtClean="0"/>
+              <a:t>5</a:t>
+            </a:fld>
+            <a:endParaRPr lang="en-US"/>
+          </a:p>
+        </p:txBody>
+      </p:sp>
+    </p:spTree>
+    <p:extLst>
+      <p:ext uri="{BB962C8B-B14F-4D97-AF65-F5344CB8AC3E}">
+        <p14:creationId xmlns:p14="http://schemas.microsoft.com/office/powerpoint/2010/main" val="157205150"/>
+      </p:ext>
+    </p:extLst>
+  </p:cSld>
+  <p:clrMapOvr>
+    <a:masterClrMapping/>
+  </p:clrMapOvr>
+</p:notes>
+</file>
+
+<file path=ppt/notesSlides/notesSlide2.xml><?xml version="1.0" encoding="utf-8"?>
+<p:notes xmlns:a="http://schemas.openxmlformats.org/drawingml/2006/main" xmlns:r="http://schemas.openxmlformats.org/officeDocument/2006/relationships" xmlns:p="http://schemas.openxmlformats.org/presentationml/2006/main">
+  <p:cSld>
+    <p:spTree>
+      <p:nvGrpSpPr>
+        <p:cNvPr id="1" name=""/>
+        <p:cNvGrpSpPr/>
+        <p:nvPr/>
+      </p:nvGrpSpPr>
+      <p:grpSpPr>
+        <a:xfrm>
+          <a:off x="0" y="0"/>
+          <a:ext cx="0" cy="0"/>
+          <a:chOff x="0" y="0"/>
+          <a:chExt cx="0" cy="0"/>
+        </a:xfrm>
+      </p:grpSpPr>
+      <p:sp>
+        <p:nvSpPr>
+          <p:cNvPr id="2" name="Slide Image Placeholder 1"/>
+          <p:cNvSpPr>
+            <a:spLocks noGrp="1" noRot="1" noChangeAspect="1"/>
+          </p:cNvSpPr>
+          <p:nvPr>
+            <p:ph type="sldImg"/>
+          </p:nvPr>
+        </p:nvSpPr>
+        <p:spPr/>
+      </p:sp>
+      <p:sp>
+        <p:nvSpPr>
+          <p:cNvPr id="3" name="Notes Placeholder 2"/>
+          <p:cNvSpPr>
+            <a:spLocks noGrp="1"/>
+          </p:cNvSpPr>
+          <p:nvPr>
+            <p:ph type="body" idx="1"/>
+          </p:nvPr>
+        </p:nvSpPr>
+        <p:spPr/>
+        <p:txBody>
+          <a:bodyPr/>
+          <a:lstStyle/>
+          <a:p>
+            <a:endParaRPr lang="en-US" dirty="0"/>
+          </a:p>
+        </p:txBody>
+      </p:sp>
+      <p:sp>
+        <p:nvSpPr>
+          <p:cNvPr id="4" name="Slide Number Placeholder 3"/>
+          <p:cNvSpPr>
+            <a:spLocks noGrp="1"/>
+          </p:cNvSpPr>
+          <p:nvPr>
+            <p:ph type="sldNum" sz="quarter" idx="5"/>
+          </p:nvPr>
+        </p:nvSpPr>
+        <p:spPr/>
+        <p:txBody>
+          <a:bodyPr/>
+          <a:lstStyle/>
+          <a:p>
+            <a:fld id="{75C9799E-A595-5147-881F-6C525CAF4F25}" type="slidenum">
+              <a:rPr lang="en-US" smtClean="0"/>
+              <a:t>6</a:t>
+            </a:fld>
+            <a:endParaRPr lang="en-US"/>
+          </a:p>
+        </p:txBody>
+      </p:sp>
+    </p:spTree>
+    <p:extLst>
+      <p:ext uri="{BB962C8B-B14F-4D97-AF65-F5344CB8AC3E}">
+        <p14:creationId xmlns:p14="http://schemas.microsoft.com/office/powerpoint/2010/main" val="681487509"/>
+      </p:ext>
+    </p:extLst>
+  </p:cSld>
+  <p:clrMapOvr>
+    <a:masterClrMapping/>
+  </p:clrMapOvr>
+</p:notes>
+</file>
+
 <file path=ppt/slideLayouts/slideLayout1.xml><?xml version="1.0" encoding="utf-8"?>
 <p:sldLayout xmlns:a="http://schemas.openxmlformats.org/drawingml/2006/main" xmlns:r="http://schemas.openxmlformats.org/officeDocument/2006/relationships" xmlns:p="http://schemas.openxmlformats.org/presentationml/2006/main" type="title" preserve="1">
   <p:cSld name="Title Slide">
@@ -245,7 +767,7 @@
           <a:p>
             <a:fld id="{0EC95C33-DAB6-4546-B06D-886B2BAD356F}" type="datetimeFigureOut">
               <a:rPr lang="en-US" smtClean="0"/>
-              <a:t>1/21/21</a:t>
+              <a:t>4/14/22</a:t>
             </a:fld>
             <a:endParaRPr lang="en-US"/>
           </a:p>
@@ -413,7 +935,7 @@
           <a:p>
             <a:fld id="{0EC95C33-DAB6-4546-B06D-886B2BAD356F}" type="datetimeFigureOut">
               <a:rPr lang="en-US" smtClean="0"/>
-              <a:t>1/21/21</a:t>
+              <a:t>4/14/22</a:t>
             </a:fld>
             <a:endParaRPr lang="en-US"/>
           </a:p>
@@ -591,7 +1113,7 @@
           <a:p>
             <a:fld id="{0EC95C33-DAB6-4546-B06D-886B2BAD356F}" type="datetimeFigureOut">
               <a:rPr lang="en-US" smtClean="0"/>
-              <a:t>1/21/21</a:t>
+              <a:t>4/14/22</a:t>
             </a:fld>
             <a:endParaRPr lang="en-US"/>
           </a:p>
@@ -759,7 +1281,7 @@
           <a:p>
             <a:fld id="{0EC95C33-DAB6-4546-B06D-886B2BAD356F}" type="datetimeFigureOut">
               <a:rPr lang="en-US" smtClean="0"/>
-              <a:t>1/21/21</a:t>
+              <a:t>4/14/22</a:t>
             </a:fld>
             <a:endParaRPr lang="en-US"/>
           </a:p>
@@ -1004,7 +1526,7 @@
           <a:p>
             <a:fld id="{0EC95C33-DAB6-4546-B06D-886B2BAD356F}" type="datetimeFigureOut">
               <a:rPr lang="en-US" smtClean="0"/>
-              <a:t>1/21/21</a:t>
+              <a:t>4/14/22</a:t>
             </a:fld>
             <a:endParaRPr lang="en-US"/>
           </a:p>
@@ -1233,7 +1755,7 @@
           <a:p>
             <a:fld id="{0EC95C33-DAB6-4546-B06D-886B2BAD356F}" type="datetimeFigureOut">
               <a:rPr lang="en-US" smtClean="0"/>
-              <a:t>1/21/21</a:t>
+              <a:t>4/14/22</a:t>
             </a:fld>
             <a:endParaRPr lang="en-US"/>
           </a:p>
@@ -1597,7 +2119,7 @@
           <a:p>
             <a:fld id="{0EC95C33-DAB6-4546-B06D-886B2BAD356F}" type="datetimeFigureOut">
               <a:rPr lang="en-US" smtClean="0"/>
-              <a:t>1/21/21</a:t>
+              <a:t>4/14/22</a:t>
             </a:fld>
             <a:endParaRPr lang="en-US"/>
           </a:p>
@@ -1714,7 +2236,7 @@
           <a:p>
             <a:fld id="{0EC95C33-DAB6-4546-B06D-886B2BAD356F}" type="datetimeFigureOut">
               <a:rPr lang="en-US" smtClean="0"/>
-              <a:t>1/21/21</a:t>
+              <a:t>4/14/22</a:t>
             </a:fld>
             <a:endParaRPr lang="en-US"/>
           </a:p>
@@ -1809,7 +2331,7 @@
           <a:p>
             <a:fld id="{0EC95C33-DAB6-4546-B06D-886B2BAD356F}" type="datetimeFigureOut">
               <a:rPr lang="en-US" smtClean="0"/>
-              <a:t>1/21/21</a:t>
+              <a:t>4/14/22</a:t>
             </a:fld>
             <a:endParaRPr lang="en-US"/>
           </a:p>
@@ -2084,7 +2606,7 @@
           <a:p>
             <a:fld id="{0EC95C33-DAB6-4546-B06D-886B2BAD356F}" type="datetimeFigureOut">
               <a:rPr lang="en-US" smtClean="0"/>
-              <a:t>1/21/21</a:t>
+              <a:t>4/14/22</a:t>
             </a:fld>
             <a:endParaRPr lang="en-US"/>
           </a:p>
@@ -2336,7 +2858,7 @@
           <a:p>
             <a:fld id="{0EC95C33-DAB6-4546-B06D-886B2BAD356F}" type="datetimeFigureOut">
               <a:rPr lang="en-US" smtClean="0"/>
-              <a:t>1/21/21</a:t>
+              <a:t>4/14/22</a:t>
             </a:fld>
             <a:endParaRPr lang="en-US"/>
           </a:p>
@@ -2547,7 +3069,7 @@
           <a:p>
             <a:fld id="{0EC95C33-DAB6-4546-B06D-886B2BAD356F}" type="datetimeFigureOut">
               <a:rPr lang="en-US" smtClean="0"/>
-              <a:t>1/21/21</a:t>
+              <a:t>4/14/22</a:t>
             </a:fld>
             <a:endParaRPr lang="en-US"/>
           </a:p>
@@ -8603,6 +9125,3834 @@
 </file>
 
 <file path=ppt/slides/slide5.xml><?xml version="1.0" encoding="utf-8"?>
+<p:sld xmlns:a="http://schemas.openxmlformats.org/drawingml/2006/main" xmlns:r="http://schemas.openxmlformats.org/officeDocument/2006/relationships" xmlns:p="http://schemas.openxmlformats.org/presentationml/2006/main">
+  <p:cSld>
+    <p:spTree>
+      <p:nvGrpSpPr>
+        <p:cNvPr id="1" name=""/>
+        <p:cNvGrpSpPr/>
+        <p:nvPr/>
+      </p:nvGrpSpPr>
+      <p:grpSpPr>
+        <a:xfrm>
+          <a:off x="0" y="0"/>
+          <a:ext cx="0" cy="0"/>
+          <a:chOff x="0" y="0"/>
+          <a:chExt cx="0" cy="0"/>
+        </a:xfrm>
+      </p:grpSpPr>
+      <p:sp>
+        <p:nvSpPr>
+          <p:cNvPr id="11" name="Rectangle 10">
+            <a:extLst>
+              <a:ext uri="{FF2B5EF4-FFF2-40B4-BE49-F238E27FC236}">
+                <a16:creationId xmlns:a16="http://schemas.microsoft.com/office/drawing/2014/main" id="{2575B382-93BF-E1D9-66B6-416479D7DC3B}"/>
+              </a:ext>
+            </a:extLst>
+          </p:cNvPr>
+          <p:cNvSpPr/>
+          <p:nvPr/>
+        </p:nvSpPr>
+        <p:spPr>
+          <a:xfrm>
+            <a:off x="2055253" y="1005016"/>
+            <a:ext cx="3291104" cy="1614616"/>
+          </a:xfrm>
+          <a:prstGeom prst="rect">
+            <a:avLst/>
+          </a:prstGeom>
+          <a:effectLst>
+            <a:outerShdw blurRad="50800" dist="38100" dir="2700000" algn="tl" rotWithShape="0">
+              <a:prstClr val="black">
+                <a:alpha val="40000"/>
+              </a:prstClr>
+            </a:outerShdw>
+          </a:effectLst>
+        </p:spPr>
+        <p:style>
+          <a:lnRef idx="2">
+            <a:schemeClr val="accent6"/>
+          </a:lnRef>
+          <a:fillRef idx="1">
+            <a:schemeClr val="lt1"/>
+          </a:fillRef>
+          <a:effectRef idx="0">
+            <a:schemeClr val="accent6"/>
+          </a:effectRef>
+          <a:fontRef idx="minor">
+            <a:schemeClr val="dk1"/>
+          </a:fontRef>
+        </p:style>
+        <p:txBody>
+          <a:bodyPr rtlCol="0" anchor="ctr"/>
+          <a:lstStyle/>
+          <a:p>
+            <a:pPr algn="ctr"/>
+            <a:endParaRPr lang="en-US"/>
+          </a:p>
+        </p:txBody>
+      </p:sp>
+      <p:sp>
+        <p:nvSpPr>
+          <p:cNvPr id="4" name="Rounded Rectangle 3"/>
+          <p:cNvSpPr/>
+          <p:nvPr/>
+        </p:nvSpPr>
+        <p:spPr>
+          <a:xfrm>
+            <a:off x="3115679" y="4290045"/>
+            <a:ext cx="1372805" cy="707572"/>
+          </a:xfrm>
+          <a:prstGeom prst="roundRect">
+            <a:avLst/>
+          </a:prstGeom>
+          <a:solidFill>
+            <a:schemeClr val="accent3">
+              <a:lumMod val="40000"/>
+              <a:lumOff val="60000"/>
+            </a:schemeClr>
+          </a:solidFill>
+          <a:effectLst>
+            <a:outerShdw blurRad="50800" dist="38100" dir="2700000" algn="tl" rotWithShape="0">
+              <a:prstClr val="black">
+                <a:alpha val="40000"/>
+              </a:prstClr>
+            </a:outerShdw>
+          </a:effectLst>
+        </p:spPr>
+        <p:style>
+          <a:lnRef idx="2">
+            <a:schemeClr val="accent1">
+              <a:shade val="50000"/>
+            </a:schemeClr>
+          </a:lnRef>
+          <a:fillRef idx="1">
+            <a:schemeClr val="accent1"/>
+          </a:fillRef>
+          <a:effectRef idx="0">
+            <a:schemeClr val="accent1"/>
+          </a:effectRef>
+          <a:fontRef idx="minor">
+            <a:schemeClr val="lt1"/>
+          </a:fontRef>
+        </p:style>
+        <p:txBody>
+          <a:bodyPr rtlCol="0" anchor="ctr"/>
+          <a:lstStyle/>
+          <a:p>
+            <a:pPr algn="ctr"/>
+            <a:r>
+              <a:rPr lang="en-US">
+                <a:solidFill>
+                  <a:schemeClr val="tx1"/>
+                </a:solidFill>
+              </a:rPr>
+              <a:t>PI Worker</a:t>
+            </a:r>
+          </a:p>
+        </p:txBody>
+      </p:sp>
+      <p:sp>
+        <p:nvSpPr>
+          <p:cNvPr id="5" name="Rounded Rectangle 4"/>
+          <p:cNvSpPr/>
+          <p:nvPr/>
+        </p:nvSpPr>
+        <p:spPr>
+          <a:xfrm>
+            <a:off x="5655653" y="2340258"/>
+            <a:ext cx="1372805" cy="707572"/>
+          </a:xfrm>
+          <a:prstGeom prst="roundRect">
+            <a:avLst/>
+          </a:prstGeom>
+          <a:solidFill>
+            <a:schemeClr val="accent3">
+              <a:lumMod val="40000"/>
+              <a:lumOff val="60000"/>
+            </a:schemeClr>
+          </a:solidFill>
+          <a:effectLst>
+            <a:outerShdw blurRad="50800" dist="38100" dir="2700000" algn="tl" rotWithShape="0">
+              <a:prstClr val="black">
+                <a:alpha val="40000"/>
+              </a:prstClr>
+            </a:outerShdw>
+          </a:effectLst>
+        </p:spPr>
+        <p:style>
+          <a:lnRef idx="2">
+            <a:schemeClr val="accent1">
+              <a:shade val="50000"/>
+            </a:schemeClr>
+          </a:lnRef>
+          <a:fillRef idx="1">
+            <a:schemeClr val="accent1"/>
+          </a:fillRef>
+          <a:effectRef idx="0">
+            <a:schemeClr val="accent1"/>
+          </a:effectRef>
+          <a:fontRef idx="minor">
+            <a:schemeClr val="lt1"/>
+          </a:fontRef>
+        </p:style>
+        <p:txBody>
+          <a:bodyPr rtlCol="0" anchor="ctr"/>
+          <a:lstStyle/>
+          <a:p>
+            <a:pPr algn="ctr"/>
+            <a:r>
+              <a:rPr lang="en-US">
+                <a:solidFill>
+                  <a:schemeClr val="tx1"/>
+                </a:solidFill>
+              </a:rPr>
+              <a:t>PI Master </a:t>
+            </a:r>
+            <a:endParaRPr lang="en-US" dirty="0">
+              <a:solidFill>
+                <a:schemeClr val="tx1"/>
+              </a:solidFill>
+            </a:endParaRPr>
+          </a:p>
+        </p:txBody>
+      </p:sp>
+      <p:sp>
+        <p:nvSpPr>
+          <p:cNvPr id="6" name="Rounded Rectangle 5"/>
+          <p:cNvSpPr/>
+          <p:nvPr/>
+        </p:nvSpPr>
+        <p:spPr>
+          <a:xfrm>
+            <a:off x="7928156" y="4290045"/>
+            <a:ext cx="1372805" cy="707572"/>
+          </a:xfrm>
+          <a:prstGeom prst="roundRect">
+            <a:avLst/>
+          </a:prstGeom>
+          <a:solidFill>
+            <a:schemeClr val="accent3">
+              <a:lumMod val="40000"/>
+              <a:lumOff val="60000"/>
+            </a:schemeClr>
+          </a:solidFill>
+          <a:effectLst>
+            <a:outerShdw blurRad="50800" dist="38100" dir="2700000" algn="tl" rotWithShape="0">
+              <a:prstClr val="black">
+                <a:alpha val="40000"/>
+              </a:prstClr>
+            </a:outerShdw>
+          </a:effectLst>
+        </p:spPr>
+        <p:style>
+          <a:lnRef idx="2">
+            <a:schemeClr val="accent1">
+              <a:shade val="50000"/>
+            </a:schemeClr>
+          </a:lnRef>
+          <a:fillRef idx="1">
+            <a:schemeClr val="accent1"/>
+          </a:fillRef>
+          <a:effectRef idx="0">
+            <a:schemeClr val="accent1"/>
+          </a:effectRef>
+          <a:fontRef idx="minor">
+            <a:schemeClr val="lt1"/>
+          </a:fontRef>
+        </p:style>
+        <p:txBody>
+          <a:bodyPr rtlCol="0" anchor="ctr"/>
+          <a:lstStyle/>
+          <a:p>
+            <a:pPr algn="ctr"/>
+            <a:r>
+              <a:rPr lang="en-US">
+                <a:solidFill>
+                  <a:schemeClr val="tx1"/>
+                </a:solidFill>
+              </a:rPr>
+              <a:t>PI Worker</a:t>
+            </a:r>
+          </a:p>
+        </p:txBody>
+      </p:sp>
+      <p:sp>
+        <p:nvSpPr>
+          <p:cNvPr id="7" name="Rounded Rectangle 6"/>
+          <p:cNvSpPr/>
+          <p:nvPr/>
+        </p:nvSpPr>
+        <p:spPr>
+          <a:xfrm>
+            <a:off x="6323997" y="4295984"/>
+            <a:ext cx="1372805" cy="707572"/>
+          </a:xfrm>
+          <a:prstGeom prst="roundRect">
+            <a:avLst/>
+          </a:prstGeom>
+          <a:solidFill>
+            <a:schemeClr val="accent3">
+              <a:lumMod val="40000"/>
+              <a:lumOff val="60000"/>
+            </a:schemeClr>
+          </a:solidFill>
+          <a:effectLst>
+            <a:outerShdw blurRad="50800" dist="38100" dir="2700000" algn="tl" rotWithShape="0">
+              <a:prstClr val="black">
+                <a:alpha val="40000"/>
+              </a:prstClr>
+            </a:outerShdw>
+          </a:effectLst>
+        </p:spPr>
+        <p:style>
+          <a:lnRef idx="2">
+            <a:schemeClr val="accent1">
+              <a:shade val="50000"/>
+            </a:schemeClr>
+          </a:lnRef>
+          <a:fillRef idx="1">
+            <a:schemeClr val="accent1"/>
+          </a:fillRef>
+          <a:effectRef idx="0">
+            <a:schemeClr val="accent1"/>
+          </a:effectRef>
+          <a:fontRef idx="minor">
+            <a:schemeClr val="lt1"/>
+          </a:fontRef>
+        </p:style>
+        <p:txBody>
+          <a:bodyPr rtlCol="0" anchor="ctr"/>
+          <a:lstStyle/>
+          <a:p>
+            <a:pPr algn="ctr"/>
+            <a:r>
+              <a:rPr lang="en-US">
+                <a:solidFill>
+                  <a:schemeClr val="tx1"/>
+                </a:solidFill>
+              </a:rPr>
+              <a:t>PI Worker</a:t>
+            </a:r>
+          </a:p>
+        </p:txBody>
+      </p:sp>
+      <p:sp>
+        <p:nvSpPr>
+          <p:cNvPr id="8" name="Rounded Rectangle 7"/>
+          <p:cNvSpPr/>
+          <p:nvPr/>
+        </p:nvSpPr>
+        <p:spPr>
+          <a:xfrm>
+            <a:off x="4719838" y="4290045"/>
+            <a:ext cx="1372805" cy="707572"/>
+          </a:xfrm>
+          <a:prstGeom prst="roundRect">
+            <a:avLst/>
+          </a:prstGeom>
+          <a:solidFill>
+            <a:schemeClr val="accent3">
+              <a:lumMod val="40000"/>
+              <a:lumOff val="60000"/>
+            </a:schemeClr>
+          </a:solidFill>
+          <a:effectLst>
+            <a:outerShdw blurRad="50800" dist="38100" dir="2700000" algn="tl" rotWithShape="0">
+              <a:prstClr val="black">
+                <a:alpha val="40000"/>
+              </a:prstClr>
+            </a:outerShdw>
+          </a:effectLst>
+        </p:spPr>
+        <p:style>
+          <a:lnRef idx="2">
+            <a:schemeClr val="accent1">
+              <a:shade val="50000"/>
+            </a:schemeClr>
+          </a:lnRef>
+          <a:fillRef idx="1">
+            <a:schemeClr val="accent1"/>
+          </a:fillRef>
+          <a:effectRef idx="0">
+            <a:schemeClr val="accent1"/>
+          </a:effectRef>
+          <a:fontRef idx="minor">
+            <a:schemeClr val="lt1"/>
+          </a:fontRef>
+        </p:style>
+        <p:txBody>
+          <a:bodyPr rtlCol="0" anchor="ctr"/>
+          <a:lstStyle/>
+          <a:p>
+            <a:pPr algn="ctr"/>
+            <a:r>
+              <a:rPr lang="en-US" dirty="0">
+                <a:solidFill>
+                  <a:schemeClr val="tx1"/>
+                </a:solidFill>
+              </a:rPr>
+              <a:t>PI Worker</a:t>
+            </a:r>
+          </a:p>
+        </p:txBody>
+      </p:sp>
+      <p:sp>
+        <p:nvSpPr>
+          <p:cNvPr id="9" name="Rounded Rectangle 8"/>
+          <p:cNvSpPr/>
+          <p:nvPr/>
+        </p:nvSpPr>
+        <p:spPr>
+          <a:xfrm>
+            <a:off x="3072916" y="3448878"/>
+            <a:ext cx="6228045" cy="410934"/>
+          </a:xfrm>
+          <a:prstGeom prst="roundRect">
+            <a:avLst/>
+          </a:prstGeom>
+          <a:solidFill>
+            <a:schemeClr val="accent1"/>
+          </a:solidFill>
+          <a:effectLst>
+            <a:outerShdw blurRad="50800" dist="38100" dir="2700000" algn="tl" rotWithShape="0">
+              <a:prstClr val="black">
+                <a:alpha val="40000"/>
+              </a:prstClr>
+            </a:outerShdw>
+          </a:effectLst>
+        </p:spPr>
+        <p:style>
+          <a:lnRef idx="2">
+            <a:schemeClr val="accent1">
+              <a:shade val="50000"/>
+            </a:schemeClr>
+          </a:lnRef>
+          <a:fillRef idx="1">
+            <a:schemeClr val="accent1"/>
+          </a:fillRef>
+          <a:effectRef idx="0">
+            <a:schemeClr val="accent1"/>
+          </a:effectRef>
+          <a:fontRef idx="minor">
+            <a:schemeClr val="lt1"/>
+          </a:fontRef>
+        </p:style>
+        <p:txBody>
+          <a:bodyPr rtlCol="0" anchor="ctr"/>
+          <a:lstStyle/>
+          <a:p>
+            <a:pPr algn="ctr"/>
+            <a:r>
+              <a:rPr lang="en-US" dirty="0"/>
+              <a:t>Network Switch</a:t>
+            </a:r>
+          </a:p>
+        </p:txBody>
+      </p:sp>
+      <p:cxnSp>
+        <p:nvCxnSpPr>
+          <p:cNvPr id="12" name="Straight Arrow Connector 11"/>
+          <p:cNvCxnSpPr>
+            <a:cxnSpLocks/>
+          </p:cNvCxnSpPr>
+          <p:nvPr/>
+        </p:nvCxnSpPr>
+        <p:spPr>
+          <a:xfrm>
+            <a:off x="3818517" y="3859812"/>
+            <a:ext cx="0" cy="430233"/>
+          </a:xfrm>
+          <a:prstGeom prst="straightConnector1">
+            <a:avLst/>
+          </a:prstGeom>
+          <a:ln w="38100">
+            <a:headEnd type="triangle"/>
+            <a:tailEnd type="triangle"/>
+          </a:ln>
+        </p:spPr>
+        <p:style>
+          <a:lnRef idx="1">
+            <a:schemeClr val="accent1"/>
+          </a:lnRef>
+          <a:fillRef idx="0">
+            <a:schemeClr val="accent1"/>
+          </a:fillRef>
+          <a:effectRef idx="0">
+            <a:schemeClr val="accent1"/>
+          </a:effectRef>
+          <a:fontRef idx="minor">
+            <a:schemeClr val="tx1"/>
+          </a:fontRef>
+        </p:style>
+      </p:cxnSp>
+      <p:cxnSp>
+        <p:nvCxnSpPr>
+          <p:cNvPr id="13" name="Straight Arrow Connector 12"/>
+          <p:cNvCxnSpPr>
+            <a:cxnSpLocks/>
+          </p:cNvCxnSpPr>
+          <p:nvPr/>
+        </p:nvCxnSpPr>
+        <p:spPr>
+          <a:xfrm>
+            <a:off x="5455332" y="3859812"/>
+            <a:ext cx="0" cy="430233"/>
+          </a:xfrm>
+          <a:prstGeom prst="straightConnector1">
+            <a:avLst/>
+          </a:prstGeom>
+          <a:ln w="38100">
+            <a:headEnd type="triangle"/>
+            <a:tailEnd type="triangle"/>
+          </a:ln>
+        </p:spPr>
+        <p:style>
+          <a:lnRef idx="1">
+            <a:schemeClr val="accent1"/>
+          </a:lnRef>
+          <a:fillRef idx="0">
+            <a:schemeClr val="accent1"/>
+          </a:fillRef>
+          <a:effectRef idx="0">
+            <a:schemeClr val="accent1"/>
+          </a:effectRef>
+          <a:fontRef idx="minor">
+            <a:schemeClr val="tx1"/>
+          </a:fontRef>
+        </p:style>
+      </p:cxnSp>
+      <p:cxnSp>
+        <p:nvCxnSpPr>
+          <p:cNvPr id="14" name="Straight Arrow Connector 13"/>
+          <p:cNvCxnSpPr>
+            <a:cxnSpLocks/>
+          </p:cNvCxnSpPr>
+          <p:nvPr/>
+        </p:nvCxnSpPr>
+        <p:spPr>
+          <a:xfrm>
+            <a:off x="6987250" y="3859812"/>
+            <a:ext cx="0" cy="430233"/>
+          </a:xfrm>
+          <a:prstGeom prst="straightConnector1">
+            <a:avLst/>
+          </a:prstGeom>
+          <a:ln w="38100">
+            <a:headEnd type="triangle"/>
+            <a:tailEnd type="triangle"/>
+          </a:ln>
+        </p:spPr>
+        <p:style>
+          <a:lnRef idx="1">
+            <a:schemeClr val="accent1"/>
+          </a:lnRef>
+          <a:fillRef idx="0">
+            <a:schemeClr val="accent1"/>
+          </a:fillRef>
+          <a:effectRef idx="0">
+            <a:schemeClr val="accent1"/>
+          </a:effectRef>
+          <a:fontRef idx="minor">
+            <a:schemeClr val="tx1"/>
+          </a:fontRef>
+        </p:style>
+      </p:cxnSp>
+      <p:cxnSp>
+        <p:nvCxnSpPr>
+          <p:cNvPr id="15" name="Straight Arrow Connector 14"/>
+          <p:cNvCxnSpPr>
+            <a:cxnSpLocks/>
+          </p:cNvCxnSpPr>
+          <p:nvPr/>
+        </p:nvCxnSpPr>
+        <p:spPr>
+          <a:xfrm>
+            <a:off x="8588439" y="3859812"/>
+            <a:ext cx="0" cy="430233"/>
+          </a:xfrm>
+          <a:prstGeom prst="straightConnector1">
+            <a:avLst/>
+          </a:prstGeom>
+          <a:ln w="38100">
+            <a:headEnd type="triangle"/>
+            <a:tailEnd type="triangle"/>
+          </a:ln>
+        </p:spPr>
+        <p:style>
+          <a:lnRef idx="1">
+            <a:schemeClr val="accent1"/>
+          </a:lnRef>
+          <a:fillRef idx="0">
+            <a:schemeClr val="accent1"/>
+          </a:fillRef>
+          <a:effectRef idx="0">
+            <a:schemeClr val="accent1"/>
+          </a:effectRef>
+          <a:fontRef idx="minor">
+            <a:schemeClr val="tx1"/>
+          </a:fontRef>
+        </p:style>
+      </p:cxnSp>
+      <p:sp>
+        <p:nvSpPr>
+          <p:cNvPr id="16" name="Rounded Rectangle 15"/>
+          <p:cNvSpPr/>
+          <p:nvPr/>
+        </p:nvSpPr>
+        <p:spPr>
+          <a:xfrm>
+            <a:off x="534003" y="1069812"/>
+            <a:ext cx="1372805" cy="707572"/>
+          </a:xfrm>
+          <a:prstGeom prst="roundRect">
+            <a:avLst/>
+          </a:prstGeom>
+          <a:solidFill>
+            <a:schemeClr val="accent3">
+              <a:lumMod val="40000"/>
+              <a:lumOff val="60000"/>
+            </a:schemeClr>
+          </a:solidFill>
+          <a:effectLst>
+            <a:outerShdw blurRad="50800" dist="38100" dir="2700000" algn="tl" rotWithShape="0">
+              <a:prstClr val="black">
+                <a:alpha val="40000"/>
+              </a:prstClr>
+            </a:outerShdw>
+          </a:effectLst>
+        </p:spPr>
+        <p:style>
+          <a:lnRef idx="2">
+            <a:schemeClr val="accent1">
+              <a:shade val="50000"/>
+            </a:schemeClr>
+          </a:lnRef>
+          <a:fillRef idx="1">
+            <a:schemeClr val="accent1"/>
+          </a:fillRef>
+          <a:effectRef idx="0">
+            <a:schemeClr val="accent1"/>
+          </a:effectRef>
+          <a:fontRef idx="minor">
+            <a:schemeClr val="lt1"/>
+          </a:fontRef>
+        </p:style>
+        <p:txBody>
+          <a:bodyPr rtlCol="0" anchor="ctr"/>
+          <a:lstStyle/>
+          <a:p>
+            <a:pPr algn="ctr"/>
+            <a:r>
+              <a:rPr lang="en-US" dirty="0">
+                <a:solidFill>
+                  <a:schemeClr val="tx1"/>
+                </a:solidFill>
+              </a:rPr>
+              <a:t>Internet</a:t>
+            </a:r>
+          </a:p>
+        </p:txBody>
+      </p:sp>
+      <p:sp>
+        <p:nvSpPr>
+          <p:cNvPr id="17" name="Rounded Rectangle 16"/>
+          <p:cNvSpPr/>
+          <p:nvPr/>
+        </p:nvSpPr>
+        <p:spPr>
+          <a:xfrm>
+            <a:off x="459991" y="3464733"/>
+            <a:ext cx="2560396" cy="410934"/>
+          </a:xfrm>
+          <a:prstGeom prst="roundRect">
+            <a:avLst/>
+          </a:prstGeom>
+          <a:solidFill>
+            <a:schemeClr val="accent1"/>
+          </a:solidFill>
+          <a:effectLst>
+            <a:outerShdw blurRad="50800" dist="38100" dir="2700000" algn="tl" rotWithShape="0">
+              <a:prstClr val="black">
+                <a:alpha val="40000"/>
+              </a:prstClr>
+            </a:outerShdw>
+          </a:effectLst>
+        </p:spPr>
+        <p:style>
+          <a:lnRef idx="2">
+            <a:schemeClr val="accent1">
+              <a:shade val="50000"/>
+            </a:schemeClr>
+          </a:lnRef>
+          <a:fillRef idx="1">
+            <a:schemeClr val="accent1"/>
+          </a:fillRef>
+          <a:effectRef idx="0">
+            <a:schemeClr val="accent1"/>
+          </a:effectRef>
+          <a:fontRef idx="minor">
+            <a:schemeClr val="lt1"/>
+          </a:fontRef>
+        </p:style>
+        <p:txBody>
+          <a:bodyPr rtlCol="0" anchor="ctr"/>
+          <a:lstStyle/>
+          <a:p>
+            <a:pPr algn="ctr"/>
+            <a:r>
+              <a:rPr lang="en-US" dirty="0"/>
+              <a:t>Mesh </a:t>
+            </a:r>
+            <a:r>
+              <a:rPr lang="en-US" dirty="0" err="1"/>
+              <a:t>Wifi</a:t>
+            </a:r>
+            <a:endParaRPr lang="en-US" dirty="0"/>
+          </a:p>
+        </p:txBody>
+      </p:sp>
+      <p:cxnSp>
+        <p:nvCxnSpPr>
+          <p:cNvPr id="20" name="Straight Arrow Connector 19"/>
+          <p:cNvCxnSpPr>
+            <a:cxnSpLocks/>
+          </p:cNvCxnSpPr>
+          <p:nvPr/>
+        </p:nvCxnSpPr>
+        <p:spPr>
+          <a:xfrm>
+            <a:off x="754190" y="1769492"/>
+            <a:ext cx="0" cy="1695241"/>
+          </a:xfrm>
+          <a:prstGeom prst="straightConnector1">
+            <a:avLst/>
+          </a:prstGeom>
+          <a:ln w="38100">
+            <a:headEnd type="triangle"/>
+            <a:tailEnd type="triangle"/>
+          </a:ln>
+        </p:spPr>
+        <p:style>
+          <a:lnRef idx="1">
+            <a:schemeClr val="accent1"/>
+          </a:lnRef>
+          <a:fillRef idx="0">
+            <a:schemeClr val="accent1"/>
+          </a:fillRef>
+          <a:effectRef idx="0">
+            <a:schemeClr val="accent1"/>
+          </a:effectRef>
+          <a:fontRef idx="minor">
+            <a:schemeClr val="tx1"/>
+          </a:fontRef>
+        </p:style>
+      </p:cxnSp>
+      <p:pic>
+        <p:nvPicPr>
+          <p:cNvPr id="2" name="Picture 1"/>
+          <p:cNvPicPr>
+            <a:picLocks noChangeAspect="1"/>
+          </p:cNvPicPr>
+          <p:nvPr/>
+        </p:nvPicPr>
+        <p:blipFill>
+          <a:blip r:embed="rId3"/>
+          <a:stretch>
+            <a:fillRect/>
+          </a:stretch>
+        </p:blipFill>
+        <p:spPr>
+          <a:xfrm>
+            <a:off x="3794759" y="1149760"/>
+            <a:ext cx="1195347" cy="1184819"/>
+          </a:xfrm>
+          <a:prstGeom prst="rect">
+            <a:avLst/>
+          </a:prstGeom>
+        </p:spPr>
+      </p:pic>
+      <p:pic>
+        <p:nvPicPr>
+          <p:cNvPr id="3" name="Picture 2"/>
+          <p:cNvPicPr>
+            <a:picLocks noChangeAspect="1"/>
+          </p:cNvPicPr>
+          <p:nvPr/>
+        </p:nvPicPr>
+        <p:blipFill>
+          <a:blip r:embed="rId4"/>
+          <a:stretch>
+            <a:fillRect/>
+          </a:stretch>
+        </p:blipFill>
+        <p:spPr>
+          <a:xfrm flipH="1">
+            <a:off x="2708680" y="1310899"/>
+            <a:ext cx="995461" cy="986693"/>
+          </a:xfrm>
+          <a:prstGeom prst="rect">
+            <a:avLst/>
+          </a:prstGeom>
+        </p:spPr>
+      </p:pic>
+      <p:pic>
+        <p:nvPicPr>
+          <p:cNvPr id="10" name="Picture 9"/>
+          <p:cNvPicPr>
+            <a:picLocks noChangeAspect="1"/>
+          </p:cNvPicPr>
+          <p:nvPr/>
+        </p:nvPicPr>
+        <p:blipFill>
+          <a:blip r:embed="rId5"/>
+          <a:stretch>
+            <a:fillRect/>
+          </a:stretch>
+        </p:blipFill>
+        <p:spPr>
+          <a:xfrm>
+            <a:off x="2201007" y="1695994"/>
+            <a:ext cx="469583" cy="465447"/>
+          </a:xfrm>
+          <a:prstGeom prst="rect">
+            <a:avLst/>
+          </a:prstGeom>
+        </p:spPr>
+      </p:pic>
+      <p:sp>
+        <p:nvSpPr>
+          <p:cNvPr id="23" name="Rounded Rectangle 22">
+            <a:extLst>
+              <a:ext uri="{FF2B5EF4-FFF2-40B4-BE49-F238E27FC236}">
+                <a16:creationId xmlns:a16="http://schemas.microsoft.com/office/drawing/2014/main" id="{F94134C2-F81E-FF4D-935A-39569E1CB389}"/>
+              </a:ext>
+            </a:extLst>
+          </p:cNvPr>
+          <p:cNvSpPr/>
+          <p:nvPr/>
+        </p:nvSpPr>
+        <p:spPr>
+          <a:xfrm>
+            <a:off x="1073792" y="2334579"/>
+            <a:ext cx="1876226" cy="707572"/>
+          </a:xfrm>
+          <a:prstGeom prst="roundRect">
+            <a:avLst/>
+          </a:prstGeom>
+          <a:solidFill>
+            <a:schemeClr val="accent3">
+              <a:lumMod val="40000"/>
+              <a:lumOff val="60000"/>
+            </a:schemeClr>
+          </a:solidFill>
+          <a:effectLst>
+            <a:outerShdw blurRad="50800" dist="38100" dir="2700000" algn="tl" rotWithShape="0">
+              <a:prstClr val="black">
+                <a:alpha val="40000"/>
+              </a:prstClr>
+            </a:outerShdw>
+          </a:effectLst>
+        </p:spPr>
+        <p:style>
+          <a:lnRef idx="2">
+            <a:schemeClr val="accent1">
+              <a:shade val="50000"/>
+            </a:schemeClr>
+          </a:lnRef>
+          <a:fillRef idx="1">
+            <a:schemeClr val="accent1"/>
+          </a:fillRef>
+          <a:effectRef idx="0">
+            <a:schemeClr val="accent1"/>
+          </a:effectRef>
+          <a:fontRef idx="minor">
+            <a:schemeClr val="lt1"/>
+          </a:fontRef>
+        </p:style>
+        <p:txBody>
+          <a:bodyPr rtlCol="0" anchor="ctr"/>
+          <a:lstStyle/>
+          <a:p>
+            <a:pPr algn="ctr"/>
+            <a:r>
+              <a:rPr lang="en-US" dirty="0">
+                <a:solidFill>
+                  <a:schemeClr val="tx1"/>
+                </a:solidFill>
+              </a:rPr>
+              <a:t>Laptop, Desktop,</a:t>
+            </a:r>
+          </a:p>
+          <a:p>
+            <a:pPr algn="ctr"/>
+            <a:r>
+              <a:rPr lang="en-US" dirty="0">
+                <a:solidFill>
+                  <a:schemeClr val="tx1"/>
+                </a:solidFill>
+              </a:rPr>
+              <a:t> or PI</a:t>
+            </a:r>
+          </a:p>
+        </p:txBody>
+      </p:sp>
+      <p:cxnSp>
+        <p:nvCxnSpPr>
+          <p:cNvPr id="24" name="Straight Arrow Connector 23">
+            <a:extLst>
+              <a:ext uri="{FF2B5EF4-FFF2-40B4-BE49-F238E27FC236}">
+                <a16:creationId xmlns:a16="http://schemas.microsoft.com/office/drawing/2014/main" id="{78518C1B-A23B-2D4F-BC73-064275EC105A}"/>
+              </a:ext>
+            </a:extLst>
+          </p:cNvPr>
+          <p:cNvCxnSpPr>
+            <a:cxnSpLocks/>
+          </p:cNvCxnSpPr>
+          <p:nvPr/>
+        </p:nvCxnSpPr>
+        <p:spPr>
+          <a:xfrm>
+            <a:off x="2142092" y="3042151"/>
+            <a:ext cx="0" cy="430233"/>
+          </a:xfrm>
+          <a:prstGeom prst="straightConnector1">
+            <a:avLst/>
+          </a:prstGeom>
+          <a:ln w="38100">
+            <a:headEnd type="triangle"/>
+            <a:tailEnd type="triangle"/>
+          </a:ln>
+        </p:spPr>
+        <p:style>
+          <a:lnRef idx="1">
+            <a:schemeClr val="accent1"/>
+          </a:lnRef>
+          <a:fillRef idx="0">
+            <a:schemeClr val="accent1"/>
+          </a:fillRef>
+          <a:effectRef idx="0">
+            <a:schemeClr val="accent1"/>
+          </a:effectRef>
+          <a:fontRef idx="minor">
+            <a:schemeClr val="tx1"/>
+          </a:fontRef>
+        </p:style>
+      </p:cxnSp>
+      <p:sp>
+        <p:nvSpPr>
+          <p:cNvPr id="28" name="Snip Single Corner Rectangle 27">
+            <a:extLst>
+              <a:ext uri="{FF2B5EF4-FFF2-40B4-BE49-F238E27FC236}">
+                <a16:creationId xmlns:a16="http://schemas.microsoft.com/office/drawing/2014/main" id="{376A0602-DB5B-5E40-BE3E-862271695BEF}"/>
+              </a:ext>
+            </a:extLst>
+          </p:cNvPr>
+          <p:cNvSpPr/>
+          <p:nvPr/>
+        </p:nvSpPr>
+        <p:spPr>
+          <a:xfrm>
+            <a:off x="4120152" y="4867900"/>
+            <a:ext cx="291655" cy="317292"/>
+          </a:xfrm>
+          <a:prstGeom prst="snip1Rect">
+            <a:avLst/>
+          </a:prstGeom>
+        </p:spPr>
+        <p:style>
+          <a:lnRef idx="2">
+            <a:schemeClr val="accent2">
+              <a:shade val="50000"/>
+            </a:schemeClr>
+          </a:lnRef>
+          <a:fillRef idx="1">
+            <a:schemeClr val="accent2"/>
+          </a:fillRef>
+          <a:effectRef idx="0">
+            <a:schemeClr val="accent2"/>
+          </a:effectRef>
+          <a:fontRef idx="minor">
+            <a:schemeClr val="lt1"/>
+          </a:fontRef>
+        </p:style>
+        <p:txBody>
+          <a:bodyPr rtlCol="0" anchor="ctr"/>
+          <a:lstStyle/>
+          <a:p>
+            <a:pPr algn="ctr"/>
+            <a:r>
+              <a:rPr lang="en-US" dirty="0"/>
+              <a:t>L</a:t>
+            </a:r>
+          </a:p>
+        </p:txBody>
+      </p:sp>
+      <p:sp>
+        <p:nvSpPr>
+          <p:cNvPr id="29" name="Snip Single Corner Rectangle 28">
+            <a:extLst>
+              <a:ext uri="{FF2B5EF4-FFF2-40B4-BE49-F238E27FC236}">
+                <a16:creationId xmlns:a16="http://schemas.microsoft.com/office/drawing/2014/main" id="{D8C856D9-17AB-E54D-BE31-7FBCD4A07537}"/>
+              </a:ext>
+            </a:extLst>
+          </p:cNvPr>
+          <p:cNvSpPr/>
+          <p:nvPr/>
+        </p:nvSpPr>
+        <p:spPr>
+          <a:xfrm>
+            <a:off x="5708023" y="4873612"/>
+            <a:ext cx="291655" cy="317292"/>
+          </a:xfrm>
+          <a:prstGeom prst="snip1Rect">
+            <a:avLst/>
+          </a:prstGeom>
+        </p:spPr>
+        <p:style>
+          <a:lnRef idx="2">
+            <a:schemeClr val="accent2">
+              <a:shade val="50000"/>
+            </a:schemeClr>
+          </a:lnRef>
+          <a:fillRef idx="1">
+            <a:schemeClr val="accent2"/>
+          </a:fillRef>
+          <a:effectRef idx="0">
+            <a:schemeClr val="accent2"/>
+          </a:effectRef>
+          <a:fontRef idx="minor">
+            <a:schemeClr val="lt1"/>
+          </a:fontRef>
+        </p:style>
+        <p:txBody>
+          <a:bodyPr rtlCol="0" anchor="ctr"/>
+          <a:lstStyle/>
+          <a:p>
+            <a:pPr algn="ctr"/>
+            <a:r>
+              <a:rPr lang="en-US" dirty="0"/>
+              <a:t>L</a:t>
+            </a:r>
+          </a:p>
+        </p:txBody>
+      </p:sp>
+      <p:sp>
+        <p:nvSpPr>
+          <p:cNvPr id="30" name="Snip Single Corner Rectangle 29">
+            <a:extLst>
+              <a:ext uri="{FF2B5EF4-FFF2-40B4-BE49-F238E27FC236}">
+                <a16:creationId xmlns:a16="http://schemas.microsoft.com/office/drawing/2014/main" id="{28F08A7F-B052-A542-80B3-9D0D27EC5955}"/>
+              </a:ext>
+            </a:extLst>
+          </p:cNvPr>
+          <p:cNvSpPr/>
+          <p:nvPr/>
+        </p:nvSpPr>
+        <p:spPr>
+          <a:xfrm>
+            <a:off x="7328264" y="4838971"/>
+            <a:ext cx="291655" cy="317292"/>
+          </a:xfrm>
+          <a:prstGeom prst="snip1Rect">
+            <a:avLst/>
+          </a:prstGeom>
+        </p:spPr>
+        <p:style>
+          <a:lnRef idx="2">
+            <a:schemeClr val="accent2">
+              <a:shade val="50000"/>
+            </a:schemeClr>
+          </a:lnRef>
+          <a:fillRef idx="1">
+            <a:schemeClr val="accent2"/>
+          </a:fillRef>
+          <a:effectRef idx="0">
+            <a:schemeClr val="accent2"/>
+          </a:effectRef>
+          <a:fontRef idx="minor">
+            <a:schemeClr val="lt1"/>
+          </a:fontRef>
+        </p:style>
+        <p:txBody>
+          <a:bodyPr rtlCol="0" anchor="ctr"/>
+          <a:lstStyle/>
+          <a:p>
+            <a:pPr algn="ctr"/>
+            <a:r>
+              <a:rPr lang="en-US" dirty="0"/>
+              <a:t>L</a:t>
+            </a:r>
+          </a:p>
+        </p:txBody>
+      </p:sp>
+      <p:sp>
+        <p:nvSpPr>
+          <p:cNvPr id="31" name="Snip Single Corner Rectangle 30">
+            <a:extLst>
+              <a:ext uri="{FF2B5EF4-FFF2-40B4-BE49-F238E27FC236}">
+                <a16:creationId xmlns:a16="http://schemas.microsoft.com/office/drawing/2014/main" id="{F1E362E6-1F53-9644-9976-F35F2A2F16C5}"/>
+              </a:ext>
+            </a:extLst>
+          </p:cNvPr>
+          <p:cNvSpPr/>
+          <p:nvPr/>
+        </p:nvSpPr>
+        <p:spPr>
+          <a:xfrm>
+            <a:off x="8916341" y="4887588"/>
+            <a:ext cx="291655" cy="317292"/>
+          </a:xfrm>
+          <a:prstGeom prst="snip1Rect">
+            <a:avLst/>
+          </a:prstGeom>
+        </p:spPr>
+        <p:style>
+          <a:lnRef idx="2">
+            <a:schemeClr val="accent2">
+              <a:shade val="50000"/>
+            </a:schemeClr>
+          </a:lnRef>
+          <a:fillRef idx="1">
+            <a:schemeClr val="accent2"/>
+          </a:fillRef>
+          <a:effectRef idx="0">
+            <a:schemeClr val="accent2"/>
+          </a:effectRef>
+          <a:fontRef idx="minor">
+            <a:schemeClr val="lt1"/>
+          </a:fontRef>
+        </p:style>
+        <p:txBody>
+          <a:bodyPr rtlCol="0" anchor="ctr"/>
+          <a:lstStyle/>
+          <a:p>
+            <a:pPr algn="ctr"/>
+            <a:r>
+              <a:rPr lang="en-US" dirty="0"/>
+              <a:t>L</a:t>
+            </a:r>
+          </a:p>
+        </p:txBody>
+      </p:sp>
+      <p:sp>
+        <p:nvSpPr>
+          <p:cNvPr id="37" name="TextBox 36">
+            <a:extLst>
+              <a:ext uri="{FF2B5EF4-FFF2-40B4-BE49-F238E27FC236}">
+                <a16:creationId xmlns:a16="http://schemas.microsoft.com/office/drawing/2014/main" id="{CBDAB471-40AB-0742-9274-9A0650CE2224}"/>
+              </a:ext>
+            </a:extLst>
+          </p:cNvPr>
+          <p:cNvSpPr txBox="1"/>
+          <p:nvPr/>
+        </p:nvSpPr>
+        <p:spPr>
+          <a:xfrm>
+            <a:off x="8448235" y="1305028"/>
+            <a:ext cx="936212" cy="461665"/>
+          </a:xfrm>
+          <a:prstGeom prst="rect">
+            <a:avLst/>
+          </a:prstGeom>
+          <a:noFill/>
+        </p:spPr>
+        <p:txBody>
+          <a:bodyPr wrap="square" rtlCol="0">
+            <a:spAutoFit/>
+          </a:bodyPr>
+          <a:lstStyle/>
+          <a:p>
+            <a:r>
+              <a:rPr lang="en-US" sz="1200" dirty="0"/>
+              <a:t>Raspberry </a:t>
+            </a:r>
+          </a:p>
+          <a:p>
+            <a:r>
+              <a:rPr lang="en-US" sz="1200" dirty="0"/>
+              <a:t>Pi OS Lite</a:t>
+            </a:r>
+          </a:p>
+        </p:txBody>
+      </p:sp>
+      <p:cxnSp>
+        <p:nvCxnSpPr>
+          <p:cNvPr id="42" name="Straight Arrow Connector 41">
+            <a:extLst>
+              <a:ext uri="{FF2B5EF4-FFF2-40B4-BE49-F238E27FC236}">
+                <a16:creationId xmlns:a16="http://schemas.microsoft.com/office/drawing/2014/main" id="{93CD81B8-1080-EB47-9E05-20E57DE27063}"/>
+              </a:ext>
+            </a:extLst>
+          </p:cNvPr>
+          <p:cNvCxnSpPr>
+            <a:cxnSpLocks/>
+          </p:cNvCxnSpPr>
+          <p:nvPr/>
+        </p:nvCxnSpPr>
+        <p:spPr>
+          <a:xfrm>
+            <a:off x="6342055" y="3018645"/>
+            <a:ext cx="0" cy="430233"/>
+          </a:xfrm>
+          <a:prstGeom prst="straightConnector1">
+            <a:avLst/>
+          </a:prstGeom>
+          <a:ln w="38100">
+            <a:headEnd type="triangle"/>
+            <a:tailEnd type="triangle"/>
+          </a:ln>
+        </p:spPr>
+        <p:style>
+          <a:lnRef idx="1">
+            <a:schemeClr val="accent1"/>
+          </a:lnRef>
+          <a:fillRef idx="0">
+            <a:schemeClr val="accent1"/>
+          </a:fillRef>
+          <a:effectRef idx="0">
+            <a:schemeClr val="accent1"/>
+          </a:effectRef>
+          <a:fontRef idx="minor">
+            <a:schemeClr val="tx1"/>
+          </a:fontRef>
+        </p:style>
+      </p:cxnSp>
+      <p:sp>
+        <p:nvSpPr>
+          <p:cNvPr id="47" name="Left-Right Arrow 46">
+            <a:extLst>
+              <a:ext uri="{FF2B5EF4-FFF2-40B4-BE49-F238E27FC236}">
+                <a16:creationId xmlns:a16="http://schemas.microsoft.com/office/drawing/2014/main" id="{F775F459-8736-A644-8C3D-4DDEA1D77586}"/>
+              </a:ext>
+            </a:extLst>
+          </p:cNvPr>
+          <p:cNvSpPr/>
+          <p:nvPr/>
+        </p:nvSpPr>
+        <p:spPr>
+          <a:xfrm>
+            <a:off x="2852990" y="3602217"/>
+            <a:ext cx="438317" cy="158647"/>
+          </a:xfrm>
+          <a:prstGeom prst="leftRightArrow">
+            <a:avLst/>
+          </a:prstGeom>
+        </p:spPr>
+        <p:style>
+          <a:lnRef idx="3">
+            <a:schemeClr val="lt1"/>
+          </a:lnRef>
+          <a:fillRef idx="1">
+            <a:schemeClr val="accent1"/>
+          </a:fillRef>
+          <a:effectRef idx="1">
+            <a:schemeClr val="accent1"/>
+          </a:effectRef>
+          <a:fontRef idx="minor">
+            <a:schemeClr val="lt1"/>
+          </a:fontRef>
+        </p:style>
+        <p:txBody>
+          <a:bodyPr rtlCol="0" anchor="ctr"/>
+          <a:lstStyle/>
+          <a:p>
+            <a:pPr algn="ctr"/>
+            <a:endParaRPr lang="en-US"/>
+          </a:p>
+        </p:txBody>
+      </p:sp>
+      <p:sp>
+        <p:nvSpPr>
+          <p:cNvPr id="48" name="TextBox 47">
+            <a:extLst>
+              <a:ext uri="{FF2B5EF4-FFF2-40B4-BE49-F238E27FC236}">
+                <a16:creationId xmlns:a16="http://schemas.microsoft.com/office/drawing/2014/main" id="{D2F43E4D-D320-C341-86CB-E4A6251995B6}"/>
+              </a:ext>
+            </a:extLst>
+          </p:cNvPr>
+          <p:cNvSpPr txBox="1"/>
+          <p:nvPr/>
+        </p:nvSpPr>
+        <p:spPr>
+          <a:xfrm>
+            <a:off x="7977820" y="914530"/>
+            <a:ext cx="1008674" cy="369332"/>
+          </a:xfrm>
+          <a:prstGeom prst="rect">
+            <a:avLst/>
+          </a:prstGeom>
+          <a:noFill/>
+        </p:spPr>
+        <p:txBody>
+          <a:bodyPr wrap="none" rtlCol="0">
+            <a:spAutoFit/>
+          </a:bodyPr>
+          <a:lstStyle/>
+          <a:p>
+            <a:r>
+              <a:rPr lang="en-US" dirty="0"/>
+              <a:t>SD Cards</a:t>
+            </a:r>
+          </a:p>
+        </p:txBody>
+      </p:sp>
+      <p:sp>
+        <p:nvSpPr>
+          <p:cNvPr id="40" name="Snip Single Corner Rectangle 39">
+            <a:extLst>
+              <a:ext uri="{FF2B5EF4-FFF2-40B4-BE49-F238E27FC236}">
+                <a16:creationId xmlns:a16="http://schemas.microsoft.com/office/drawing/2014/main" id="{654C21AF-C051-E35B-56C5-FE264AA7DFF0}"/>
+              </a:ext>
+            </a:extLst>
+          </p:cNvPr>
+          <p:cNvSpPr/>
+          <p:nvPr/>
+        </p:nvSpPr>
+        <p:spPr>
+          <a:xfrm>
+            <a:off x="6661657" y="2895123"/>
+            <a:ext cx="291655" cy="317292"/>
+          </a:xfrm>
+          <a:prstGeom prst="snip1Rect">
+            <a:avLst/>
+          </a:prstGeom>
+        </p:spPr>
+        <p:style>
+          <a:lnRef idx="2">
+            <a:schemeClr val="accent2">
+              <a:shade val="50000"/>
+            </a:schemeClr>
+          </a:lnRef>
+          <a:fillRef idx="1">
+            <a:schemeClr val="accent2"/>
+          </a:fillRef>
+          <a:effectRef idx="0">
+            <a:schemeClr val="accent2"/>
+          </a:effectRef>
+          <a:fontRef idx="minor">
+            <a:schemeClr val="lt1"/>
+          </a:fontRef>
+        </p:style>
+        <p:txBody>
+          <a:bodyPr rtlCol="0" anchor="ctr"/>
+          <a:lstStyle/>
+          <a:p>
+            <a:pPr algn="ctr"/>
+            <a:r>
+              <a:rPr lang="en-US" dirty="0"/>
+              <a:t>L</a:t>
+            </a:r>
+          </a:p>
+        </p:txBody>
+      </p:sp>
+      <p:sp>
+        <p:nvSpPr>
+          <p:cNvPr id="43" name="Snip Single Corner Rectangle 42">
+            <a:extLst>
+              <a:ext uri="{FF2B5EF4-FFF2-40B4-BE49-F238E27FC236}">
+                <a16:creationId xmlns:a16="http://schemas.microsoft.com/office/drawing/2014/main" id="{94FA775F-CDE4-BCAA-8C36-9AD3D67F9E3E}"/>
+              </a:ext>
+            </a:extLst>
+          </p:cNvPr>
+          <p:cNvSpPr/>
+          <p:nvPr/>
+        </p:nvSpPr>
+        <p:spPr>
+          <a:xfrm>
+            <a:off x="8065961" y="1381813"/>
+            <a:ext cx="291655" cy="317292"/>
+          </a:xfrm>
+          <a:prstGeom prst="snip1Rect">
+            <a:avLst/>
+          </a:prstGeom>
+        </p:spPr>
+        <p:style>
+          <a:lnRef idx="2">
+            <a:schemeClr val="accent2">
+              <a:shade val="50000"/>
+            </a:schemeClr>
+          </a:lnRef>
+          <a:fillRef idx="1">
+            <a:schemeClr val="accent2"/>
+          </a:fillRef>
+          <a:effectRef idx="0">
+            <a:schemeClr val="accent2"/>
+          </a:effectRef>
+          <a:fontRef idx="minor">
+            <a:schemeClr val="lt1"/>
+          </a:fontRef>
+        </p:style>
+        <p:txBody>
+          <a:bodyPr rtlCol="0" anchor="ctr"/>
+          <a:lstStyle/>
+          <a:p>
+            <a:pPr algn="ctr"/>
+            <a:r>
+              <a:rPr lang="en-US" dirty="0"/>
+              <a:t>L</a:t>
+            </a:r>
+          </a:p>
+        </p:txBody>
+      </p:sp>
+      <p:sp>
+        <p:nvSpPr>
+          <p:cNvPr id="44" name="Snip Single Corner Rectangle 43">
+            <a:extLst>
+              <a:ext uri="{FF2B5EF4-FFF2-40B4-BE49-F238E27FC236}">
+                <a16:creationId xmlns:a16="http://schemas.microsoft.com/office/drawing/2014/main" id="{61DDE60D-6992-9685-2C23-20F2A3DA27EB}"/>
+              </a:ext>
+            </a:extLst>
+          </p:cNvPr>
+          <p:cNvSpPr/>
+          <p:nvPr/>
+        </p:nvSpPr>
+        <p:spPr>
+          <a:xfrm>
+            <a:off x="4272552" y="5020300"/>
+            <a:ext cx="291655" cy="317292"/>
+          </a:xfrm>
+          <a:prstGeom prst="snip1Rect">
+            <a:avLst/>
+          </a:prstGeom>
+        </p:spPr>
+        <p:style>
+          <a:lnRef idx="2">
+            <a:schemeClr val="accent2">
+              <a:shade val="50000"/>
+            </a:schemeClr>
+          </a:lnRef>
+          <a:fillRef idx="1">
+            <a:schemeClr val="accent2"/>
+          </a:fillRef>
+          <a:effectRef idx="0">
+            <a:schemeClr val="accent2"/>
+          </a:effectRef>
+          <a:fontRef idx="minor">
+            <a:schemeClr val="lt1"/>
+          </a:fontRef>
+        </p:style>
+        <p:txBody>
+          <a:bodyPr rtlCol="0" anchor="ctr"/>
+          <a:lstStyle/>
+          <a:p>
+            <a:pPr algn="ctr"/>
+            <a:r>
+              <a:rPr lang="en-US" dirty="0"/>
+              <a:t>W</a:t>
+            </a:r>
+          </a:p>
+        </p:txBody>
+      </p:sp>
+    </p:spTree>
+    <p:extLst>
+      <p:ext uri="{BB962C8B-B14F-4D97-AF65-F5344CB8AC3E}">
+        <p14:creationId xmlns:p14="http://schemas.microsoft.com/office/powerpoint/2010/main" val="3411769345"/>
+      </p:ext>
+    </p:extLst>
+  </p:cSld>
+  <p:clrMapOvr>
+    <a:masterClrMapping/>
+  </p:clrMapOvr>
+</p:sld>
+</file>
+
+<file path=ppt/slides/slide6.xml><?xml version="1.0" encoding="utf-8"?>
+<p:sld xmlns:a="http://schemas.openxmlformats.org/drawingml/2006/main" xmlns:r="http://schemas.openxmlformats.org/officeDocument/2006/relationships" xmlns:p="http://schemas.openxmlformats.org/presentationml/2006/main">
+  <p:cSld>
+    <p:spTree>
+      <p:nvGrpSpPr>
+        <p:cNvPr id="1" name=""/>
+        <p:cNvGrpSpPr/>
+        <p:nvPr/>
+      </p:nvGrpSpPr>
+      <p:grpSpPr>
+        <a:xfrm>
+          <a:off x="0" y="0"/>
+          <a:ext cx="0" cy="0"/>
+          <a:chOff x="0" y="0"/>
+          <a:chExt cx="0" cy="0"/>
+        </a:xfrm>
+      </p:grpSpPr>
+      <p:sp>
+        <p:nvSpPr>
+          <p:cNvPr id="11" name="Rectangle 10">
+            <a:extLst>
+              <a:ext uri="{FF2B5EF4-FFF2-40B4-BE49-F238E27FC236}">
+                <a16:creationId xmlns:a16="http://schemas.microsoft.com/office/drawing/2014/main" id="{2575B382-93BF-E1D9-66B6-416479D7DC3B}"/>
+              </a:ext>
+            </a:extLst>
+          </p:cNvPr>
+          <p:cNvSpPr/>
+          <p:nvPr/>
+        </p:nvSpPr>
+        <p:spPr>
+          <a:xfrm>
+            <a:off x="2055253" y="1005016"/>
+            <a:ext cx="3291104" cy="1614616"/>
+          </a:xfrm>
+          <a:prstGeom prst="rect">
+            <a:avLst/>
+          </a:prstGeom>
+          <a:effectLst>
+            <a:outerShdw blurRad="50800" dist="38100" dir="2700000" algn="tl" rotWithShape="0">
+              <a:prstClr val="black">
+                <a:alpha val="40000"/>
+              </a:prstClr>
+            </a:outerShdw>
+          </a:effectLst>
+        </p:spPr>
+        <p:style>
+          <a:lnRef idx="2">
+            <a:schemeClr val="accent6"/>
+          </a:lnRef>
+          <a:fillRef idx="1">
+            <a:schemeClr val="lt1"/>
+          </a:fillRef>
+          <a:effectRef idx="0">
+            <a:schemeClr val="accent6"/>
+          </a:effectRef>
+          <a:fontRef idx="minor">
+            <a:schemeClr val="dk1"/>
+          </a:fontRef>
+        </p:style>
+        <p:txBody>
+          <a:bodyPr rtlCol="0" anchor="ctr"/>
+          <a:lstStyle/>
+          <a:p>
+            <a:pPr algn="ctr"/>
+            <a:endParaRPr lang="en-US"/>
+          </a:p>
+        </p:txBody>
+      </p:sp>
+      <p:sp>
+        <p:nvSpPr>
+          <p:cNvPr id="4" name="Rounded Rectangle 3"/>
+          <p:cNvSpPr/>
+          <p:nvPr/>
+        </p:nvSpPr>
+        <p:spPr>
+          <a:xfrm>
+            <a:off x="3115679" y="4290045"/>
+            <a:ext cx="1372805" cy="707572"/>
+          </a:xfrm>
+          <a:prstGeom prst="roundRect">
+            <a:avLst/>
+          </a:prstGeom>
+          <a:solidFill>
+            <a:schemeClr val="accent3">
+              <a:lumMod val="40000"/>
+              <a:lumOff val="60000"/>
+            </a:schemeClr>
+          </a:solidFill>
+          <a:effectLst>
+            <a:outerShdw blurRad="50800" dist="38100" dir="2700000" algn="tl" rotWithShape="0">
+              <a:prstClr val="black">
+                <a:alpha val="40000"/>
+              </a:prstClr>
+            </a:outerShdw>
+          </a:effectLst>
+        </p:spPr>
+        <p:style>
+          <a:lnRef idx="2">
+            <a:schemeClr val="accent1">
+              <a:shade val="50000"/>
+            </a:schemeClr>
+          </a:lnRef>
+          <a:fillRef idx="1">
+            <a:schemeClr val="accent1"/>
+          </a:fillRef>
+          <a:effectRef idx="0">
+            <a:schemeClr val="accent1"/>
+          </a:effectRef>
+          <a:fontRef idx="minor">
+            <a:schemeClr val="lt1"/>
+          </a:fontRef>
+        </p:style>
+        <p:txBody>
+          <a:bodyPr rtlCol="0" anchor="ctr"/>
+          <a:lstStyle/>
+          <a:p>
+            <a:pPr algn="ctr"/>
+            <a:r>
+              <a:rPr lang="en-US">
+                <a:solidFill>
+                  <a:schemeClr val="tx1"/>
+                </a:solidFill>
+              </a:rPr>
+              <a:t>PI Worker</a:t>
+            </a:r>
+          </a:p>
+        </p:txBody>
+      </p:sp>
+      <p:sp>
+        <p:nvSpPr>
+          <p:cNvPr id="5" name="Rounded Rectangle 4"/>
+          <p:cNvSpPr/>
+          <p:nvPr/>
+        </p:nvSpPr>
+        <p:spPr>
+          <a:xfrm>
+            <a:off x="5655653" y="2340258"/>
+            <a:ext cx="1372805" cy="707572"/>
+          </a:xfrm>
+          <a:prstGeom prst="roundRect">
+            <a:avLst/>
+          </a:prstGeom>
+          <a:solidFill>
+            <a:schemeClr val="accent3">
+              <a:lumMod val="40000"/>
+              <a:lumOff val="60000"/>
+            </a:schemeClr>
+          </a:solidFill>
+          <a:effectLst>
+            <a:outerShdw blurRad="50800" dist="38100" dir="2700000" algn="tl" rotWithShape="0">
+              <a:prstClr val="black">
+                <a:alpha val="40000"/>
+              </a:prstClr>
+            </a:outerShdw>
+          </a:effectLst>
+        </p:spPr>
+        <p:style>
+          <a:lnRef idx="2">
+            <a:schemeClr val="accent1">
+              <a:shade val="50000"/>
+            </a:schemeClr>
+          </a:lnRef>
+          <a:fillRef idx="1">
+            <a:schemeClr val="accent1"/>
+          </a:fillRef>
+          <a:effectRef idx="0">
+            <a:schemeClr val="accent1"/>
+          </a:effectRef>
+          <a:fontRef idx="minor">
+            <a:schemeClr val="lt1"/>
+          </a:fontRef>
+        </p:style>
+        <p:txBody>
+          <a:bodyPr rtlCol="0" anchor="ctr"/>
+          <a:lstStyle/>
+          <a:p>
+            <a:pPr algn="ctr"/>
+            <a:r>
+              <a:rPr lang="en-US">
+                <a:solidFill>
+                  <a:schemeClr val="tx1"/>
+                </a:solidFill>
+              </a:rPr>
+              <a:t>PI Master </a:t>
+            </a:r>
+            <a:endParaRPr lang="en-US" dirty="0">
+              <a:solidFill>
+                <a:schemeClr val="tx1"/>
+              </a:solidFill>
+            </a:endParaRPr>
+          </a:p>
+        </p:txBody>
+      </p:sp>
+      <p:sp>
+        <p:nvSpPr>
+          <p:cNvPr id="6" name="Rounded Rectangle 5"/>
+          <p:cNvSpPr/>
+          <p:nvPr/>
+        </p:nvSpPr>
+        <p:spPr>
+          <a:xfrm>
+            <a:off x="7928156" y="4290045"/>
+            <a:ext cx="1372805" cy="707572"/>
+          </a:xfrm>
+          <a:prstGeom prst="roundRect">
+            <a:avLst/>
+          </a:prstGeom>
+          <a:solidFill>
+            <a:schemeClr val="accent3">
+              <a:lumMod val="40000"/>
+              <a:lumOff val="60000"/>
+            </a:schemeClr>
+          </a:solidFill>
+          <a:effectLst>
+            <a:outerShdw blurRad="50800" dist="38100" dir="2700000" algn="tl" rotWithShape="0">
+              <a:prstClr val="black">
+                <a:alpha val="40000"/>
+              </a:prstClr>
+            </a:outerShdw>
+          </a:effectLst>
+        </p:spPr>
+        <p:style>
+          <a:lnRef idx="2">
+            <a:schemeClr val="accent1">
+              <a:shade val="50000"/>
+            </a:schemeClr>
+          </a:lnRef>
+          <a:fillRef idx="1">
+            <a:schemeClr val="accent1"/>
+          </a:fillRef>
+          <a:effectRef idx="0">
+            <a:schemeClr val="accent1"/>
+          </a:effectRef>
+          <a:fontRef idx="minor">
+            <a:schemeClr val="lt1"/>
+          </a:fontRef>
+        </p:style>
+        <p:txBody>
+          <a:bodyPr rtlCol="0" anchor="ctr"/>
+          <a:lstStyle/>
+          <a:p>
+            <a:pPr algn="ctr"/>
+            <a:r>
+              <a:rPr lang="en-US">
+                <a:solidFill>
+                  <a:schemeClr val="tx1"/>
+                </a:solidFill>
+              </a:rPr>
+              <a:t>PI Worker</a:t>
+            </a:r>
+          </a:p>
+        </p:txBody>
+      </p:sp>
+      <p:sp>
+        <p:nvSpPr>
+          <p:cNvPr id="7" name="Rounded Rectangle 6"/>
+          <p:cNvSpPr/>
+          <p:nvPr/>
+        </p:nvSpPr>
+        <p:spPr>
+          <a:xfrm>
+            <a:off x="6323997" y="4295984"/>
+            <a:ext cx="1372805" cy="707572"/>
+          </a:xfrm>
+          <a:prstGeom prst="roundRect">
+            <a:avLst/>
+          </a:prstGeom>
+          <a:solidFill>
+            <a:schemeClr val="accent3">
+              <a:lumMod val="40000"/>
+              <a:lumOff val="60000"/>
+            </a:schemeClr>
+          </a:solidFill>
+          <a:effectLst>
+            <a:outerShdw blurRad="50800" dist="38100" dir="2700000" algn="tl" rotWithShape="0">
+              <a:prstClr val="black">
+                <a:alpha val="40000"/>
+              </a:prstClr>
+            </a:outerShdw>
+          </a:effectLst>
+        </p:spPr>
+        <p:style>
+          <a:lnRef idx="2">
+            <a:schemeClr val="accent1">
+              <a:shade val="50000"/>
+            </a:schemeClr>
+          </a:lnRef>
+          <a:fillRef idx="1">
+            <a:schemeClr val="accent1"/>
+          </a:fillRef>
+          <a:effectRef idx="0">
+            <a:schemeClr val="accent1"/>
+          </a:effectRef>
+          <a:fontRef idx="minor">
+            <a:schemeClr val="lt1"/>
+          </a:fontRef>
+        </p:style>
+        <p:txBody>
+          <a:bodyPr rtlCol="0" anchor="ctr"/>
+          <a:lstStyle/>
+          <a:p>
+            <a:pPr algn="ctr"/>
+            <a:r>
+              <a:rPr lang="en-US">
+                <a:solidFill>
+                  <a:schemeClr val="tx1"/>
+                </a:solidFill>
+              </a:rPr>
+              <a:t>PI Worker</a:t>
+            </a:r>
+          </a:p>
+        </p:txBody>
+      </p:sp>
+      <p:sp>
+        <p:nvSpPr>
+          <p:cNvPr id="8" name="Rounded Rectangle 7"/>
+          <p:cNvSpPr/>
+          <p:nvPr/>
+        </p:nvSpPr>
+        <p:spPr>
+          <a:xfrm>
+            <a:off x="4719838" y="4290045"/>
+            <a:ext cx="1372805" cy="707572"/>
+          </a:xfrm>
+          <a:prstGeom prst="roundRect">
+            <a:avLst/>
+          </a:prstGeom>
+          <a:solidFill>
+            <a:schemeClr val="accent3">
+              <a:lumMod val="40000"/>
+              <a:lumOff val="60000"/>
+            </a:schemeClr>
+          </a:solidFill>
+          <a:effectLst>
+            <a:outerShdw blurRad="50800" dist="38100" dir="2700000" algn="tl" rotWithShape="0">
+              <a:prstClr val="black">
+                <a:alpha val="40000"/>
+              </a:prstClr>
+            </a:outerShdw>
+          </a:effectLst>
+        </p:spPr>
+        <p:style>
+          <a:lnRef idx="2">
+            <a:schemeClr val="accent1">
+              <a:shade val="50000"/>
+            </a:schemeClr>
+          </a:lnRef>
+          <a:fillRef idx="1">
+            <a:schemeClr val="accent1"/>
+          </a:fillRef>
+          <a:effectRef idx="0">
+            <a:schemeClr val="accent1"/>
+          </a:effectRef>
+          <a:fontRef idx="minor">
+            <a:schemeClr val="lt1"/>
+          </a:fontRef>
+        </p:style>
+        <p:txBody>
+          <a:bodyPr rtlCol="0" anchor="ctr"/>
+          <a:lstStyle/>
+          <a:p>
+            <a:pPr algn="ctr"/>
+            <a:r>
+              <a:rPr lang="en-US" dirty="0">
+                <a:solidFill>
+                  <a:schemeClr val="tx1"/>
+                </a:solidFill>
+              </a:rPr>
+              <a:t>PI Worker</a:t>
+            </a:r>
+          </a:p>
+        </p:txBody>
+      </p:sp>
+      <p:sp>
+        <p:nvSpPr>
+          <p:cNvPr id="9" name="Rounded Rectangle 8"/>
+          <p:cNvSpPr/>
+          <p:nvPr/>
+        </p:nvSpPr>
+        <p:spPr>
+          <a:xfrm>
+            <a:off x="3072916" y="3448878"/>
+            <a:ext cx="6228045" cy="410934"/>
+          </a:xfrm>
+          <a:prstGeom prst="roundRect">
+            <a:avLst/>
+          </a:prstGeom>
+          <a:solidFill>
+            <a:schemeClr val="accent1"/>
+          </a:solidFill>
+          <a:effectLst>
+            <a:outerShdw blurRad="50800" dist="38100" dir="2700000" algn="tl" rotWithShape="0">
+              <a:prstClr val="black">
+                <a:alpha val="40000"/>
+              </a:prstClr>
+            </a:outerShdw>
+          </a:effectLst>
+        </p:spPr>
+        <p:style>
+          <a:lnRef idx="2">
+            <a:schemeClr val="accent1">
+              <a:shade val="50000"/>
+            </a:schemeClr>
+          </a:lnRef>
+          <a:fillRef idx="1">
+            <a:schemeClr val="accent1"/>
+          </a:fillRef>
+          <a:effectRef idx="0">
+            <a:schemeClr val="accent1"/>
+          </a:effectRef>
+          <a:fontRef idx="minor">
+            <a:schemeClr val="lt1"/>
+          </a:fontRef>
+        </p:style>
+        <p:txBody>
+          <a:bodyPr rtlCol="0" anchor="ctr"/>
+          <a:lstStyle/>
+          <a:p>
+            <a:pPr algn="ctr"/>
+            <a:r>
+              <a:rPr lang="en-US" dirty="0"/>
+              <a:t>Network Switch</a:t>
+            </a:r>
+          </a:p>
+        </p:txBody>
+      </p:sp>
+      <p:cxnSp>
+        <p:nvCxnSpPr>
+          <p:cNvPr id="12" name="Straight Arrow Connector 11"/>
+          <p:cNvCxnSpPr>
+            <a:cxnSpLocks/>
+          </p:cNvCxnSpPr>
+          <p:nvPr/>
+        </p:nvCxnSpPr>
+        <p:spPr>
+          <a:xfrm>
+            <a:off x="3818517" y="3859812"/>
+            <a:ext cx="0" cy="430233"/>
+          </a:xfrm>
+          <a:prstGeom prst="straightConnector1">
+            <a:avLst/>
+          </a:prstGeom>
+          <a:ln w="38100">
+            <a:headEnd type="triangle"/>
+            <a:tailEnd type="triangle"/>
+          </a:ln>
+        </p:spPr>
+        <p:style>
+          <a:lnRef idx="1">
+            <a:schemeClr val="accent1"/>
+          </a:lnRef>
+          <a:fillRef idx="0">
+            <a:schemeClr val="accent1"/>
+          </a:fillRef>
+          <a:effectRef idx="0">
+            <a:schemeClr val="accent1"/>
+          </a:effectRef>
+          <a:fontRef idx="minor">
+            <a:schemeClr val="tx1"/>
+          </a:fontRef>
+        </p:style>
+      </p:cxnSp>
+      <p:cxnSp>
+        <p:nvCxnSpPr>
+          <p:cNvPr id="13" name="Straight Arrow Connector 12"/>
+          <p:cNvCxnSpPr>
+            <a:cxnSpLocks/>
+          </p:cNvCxnSpPr>
+          <p:nvPr/>
+        </p:nvCxnSpPr>
+        <p:spPr>
+          <a:xfrm>
+            <a:off x="5455332" y="3859812"/>
+            <a:ext cx="0" cy="430233"/>
+          </a:xfrm>
+          <a:prstGeom prst="straightConnector1">
+            <a:avLst/>
+          </a:prstGeom>
+          <a:ln w="38100">
+            <a:headEnd type="triangle"/>
+            <a:tailEnd type="triangle"/>
+          </a:ln>
+        </p:spPr>
+        <p:style>
+          <a:lnRef idx="1">
+            <a:schemeClr val="accent1"/>
+          </a:lnRef>
+          <a:fillRef idx="0">
+            <a:schemeClr val="accent1"/>
+          </a:fillRef>
+          <a:effectRef idx="0">
+            <a:schemeClr val="accent1"/>
+          </a:effectRef>
+          <a:fontRef idx="minor">
+            <a:schemeClr val="tx1"/>
+          </a:fontRef>
+        </p:style>
+      </p:cxnSp>
+      <p:cxnSp>
+        <p:nvCxnSpPr>
+          <p:cNvPr id="14" name="Straight Arrow Connector 13"/>
+          <p:cNvCxnSpPr>
+            <a:cxnSpLocks/>
+          </p:cNvCxnSpPr>
+          <p:nvPr/>
+        </p:nvCxnSpPr>
+        <p:spPr>
+          <a:xfrm>
+            <a:off x="6987250" y="3859812"/>
+            <a:ext cx="0" cy="430233"/>
+          </a:xfrm>
+          <a:prstGeom prst="straightConnector1">
+            <a:avLst/>
+          </a:prstGeom>
+          <a:ln w="38100">
+            <a:headEnd type="triangle"/>
+            <a:tailEnd type="triangle"/>
+          </a:ln>
+        </p:spPr>
+        <p:style>
+          <a:lnRef idx="1">
+            <a:schemeClr val="accent1"/>
+          </a:lnRef>
+          <a:fillRef idx="0">
+            <a:schemeClr val="accent1"/>
+          </a:fillRef>
+          <a:effectRef idx="0">
+            <a:schemeClr val="accent1"/>
+          </a:effectRef>
+          <a:fontRef idx="minor">
+            <a:schemeClr val="tx1"/>
+          </a:fontRef>
+        </p:style>
+      </p:cxnSp>
+      <p:cxnSp>
+        <p:nvCxnSpPr>
+          <p:cNvPr id="15" name="Straight Arrow Connector 14"/>
+          <p:cNvCxnSpPr>
+            <a:cxnSpLocks/>
+          </p:cNvCxnSpPr>
+          <p:nvPr/>
+        </p:nvCxnSpPr>
+        <p:spPr>
+          <a:xfrm>
+            <a:off x="8588439" y="3859812"/>
+            <a:ext cx="0" cy="430233"/>
+          </a:xfrm>
+          <a:prstGeom prst="straightConnector1">
+            <a:avLst/>
+          </a:prstGeom>
+          <a:ln w="38100">
+            <a:headEnd type="triangle"/>
+            <a:tailEnd type="triangle"/>
+          </a:ln>
+        </p:spPr>
+        <p:style>
+          <a:lnRef idx="1">
+            <a:schemeClr val="accent1"/>
+          </a:lnRef>
+          <a:fillRef idx="0">
+            <a:schemeClr val="accent1"/>
+          </a:fillRef>
+          <a:effectRef idx="0">
+            <a:schemeClr val="accent1"/>
+          </a:effectRef>
+          <a:fontRef idx="minor">
+            <a:schemeClr val="tx1"/>
+          </a:fontRef>
+        </p:style>
+      </p:cxnSp>
+      <p:sp>
+        <p:nvSpPr>
+          <p:cNvPr id="16" name="Rounded Rectangle 15"/>
+          <p:cNvSpPr/>
+          <p:nvPr/>
+        </p:nvSpPr>
+        <p:spPr>
+          <a:xfrm>
+            <a:off x="534003" y="1069812"/>
+            <a:ext cx="1372805" cy="707572"/>
+          </a:xfrm>
+          <a:prstGeom prst="roundRect">
+            <a:avLst/>
+          </a:prstGeom>
+          <a:solidFill>
+            <a:schemeClr val="accent3">
+              <a:lumMod val="40000"/>
+              <a:lumOff val="60000"/>
+            </a:schemeClr>
+          </a:solidFill>
+          <a:effectLst>
+            <a:outerShdw blurRad="50800" dist="38100" dir="2700000" algn="tl" rotWithShape="0">
+              <a:prstClr val="black">
+                <a:alpha val="40000"/>
+              </a:prstClr>
+            </a:outerShdw>
+          </a:effectLst>
+        </p:spPr>
+        <p:style>
+          <a:lnRef idx="2">
+            <a:schemeClr val="accent1">
+              <a:shade val="50000"/>
+            </a:schemeClr>
+          </a:lnRef>
+          <a:fillRef idx="1">
+            <a:schemeClr val="accent1"/>
+          </a:fillRef>
+          <a:effectRef idx="0">
+            <a:schemeClr val="accent1"/>
+          </a:effectRef>
+          <a:fontRef idx="minor">
+            <a:schemeClr val="lt1"/>
+          </a:fontRef>
+        </p:style>
+        <p:txBody>
+          <a:bodyPr rtlCol="0" anchor="ctr"/>
+          <a:lstStyle/>
+          <a:p>
+            <a:pPr algn="ctr"/>
+            <a:r>
+              <a:rPr lang="en-US" dirty="0">
+                <a:solidFill>
+                  <a:schemeClr val="tx1"/>
+                </a:solidFill>
+              </a:rPr>
+              <a:t>Internet</a:t>
+            </a:r>
+          </a:p>
+        </p:txBody>
+      </p:sp>
+      <p:sp>
+        <p:nvSpPr>
+          <p:cNvPr id="17" name="Rounded Rectangle 16"/>
+          <p:cNvSpPr/>
+          <p:nvPr/>
+        </p:nvSpPr>
+        <p:spPr>
+          <a:xfrm>
+            <a:off x="459991" y="3464733"/>
+            <a:ext cx="2560396" cy="410934"/>
+          </a:xfrm>
+          <a:prstGeom prst="roundRect">
+            <a:avLst/>
+          </a:prstGeom>
+          <a:solidFill>
+            <a:schemeClr val="accent1"/>
+          </a:solidFill>
+          <a:effectLst>
+            <a:outerShdw blurRad="50800" dist="38100" dir="2700000" algn="tl" rotWithShape="0">
+              <a:prstClr val="black">
+                <a:alpha val="40000"/>
+              </a:prstClr>
+            </a:outerShdw>
+          </a:effectLst>
+        </p:spPr>
+        <p:style>
+          <a:lnRef idx="2">
+            <a:schemeClr val="accent1">
+              <a:shade val="50000"/>
+            </a:schemeClr>
+          </a:lnRef>
+          <a:fillRef idx="1">
+            <a:schemeClr val="accent1"/>
+          </a:fillRef>
+          <a:effectRef idx="0">
+            <a:schemeClr val="accent1"/>
+          </a:effectRef>
+          <a:fontRef idx="minor">
+            <a:schemeClr val="lt1"/>
+          </a:fontRef>
+        </p:style>
+        <p:txBody>
+          <a:bodyPr rtlCol="0" anchor="ctr"/>
+          <a:lstStyle/>
+          <a:p>
+            <a:pPr algn="ctr"/>
+            <a:r>
+              <a:rPr lang="en-US" dirty="0"/>
+              <a:t>Mesh Router</a:t>
+            </a:r>
+          </a:p>
+        </p:txBody>
+      </p:sp>
+      <p:cxnSp>
+        <p:nvCxnSpPr>
+          <p:cNvPr id="20" name="Straight Arrow Connector 19"/>
+          <p:cNvCxnSpPr>
+            <a:cxnSpLocks/>
+          </p:cNvCxnSpPr>
+          <p:nvPr/>
+        </p:nvCxnSpPr>
+        <p:spPr>
+          <a:xfrm>
+            <a:off x="754190" y="1769492"/>
+            <a:ext cx="0" cy="1695241"/>
+          </a:xfrm>
+          <a:prstGeom prst="straightConnector1">
+            <a:avLst/>
+          </a:prstGeom>
+          <a:ln w="38100">
+            <a:headEnd type="triangle"/>
+            <a:tailEnd type="triangle"/>
+          </a:ln>
+        </p:spPr>
+        <p:style>
+          <a:lnRef idx="1">
+            <a:schemeClr val="accent1"/>
+          </a:lnRef>
+          <a:fillRef idx="0">
+            <a:schemeClr val="accent1"/>
+          </a:fillRef>
+          <a:effectRef idx="0">
+            <a:schemeClr val="accent1"/>
+          </a:effectRef>
+          <a:fontRef idx="minor">
+            <a:schemeClr val="tx1"/>
+          </a:fontRef>
+        </p:style>
+      </p:cxnSp>
+      <p:pic>
+        <p:nvPicPr>
+          <p:cNvPr id="2" name="Picture 1"/>
+          <p:cNvPicPr>
+            <a:picLocks noChangeAspect="1"/>
+          </p:cNvPicPr>
+          <p:nvPr/>
+        </p:nvPicPr>
+        <p:blipFill>
+          <a:blip r:embed="rId3"/>
+          <a:stretch>
+            <a:fillRect/>
+          </a:stretch>
+        </p:blipFill>
+        <p:spPr>
+          <a:xfrm>
+            <a:off x="3794759" y="1149760"/>
+            <a:ext cx="1195347" cy="1184819"/>
+          </a:xfrm>
+          <a:prstGeom prst="rect">
+            <a:avLst/>
+          </a:prstGeom>
+        </p:spPr>
+      </p:pic>
+      <p:pic>
+        <p:nvPicPr>
+          <p:cNvPr id="3" name="Picture 2"/>
+          <p:cNvPicPr>
+            <a:picLocks noChangeAspect="1"/>
+          </p:cNvPicPr>
+          <p:nvPr/>
+        </p:nvPicPr>
+        <p:blipFill>
+          <a:blip r:embed="rId4"/>
+          <a:stretch>
+            <a:fillRect/>
+          </a:stretch>
+        </p:blipFill>
+        <p:spPr>
+          <a:xfrm flipH="1">
+            <a:off x="2708680" y="1310899"/>
+            <a:ext cx="995461" cy="986693"/>
+          </a:xfrm>
+          <a:prstGeom prst="rect">
+            <a:avLst/>
+          </a:prstGeom>
+        </p:spPr>
+      </p:pic>
+      <p:pic>
+        <p:nvPicPr>
+          <p:cNvPr id="10" name="Picture 9"/>
+          <p:cNvPicPr>
+            <a:picLocks noChangeAspect="1"/>
+          </p:cNvPicPr>
+          <p:nvPr/>
+        </p:nvPicPr>
+        <p:blipFill>
+          <a:blip r:embed="rId5"/>
+          <a:stretch>
+            <a:fillRect/>
+          </a:stretch>
+        </p:blipFill>
+        <p:spPr>
+          <a:xfrm>
+            <a:off x="2201007" y="1695994"/>
+            <a:ext cx="469583" cy="465447"/>
+          </a:xfrm>
+          <a:prstGeom prst="rect">
+            <a:avLst/>
+          </a:prstGeom>
+        </p:spPr>
+      </p:pic>
+      <p:sp>
+        <p:nvSpPr>
+          <p:cNvPr id="23" name="Rounded Rectangle 22">
+            <a:extLst>
+              <a:ext uri="{FF2B5EF4-FFF2-40B4-BE49-F238E27FC236}">
+                <a16:creationId xmlns:a16="http://schemas.microsoft.com/office/drawing/2014/main" id="{F94134C2-F81E-FF4D-935A-39569E1CB389}"/>
+              </a:ext>
+            </a:extLst>
+          </p:cNvPr>
+          <p:cNvSpPr/>
+          <p:nvPr/>
+        </p:nvSpPr>
+        <p:spPr>
+          <a:xfrm>
+            <a:off x="1073792" y="2334579"/>
+            <a:ext cx="1876226" cy="707572"/>
+          </a:xfrm>
+          <a:prstGeom prst="roundRect">
+            <a:avLst/>
+          </a:prstGeom>
+          <a:solidFill>
+            <a:schemeClr val="accent3">
+              <a:lumMod val="40000"/>
+              <a:lumOff val="60000"/>
+            </a:schemeClr>
+          </a:solidFill>
+          <a:effectLst>
+            <a:outerShdw blurRad="50800" dist="38100" dir="2700000" algn="tl" rotWithShape="0">
+              <a:prstClr val="black">
+                <a:alpha val="40000"/>
+              </a:prstClr>
+            </a:outerShdw>
+          </a:effectLst>
+        </p:spPr>
+        <p:style>
+          <a:lnRef idx="2">
+            <a:schemeClr val="accent1">
+              <a:shade val="50000"/>
+            </a:schemeClr>
+          </a:lnRef>
+          <a:fillRef idx="1">
+            <a:schemeClr val="accent1"/>
+          </a:fillRef>
+          <a:effectRef idx="0">
+            <a:schemeClr val="accent1"/>
+          </a:effectRef>
+          <a:fontRef idx="minor">
+            <a:schemeClr val="lt1"/>
+          </a:fontRef>
+        </p:style>
+        <p:txBody>
+          <a:bodyPr rtlCol="0" anchor="ctr"/>
+          <a:lstStyle/>
+          <a:p>
+            <a:pPr algn="ctr"/>
+            <a:r>
+              <a:rPr lang="en-US" dirty="0">
+                <a:solidFill>
+                  <a:schemeClr val="tx1"/>
+                </a:solidFill>
+              </a:rPr>
+              <a:t>Laptop, Desktop,</a:t>
+            </a:r>
+          </a:p>
+          <a:p>
+            <a:pPr algn="ctr"/>
+            <a:r>
+              <a:rPr lang="en-US" dirty="0">
+                <a:solidFill>
+                  <a:schemeClr val="tx1"/>
+                </a:solidFill>
+              </a:rPr>
+              <a:t> or PI</a:t>
+            </a:r>
+          </a:p>
+        </p:txBody>
+      </p:sp>
+      <p:cxnSp>
+        <p:nvCxnSpPr>
+          <p:cNvPr id="24" name="Straight Arrow Connector 23">
+            <a:extLst>
+              <a:ext uri="{FF2B5EF4-FFF2-40B4-BE49-F238E27FC236}">
+                <a16:creationId xmlns:a16="http://schemas.microsoft.com/office/drawing/2014/main" id="{78518C1B-A23B-2D4F-BC73-064275EC105A}"/>
+              </a:ext>
+            </a:extLst>
+          </p:cNvPr>
+          <p:cNvCxnSpPr>
+            <a:cxnSpLocks/>
+          </p:cNvCxnSpPr>
+          <p:nvPr/>
+        </p:nvCxnSpPr>
+        <p:spPr>
+          <a:xfrm>
+            <a:off x="1285357" y="3025334"/>
+            <a:ext cx="0" cy="430233"/>
+          </a:xfrm>
+          <a:prstGeom prst="straightConnector1">
+            <a:avLst/>
+          </a:prstGeom>
+          <a:ln w="38100">
+            <a:headEnd type="triangle"/>
+            <a:tailEnd type="triangle"/>
+          </a:ln>
+        </p:spPr>
+        <p:style>
+          <a:lnRef idx="1">
+            <a:schemeClr val="accent1"/>
+          </a:lnRef>
+          <a:fillRef idx="0">
+            <a:schemeClr val="accent1"/>
+          </a:fillRef>
+          <a:effectRef idx="0">
+            <a:schemeClr val="accent1"/>
+          </a:effectRef>
+          <a:fontRef idx="minor">
+            <a:schemeClr val="tx1"/>
+          </a:fontRef>
+        </p:style>
+      </p:cxnSp>
+      <p:sp>
+        <p:nvSpPr>
+          <p:cNvPr id="28" name="Snip Single Corner Rectangle 27">
+            <a:extLst>
+              <a:ext uri="{FF2B5EF4-FFF2-40B4-BE49-F238E27FC236}">
+                <a16:creationId xmlns:a16="http://schemas.microsoft.com/office/drawing/2014/main" id="{376A0602-DB5B-5E40-BE3E-862271695BEF}"/>
+              </a:ext>
+            </a:extLst>
+          </p:cNvPr>
+          <p:cNvSpPr/>
+          <p:nvPr/>
+        </p:nvSpPr>
+        <p:spPr>
+          <a:xfrm>
+            <a:off x="4120152" y="4867900"/>
+            <a:ext cx="291655" cy="317292"/>
+          </a:xfrm>
+          <a:prstGeom prst="snip1Rect">
+            <a:avLst/>
+          </a:prstGeom>
+        </p:spPr>
+        <p:style>
+          <a:lnRef idx="2">
+            <a:schemeClr val="accent2">
+              <a:shade val="50000"/>
+            </a:schemeClr>
+          </a:lnRef>
+          <a:fillRef idx="1">
+            <a:schemeClr val="accent2"/>
+          </a:fillRef>
+          <a:effectRef idx="0">
+            <a:schemeClr val="accent2"/>
+          </a:effectRef>
+          <a:fontRef idx="minor">
+            <a:schemeClr val="lt1"/>
+          </a:fontRef>
+        </p:style>
+        <p:txBody>
+          <a:bodyPr rtlCol="0" anchor="ctr"/>
+          <a:lstStyle/>
+          <a:p>
+            <a:pPr algn="ctr"/>
+            <a:r>
+              <a:rPr lang="en-US" dirty="0"/>
+              <a:t>L</a:t>
+            </a:r>
+          </a:p>
+        </p:txBody>
+      </p:sp>
+      <p:sp>
+        <p:nvSpPr>
+          <p:cNvPr id="29" name="Snip Single Corner Rectangle 28">
+            <a:extLst>
+              <a:ext uri="{FF2B5EF4-FFF2-40B4-BE49-F238E27FC236}">
+                <a16:creationId xmlns:a16="http://schemas.microsoft.com/office/drawing/2014/main" id="{D8C856D9-17AB-E54D-BE31-7FBCD4A07537}"/>
+              </a:ext>
+            </a:extLst>
+          </p:cNvPr>
+          <p:cNvSpPr/>
+          <p:nvPr/>
+        </p:nvSpPr>
+        <p:spPr>
+          <a:xfrm>
+            <a:off x="5708023" y="4873612"/>
+            <a:ext cx="291655" cy="317292"/>
+          </a:xfrm>
+          <a:prstGeom prst="snip1Rect">
+            <a:avLst/>
+          </a:prstGeom>
+        </p:spPr>
+        <p:style>
+          <a:lnRef idx="2">
+            <a:schemeClr val="accent2">
+              <a:shade val="50000"/>
+            </a:schemeClr>
+          </a:lnRef>
+          <a:fillRef idx="1">
+            <a:schemeClr val="accent2"/>
+          </a:fillRef>
+          <a:effectRef idx="0">
+            <a:schemeClr val="accent2"/>
+          </a:effectRef>
+          <a:fontRef idx="minor">
+            <a:schemeClr val="lt1"/>
+          </a:fontRef>
+        </p:style>
+        <p:txBody>
+          <a:bodyPr rtlCol="0" anchor="ctr"/>
+          <a:lstStyle/>
+          <a:p>
+            <a:pPr algn="ctr"/>
+            <a:r>
+              <a:rPr lang="en-US" dirty="0"/>
+              <a:t>L</a:t>
+            </a:r>
+          </a:p>
+        </p:txBody>
+      </p:sp>
+      <p:sp>
+        <p:nvSpPr>
+          <p:cNvPr id="30" name="Snip Single Corner Rectangle 29">
+            <a:extLst>
+              <a:ext uri="{FF2B5EF4-FFF2-40B4-BE49-F238E27FC236}">
+                <a16:creationId xmlns:a16="http://schemas.microsoft.com/office/drawing/2014/main" id="{28F08A7F-B052-A542-80B3-9D0D27EC5955}"/>
+              </a:ext>
+            </a:extLst>
+          </p:cNvPr>
+          <p:cNvSpPr/>
+          <p:nvPr/>
+        </p:nvSpPr>
+        <p:spPr>
+          <a:xfrm>
+            <a:off x="7328264" y="4838971"/>
+            <a:ext cx="291655" cy="317292"/>
+          </a:xfrm>
+          <a:prstGeom prst="snip1Rect">
+            <a:avLst/>
+          </a:prstGeom>
+        </p:spPr>
+        <p:style>
+          <a:lnRef idx="2">
+            <a:schemeClr val="accent2">
+              <a:shade val="50000"/>
+            </a:schemeClr>
+          </a:lnRef>
+          <a:fillRef idx="1">
+            <a:schemeClr val="accent2"/>
+          </a:fillRef>
+          <a:effectRef idx="0">
+            <a:schemeClr val="accent2"/>
+          </a:effectRef>
+          <a:fontRef idx="minor">
+            <a:schemeClr val="lt1"/>
+          </a:fontRef>
+        </p:style>
+        <p:txBody>
+          <a:bodyPr rtlCol="0" anchor="ctr"/>
+          <a:lstStyle/>
+          <a:p>
+            <a:pPr algn="ctr"/>
+            <a:r>
+              <a:rPr lang="en-US" dirty="0"/>
+              <a:t>L</a:t>
+            </a:r>
+          </a:p>
+        </p:txBody>
+      </p:sp>
+      <p:sp>
+        <p:nvSpPr>
+          <p:cNvPr id="31" name="Snip Single Corner Rectangle 30">
+            <a:extLst>
+              <a:ext uri="{FF2B5EF4-FFF2-40B4-BE49-F238E27FC236}">
+                <a16:creationId xmlns:a16="http://schemas.microsoft.com/office/drawing/2014/main" id="{F1E362E6-1F53-9644-9976-F35F2A2F16C5}"/>
+              </a:ext>
+            </a:extLst>
+          </p:cNvPr>
+          <p:cNvSpPr/>
+          <p:nvPr/>
+        </p:nvSpPr>
+        <p:spPr>
+          <a:xfrm>
+            <a:off x="8916341" y="4887588"/>
+            <a:ext cx="291655" cy="317292"/>
+          </a:xfrm>
+          <a:prstGeom prst="snip1Rect">
+            <a:avLst/>
+          </a:prstGeom>
+        </p:spPr>
+        <p:style>
+          <a:lnRef idx="2">
+            <a:schemeClr val="accent2">
+              <a:shade val="50000"/>
+            </a:schemeClr>
+          </a:lnRef>
+          <a:fillRef idx="1">
+            <a:schemeClr val="accent2"/>
+          </a:fillRef>
+          <a:effectRef idx="0">
+            <a:schemeClr val="accent2"/>
+          </a:effectRef>
+          <a:fontRef idx="minor">
+            <a:schemeClr val="lt1"/>
+          </a:fontRef>
+        </p:style>
+        <p:txBody>
+          <a:bodyPr rtlCol="0" anchor="ctr"/>
+          <a:lstStyle/>
+          <a:p>
+            <a:pPr algn="ctr"/>
+            <a:r>
+              <a:rPr lang="en-US" dirty="0"/>
+              <a:t>L</a:t>
+            </a:r>
+          </a:p>
+        </p:txBody>
+      </p:sp>
+      <p:sp>
+        <p:nvSpPr>
+          <p:cNvPr id="37" name="TextBox 36">
+            <a:extLst>
+              <a:ext uri="{FF2B5EF4-FFF2-40B4-BE49-F238E27FC236}">
+                <a16:creationId xmlns:a16="http://schemas.microsoft.com/office/drawing/2014/main" id="{CBDAB471-40AB-0742-9274-9A0650CE2224}"/>
+              </a:ext>
+            </a:extLst>
+          </p:cNvPr>
+          <p:cNvSpPr txBox="1"/>
+          <p:nvPr/>
+        </p:nvSpPr>
+        <p:spPr>
+          <a:xfrm>
+            <a:off x="8183729" y="1777384"/>
+            <a:ext cx="936212" cy="461665"/>
+          </a:xfrm>
+          <a:prstGeom prst="rect">
+            <a:avLst/>
+          </a:prstGeom>
+          <a:noFill/>
+        </p:spPr>
+        <p:txBody>
+          <a:bodyPr wrap="square" rtlCol="0">
+            <a:spAutoFit/>
+          </a:bodyPr>
+          <a:lstStyle/>
+          <a:p>
+            <a:r>
+              <a:rPr lang="en-US" sz="1200" dirty="0"/>
+              <a:t>Raspberry </a:t>
+            </a:r>
+          </a:p>
+          <a:p>
+            <a:r>
+              <a:rPr lang="en-US" sz="1200" dirty="0"/>
+              <a:t>Pi OS Lite</a:t>
+            </a:r>
+          </a:p>
+        </p:txBody>
+      </p:sp>
+      <p:cxnSp>
+        <p:nvCxnSpPr>
+          <p:cNvPr id="42" name="Straight Arrow Connector 41">
+            <a:extLst>
+              <a:ext uri="{FF2B5EF4-FFF2-40B4-BE49-F238E27FC236}">
+                <a16:creationId xmlns:a16="http://schemas.microsoft.com/office/drawing/2014/main" id="{93CD81B8-1080-EB47-9E05-20E57DE27063}"/>
+              </a:ext>
+            </a:extLst>
+          </p:cNvPr>
+          <p:cNvCxnSpPr>
+            <a:cxnSpLocks/>
+          </p:cNvCxnSpPr>
+          <p:nvPr/>
+        </p:nvCxnSpPr>
+        <p:spPr>
+          <a:xfrm>
+            <a:off x="6342055" y="3018645"/>
+            <a:ext cx="0" cy="430233"/>
+          </a:xfrm>
+          <a:prstGeom prst="straightConnector1">
+            <a:avLst/>
+          </a:prstGeom>
+          <a:ln w="38100">
+            <a:headEnd type="triangle"/>
+            <a:tailEnd type="triangle"/>
+          </a:ln>
+        </p:spPr>
+        <p:style>
+          <a:lnRef idx="1">
+            <a:schemeClr val="accent1"/>
+          </a:lnRef>
+          <a:fillRef idx="0">
+            <a:schemeClr val="accent1"/>
+          </a:fillRef>
+          <a:effectRef idx="0">
+            <a:schemeClr val="accent1"/>
+          </a:effectRef>
+          <a:fontRef idx="minor">
+            <a:schemeClr val="tx1"/>
+          </a:fontRef>
+        </p:style>
+      </p:cxnSp>
+      <p:sp>
+        <p:nvSpPr>
+          <p:cNvPr id="47" name="Left-Right Arrow 46">
+            <a:extLst>
+              <a:ext uri="{FF2B5EF4-FFF2-40B4-BE49-F238E27FC236}">
+                <a16:creationId xmlns:a16="http://schemas.microsoft.com/office/drawing/2014/main" id="{F775F459-8736-A644-8C3D-4DDEA1D77586}"/>
+              </a:ext>
+            </a:extLst>
+          </p:cNvPr>
+          <p:cNvSpPr/>
+          <p:nvPr/>
+        </p:nvSpPr>
+        <p:spPr>
+          <a:xfrm>
+            <a:off x="2811800" y="3602217"/>
+            <a:ext cx="438317" cy="158647"/>
+          </a:xfrm>
+          <a:prstGeom prst="leftRightArrow">
+            <a:avLst/>
+          </a:prstGeom>
+        </p:spPr>
+        <p:style>
+          <a:lnRef idx="3">
+            <a:schemeClr val="lt1"/>
+          </a:lnRef>
+          <a:fillRef idx="1">
+            <a:schemeClr val="accent1"/>
+          </a:fillRef>
+          <a:effectRef idx="1">
+            <a:schemeClr val="accent1"/>
+          </a:effectRef>
+          <a:fontRef idx="minor">
+            <a:schemeClr val="lt1"/>
+          </a:fontRef>
+        </p:style>
+        <p:txBody>
+          <a:bodyPr rtlCol="0" anchor="ctr"/>
+          <a:lstStyle/>
+          <a:p>
+            <a:pPr algn="ctr"/>
+            <a:endParaRPr lang="en-US"/>
+          </a:p>
+        </p:txBody>
+      </p:sp>
+      <p:sp>
+        <p:nvSpPr>
+          <p:cNvPr id="48" name="TextBox 47">
+            <a:extLst>
+              <a:ext uri="{FF2B5EF4-FFF2-40B4-BE49-F238E27FC236}">
+                <a16:creationId xmlns:a16="http://schemas.microsoft.com/office/drawing/2014/main" id="{D2F43E4D-D320-C341-86CB-E4A6251995B6}"/>
+              </a:ext>
+            </a:extLst>
+          </p:cNvPr>
+          <p:cNvSpPr txBox="1"/>
+          <p:nvPr/>
+        </p:nvSpPr>
+        <p:spPr>
+          <a:xfrm>
+            <a:off x="7713314" y="1386886"/>
+            <a:ext cx="1008674" cy="369332"/>
+          </a:xfrm>
+          <a:prstGeom prst="rect">
+            <a:avLst/>
+          </a:prstGeom>
+          <a:noFill/>
+        </p:spPr>
+        <p:txBody>
+          <a:bodyPr wrap="none" rtlCol="0">
+            <a:spAutoFit/>
+          </a:bodyPr>
+          <a:lstStyle/>
+          <a:p>
+            <a:r>
+              <a:rPr lang="en-US" dirty="0"/>
+              <a:t>SD Cards</a:t>
+            </a:r>
+          </a:p>
+        </p:txBody>
+      </p:sp>
+      <p:sp>
+        <p:nvSpPr>
+          <p:cNvPr id="40" name="Snip Single Corner Rectangle 39">
+            <a:extLst>
+              <a:ext uri="{FF2B5EF4-FFF2-40B4-BE49-F238E27FC236}">
+                <a16:creationId xmlns:a16="http://schemas.microsoft.com/office/drawing/2014/main" id="{654C21AF-C051-E35B-56C5-FE264AA7DFF0}"/>
+              </a:ext>
+            </a:extLst>
+          </p:cNvPr>
+          <p:cNvSpPr/>
+          <p:nvPr/>
+        </p:nvSpPr>
+        <p:spPr>
+          <a:xfrm>
+            <a:off x="6661657" y="2895123"/>
+            <a:ext cx="291655" cy="317292"/>
+          </a:xfrm>
+          <a:prstGeom prst="snip1Rect">
+            <a:avLst/>
+          </a:prstGeom>
+        </p:spPr>
+        <p:style>
+          <a:lnRef idx="2">
+            <a:schemeClr val="accent2">
+              <a:shade val="50000"/>
+            </a:schemeClr>
+          </a:lnRef>
+          <a:fillRef idx="1">
+            <a:schemeClr val="accent2"/>
+          </a:fillRef>
+          <a:effectRef idx="0">
+            <a:schemeClr val="accent2"/>
+          </a:effectRef>
+          <a:fontRef idx="minor">
+            <a:schemeClr val="lt1"/>
+          </a:fontRef>
+        </p:style>
+        <p:txBody>
+          <a:bodyPr rtlCol="0" anchor="ctr"/>
+          <a:lstStyle/>
+          <a:p>
+            <a:pPr algn="ctr"/>
+            <a:r>
+              <a:rPr lang="en-US" dirty="0"/>
+              <a:t>L</a:t>
+            </a:r>
+          </a:p>
+        </p:txBody>
+      </p:sp>
+      <p:sp>
+        <p:nvSpPr>
+          <p:cNvPr id="43" name="Snip Single Corner Rectangle 42">
+            <a:extLst>
+              <a:ext uri="{FF2B5EF4-FFF2-40B4-BE49-F238E27FC236}">
+                <a16:creationId xmlns:a16="http://schemas.microsoft.com/office/drawing/2014/main" id="{94FA775F-CDE4-BCAA-8C36-9AD3D67F9E3E}"/>
+              </a:ext>
+            </a:extLst>
+          </p:cNvPr>
+          <p:cNvSpPr/>
+          <p:nvPr/>
+        </p:nvSpPr>
+        <p:spPr>
+          <a:xfrm>
+            <a:off x="7801455" y="1854169"/>
+            <a:ext cx="291655" cy="317292"/>
+          </a:xfrm>
+          <a:prstGeom prst="snip1Rect">
+            <a:avLst/>
+          </a:prstGeom>
+        </p:spPr>
+        <p:style>
+          <a:lnRef idx="2">
+            <a:schemeClr val="accent2">
+              <a:shade val="50000"/>
+            </a:schemeClr>
+          </a:lnRef>
+          <a:fillRef idx="1">
+            <a:schemeClr val="accent2"/>
+          </a:fillRef>
+          <a:effectRef idx="0">
+            <a:schemeClr val="accent2"/>
+          </a:effectRef>
+          <a:fontRef idx="minor">
+            <a:schemeClr val="lt1"/>
+          </a:fontRef>
+        </p:style>
+        <p:txBody>
+          <a:bodyPr rtlCol="0" anchor="ctr"/>
+          <a:lstStyle/>
+          <a:p>
+            <a:pPr algn="ctr"/>
+            <a:r>
+              <a:rPr lang="en-US" dirty="0"/>
+              <a:t>L</a:t>
+            </a:r>
+          </a:p>
+        </p:txBody>
+      </p:sp>
+      <p:sp>
+        <p:nvSpPr>
+          <p:cNvPr id="19" name="TextBox 18">
+            <a:extLst>
+              <a:ext uri="{FF2B5EF4-FFF2-40B4-BE49-F238E27FC236}">
+                <a16:creationId xmlns:a16="http://schemas.microsoft.com/office/drawing/2014/main" id="{CEA7DCBF-C914-81A4-38B4-AEB02B4CD626}"/>
+              </a:ext>
+            </a:extLst>
+          </p:cNvPr>
+          <p:cNvSpPr txBox="1"/>
+          <p:nvPr/>
+        </p:nvSpPr>
+        <p:spPr>
+          <a:xfrm>
+            <a:off x="2755265" y="3862699"/>
+            <a:ext cx="635302" cy="369332"/>
+          </a:xfrm>
+          <a:prstGeom prst="rect">
+            <a:avLst/>
+          </a:prstGeom>
+          <a:noFill/>
+        </p:spPr>
+        <p:txBody>
+          <a:bodyPr wrap="none" rtlCol="0">
+            <a:spAutoFit/>
+          </a:bodyPr>
+          <a:lstStyle/>
+          <a:p>
+            <a:r>
+              <a:rPr lang="en-US" dirty="0"/>
+              <a:t>Wire</a:t>
+            </a:r>
+          </a:p>
+        </p:txBody>
+      </p:sp>
+      <p:pic>
+        <p:nvPicPr>
+          <p:cNvPr id="25" name="Picture 24" descr="Icon&#10;&#10;Description automatically generated">
+            <a:extLst>
+              <a:ext uri="{FF2B5EF4-FFF2-40B4-BE49-F238E27FC236}">
+                <a16:creationId xmlns:a16="http://schemas.microsoft.com/office/drawing/2014/main" id="{D87CF601-6525-FAB8-5EA0-63F97481669B}"/>
+              </a:ext>
+            </a:extLst>
+          </p:cNvPr>
+          <p:cNvPicPr>
+            <a:picLocks noChangeAspect="1"/>
+          </p:cNvPicPr>
+          <p:nvPr/>
+        </p:nvPicPr>
+        <p:blipFill>
+          <a:blip r:embed="rId6"/>
+          <a:stretch>
+            <a:fillRect/>
+          </a:stretch>
+        </p:blipFill>
+        <p:spPr>
+          <a:xfrm>
+            <a:off x="1466395" y="3106827"/>
+            <a:ext cx="303126" cy="305857"/>
+          </a:xfrm>
+          <a:prstGeom prst="rect">
+            <a:avLst/>
+          </a:prstGeom>
+        </p:spPr>
+      </p:pic>
+      <p:grpSp>
+        <p:nvGrpSpPr>
+          <p:cNvPr id="32" name="Group 31">
+            <a:extLst>
+              <a:ext uri="{FF2B5EF4-FFF2-40B4-BE49-F238E27FC236}">
+                <a16:creationId xmlns:a16="http://schemas.microsoft.com/office/drawing/2014/main" id="{521C055B-AC74-9678-9D4B-3AFBBC6CAE0F}"/>
+              </a:ext>
+            </a:extLst>
+          </p:cNvPr>
+          <p:cNvGrpSpPr/>
+          <p:nvPr/>
+        </p:nvGrpSpPr>
+        <p:grpSpPr>
+          <a:xfrm>
+            <a:off x="5437628" y="3070925"/>
+            <a:ext cx="721027" cy="369332"/>
+            <a:chOff x="7040622" y="3868433"/>
+            <a:chExt cx="721027" cy="369332"/>
+          </a:xfrm>
+        </p:grpSpPr>
+        <p:sp>
+          <p:nvSpPr>
+            <p:cNvPr id="45" name="TextBox 44">
+              <a:extLst>
+                <a:ext uri="{FF2B5EF4-FFF2-40B4-BE49-F238E27FC236}">
+                  <a16:creationId xmlns:a16="http://schemas.microsoft.com/office/drawing/2014/main" id="{D2FB4E97-A055-4082-5B59-36BEB9836348}"/>
+                </a:ext>
+              </a:extLst>
+            </p:cNvPr>
+            <p:cNvSpPr txBox="1"/>
+            <p:nvPr/>
+          </p:nvSpPr>
+          <p:spPr>
+            <a:xfrm>
+              <a:off x="7126347" y="3868433"/>
+              <a:ext cx="635302" cy="369332"/>
+            </a:xfrm>
+            <a:prstGeom prst="rect">
+              <a:avLst/>
+            </a:prstGeom>
+            <a:noFill/>
+          </p:spPr>
+          <p:txBody>
+            <a:bodyPr wrap="none" rtlCol="0">
+              <a:spAutoFit/>
+            </a:bodyPr>
+            <a:lstStyle/>
+            <a:p>
+              <a:r>
+                <a:rPr lang="en-US" dirty="0"/>
+                <a:t>Wire</a:t>
+              </a:r>
+            </a:p>
+          </p:txBody>
+        </p:sp>
+        <p:pic>
+          <p:nvPicPr>
+            <p:cNvPr id="27" name="Picture 26" descr="Icon&#10;&#10;Description automatically generated">
+              <a:extLst>
+                <a:ext uri="{FF2B5EF4-FFF2-40B4-BE49-F238E27FC236}">
+                  <a16:creationId xmlns:a16="http://schemas.microsoft.com/office/drawing/2014/main" id="{4856A78C-B6E7-D6DE-F052-16227BF8611F}"/>
+                </a:ext>
+              </a:extLst>
+            </p:cNvPr>
+            <p:cNvPicPr>
+              <a:picLocks noChangeAspect="1"/>
+            </p:cNvPicPr>
+            <p:nvPr/>
+          </p:nvPicPr>
+          <p:blipFill>
+            <a:blip r:embed="rId7"/>
+            <a:stretch>
+              <a:fillRect/>
+            </a:stretch>
+          </p:blipFill>
+          <p:spPr>
+            <a:xfrm>
+              <a:off x="7040622" y="3912883"/>
+              <a:ext cx="157693" cy="291085"/>
+            </a:xfrm>
+            <a:prstGeom prst="rect">
+              <a:avLst/>
+            </a:prstGeom>
+          </p:spPr>
+        </p:pic>
+      </p:grpSp>
+      <p:grpSp>
+        <p:nvGrpSpPr>
+          <p:cNvPr id="33" name="Group 32">
+            <a:extLst>
+              <a:ext uri="{FF2B5EF4-FFF2-40B4-BE49-F238E27FC236}">
+                <a16:creationId xmlns:a16="http://schemas.microsoft.com/office/drawing/2014/main" id="{D445B041-42BE-5CDF-5728-67EE1B5487FF}"/>
+              </a:ext>
+            </a:extLst>
+          </p:cNvPr>
+          <p:cNvGrpSpPr/>
+          <p:nvPr/>
+        </p:nvGrpSpPr>
+        <p:grpSpPr>
+          <a:xfrm>
+            <a:off x="2317014" y="3064193"/>
+            <a:ext cx="723443" cy="369332"/>
+            <a:chOff x="7977820" y="2238453"/>
+            <a:chExt cx="723443" cy="369332"/>
+          </a:xfrm>
+        </p:grpSpPr>
+        <p:sp>
+          <p:nvSpPr>
+            <p:cNvPr id="50" name="TextBox 49">
+              <a:extLst>
+                <a:ext uri="{FF2B5EF4-FFF2-40B4-BE49-F238E27FC236}">
+                  <a16:creationId xmlns:a16="http://schemas.microsoft.com/office/drawing/2014/main" id="{805FBEA9-75DF-7BAF-5859-4DF153BE7DE8}"/>
+                </a:ext>
+              </a:extLst>
+            </p:cNvPr>
+            <p:cNvSpPr txBox="1"/>
+            <p:nvPr/>
+          </p:nvSpPr>
+          <p:spPr>
+            <a:xfrm>
+              <a:off x="8065961" y="2238453"/>
+              <a:ext cx="635302" cy="369332"/>
+            </a:xfrm>
+            <a:prstGeom prst="rect">
+              <a:avLst/>
+            </a:prstGeom>
+            <a:noFill/>
+          </p:spPr>
+          <p:txBody>
+            <a:bodyPr wrap="none" rtlCol="0">
+              <a:spAutoFit/>
+            </a:bodyPr>
+            <a:lstStyle/>
+            <a:p>
+              <a:r>
+                <a:rPr lang="en-US" dirty="0"/>
+                <a:t>Wire</a:t>
+              </a:r>
+            </a:p>
+          </p:txBody>
+        </p:sp>
+        <p:pic>
+          <p:nvPicPr>
+            <p:cNvPr id="51" name="Picture 50" descr="Icon&#10;&#10;Description automatically generated">
+              <a:extLst>
+                <a:ext uri="{FF2B5EF4-FFF2-40B4-BE49-F238E27FC236}">
+                  <a16:creationId xmlns:a16="http://schemas.microsoft.com/office/drawing/2014/main" id="{CE6C8C85-94D8-762F-838F-CD2A50FEBF5E}"/>
+                </a:ext>
+              </a:extLst>
+            </p:cNvPr>
+            <p:cNvPicPr>
+              <a:picLocks noChangeAspect="1"/>
+            </p:cNvPicPr>
+            <p:nvPr/>
+          </p:nvPicPr>
+          <p:blipFill>
+            <a:blip r:embed="rId7"/>
+            <a:stretch>
+              <a:fillRect/>
+            </a:stretch>
+          </p:blipFill>
+          <p:spPr>
+            <a:xfrm>
+              <a:off x="7977820" y="2297592"/>
+              <a:ext cx="157693" cy="291085"/>
+            </a:xfrm>
+            <a:prstGeom prst="rect">
+              <a:avLst/>
+            </a:prstGeom>
+          </p:spPr>
+        </p:pic>
+      </p:grpSp>
+      <p:grpSp>
+        <p:nvGrpSpPr>
+          <p:cNvPr id="55" name="Group 54">
+            <a:extLst>
+              <a:ext uri="{FF2B5EF4-FFF2-40B4-BE49-F238E27FC236}">
+                <a16:creationId xmlns:a16="http://schemas.microsoft.com/office/drawing/2014/main" id="{D6C5AC21-80E5-AC29-96E7-5B4F0220D6E9}"/>
+              </a:ext>
+            </a:extLst>
+          </p:cNvPr>
+          <p:cNvGrpSpPr/>
+          <p:nvPr/>
+        </p:nvGrpSpPr>
+        <p:grpSpPr>
+          <a:xfrm>
+            <a:off x="8651835" y="3890262"/>
+            <a:ext cx="721027" cy="369332"/>
+            <a:chOff x="7040622" y="3868433"/>
+            <a:chExt cx="721027" cy="369332"/>
+          </a:xfrm>
+        </p:grpSpPr>
+        <p:sp>
+          <p:nvSpPr>
+            <p:cNvPr id="56" name="TextBox 55">
+              <a:extLst>
+                <a:ext uri="{FF2B5EF4-FFF2-40B4-BE49-F238E27FC236}">
+                  <a16:creationId xmlns:a16="http://schemas.microsoft.com/office/drawing/2014/main" id="{4C6C41D0-BFAE-8A69-F1B7-6607E9D42FEB}"/>
+                </a:ext>
+              </a:extLst>
+            </p:cNvPr>
+            <p:cNvSpPr txBox="1"/>
+            <p:nvPr/>
+          </p:nvSpPr>
+          <p:spPr>
+            <a:xfrm>
+              <a:off x="7126347" y="3868433"/>
+              <a:ext cx="635302" cy="369332"/>
+            </a:xfrm>
+            <a:prstGeom prst="rect">
+              <a:avLst/>
+            </a:prstGeom>
+            <a:noFill/>
+          </p:spPr>
+          <p:txBody>
+            <a:bodyPr wrap="none" rtlCol="0">
+              <a:spAutoFit/>
+            </a:bodyPr>
+            <a:lstStyle/>
+            <a:p>
+              <a:r>
+                <a:rPr lang="en-US" dirty="0"/>
+                <a:t>Wire</a:t>
+              </a:r>
+            </a:p>
+          </p:txBody>
+        </p:sp>
+        <p:pic>
+          <p:nvPicPr>
+            <p:cNvPr id="57" name="Picture 56" descr="Icon&#10;&#10;Description automatically generated">
+              <a:extLst>
+                <a:ext uri="{FF2B5EF4-FFF2-40B4-BE49-F238E27FC236}">
+                  <a16:creationId xmlns:a16="http://schemas.microsoft.com/office/drawing/2014/main" id="{23D62DBD-FECD-5202-4F2A-2D4D79B763AE}"/>
+                </a:ext>
+              </a:extLst>
+            </p:cNvPr>
+            <p:cNvPicPr>
+              <a:picLocks noChangeAspect="1"/>
+            </p:cNvPicPr>
+            <p:nvPr/>
+          </p:nvPicPr>
+          <p:blipFill>
+            <a:blip r:embed="rId7"/>
+            <a:stretch>
+              <a:fillRect/>
+            </a:stretch>
+          </p:blipFill>
+          <p:spPr>
+            <a:xfrm>
+              <a:off x="7040622" y="3912883"/>
+              <a:ext cx="157693" cy="291085"/>
+            </a:xfrm>
+            <a:prstGeom prst="rect">
+              <a:avLst/>
+            </a:prstGeom>
+          </p:spPr>
+        </p:pic>
+      </p:grpSp>
+      <p:grpSp>
+        <p:nvGrpSpPr>
+          <p:cNvPr id="58" name="Group 57">
+            <a:extLst>
+              <a:ext uri="{FF2B5EF4-FFF2-40B4-BE49-F238E27FC236}">
+                <a16:creationId xmlns:a16="http://schemas.microsoft.com/office/drawing/2014/main" id="{2C75191F-962A-C968-17CA-748AF783FF09}"/>
+              </a:ext>
+            </a:extLst>
+          </p:cNvPr>
+          <p:cNvGrpSpPr/>
+          <p:nvPr/>
+        </p:nvGrpSpPr>
+        <p:grpSpPr>
+          <a:xfrm>
+            <a:off x="5525849" y="3890262"/>
+            <a:ext cx="721027" cy="369332"/>
+            <a:chOff x="7040622" y="3868433"/>
+            <a:chExt cx="721027" cy="369332"/>
+          </a:xfrm>
+        </p:grpSpPr>
+        <p:sp>
+          <p:nvSpPr>
+            <p:cNvPr id="59" name="TextBox 58">
+              <a:extLst>
+                <a:ext uri="{FF2B5EF4-FFF2-40B4-BE49-F238E27FC236}">
+                  <a16:creationId xmlns:a16="http://schemas.microsoft.com/office/drawing/2014/main" id="{D0914BDC-53CA-5B6F-F4CB-DB3B416C368D}"/>
+                </a:ext>
+              </a:extLst>
+            </p:cNvPr>
+            <p:cNvSpPr txBox="1"/>
+            <p:nvPr/>
+          </p:nvSpPr>
+          <p:spPr>
+            <a:xfrm>
+              <a:off x="7126347" y="3868433"/>
+              <a:ext cx="635302" cy="369332"/>
+            </a:xfrm>
+            <a:prstGeom prst="rect">
+              <a:avLst/>
+            </a:prstGeom>
+            <a:noFill/>
+          </p:spPr>
+          <p:txBody>
+            <a:bodyPr wrap="none" rtlCol="0">
+              <a:spAutoFit/>
+            </a:bodyPr>
+            <a:lstStyle/>
+            <a:p>
+              <a:r>
+                <a:rPr lang="en-US" dirty="0"/>
+                <a:t>Wire</a:t>
+              </a:r>
+            </a:p>
+          </p:txBody>
+        </p:sp>
+        <p:pic>
+          <p:nvPicPr>
+            <p:cNvPr id="60" name="Picture 59" descr="Icon&#10;&#10;Description automatically generated">
+              <a:extLst>
+                <a:ext uri="{FF2B5EF4-FFF2-40B4-BE49-F238E27FC236}">
+                  <a16:creationId xmlns:a16="http://schemas.microsoft.com/office/drawing/2014/main" id="{6BC1E895-FAE8-0767-1A88-D619ECE85289}"/>
+                </a:ext>
+              </a:extLst>
+            </p:cNvPr>
+            <p:cNvPicPr>
+              <a:picLocks noChangeAspect="1"/>
+            </p:cNvPicPr>
+            <p:nvPr/>
+          </p:nvPicPr>
+          <p:blipFill>
+            <a:blip r:embed="rId7"/>
+            <a:stretch>
+              <a:fillRect/>
+            </a:stretch>
+          </p:blipFill>
+          <p:spPr>
+            <a:xfrm>
+              <a:off x="7040622" y="3912883"/>
+              <a:ext cx="157693" cy="291085"/>
+            </a:xfrm>
+            <a:prstGeom prst="rect">
+              <a:avLst/>
+            </a:prstGeom>
+          </p:spPr>
+        </p:pic>
+      </p:grpSp>
+      <p:grpSp>
+        <p:nvGrpSpPr>
+          <p:cNvPr id="61" name="Group 60">
+            <a:extLst>
+              <a:ext uri="{FF2B5EF4-FFF2-40B4-BE49-F238E27FC236}">
+                <a16:creationId xmlns:a16="http://schemas.microsoft.com/office/drawing/2014/main" id="{1E10736F-DEDE-B022-81D1-81DD6B7D502E}"/>
+              </a:ext>
+            </a:extLst>
+          </p:cNvPr>
+          <p:cNvGrpSpPr/>
+          <p:nvPr/>
+        </p:nvGrpSpPr>
+        <p:grpSpPr>
+          <a:xfrm>
+            <a:off x="3924281" y="3911609"/>
+            <a:ext cx="721027" cy="369332"/>
+            <a:chOff x="7040622" y="3868433"/>
+            <a:chExt cx="721027" cy="369332"/>
+          </a:xfrm>
+        </p:grpSpPr>
+        <p:sp>
+          <p:nvSpPr>
+            <p:cNvPr id="62" name="TextBox 61">
+              <a:extLst>
+                <a:ext uri="{FF2B5EF4-FFF2-40B4-BE49-F238E27FC236}">
+                  <a16:creationId xmlns:a16="http://schemas.microsoft.com/office/drawing/2014/main" id="{17D26A78-BA30-D0D2-112C-81EC01E59F48}"/>
+                </a:ext>
+              </a:extLst>
+            </p:cNvPr>
+            <p:cNvSpPr txBox="1"/>
+            <p:nvPr/>
+          </p:nvSpPr>
+          <p:spPr>
+            <a:xfrm>
+              <a:off x="7126347" y="3868433"/>
+              <a:ext cx="635302" cy="369332"/>
+            </a:xfrm>
+            <a:prstGeom prst="rect">
+              <a:avLst/>
+            </a:prstGeom>
+            <a:noFill/>
+          </p:spPr>
+          <p:txBody>
+            <a:bodyPr wrap="none" rtlCol="0">
+              <a:spAutoFit/>
+            </a:bodyPr>
+            <a:lstStyle/>
+            <a:p>
+              <a:r>
+                <a:rPr lang="en-US" dirty="0"/>
+                <a:t>Wire</a:t>
+              </a:r>
+            </a:p>
+          </p:txBody>
+        </p:sp>
+        <p:pic>
+          <p:nvPicPr>
+            <p:cNvPr id="63" name="Picture 62" descr="Icon&#10;&#10;Description automatically generated">
+              <a:extLst>
+                <a:ext uri="{FF2B5EF4-FFF2-40B4-BE49-F238E27FC236}">
+                  <a16:creationId xmlns:a16="http://schemas.microsoft.com/office/drawing/2014/main" id="{4B359D38-77B5-D4E2-1EB5-D64A6011814F}"/>
+                </a:ext>
+              </a:extLst>
+            </p:cNvPr>
+            <p:cNvPicPr>
+              <a:picLocks noChangeAspect="1"/>
+            </p:cNvPicPr>
+            <p:nvPr/>
+          </p:nvPicPr>
+          <p:blipFill>
+            <a:blip r:embed="rId7"/>
+            <a:stretch>
+              <a:fillRect/>
+            </a:stretch>
+          </p:blipFill>
+          <p:spPr>
+            <a:xfrm>
+              <a:off x="7040622" y="3912883"/>
+              <a:ext cx="157693" cy="291085"/>
+            </a:xfrm>
+            <a:prstGeom prst="rect">
+              <a:avLst/>
+            </a:prstGeom>
+          </p:spPr>
+        </p:pic>
+      </p:grpSp>
+      <p:sp>
+        <p:nvSpPr>
+          <p:cNvPr id="35" name="TextBox 34">
+            <a:extLst>
+              <a:ext uri="{FF2B5EF4-FFF2-40B4-BE49-F238E27FC236}">
+                <a16:creationId xmlns:a16="http://schemas.microsoft.com/office/drawing/2014/main" id="{A2F23EF7-BE5F-6CFF-E3E6-A5C021760984}"/>
+              </a:ext>
+            </a:extLst>
+          </p:cNvPr>
+          <p:cNvSpPr txBox="1"/>
+          <p:nvPr/>
+        </p:nvSpPr>
+        <p:spPr>
+          <a:xfrm>
+            <a:off x="1846999" y="3073359"/>
+            <a:ext cx="386644" cy="369332"/>
+          </a:xfrm>
+          <a:prstGeom prst="rect">
+            <a:avLst/>
+          </a:prstGeom>
+          <a:noFill/>
+        </p:spPr>
+        <p:txBody>
+          <a:bodyPr wrap="none" rtlCol="0">
+            <a:spAutoFit/>
+          </a:bodyPr>
+          <a:lstStyle/>
+          <a:p>
+            <a:r>
+              <a:rPr lang="en-US" dirty="0"/>
+              <a:t>or</a:t>
+            </a:r>
+          </a:p>
+        </p:txBody>
+      </p:sp>
+      <p:grpSp>
+        <p:nvGrpSpPr>
+          <p:cNvPr id="64" name="Group 63">
+            <a:extLst>
+              <a:ext uri="{FF2B5EF4-FFF2-40B4-BE49-F238E27FC236}">
+                <a16:creationId xmlns:a16="http://schemas.microsoft.com/office/drawing/2014/main" id="{E573EC89-BBAA-2BC6-2552-364F7AFA7BC9}"/>
+              </a:ext>
+            </a:extLst>
+          </p:cNvPr>
+          <p:cNvGrpSpPr/>
+          <p:nvPr/>
+        </p:nvGrpSpPr>
+        <p:grpSpPr>
+          <a:xfrm>
+            <a:off x="885599" y="1845856"/>
+            <a:ext cx="723443" cy="369332"/>
+            <a:chOff x="7977820" y="2238453"/>
+            <a:chExt cx="723443" cy="369332"/>
+          </a:xfrm>
+        </p:grpSpPr>
+        <p:sp>
+          <p:nvSpPr>
+            <p:cNvPr id="65" name="TextBox 64">
+              <a:extLst>
+                <a:ext uri="{FF2B5EF4-FFF2-40B4-BE49-F238E27FC236}">
+                  <a16:creationId xmlns:a16="http://schemas.microsoft.com/office/drawing/2014/main" id="{5D64137B-780C-9C66-F1DD-92BF5F8356BD}"/>
+                </a:ext>
+              </a:extLst>
+            </p:cNvPr>
+            <p:cNvSpPr txBox="1"/>
+            <p:nvPr/>
+          </p:nvSpPr>
+          <p:spPr>
+            <a:xfrm>
+              <a:off x="8065961" y="2238453"/>
+              <a:ext cx="635302" cy="369332"/>
+            </a:xfrm>
+            <a:prstGeom prst="rect">
+              <a:avLst/>
+            </a:prstGeom>
+            <a:noFill/>
+          </p:spPr>
+          <p:txBody>
+            <a:bodyPr wrap="none" rtlCol="0">
+              <a:spAutoFit/>
+            </a:bodyPr>
+            <a:lstStyle/>
+            <a:p>
+              <a:r>
+                <a:rPr lang="en-US" dirty="0"/>
+                <a:t>Wire</a:t>
+              </a:r>
+            </a:p>
+          </p:txBody>
+        </p:sp>
+        <p:pic>
+          <p:nvPicPr>
+            <p:cNvPr id="66" name="Picture 65" descr="Icon&#10;&#10;Description automatically generated">
+              <a:extLst>
+                <a:ext uri="{FF2B5EF4-FFF2-40B4-BE49-F238E27FC236}">
+                  <a16:creationId xmlns:a16="http://schemas.microsoft.com/office/drawing/2014/main" id="{C81548D5-608D-A81B-BC75-8EFE3FE0A071}"/>
+                </a:ext>
+              </a:extLst>
+            </p:cNvPr>
+            <p:cNvPicPr>
+              <a:picLocks noChangeAspect="1"/>
+            </p:cNvPicPr>
+            <p:nvPr/>
+          </p:nvPicPr>
+          <p:blipFill>
+            <a:blip r:embed="rId7"/>
+            <a:stretch>
+              <a:fillRect/>
+            </a:stretch>
+          </p:blipFill>
+          <p:spPr>
+            <a:xfrm>
+              <a:off x="7977820" y="2297592"/>
+              <a:ext cx="157693" cy="291085"/>
+            </a:xfrm>
+            <a:prstGeom prst="rect">
+              <a:avLst/>
+            </a:prstGeom>
+          </p:spPr>
+        </p:pic>
+      </p:grpSp>
+      <p:grpSp>
+        <p:nvGrpSpPr>
+          <p:cNvPr id="67" name="Group 66">
+            <a:extLst>
+              <a:ext uri="{FF2B5EF4-FFF2-40B4-BE49-F238E27FC236}">
+                <a16:creationId xmlns:a16="http://schemas.microsoft.com/office/drawing/2014/main" id="{1EF5ED7F-A78F-06CF-DB07-D46DADB715FD}"/>
+              </a:ext>
+            </a:extLst>
+          </p:cNvPr>
+          <p:cNvGrpSpPr/>
+          <p:nvPr/>
+        </p:nvGrpSpPr>
+        <p:grpSpPr>
+          <a:xfrm>
+            <a:off x="7193022" y="4020833"/>
+            <a:ext cx="721027" cy="369332"/>
+            <a:chOff x="7040622" y="3868433"/>
+            <a:chExt cx="721027" cy="369332"/>
+          </a:xfrm>
+        </p:grpSpPr>
+        <p:sp>
+          <p:nvSpPr>
+            <p:cNvPr id="68" name="TextBox 67">
+              <a:extLst>
+                <a:ext uri="{FF2B5EF4-FFF2-40B4-BE49-F238E27FC236}">
+                  <a16:creationId xmlns:a16="http://schemas.microsoft.com/office/drawing/2014/main" id="{0720FA69-F30E-F5A8-44C6-3C542D551CA8}"/>
+                </a:ext>
+              </a:extLst>
+            </p:cNvPr>
+            <p:cNvSpPr txBox="1"/>
+            <p:nvPr/>
+          </p:nvSpPr>
+          <p:spPr>
+            <a:xfrm>
+              <a:off x="7126347" y="3868433"/>
+              <a:ext cx="635302" cy="369332"/>
+            </a:xfrm>
+            <a:prstGeom prst="rect">
+              <a:avLst/>
+            </a:prstGeom>
+            <a:noFill/>
+          </p:spPr>
+          <p:txBody>
+            <a:bodyPr wrap="none" rtlCol="0">
+              <a:spAutoFit/>
+            </a:bodyPr>
+            <a:lstStyle/>
+            <a:p>
+              <a:r>
+                <a:rPr lang="en-US" dirty="0"/>
+                <a:t>Wire</a:t>
+              </a:r>
+            </a:p>
+          </p:txBody>
+        </p:sp>
+        <p:pic>
+          <p:nvPicPr>
+            <p:cNvPr id="69" name="Picture 68" descr="Icon&#10;&#10;Description automatically generated">
+              <a:extLst>
+                <a:ext uri="{FF2B5EF4-FFF2-40B4-BE49-F238E27FC236}">
+                  <a16:creationId xmlns:a16="http://schemas.microsoft.com/office/drawing/2014/main" id="{B46F7F2C-3D51-98A9-A989-EF61FA97993D}"/>
+                </a:ext>
+              </a:extLst>
+            </p:cNvPr>
+            <p:cNvPicPr>
+              <a:picLocks noChangeAspect="1"/>
+            </p:cNvPicPr>
+            <p:nvPr/>
+          </p:nvPicPr>
+          <p:blipFill>
+            <a:blip r:embed="rId7"/>
+            <a:stretch>
+              <a:fillRect/>
+            </a:stretch>
+          </p:blipFill>
+          <p:spPr>
+            <a:xfrm>
+              <a:off x="7040622" y="3912883"/>
+              <a:ext cx="157693" cy="291085"/>
+            </a:xfrm>
+            <a:prstGeom prst="rect">
+              <a:avLst/>
+            </a:prstGeom>
+          </p:spPr>
+        </p:pic>
+      </p:grpSp>
+      <p:sp>
+        <p:nvSpPr>
+          <p:cNvPr id="70" name="TextBox 69">
+            <a:extLst>
+              <a:ext uri="{FF2B5EF4-FFF2-40B4-BE49-F238E27FC236}">
+                <a16:creationId xmlns:a16="http://schemas.microsoft.com/office/drawing/2014/main" id="{B86B66F7-FF09-3EA9-3A34-6F3D12841C81}"/>
+              </a:ext>
+            </a:extLst>
+          </p:cNvPr>
+          <p:cNvSpPr txBox="1"/>
+          <p:nvPr/>
+        </p:nvSpPr>
+        <p:spPr>
+          <a:xfrm>
+            <a:off x="8183729" y="2279641"/>
+            <a:ext cx="936212" cy="461665"/>
+          </a:xfrm>
+          <a:prstGeom prst="rect">
+            <a:avLst/>
+          </a:prstGeom>
+          <a:noFill/>
+        </p:spPr>
+        <p:txBody>
+          <a:bodyPr wrap="square" rtlCol="0">
+            <a:spAutoFit/>
+          </a:bodyPr>
+          <a:lstStyle/>
+          <a:p>
+            <a:r>
+              <a:rPr lang="en-US" sz="1200" dirty="0"/>
+              <a:t>Raspberry </a:t>
+            </a:r>
+          </a:p>
+          <a:p>
+            <a:r>
+              <a:rPr lang="en-US" sz="1200" dirty="0"/>
+              <a:t>Pi OS Full</a:t>
+            </a:r>
+          </a:p>
+        </p:txBody>
+      </p:sp>
+      <p:sp>
+        <p:nvSpPr>
+          <p:cNvPr id="71" name="Snip Single Corner Rectangle 70">
+            <a:extLst>
+              <a:ext uri="{FF2B5EF4-FFF2-40B4-BE49-F238E27FC236}">
+                <a16:creationId xmlns:a16="http://schemas.microsoft.com/office/drawing/2014/main" id="{2B173A64-FD99-CA6E-9A10-90C4A997FB9B}"/>
+              </a:ext>
+            </a:extLst>
+          </p:cNvPr>
+          <p:cNvSpPr/>
+          <p:nvPr/>
+        </p:nvSpPr>
+        <p:spPr>
+          <a:xfrm>
+            <a:off x="7801455" y="2356426"/>
+            <a:ext cx="291655" cy="317292"/>
+          </a:xfrm>
+          <a:prstGeom prst="snip1Rect">
+            <a:avLst/>
+          </a:prstGeom>
+        </p:spPr>
+        <p:style>
+          <a:lnRef idx="2">
+            <a:schemeClr val="accent2">
+              <a:shade val="50000"/>
+            </a:schemeClr>
+          </a:lnRef>
+          <a:fillRef idx="1">
+            <a:schemeClr val="accent2"/>
+          </a:fillRef>
+          <a:effectRef idx="0">
+            <a:schemeClr val="accent2"/>
+          </a:effectRef>
+          <a:fontRef idx="minor">
+            <a:schemeClr val="lt1"/>
+          </a:fontRef>
+        </p:style>
+        <p:txBody>
+          <a:bodyPr rtlCol="0" anchor="ctr"/>
+          <a:lstStyle/>
+          <a:p>
+            <a:pPr algn="ctr"/>
+            <a:r>
+              <a:rPr lang="en-US" dirty="0"/>
+              <a:t>F</a:t>
+            </a:r>
+          </a:p>
+        </p:txBody>
+      </p:sp>
+      <p:sp>
+        <p:nvSpPr>
+          <p:cNvPr id="72" name="Snip Single Corner Rectangle 71">
+            <a:extLst>
+              <a:ext uri="{FF2B5EF4-FFF2-40B4-BE49-F238E27FC236}">
+                <a16:creationId xmlns:a16="http://schemas.microsoft.com/office/drawing/2014/main" id="{771782E8-8256-10F9-FD97-7BF3CAF54876}"/>
+              </a:ext>
+            </a:extLst>
+          </p:cNvPr>
+          <p:cNvSpPr/>
+          <p:nvPr/>
+        </p:nvSpPr>
+        <p:spPr>
+          <a:xfrm>
+            <a:off x="2325147" y="2673275"/>
+            <a:ext cx="291655" cy="317292"/>
+          </a:xfrm>
+          <a:prstGeom prst="snip1Rect">
+            <a:avLst/>
+          </a:prstGeom>
+        </p:spPr>
+        <p:style>
+          <a:lnRef idx="2">
+            <a:schemeClr val="accent2">
+              <a:shade val="50000"/>
+            </a:schemeClr>
+          </a:lnRef>
+          <a:fillRef idx="1">
+            <a:schemeClr val="accent2"/>
+          </a:fillRef>
+          <a:effectRef idx="0">
+            <a:schemeClr val="accent2"/>
+          </a:effectRef>
+          <a:fontRef idx="minor">
+            <a:schemeClr val="lt1"/>
+          </a:fontRef>
+        </p:style>
+        <p:txBody>
+          <a:bodyPr rtlCol="0" anchor="ctr"/>
+          <a:lstStyle/>
+          <a:p>
+            <a:pPr algn="ctr"/>
+            <a:r>
+              <a:rPr lang="en-US" dirty="0"/>
+              <a:t>F</a:t>
+            </a:r>
+          </a:p>
+        </p:txBody>
+      </p:sp>
+      <p:sp>
+        <p:nvSpPr>
+          <p:cNvPr id="73" name="TextBox 72">
+            <a:extLst>
+              <a:ext uri="{FF2B5EF4-FFF2-40B4-BE49-F238E27FC236}">
+                <a16:creationId xmlns:a16="http://schemas.microsoft.com/office/drawing/2014/main" id="{4B7A7ED7-2B60-D934-764C-658581E03091}"/>
+              </a:ext>
+            </a:extLst>
+          </p:cNvPr>
+          <p:cNvSpPr txBox="1"/>
+          <p:nvPr/>
+        </p:nvSpPr>
+        <p:spPr>
+          <a:xfrm>
+            <a:off x="6074473" y="1970926"/>
+            <a:ext cx="499047" cy="369332"/>
+          </a:xfrm>
+          <a:prstGeom prst="rect">
+            <a:avLst/>
+          </a:prstGeom>
+          <a:noFill/>
+        </p:spPr>
+        <p:txBody>
+          <a:bodyPr wrap="none" rtlCol="0">
+            <a:spAutoFit/>
+          </a:bodyPr>
+          <a:lstStyle/>
+          <a:p>
+            <a:r>
+              <a:rPr lang="en-US" dirty="0"/>
+              <a:t>red</a:t>
+            </a:r>
+          </a:p>
+        </p:txBody>
+      </p:sp>
+      <p:sp>
+        <p:nvSpPr>
+          <p:cNvPr id="74" name="TextBox 73">
+            <a:extLst>
+              <a:ext uri="{FF2B5EF4-FFF2-40B4-BE49-F238E27FC236}">
+                <a16:creationId xmlns:a16="http://schemas.microsoft.com/office/drawing/2014/main" id="{F3FBC2E6-6E66-869B-6800-619161B50F78}"/>
+              </a:ext>
+            </a:extLst>
+          </p:cNvPr>
+          <p:cNvSpPr txBox="1"/>
+          <p:nvPr/>
+        </p:nvSpPr>
+        <p:spPr>
+          <a:xfrm>
+            <a:off x="3086432" y="5019075"/>
+            <a:ext cx="733086" cy="369332"/>
+          </a:xfrm>
+          <a:prstGeom prst="rect">
+            <a:avLst/>
+          </a:prstGeom>
+          <a:noFill/>
+        </p:spPr>
+        <p:txBody>
+          <a:bodyPr wrap="none" rtlCol="0">
+            <a:spAutoFit/>
+          </a:bodyPr>
+          <a:lstStyle/>
+          <a:p>
+            <a:r>
+              <a:rPr lang="en-US" dirty="0"/>
+              <a:t>red01</a:t>
+            </a:r>
+          </a:p>
+        </p:txBody>
+      </p:sp>
+      <p:sp>
+        <p:nvSpPr>
+          <p:cNvPr id="75" name="TextBox 74">
+            <a:extLst>
+              <a:ext uri="{FF2B5EF4-FFF2-40B4-BE49-F238E27FC236}">
+                <a16:creationId xmlns:a16="http://schemas.microsoft.com/office/drawing/2014/main" id="{FC813842-FCDA-31F3-41C0-7262238EFB4E}"/>
+              </a:ext>
+            </a:extLst>
+          </p:cNvPr>
+          <p:cNvSpPr txBox="1"/>
+          <p:nvPr/>
+        </p:nvSpPr>
+        <p:spPr>
+          <a:xfrm>
+            <a:off x="4688596" y="5006721"/>
+            <a:ext cx="733086" cy="369332"/>
+          </a:xfrm>
+          <a:prstGeom prst="rect">
+            <a:avLst/>
+          </a:prstGeom>
+          <a:noFill/>
+        </p:spPr>
+        <p:txBody>
+          <a:bodyPr wrap="none" rtlCol="0">
+            <a:spAutoFit/>
+          </a:bodyPr>
+          <a:lstStyle/>
+          <a:p>
+            <a:r>
+              <a:rPr lang="en-US" dirty="0"/>
+              <a:t>red02</a:t>
+            </a:r>
+          </a:p>
+        </p:txBody>
+      </p:sp>
+      <p:sp>
+        <p:nvSpPr>
+          <p:cNvPr id="76" name="TextBox 75">
+            <a:extLst>
+              <a:ext uri="{FF2B5EF4-FFF2-40B4-BE49-F238E27FC236}">
+                <a16:creationId xmlns:a16="http://schemas.microsoft.com/office/drawing/2014/main" id="{020B9F59-23DD-7EC4-3F55-4207F10D7C47}"/>
+              </a:ext>
+            </a:extLst>
+          </p:cNvPr>
+          <p:cNvSpPr txBox="1"/>
+          <p:nvPr/>
+        </p:nvSpPr>
+        <p:spPr>
+          <a:xfrm>
+            <a:off x="6283384" y="5006721"/>
+            <a:ext cx="733086" cy="369332"/>
+          </a:xfrm>
+          <a:prstGeom prst="rect">
+            <a:avLst/>
+          </a:prstGeom>
+          <a:noFill/>
+        </p:spPr>
+        <p:txBody>
+          <a:bodyPr wrap="none" rtlCol="0">
+            <a:spAutoFit/>
+          </a:bodyPr>
+          <a:lstStyle/>
+          <a:p>
+            <a:r>
+              <a:rPr lang="en-US" dirty="0"/>
+              <a:t>red03</a:t>
+            </a:r>
+          </a:p>
+        </p:txBody>
+      </p:sp>
+      <p:sp>
+        <p:nvSpPr>
+          <p:cNvPr id="77" name="TextBox 76">
+            <a:extLst>
+              <a:ext uri="{FF2B5EF4-FFF2-40B4-BE49-F238E27FC236}">
+                <a16:creationId xmlns:a16="http://schemas.microsoft.com/office/drawing/2014/main" id="{013987CC-C791-3D7A-1C5C-EBC611964832}"/>
+              </a:ext>
+            </a:extLst>
+          </p:cNvPr>
+          <p:cNvSpPr txBox="1"/>
+          <p:nvPr/>
+        </p:nvSpPr>
+        <p:spPr>
+          <a:xfrm>
+            <a:off x="7907134" y="5006721"/>
+            <a:ext cx="733086" cy="369332"/>
+          </a:xfrm>
+          <a:prstGeom prst="rect">
+            <a:avLst/>
+          </a:prstGeom>
+          <a:noFill/>
+        </p:spPr>
+        <p:txBody>
+          <a:bodyPr wrap="none" rtlCol="0">
+            <a:spAutoFit/>
+          </a:bodyPr>
+          <a:lstStyle/>
+          <a:p>
+            <a:r>
+              <a:rPr lang="en-US" dirty="0"/>
+              <a:t>red04</a:t>
+            </a:r>
+          </a:p>
+        </p:txBody>
+      </p:sp>
+    </p:spTree>
+    <p:extLst>
+      <p:ext uri="{BB962C8B-B14F-4D97-AF65-F5344CB8AC3E}">
+        <p14:creationId xmlns:p14="http://schemas.microsoft.com/office/powerpoint/2010/main" val="275573843"/>
+      </p:ext>
+    </p:extLst>
+  </p:cSld>
+  <p:clrMapOvr>
+    <a:masterClrMapping/>
+  </p:clrMapOvr>
+</p:sld>
+</file>
+
+<file path=ppt/slides/slide7.xml><?xml version="1.0" encoding="utf-8"?>
 <p:sld xmlns:a="http://schemas.openxmlformats.org/drawingml/2006/main" xmlns:r="http://schemas.openxmlformats.org/officeDocument/2006/relationships" xmlns:p="http://schemas.openxmlformats.org/presentationml/2006/main">
   <p:cSld>
     <p:spTree>
@@ -12448,4 +16798,299 @@
     </a:ext>
   </a:extLst>
 </a:theme>
+</file>
+
+<file path=ppt/theme/theme2.xml><?xml version="1.0" encoding="utf-8"?>
+<a:theme xmlns:a="http://schemas.openxmlformats.org/drawingml/2006/main" name="Office Theme">
+  <a:themeElements>
+    <a:clrScheme name="Office">
+      <a:dk1>
+        <a:sysClr val="windowText" lastClr="000000"/>
+      </a:dk1>
+      <a:lt1>
+        <a:sysClr val="window" lastClr="FFFFFF"/>
+      </a:lt1>
+      <a:dk2>
+        <a:srgbClr val="44546A"/>
+      </a:dk2>
+      <a:lt2>
+        <a:srgbClr val="E7E6E6"/>
+      </a:lt2>
+      <a:accent1>
+        <a:srgbClr val="4472C4"/>
+      </a:accent1>
+      <a:accent2>
+        <a:srgbClr val="ED7D31"/>
+      </a:accent2>
+      <a:accent3>
+        <a:srgbClr val="A5A5A5"/>
+      </a:accent3>
+      <a:accent4>
+        <a:srgbClr val="FFC000"/>
+      </a:accent4>
+      <a:accent5>
+        <a:srgbClr val="5B9BD5"/>
+      </a:accent5>
+      <a:accent6>
+        <a:srgbClr val="70AD47"/>
+      </a:accent6>
+      <a:hlink>
+        <a:srgbClr val="0563C1"/>
+      </a:hlink>
+      <a:folHlink>
+        <a:srgbClr val="954F72"/>
+      </a:folHlink>
+    </a:clrScheme>
+    <a:fontScheme name="Office">
+      <a:majorFont>
+        <a:latin typeface="Calibri Light" panose="020F0302020204030204"/>
+        <a:ea typeface=""/>
+        <a:cs typeface=""/>
+        <a:font script="Jpan" typeface="游ゴシック Light"/>
+        <a:font script="Hang" typeface="맑은 고딕"/>
+        <a:font script="Hans" typeface="等线 Light"/>
+        <a:font script="Hant" typeface="新細明體"/>
+        <a:font script="Arab" typeface="Times New Roman"/>
+        <a:font script="Hebr" typeface="Times New Roman"/>
+        <a:font script="Thai" typeface="Angsana New"/>
+        <a:font script="Ethi" typeface="Nyala"/>
+        <a:font script="Beng" typeface="Vrinda"/>
+        <a:font script="Gujr" typeface="Shruti"/>
+        <a:font script="Khmr" typeface="MoolBoran"/>
+        <a:font script="Knda" typeface="Tunga"/>
+        <a:font script="Guru" typeface="Raavi"/>
+        <a:font script="Cans" typeface="Euphemia"/>
+        <a:font script="Cher" typeface="Plantagenet Cherokee"/>
+        <a:font script="Yiii" typeface="Microsoft Yi Baiti"/>
+        <a:font script="Tibt" typeface="Microsoft Himalaya"/>
+        <a:font script="Thaa" typeface="MV Boli"/>
+        <a:font script="Deva" typeface="Mangal"/>
+        <a:font script="Telu" typeface="Gautami"/>
+        <a:font script="Taml" typeface="Latha"/>
+        <a:font script="Syrc" typeface="Estrangelo Edessa"/>
+        <a:font script="Orya" typeface="Kalinga"/>
+        <a:font script="Mlym" typeface="Kartika"/>
+        <a:font script="Laoo" typeface="DokChampa"/>
+        <a:font script="Sinh" typeface="Iskoola Pota"/>
+        <a:font script="Mong" typeface="Mongolian Baiti"/>
+        <a:font script="Viet" typeface="Times New Roman"/>
+        <a:font script="Uigh" typeface="Microsoft Uighur"/>
+        <a:font script="Geor" typeface="Sylfaen"/>
+        <a:font script="Armn" typeface="Arial"/>
+        <a:font script="Bugi" typeface="Leelawadee UI"/>
+        <a:font script="Bopo" typeface="Microsoft JhengHei"/>
+        <a:font script="Java" typeface="Javanese Text"/>
+        <a:font script="Lisu" typeface="Segoe UI"/>
+        <a:font script="Mymr" typeface="Myanmar Text"/>
+        <a:font script="Nkoo" typeface="Ebrima"/>
+        <a:font script="Olck" typeface="Nirmala UI"/>
+        <a:font script="Osma" typeface="Ebrima"/>
+        <a:font script="Phag" typeface="Phagspa"/>
+        <a:font script="Syrn" typeface="Estrangelo Edessa"/>
+        <a:font script="Syrj" typeface="Estrangelo Edessa"/>
+        <a:font script="Syre" typeface="Estrangelo Edessa"/>
+        <a:font script="Sora" typeface="Nirmala UI"/>
+        <a:font script="Tale" typeface="Microsoft Tai Le"/>
+        <a:font script="Talu" typeface="Microsoft New Tai Lue"/>
+        <a:font script="Tfng" typeface="Ebrima"/>
+      </a:majorFont>
+      <a:minorFont>
+        <a:latin typeface="Calibri" panose="020F0502020204030204"/>
+        <a:ea typeface=""/>
+        <a:cs typeface=""/>
+        <a:font script="Jpan" typeface="游ゴシック"/>
+        <a:font script="Hang" typeface="맑은 고딕"/>
+        <a:font script="Hans" typeface="等线"/>
+        <a:font script="Hant" typeface="新細明體"/>
+        <a:font script="Arab" typeface="Arial"/>
+        <a:font script="Hebr" typeface="Arial"/>
+        <a:font script="Thai" typeface="Cordia New"/>
+        <a:font script="Ethi" typeface="Nyala"/>
+        <a:font script="Beng" typeface="Vrinda"/>
+        <a:font script="Gujr" typeface="Shruti"/>
+        <a:font script="Khmr" typeface="DaunPenh"/>
+        <a:font script="Knda" typeface="Tunga"/>
+        <a:font script="Guru" typeface="Raavi"/>
+        <a:font script="Cans" typeface="Euphemia"/>
+        <a:font script="Cher" typeface="Plantagenet Cherokee"/>
+        <a:font script="Yiii" typeface="Microsoft Yi Baiti"/>
+        <a:font script="Tibt" typeface="Microsoft Himalaya"/>
+        <a:font script="Thaa" typeface="MV Boli"/>
+        <a:font script="Deva" typeface="Mangal"/>
+        <a:font script="Telu" typeface="Gautami"/>
+        <a:font script="Taml" typeface="Latha"/>
+        <a:font script="Syrc" typeface="Estrangelo Edessa"/>
+        <a:font script="Orya" typeface="Kalinga"/>
+        <a:font script="Mlym" typeface="Kartika"/>
+        <a:font script="Laoo" typeface="DokChampa"/>
+        <a:font script="Sinh" typeface="Iskoola Pota"/>
+        <a:font script="Mong" typeface="Mongolian Baiti"/>
+        <a:font script="Viet" typeface="Arial"/>
+        <a:font script="Uigh" typeface="Microsoft Uighur"/>
+        <a:font script="Geor" typeface="Sylfaen"/>
+        <a:font script="Armn" typeface="Arial"/>
+        <a:font script="Bugi" typeface="Leelawadee UI"/>
+        <a:font script="Bopo" typeface="Microsoft JhengHei"/>
+        <a:font script="Java" typeface="Javanese Text"/>
+        <a:font script="Lisu" typeface="Segoe UI"/>
+        <a:font script="Mymr" typeface="Myanmar Text"/>
+        <a:font script="Nkoo" typeface="Ebrima"/>
+        <a:font script="Olck" typeface="Nirmala UI"/>
+        <a:font script="Osma" typeface="Ebrima"/>
+        <a:font script="Phag" typeface="Phagspa"/>
+        <a:font script="Syrn" typeface="Estrangelo Edessa"/>
+        <a:font script="Syrj" typeface="Estrangelo Edessa"/>
+        <a:font script="Syre" typeface="Estrangelo Edessa"/>
+        <a:font script="Sora" typeface="Nirmala UI"/>
+        <a:font script="Tale" typeface="Microsoft Tai Le"/>
+        <a:font script="Talu" typeface="Microsoft New Tai Lue"/>
+        <a:font script="Tfng" typeface="Ebrima"/>
+      </a:minorFont>
+    </a:fontScheme>
+    <a:fmtScheme name="Office">
+      <a:fillStyleLst>
+        <a:solidFill>
+          <a:schemeClr val="phClr"/>
+        </a:solidFill>
+        <a:gradFill rotWithShape="1">
+          <a:gsLst>
+            <a:gs pos="0">
+              <a:schemeClr val="phClr">
+                <a:lumMod val="110000"/>
+                <a:satMod val="105000"/>
+                <a:tint val="67000"/>
+              </a:schemeClr>
+            </a:gs>
+            <a:gs pos="50000">
+              <a:schemeClr val="phClr">
+                <a:lumMod val="105000"/>
+                <a:satMod val="103000"/>
+                <a:tint val="73000"/>
+              </a:schemeClr>
+            </a:gs>
+            <a:gs pos="100000">
+              <a:schemeClr val="phClr">
+                <a:lumMod val="105000"/>
+                <a:satMod val="109000"/>
+                <a:tint val="81000"/>
+              </a:schemeClr>
+            </a:gs>
+          </a:gsLst>
+          <a:lin ang="5400000" scaled="0"/>
+        </a:gradFill>
+        <a:gradFill rotWithShape="1">
+          <a:gsLst>
+            <a:gs pos="0">
+              <a:schemeClr val="phClr">
+                <a:satMod val="103000"/>
+                <a:lumMod val="102000"/>
+                <a:tint val="94000"/>
+              </a:schemeClr>
+            </a:gs>
+            <a:gs pos="50000">
+              <a:schemeClr val="phClr">
+                <a:satMod val="110000"/>
+                <a:lumMod val="100000"/>
+                <a:shade val="100000"/>
+              </a:schemeClr>
+            </a:gs>
+            <a:gs pos="100000">
+              <a:schemeClr val="phClr">
+                <a:lumMod val="99000"/>
+                <a:satMod val="120000"/>
+                <a:shade val="78000"/>
+              </a:schemeClr>
+            </a:gs>
+          </a:gsLst>
+          <a:lin ang="5400000" scaled="0"/>
+        </a:gradFill>
+      </a:fillStyleLst>
+      <a:lnStyleLst>
+        <a:ln w="6350" cap="flat" cmpd="sng" algn="ctr">
+          <a:solidFill>
+            <a:schemeClr val="phClr"/>
+          </a:solidFill>
+          <a:prstDash val="solid"/>
+          <a:miter lim="800000"/>
+        </a:ln>
+        <a:ln w="12700" cap="flat" cmpd="sng" algn="ctr">
+          <a:solidFill>
+            <a:schemeClr val="phClr"/>
+          </a:solidFill>
+          <a:prstDash val="solid"/>
+          <a:miter lim="800000"/>
+        </a:ln>
+        <a:ln w="19050" cap="flat" cmpd="sng" algn="ctr">
+          <a:solidFill>
+            <a:schemeClr val="phClr"/>
+          </a:solidFill>
+          <a:prstDash val="solid"/>
+          <a:miter lim="800000"/>
+        </a:ln>
+      </a:lnStyleLst>
+      <a:effectStyleLst>
+        <a:effectStyle>
+          <a:effectLst/>
+        </a:effectStyle>
+        <a:effectStyle>
+          <a:effectLst/>
+        </a:effectStyle>
+        <a:effectStyle>
+          <a:effectLst>
+            <a:outerShdw blurRad="57150" dist="19050" dir="5400000" algn="ctr" rotWithShape="0">
+              <a:srgbClr val="000000">
+                <a:alpha val="63000"/>
+              </a:srgbClr>
+            </a:outerShdw>
+          </a:effectLst>
+        </a:effectStyle>
+      </a:effectStyleLst>
+      <a:bgFillStyleLst>
+        <a:solidFill>
+          <a:schemeClr val="phClr"/>
+        </a:solidFill>
+        <a:solidFill>
+          <a:schemeClr val="phClr">
+            <a:tint val="95000"/>
+            <a:satMod val="170000"/>
+          </a:schemeClr>
+        </a:solidFill>
+        <a:gradFill rotWithShape="1">
+          <a:gsLst>
+            <a:gs pos="0">
+              <a:schemeClr val="phClr">
+                <a:tint val="93000"/>
+                <a:satMod val="150000"/>
+                <a:shade val="98000"/>
+                <a:lumMod val="102000"/>
+              </a:schemeClr>
+            </a:gs>
+            <a:gs pos="50000">
+              <a:schemeClr val="phClr">
+                <a:tint val="98000"/>
+                <a:satMod val="130000"/>
+                <a:shade val="90000"/>
+                <a:lumMod val="103000"/>
+              </a:schemeClr>
+            </a:gs>
+            <a:gs pos="100000">
+              <a:schemeClr val="phClr">
+                <a:shade val="63000"/>
+                <a:satMod val="120000"/>
+              </a:schemeClr>
+            </a:gs>
+          </a:gsLst>
+          <a:lin ang="5400000" scaled="0"/>
+        </a:gradFill>
+      </a:bgFillStyleLst>
+    </a:fmtScheme>
+  </a:themeElements>
+  <a:objectDefaults/>
+  <a:extraClrSchemeLst/>
+  <a:extLst>
+    <a:ext uri="{05A4C25C-085E-4340-85A3-A5531E510DB2}">
+      <thm15:themeFamily xmlns:thm15="http://schemas.microsoft.com/office/thememl/2012/main" name="Office Theme" id="{62F939B6-93AF-4DB8-9C6B-D6C7DFDC589F}" vid="{4A3C46E8-61CC-4603-A589-7422A47A8E4A}"/>
+    </a:ext>
+  </a:extLst>
+</a:theme>
 </file>
</xml_diff>